<commit_message>
Added links to table, and a 'Links' directory
I put down some comments in Links/promisingDatasets.txt
i.e. the links and how I think they can be used. I am currently
downloading the datasets.
</commit_message>
<xml_diff>
--- a/Proposal/Project Proposal.pptx
+++ b/Proposal/Project Proposal.pptx
@@ -1,6 +1,6 @@
 
 <file path=ppt/presentation.xml><?xml version="1.0" encoding="utf-8"?>
-<p:presentation xmlns:a="http://schemas.openxmlformats.org/drawingml/2006/main" xmlns:r="http://schemas.openxmlformats.org/officeDocument/2006/relationships" xmlns:p="http://schemas.openxmlformats.org/presentationml/2006/main" showSpecialPlsOnTitleSld="0" saveSubsetFonts="1">
+<p:presentation xmlns:a="http://schemas.openxmlformats.org/drawingml/2006/main" xmlns:r="http://schemas.openxmlformats.org/officeDocument/2006/relationships" xmlns:mc="http://schemas.openxmlformats.org/markup-compatibility/2006" xmlns:mv="urn:schemas-microsoft-com:mac:vml" xmlns:p="http://schemas.openxmlformats.org/presentationml/2006/main" mc:Ignorable="mv" mc:PreserveAttributes="mv:*" showSpecialPlsOnTitleSld="0" saveSubsetFonts="1">
   <p:sldMasterIdLst>
     <p:sldMasterId id="2147483886" r:id="rId1"/>
     <p:sldMasterId id="2147483888" r:id="rId2"/>
@@ -142,7 +142,7 @@
 </file>
 
 <file path=ppt/notesMasters/notesMaster1.xml><?xml version="1.0" encoding="utf-8"?>
-<p:notesMaster xmlns:a="http://schemas.openxmlformats.org/drawingml/2006/main" xmlns:r="http://schemas.openxmlformats.org/officeDocument/2006/relationships" xmlns:p="http://schemas.openxmlformats.org/presentationml/2006/main">
+<p:notesMaster xmlns:a="http://schemas.openxmlformats.org/drawingml/2006/main" xmlns:r="http://schemas.openxmlformats.org/officeDocument/2006/relationships" xmlns:mc="http://schemas.openxmlformats.org/markup-compatibility/2006" xmlns:mv="urn:schemas-microsoft-com:mac:vml" xmlns:p="http://schemas.openxmlformats.org/presentationml/2006/main" mc:Ignorable="mv" mc:PreserveAttributes="mv:*">
   <p:cSld>
     <p:bg>
       <p:bgPr>
@@ -191,14 +191,14 @@
           <a:effectLst/>
           <a:extLst>
             <a:ext uri="{909E8E84-426E-40DD-AFC4-6F175D3DCCD1}">
-              <a14:hiddenFill xmlns:a14="http://schemas.microsoft.com/office/drawing/2010/main">
+              <a14:hiddenFill xmlns:a14="http://schemas.microsoft.com/office/drawing/2010/main" xmlns:p="http://schemas.openxmlformats.org/presentationml/2006/main" xmlns:r="http://schemas.openxmlformats.org/officeDocument/2006/relationships" xmlns:a="http://schemas.openxmlformats.org/drawingml/2006/main" xmlns="">
                 <a:solidFill>
                   <a:schemeClr val="accent1"/>
                 </a:solidFill>
               </a14:hiddenFill>
             </a:ext>
             <a:ext uri="{91240B29-F687-4F45-9708-019B960494DF}">
-              <a14:hiddenLine xmlns:a14="http://schemas.microsoft.com/office/drawing/2010/main" w="9525">
+              <a14:hiddenLine xmlns:a14="http://schemas.microsoft.com/office/drawing/2010/main" xmlns:p="http://schemas.openxmlformats.org/presentationml/2006/main" xmlns:r="http://schemas.openxmlformats.org/officeDocument/2006/relationships" xmlns:a="http://schemas.openxmlformats.org/drawingml/2006/main" xmlns="" w="9525">
                 <a:solidFill>
                   <a:schemeClr val="tx1"/>
                 </a:solidFill>
@@ -208,7 +208,7 @@
               </a14:hiddenLine>
             </a:ext>
             <a:ext uri="{AF507438-7753-43E0-B8FC-AC1667EBCBE1}">
-              <a14:hiddenEffects xmlns:a14="http://schemas.microsoft.com/office/drawing/2010/main">
+              <a14:hiddenEffects xmlns:a14="http://schemas.microsoft.com/office/drawing/2010/main" xmlns:p="http://schemas.openxmlformats.org/presentationml/2006/main" xmlns:r="http://schemas.openxmlformats.org/officeDocument/2006/relationships" xmlns:a="http://schemas.openxmlformats.org/drawingml/2006/main" xmlns="">
                 <a:effectLst>
                   <a:outerShdw dist="35921" dir="2700000" algn="ctr" rotWithShape="0">
                     <a:schemeClr val="bg2"/>
@@ -264,14 +264,14 @@
           <a:effectLst/>
           <a:extLst>
             <a:ext uri="{909E8E84-426E-40DD-AFC4-6F175D3DCCD1}">
-              <a14:hiddenFill xmlns:a14="http://schemas.microsoft.com/office/drawing/2010/main">
+              <a14:hiddenFill xmlns:a14="http://schemas.microsoft.com/office/drawing/2010/main" xmlns:p="http://schemas.openxmlformats.org/presentationml/2006/main" xmlns:r="http://schemas.openxmlformats.org/officeDocument/2006/relationships" xmlns:a="http://schemas.openxmlformats.org/drawingml/2006/main" xmlns="">
                 <a:solidFill>
                   <a:schemeClr val="accent1"/>
                 </a:solidFill>
               </a14:hiddenFill>
             </a:ext>
             <a:ext uri="{91240B29-F687-4F45-9708-019B960494DF}">
-              <a14:hiddenLine xmlns:a14="http://schemas.microsoft.com/office/drawing/2010/main" w="9525">
+              <a14:hiddenLine xmlns:a14="http://schemas.microsoft.com/office/drawing/2010/main" xmlns:p="http://schemas.openxmlformats.org/presentationml/2006/main" xmlns:r="http://schemas.openxmlformats.org/officeDocument/2006/relationships" xmlns:a="http://schemas.openxmlformats.org/drawingml/2006/main" xmlns="" w="9525">
                 <a:solidFill>
                   <a:schemeClr val="tx1"/>
                 </a:solidFill>
@@ -281,7 +281,7 @@
               </a14:hiddenLine>
             </a:ext>
             <a:ext uri="{AF507438-7753-43E0-B8FC-AC1667EBCBE1}">
-              <a14:hiddenEffects xmlns:a14="http://schemas.microsoft.com/office/drawing/2010/main">
+              <a14:hiddenEffects xmlns:a14="http://schemas.microsoft.com/office/drawing/2010/main" xmlns:p="http://schemas.openxmlformats.org/presentationml/2006/main" xmlns:r="http://schemas.openxmlformats.org/officeDocument/2006/relationships" xmlns:a="http://schemas.openxmlformats.org/drawingml/2006/main" xmlns="">
                 <a:effectLst>
                   <a:outerShdw dist="35921" dir="2700000" algn="ctr" rotWithShape="0">
                     <a:schemeClr val="bg2"/>
@@ -342,14 +342,14 @@
           <a:effectLst/>
           <a:extLst>
             <a:ext uri="{909E8E84-426E-40DD-AFC4-6F175D3DCCD1}">
-              <a14:hiddenFill xmlns:a14="http://schemas.microsoft.com/office/drawing/2010/main">
+              <a14:hiddenFill xmlns:a14="http://schemas.microsoft.com/office/drawing/2010/main" xmlns:p="http://schemas.openxmlformats.org/presentationml/2006/main" xmlns:r="http://schemas.openxmlformats.org/officeDocument/2006/relationships" xmlns:a="http://schemas.openxmlformats.org/drawingml/2006/main" xmlns="">
                 <a:solidFill>
                   <a:srgbClr val="FFFFFF"/>
                 </a:solidFill>
               </a14:hiddenFill>
             </a:ext>
             <a:ext uri="{AF507438-7753-43E0-B8FC-AC1667EBCBE1}">
-              <a14:hiddenEffects xmlns:a14="http://schemas.microsoft.com/office/drawing/2010/main">
+              <a14:hiddenEffects xmlns:a14="http://schemas.microsoft.com/office/drawing/2010/main" xmlns:p="http://schemas.openxmlformats.org/presentationml/2006/main" xmlns:r="http://schemas.openxmlformats.org/officeDocument/2006/relationships" xmlns:a="http://schemas.openxmlformats.org/drawingml/2006/main" xmlns="">
                 <a:effectLst>
                   <a:outerShdw dist="35921" dir="2700000" algn="ctr" rotWithShape="0">
                     <a:srgbClr val="808080"/>
@@ -358,7 +358,7 @@
               </a14:hiddenEffects>
             </a:ext>
             <a:ext uri="{53640926-AAD7-44D8-BBD7-CCE9431645EC}">
-              <a14:shadowObscured xmlns:a14="http://schemas.microsoft.com/office/drawing/2010/main" val="1"/>
+              <a14:shadowObscured xmlns:a14="http://schemas.microsoft.com/office/drawing/2010/main" xmlns:p="http://schemas.openxmlformats.org/presentationml/2006/main" xmlns:r="http://schemas.openxmlformats.org/officeDocument/2006/relationships" xmlns:a="http://schemas.openxmlformats.org/drawingml/2006/main" xmlns="" val="1"/>
             </a:ext>
           </a:extLst>
         </p:spPr>
@@ -388,14 +388,14 @@
           <a:effectLst/>
           <a:extLst>
             <a:ext uri="{909E8E84-426E-40DD-AFC4-6F175D3DCCD1}">
-              <a14:hiddenFill xmlns:a14="http://schemas.microsoft.com/office/drawing/2010/main">
+              <a14:hiddenFill xmlns:a14="http://schemas.microsoft.com/office/drawing/2010/main" xmlns:p="http://schemas.openxmlformats.org/presentationml/2006/main" xmlns:r="http://schemas.openxmlformats.org/officeDocument/2006/relationships" xmlns:a="http://schemas.openxmlformats.org/drawingml/2006/main" xmlns="">
                 <a:solidFill>
                   <a:schemeClr val="accent1"/>
                 </a:solidFill>
               </a14:hiddenFill>
             </a:ext>
             <a:ext uri="{91240B29-F687-4F45-9708-019B960494DF}">
-              <a14:hiddenLine xmlns:a14="http://schemas.microsoft.com/office/drawing/2010/main" w="9525">
+              <a14:hiddenLine xmlns:a14="http://schemas.microsoft.com/office/drawing/2010/main" xmlns:p="http://schemas.openxmlformats.org/presentationml/2006/main" xmlns:r="http://schemas.openxmlformats.org/officeDocument/2006/relationships" xmlns:a="http://schemas.openxmlformats.org/drawingml/2006/main" xmlns="" w="9525">
                 <a:solidFill>
                   <a:schemeClr val="tx1"/>
                 </a:solidFill>
@@ -405,7 +405,7 @@
               </a14:hiddenLine>
             </a:ext>
             <a:ext uri="{AF507438-7753-43E0-B8FC-AC1667EBCBE1}">
-              <a14:hiddenEffects xmlns:a14="http://schemas.microsoft.com/office/drawing/2010/main">
+              <a14:hiddenEffects xmlns:a14="http://schemas.microsoft.com/office/drawing/2010/main" xmlns:p="http://schemas.openxmlformats.org/presentationml/2006/main" xmlns:r="http://schemas.openxmlformats.org/officeDocument/2006/relationships" xmlns:a="http://schemas.openxmlformats.org/drawingml/2006/main" xmlns="">
                 <a:effectLst>
                   <a:outerShdw dist="35921" dir="2700000" algn="ctr" rotWithShape="0">
                     <a:schemeClr val="bg2"/>
@@ -484,14 +484,14 @@
           <a:effectLst/>
           <a:extLst>
             <a:ext uri="{909E8E84-426E-40DD-AFC4-6F175D3DCCD1}">
-              <a14:hiddenFill xmlns:a14="http://schemas.microsoft.com/office/drawing/2010/main">
+              <a14:hiddenFill xmlns:a14="http://schemas.microsoft.com/office/drawing/2010/main" xmlns:p="http://schemas.openxmlformats.org/presentationml/2006/main" xmlns:r="http://schemas.openxmlformats.org/officeDocument/2006/relationships" xmlns:a="http://schemas.openxmlformats.org/drawingml/2006/main" xmlns="">
                 <a:solidFill>
                   <a:schemeClr val="accent1"/>
                 </a:solidFill>
               </a14:hiddenFill>
             </a:ext>
             <a:ext uri="{91240B29-F687-4F45-9708-019B960494DF}">
-              <a14:hiddenLine xmlns:a14="http://schemas.microsoft.com/office/drawing/2010/main" w="9525">
+              <a14:hiddenLine xmlns:a14="http://schemas.microsoft.com/office/drawing/2010/main" xmlns:p="http://schemas.openxmlformats.org/presentationml/2006/main" xmlns:r="http://schemas.openxmlformats.org/officeDocument/2006/relationships" xmlns:a="http://schemas.openxmlformats.org/drawingml/2006/main" xmlns="" w="9525">
                 <a:solidFill>
                   <a:schemeClr val="tx1"/>
                 </a:solidFill>
@@ -501,7 +501,7 @@
               </a14:hiddenLine>
             </a:ext>
             <a:ext uri="{AF507438-7753-43E0-B8FC-AC1667EBCBE1}">
-              <a14:hiddenEffects xmlns:a14="http://schemas.microsoft.com/office/drawing/2010/main">
+              <a14:hiddenEffects xmlns:a14="http://schemas.microsoft.com/office/drawing/2010/main" xmlns:p="http://schemas.openxmlformats.org/presentationml/2006/main" xmlns:r="http://schemas.openxmlformats.org/officeDocument/2006/relationships" xmlns:a="http://schemas.openxmlformats.org/drawingml/2006/main" xmlns="">
                 <a:effectLst>
                   <a:outerShdw dist="35921" dir="2700000" algn="ctr" rotWithShape="0">
                     <a:schemeClr val="bg2"/>
@@ -557,14 +557,14 @@
           <a:effectLst/>
           <a:extLst>
             <a:ext uri="{909E8E84-426E-40DD-AFC4-6F175D3DCCD1}">
-              <a14:hiddenFill xmlns:a14="http://schemas.microsoft.com/office/drawing/2010/main">
+              <a14:hiddenFill xmlns:a14="http://schemas.microsoft.com/office/drawing/2010/main" xmlns:p="http://schemas.openxmlformats.org/presentationml/2006/main" xmlns:r="http://schemas.openxmlformats.org/officeDocument/2006/relationships" xmlns:a="http://schemas.openxmlformats.org/drawingml/2006/main" xmlns="">
                 <a:solidFill>
                   <a:schemeClr val="accent1"/>
                 </a:solidFill>
               </a14:hiddenFill>
             </a:ext>
             <a:ext uri="{91240B29-F687-4F45-9708-019B960494DF}">
-              <a14:hiddenLine xmlns:a14="http://schemas.microsoft.com/office/drawing/2010/main" w="9525">
+              <a14:hiddenLine xmlns:a14="http://schemas.microsoft.com/office/drawing/2010/main" xmlns:p="http://schemas.openxmlformats.org/presentationml/2006/main" xmlns:r="http://schemas.openxmlformats.org/officeDocument/2006/relationships" xmlns:a="http://schemas.openxmlformats.org/drawingml/2006/main" xmlns="" w="9525">
                 <a:solidFill>
                   <a:schemeClr val="tx1"/>
                 </a:solidFill>
@@ -574,7 +574,7 @@
               </a14:hiddenLine>
             </a:ext>
             <a:ext uri="{AF507438-7753-43E0-B8FC-AC1667EBCBE1}">
-              <a14:hiddenEffects xmlns:a14="http://schemas.microsoft.com/office/drawing/2010/main">
+              <a14:hiddenEffects xmlns:a14="http://schemas.microsoft.com/office/drawing/2010/main" xmlns:p="http://schemas.openxmlformats.org/presentationml/2006/main" xmlns:r="http://schemas.openxmlformats.org/officeDocument/2006/relationships" xmlns:a="http://schemas.openxmlformats.org/drawingml/2006/main" xmlns="">
                 <a:effectLst>
                   <a:outerShdw dist="35921" dir="2700000" algn="ctr" rotWithShape="0">
                     <a:schemeClr val="bg2"/>
@@ -615,7 +615,7 @@
     </p:spTree>
     <p:extLst>
       <p:ext uri="{BB962C8B-B14F-4D97-AF65-F5344CB8AC3E}">
-        <p14:creationId xmlns:p14="http://schemas.microsoft.com/office/powerpoint/2010/main" val="1219703977"/>
+        <p14:creationId xmlns:p14="http://schemas.microsoft.com/office/powerpoint/2010/main" xmlns:p="http://schemas.openxmlformats.org/presentationml/2006/main" xmlns:r="http://schemas.openxmlformats.org/officeDocument/2006/relationships" xmlns:a="http://schemas.openxmlformats.org/drawingml/2006/main" xmlns="" val="1219703977"/>
       </p:ext>
     </p:extLst>
   </p:cSld>
@@ -746,7 +746,7 @@
 </file>
 
 <file path=ppt/slideLayouts/slideLayout1.xml><?xml version="1.0" encoding="utf-8"?>
-<p:sldLayout xmlns:a="http://schemas.openxmlformats.org/drawingml/2006/main" xmlns:r="http://schemas.openxmlformats.org/officeDocument/2006/relationships" xmlns:p="http://schemas.openxmlformats.org/presentationml/2006/main" showMasterSp="0" type="title" preserve="1">
+<p:sldLayout xmlns:a="http://schemas.openxmlformats.org/drawingml/2006/main" xmlns:r="http://schemas.openxmlformats.org/officeDocument/2006/relationships" xmlns:mc="http://schemas.openxmlformats.org/markup-compatibility/2006" xmlns:mv="urn:schemas-microsoft-com:mac:vml" xmlns:p="http://schemas.openxmlformats.org/presentationml/2006/main" mc:Ignorable="mv" mc:PreserveAttributes="mv:*" showMasterSp="0" type="title" preserve="1">
   <p:cSld name="Title Slide">
     <p:spTree>
       <p:nvGrpSpPr>
@@ -787,7 +787,7 @@
           <a:effectLst/>
           <a:extLst>
             <a:ext uri="{91240B29-F687-4F45-9708-019B960494DF}">
-              <a14:hiddenLine xmlns:a14="http://schemas.microsoft.com/office/drawing/2010/main" w="9525">
+              <a14:hiddenLine xmlns:a14="http://schemas.microsoft.com/office/drawing/2010/main" xmlns:p="http://schemas.openxmlformats.org/presentationml/2006/main" xmlns:r="http://schemas.openxmlformats.org/officeDocument/2006/relationships" xmlns:a="http://schemas.openxmlformats.org/drawingml/2006/main" xmlns="" w="9525">
                 <a:solidFill>
                   <a:schemeClr val="tx1"/>
                 </a:solidFill>
@@ -797,7 +797,7 @@
               </a14:hiddenLine>
             </a:ext>
             <a:ext uri="{AF507438-7753-43E0-B8FC-AC1667EBCBE1}">
-              <a14:hiddenEffects xmlns:a14="http://schemas.microsoft.com/office/drawing/2010/main">
+              <a14:hiddenEffects xmlns:a14="http://schemas.microsoft.com/office/drawing/2010/main" xmlns:p="http://schemas.openxmlformats.org/presentationml/2006/main" xmlns:r="http://schemas.openxmlformats.org/officeDocument/2006/relationships" xmlns:a="http://schemas.openxmlformats.org/drawingml/2006/main" xmlns="">
                 <a:effectLst>
                   <a:outerShdw dist="35921" dir="2700000" algn="ctr" rotWithShape="0">
                     <a:schemeClr val="bg2"/>
@@ -949,7 +949,7 @@
           <a:effectLst/>
           <a:extLst>
             <a:ext uri="{91240B29-F687-4F45-9708-019B960494DF}">
-              <a14:hiddenLine xmlns:a14="http://schemas.microsoft.com/office/drawing/2010/main" w="9525">
+              <a14:hiddenLine xmlns:a14="http://schemas.microsoft.com/office/drawing/2010/main" xmlns:p="http://schemas.openxmlformats.org/presentationml/2006/main" xmlns:r="http://schemas.openxmlformats.org/officeDocument/2006/relationships" xmlns:a="http://schemas.openxmlformats.org/drawingml/2006/main" xmlns="" w="9525">
                 <a:solidFill>
                   <a:schemeClr val="tx1"/>
                 </a:solidFill>
@@ -959,7 +959,7 @@
               </a14:hiddenLine>
             </a:ext>
             <a:ext uri="{AF507438-7753-43E0-B8FC-AC1667EBCBE1}">
-              <a14:hiddenEffects xmlns:a14="http://schemas.microsoft.com/office/drawing/2010/main">
+              <a14:hiddenEffects xmlns:a14="http://schemas.microsoft.com/office/drawing/2010/main" xmlns:p="http://schemas.openxmlformats.org/presentationml/2006/main" xmlns:r="http://schemas.openxmlformats.org/officeDocument/2006/relationships" xmlns:a="http://schemas.openxmlformats.org/drawingml/2006/main" xmlns="">
                 <a:effectLst>
                   <a:outerShdw dist="35921" dir="2700000" algn="ctr" rotWithShape="0">
                     <a:schemeClr val="bg2"/>
@@ -1111,7 +1111,7 @@
           <a:effectLst/>
           <a:extLst>
             <a:ext uri="{91240B29-F687-4F45-9708-019B960494DF}">
-              <a14:hiddenLine xmlns:a14="http://schemas.microsoft.com/office/drawing/2010/main" w="9525">
+              <a14:hiddenLine xmlns:a14="http://schemas.microsoft.com/office/drawing/2010/main" xmlns:p="http://schemas.openxmlformats.org/presentationml/2006/main" xmlns:r="http://schemas.openxmlformats.org/officeDocument/2006/relationships" xmlns:a="http://schemas.openxmlformats.org/drawingml/2006/main" xmlns="" w="9525">
                 <a:solidFill>
                   <a:schemeClr val="tx1"/>
                 </a:solidFill>
@@ -1121,7 +1121,7 @@
               </a14:hiddenLine>
             </a:ext>
             <a:ext uri="{AF507438-7753-43E0-B8FC-AC1667EBCBE1}">
-              <a14:hiddenEffects xmlns:a14="http://schemas.microsoft.com/office/drawing/2010/main">
+              <a14:hiddenEffects xmlns:a14="http://schemas.microsoft.com/office/drawing/2010/main" xmlns:p="http://schemas.openxmlformats.org/presentationml/2006/main" xmlns:r="http://schemas.openxmlformats.org/officeDocument/2006/relationships" xmlns:a="http://schemas.openxmlformats.org/drawingml/2006/main" xmlns="">
                 <a:effectLst>
                   <a:outerShdw dist="35921" dir="2700000" algn="ctr" rotWithShape="0">
                     <a:schemeClr val="bg2"/>
@@ -1384,7 +1384,7 @@
     </p:spTree>
     <p:extLst>
       <p:ext uri="{BB962C8B-B14F-4D97-AF65-F5344CB8AC3E}">
-        <p14:creationId xmlns:p14="http://schemas.microsoft.com/office/powerpoint/2010/main" val="698456182"/>
+        <p14:creationId xmlns:p14="http://schemas.microsoft.com/office/powerpoint/2010/main" xmlns:p="http://schemas.openxmlformats.org/presentationml/2006/main" xmlns:r="http://schemas.openxmlformats.org/officeDocument/2006/relationships" xmlns:a="http://schemas.openxmlformats.org/drawingml/2006/main" xmlns="" val="698456182"/>
       </p:ext>
     </p:extLst>
   </p:cSld>
@@ -1395,7 +1395,7 @@
 </file>
 
 <file path=ppt/slideLayouts/slideLayout10.xml><?xml version="1.0" encoding="utf-8"?>
-<p:sldLayout xmlns:a="http://schemas.openxmlformats.org/drawingml/2006/main" xmlns:r="http://schemas.openxmlformats.org/officeDocument/2006/relationships" xmlns:p="http://schemas.openxmlformats.org/presentationml/2006/main" type="vertTx" preserve="1">
+<p:sldLayout xmlns:a="http://schemas.openxmlformats.org/drawingml/2006/main" xmlns:r="http://schemas.openxmlformats.org/officeDocument/2006/relationships" xmlns:mc="http://schemas.openxmlformats.org/markup-compatibility/2006" xmlns:mv="urn:schemas-microsoft-com:mac:vml" xmlns:p="http://schemas.openxmlformats.org/presentationml/2006/main" mc:Ignorable="mv" mc:PreserveAttributes="mv:*" type="vertTx" preserve="1">
   <p:cSld name="Title and Vertical Text">
     <p:spTree>
       <p:nvGrpSpPr>
@@ -1555,7 +1555,7 @@
     </p:spTree>
     <p:extLst>
       <p:ext uri="{BB962C8B-B14F-4D97-AF65-F5344CB8AC3E}">
-        <p14:creationId xmlns:p14="http://schemas.microsoft.com/office/powerpoint/2010/main" val="718308142"/>
+        <p14:creationId xmlns:p14="http://schemas.microsoft.com/office/powerpoint/2010/main" xmlns:p="http://schemas.openxmlformats.org/presentationml/2006/main" xmlns:r="http://schemas.openxmlformats.org/officeDocument/2006/relationships" xmlns:a="http://schemas.openxmlformats.org/drawingml/2006/main" xmlns="" val="718308142"/>
       </p:ext>
     </p:extLst>
   </p:cSld>
@@ -1566,7 +1566,7 @@
 </file>
 
 <file path=ppt/slideLayouts/slideLayout11.xml><?xml version="1.0" encoding="utf-8"?>
-<p:sldLayout xmlns:a="http://schemas.openxmlformats.org/drawingml/2006/main" xmlns:r="http://schemas.openxmlformats.org/officeDocument/2006/relationships" xmlns:p="http://schemas.openxmlformats.org/presentationml/2006/main" type="vertTitleAndTx" preserve="1">
+<p:sldLayout xmlns:a="http://schemas.openxmlformats.org/drawingml/2006/main" xmlns:r="http://schemas.openxmlformats.org/officeDocument/2006/relationships" xmlns:mc="http://schemas.openxmlformats.org/markup-compatibility/2006" xmlns:mv="urn:schemas-microsoft-com:mac:vml" xmlns:p="http://schemas.openxmlformats.org/presentationml/2006/main" mc:Ignorable="mv" mc:PreserveAttributes="mv:*" type="vertTitleAndTx" preserve="1">
   <p:cSld name="Vertical Title and Text">
     <p:spTree>
       <p:nvGrpSpPr>
@@ -1736,7 +1736,7 @@
     </p:spTree>
     <p:extLst>
       <p:ext uri="{BB962C8B-B14F-4D97-AF65-F5344CB8AC3E}">
-        <p14:creationId xmlns:p14="http://schemas.microsoft.com/office/powerpoint/2010/main" val="1947262867"/>
+        <p14:creationId xmlns:p14="http://schemas.microsoft.com/office/powerpoint/2010/main" xmlns:p="http://schemas.openxmlformats.org/presentationml/2006/main" xmlns:r="http://schemas.openxmlformats.org/officeDocument/2006/relationships" xmlns:a="http://schemas.openxmlformats.org/drawingml/2006/main" xmlns="" val="1947262867"/>
       </p:ext>
     </p:extLst>
   </p:cSld>
@@ -1747,7 +1747,7 @@
 </file>
 
 <file path=ppt/slideLayouts/slideLayout12.xml><?xml version="1.0" encoding="utf-8"?>
-<p:sldLayout xmlns:a="http://schemas.openxmlformats.org/drawingml/2006/main" xmlns:r="http://schemas.openxmlformats.org/officeDocument/2006/relationships" xmlns:p="http://schemas.openxmlformats.org/presentationml/2006/main" type="txAndObj" preserve="1">
+<p:sldLayout xmlns:a="http://schemas.openxmlformats.org/drawingml/2006/main" xmlns:r="http://schemas.openxmlformats.org/officeDocument/2006/relationships" xmlns:mc="http://schemas.openxmlformats.org/markup-compatibility/2006" xmlns:mv="urn:schemas-microsoft-com:mac:vml" xmlns:p="http://schemas.openxmlformats.org/presentationml/2006/main" mc:Ignorable="mv" mc:PreserveAttributes="mv:*" type="txAndObj" preserve="1">
   <p:cSld name="Title, Text, and Content">
     <p:spTree>
       <p:nvGrpSpPr>
@@ -1974,7 +1974,7 @@
     </p:spTree>
     <p:extLst>
       <p:ext uri="{BB962C8B-B14F-4D97-AF65-F5344CB8AC3E}">
-        <p14:creationId xmlns:p14="http://schemas.microsoft.com/office/powerpoint/2010/main" val="2734291439"/>
+        <p14:creationId xmlns:p14="http://schemas.microsoft.com/office/powerpoint/2010/main" xmlns:p="http://schemas.openxmlformats.org/presentationml/2006/main" xmlns:r="http://schemas.openxmlformats.org/officeDocument/2006/relationships" xmlns:a="http://schemas.openxmlformats.org/drawingml/2006/main" xmlns="" val="2734291439"/>
       </p:ext>
     </p:extLst>
   </p:cSld>
@@ -1985,7 +1985,7 @@
 </file>
 
 <file path=ppt/slideLayouts/slideLayout13.xml><?xml version="1.0" encoding="utf-8"?>
-<p:sldLayout xmlns:a="http://schemas.openxmlformats.org/drawingml/2006/main" xmlns:r="http://schemas.openxmlformats.org/officeDocument/2006/relationships" xmlns:p="http://schemas.openxmlformats.org/presentationml/2006/main" showMasterSp="0" type="title" preserve="1">
+<p:sldLayout xmlns:a="http://schemas.openxmlformats.org/drawingml/2006/main" xmlns:r="http://schemas.openxmlformats.org/officeDocument/2006/relationships" xmlns:mc="http://schemas.openxmlformats.org/markup-compatibility/2006" xmlns:mv="urn:schemas-microsoft-com:mac:vml" xmlns:p="http://schemas.openxmlformats.org/presentationml/2006/main" mc:Ignorable="mv" mc:PreserveAttributes="mv:*" showMasterSp="0" type="title" preserve="1">
   <p:cSld name="Title Slide">
     <p:spTree>
       <p:nvGrpSpPr>
@@ -2013,7 +2013,7 @@
           <a:blip r:embed="rId2">
             <a:extLst>
               <a:ext uri="{28A0092B-C50C-407E-A947-70E740481C1C}">
-                <a14:useLocalDpi xmlns:a14="http://schemas.microsoft.com/office/drawing/2010/main" val="0"/>
+                <a14:useLocalDpi xmlns:a14="http://schemas.microsoft.com/office/drawing/2010/main" xmlns:p="http://schemas.openxmlformats.org/presentationml/2006/main" xmlns:r="http://schemas.openxmlformats.org/officeDocument/2006/relationships" xmlns:a="http://schemas.openxmlformats.org/drawingml/2006/main" xmlns="" val="0"/>
               </a:ext>
             </a:extLst>
           </a:blip>
@@ -2036,14 +2036,14 @@
           </a:ln>
           <a:extLst>
             <a:ext uri="{909E8E84-426E-40DD-AFC4-6F175D3DCCD1}">
-              <a14:hiddenFill xmlns:a14="http://schemas.microsoft.com/office/drawing/2010/main">
+              <a14:hiddenFill xmlns:a14="http://schemas.microsoft.com/office/drawing/2010/main" xmlns:p="http://schemas.openxmlformats.org/presentationml/2006/main" xmlns:r="http://schemas.openxmlformats.org/officeDocument/2006/relationships" xmlns:a="http://schemas.openxmlformats.org/drawingml/2006/main" xmlns="">
                 <a:solidFill>
                   <a:srgbClr val="FFFFFF"/>
                 </a:solidFill>
               </a14:hiddenFill>
             </a:ext>
             <a:ext uri="{91240B29-F687-4F45-9708-019B960494DF}">
-              <a14:hiddenLine xmlns:a14="http://schemas.microsoft.com/office/drawing/2010/main" w="9525">
+              <a14:hiddenLine xmlns:a14="http://schemas.microsoft.com/office/drawing/2010/main" xmlns:p="http://schemas.openxmlformats.org/presentationml/2006/main" xmlns:r="http://schemas.openxmlformats.org/officeDocument/2006/relationships" xmlns:a="http://schemas.openxmlformats.org/drawingml/2006/main" xmlns="" w="9525">
                 <a:solidFill>
                   <a:srgbClr val="000000"/>
                 </a:solidFill>
@@ -2083,12 +2083,12 @@
           <a:effectLst/>
           <a:extLst>
             <a:ext uri="{909E8E84-426E-40DD-AFC4-6F175D3DCCD1}">
-              <a14:hiddenFill xmlns:a14="http://schemas.microsoft.com/office/drawing/2010/main">
+              <a14:hiddenFill xmlns:a14="http://schemas.microsoft.com/office/drawing/2010/main" xmlns:p="http://schemas.openxmlformats.org/presentationml/2006/main" xmlns:r="http://schemas.openxmlformats.org/officeDocument/2006/relationships" xmlns:a="http://schemas.openxmlformats.org/drawingml/2006/main" xmlns="">
                 <a:noFill/>
               </a14:hiddenFill>
             </a:ext>
             <a:ext uri="{AF507438-7753-43E0-B8FC-AC1667EBCBE1}">
-              <a14:hiddenEffects xmlns:a14="http://schemas.microsoft.com/office/drawing/2010/main">
+              <a14:hiddenEffects xmlns:a14="http://schemas.microsoft.com/office/drawing/2010/main" xmlns:p="http://schemas.openxmlformats.org/presentationml/2006/main" xmlns:r="http://schemas.openxmlformats.org/officeDocument/2006/relationships" xmlns:a="http://schemas.openxmlformats.org/drawingml/2006/main" xmlns="">
                 <a:effectLst>
                   <a:outerShdw dist="35921" dir="2700000" algn="ctr" rotWithShape="0">
                     <a:schemeClr val="bg2"/>
@@ -2148,7 +2148,7 @@
             </a:ln>
             <a:extLst>
               <a:ext uri="{91240B29-F687-4F45-9708-019B960494DF}">
-                <a14:hiddenLine xmlns:a14="http://schemas.microsoft.com/office/drawing/2010/main" w="9525">
+                <a14:hiddenLine xmlns:a14="http://schemas.microsoft.com/office/drawing/2010/main" xmlns:p="http://schemas.openxmlformats.org/presentationml/2006/main" xmlns:r="http://schemas.openxmlformats.org/officeDocument/2006/relationships" xmlns:a="http://schemas.openxmlformats.org/drawingml/2006/main" xmlns="" w="9525">
                   <a:solidFill>
                     <a:schemeClr val="tx1"/>
                   </a:solidFill>
@@ -2302,7 +2302,7 @@
             </a:ln>
             <a:extLst>
               <a:ext uri="{91240B29-F687-4F45-9708-019B960494DF}">
-                <a14:hiddenLine xmlns:a14="http://schemas.microsoft.com/office/drawing/2010/main" w="9525">
+                <a14:hiddenLine xmlns:a14="http://schemas.microsoft.com/office/drawing/2010/main" xmlns:p="http://schemas.openxmlformats.org/presentationml/2006/main" xmlns:r="http://schemas.openxmlformats.org/officeDocument/2006/relationships" xmlns:a="http://schemas.openxmlformats.org/drawingml/2006/main" xmlns="" w="9525">
                   <a:solidFill>
                     <a:schemeClr val="tx1"/>
                   </a:solidFill>
@@ -2456,7 +2456,7 @@
             </a:ln>
             <a:extLst>
               <a:ext uri="{91240B29-F687-4F45-9708-019B960494DF}">
-                <a14:hiddenLine xmlns:a14="http://schemas.microsoft.com/office/drawing/2010/main" w="9525">
+                <a14:hiddenLine xmlns:a14="http://schemas.microsoft.com/office/drawing/2010/main" xmlns:p="http://schemas.openxmlformats.org/presentationml/2006/main" xmlns:r="http://schemas.openxmlformats.org/officeDocument/2006/relationships" xmlns:a="http://schemas.openxmlformats.org/drawingml/2006/main" xmlns="" w="9525">
                   <a:solidFill>
                     <a:schemeClr val="tx1"/>
                   </a:solidFill>
@@ -2610,7 +2610,7 @@
             </a:ln>
             <a:extLst>
               <a:ext uri="{91240B29-F687-4F45-9708-019B960494DF}">
-                <a14:hiddenLine xmlns:a14="http://schemas.microsoft.com/office/drawing/2010/main" w="9525">
+                <a14:hiddenLine xmlns:a14="http://schemas.microsoft.com/office/drawing/2010/main" xmlns:p="http://schemas.openxmlformats.org/presentationml/2006/main" xmlns:r="http://schemas.openxmlformats.org/officeDocument/2006/relationships" xmlns:a="http://schemas.openxmlformats.org/drawingml/2006/main" xmlns="" w="9525">
                   <a:solidFill>
                     <a:schemeClr val="tx1"/>
                   </a:solidFill>
@@ -2764,7 +2764,7 @@
             </a:ln>
             <a:extLst>
               <a:ext uri="{91240B29-F687-4F45-9708-019B960494DF}">
-                <a14:hiddenLine xmlns:a14="http://schemas.microsoft.com/office/drawing/2010/main" w="9525">
+                <a14:hiddenLine xmlns:a14="http://schemas.microsoft.com/office/drawing/2010/main" xmlns:p="http://schemas.openxmlformats.org/presentationml/2006/main" xmlns:r="http://schemas.openxmlformats.org/officeDocument/2006/relationships" xmlns:a="http://schemas.openxmlformats.org/drawingml/2006/main" xmlns="" w="9525">
                   <a:solidFill>
                     <a:schemeClr val="tx1"/>
                   </a:solidFill>
@@ -2918,7 +2918,7 @@
             </a:ln>
             <a:extLst>
               <a:ext uri="{91240B29-F687-4F45-9708-019B960494DF}">
-                <a14:hiddenLine xmlns:a14="http://schemas.microsoft.com/office/drawing/2010/main" w="9525">
+                <a14:hiddenLine xmlns:a14="http://schemas.microsoft.com/office/drawing/2010/main" xmlns:p="http://schemas.openxmlformats.org/presentationml/2006/main" xmlns:r="http://schemas.openxmlformats.org/officeDocument/2006/relationships" xmlns:a="http://schemas.openxmlformats.org/drawingml/2006/main" xmlns="" w="9525">
                   <a:solidFill>
                     <a:schemeClr val="tx1"/>
                   </a:solidFill>
@@ -3170,7 +3170,7 @@
             </a:ln>
             <a:extLst>
               <a:ext uri="{91240B29-F687-4F45-9708-019B960494DF}">
-                <a14:hiddenLine xmlns:a14="http://schemas.microsoft.com/office/drawing/2010/main" w="9525">
+                <a14:hiddenLine xmlns:a14="http://schemas.microsoft.com/office/drawing/2010/main" xmlns:p="http://schemas.openxmlformats.org/presentationml/2006/main" xmlns:r="http://schemas.openxmlformats.org/officeDocument/2006/relationships" xmlns:a="http://schemas.openxmlformats.org/drawingml/2006/main" xmlns="" w="9525">
                   <a:solidFill>
                     <a:schemeClr val="tx1"/>
                   </a:solidFill>
@@ -3302,7 +3302,7 @@
             </a:ln>
             <a:extLst>
               <a:ext uri="{91240B29-F687-4F45-9708-019B960494DF}">
-                <a14:hiddenLine xmlns:a14="http://schemas.microsoft.com/office/drawing/2010/main" w="9525">
+                <a14:hiddenLine xmlns:a14="http://schemas.microsoft.com/office/drawing/2010/main" xmlns:p="http://schemas.openxmlformats.org/presentationml/2006/main" xmlns:r="http://schemas.openxmlformats.org/officeDocument/2006/relationships" xmlns:a="http://schemas.openxmlformats.org/drawingml/2006/main" xmlns="" w="9525">
                   <a:solidFill>
                     <a:schemeClr val="tx1"/>
                   </a:solidFill>
@@ -3423,7 +3423,7 @@
             </a:ln>
             <a:extLst>
               <a:ext uri="{91240B29-F687-4F45-9708-019B960494DF}">
-                <a14:hiddenLine xmlns:a14="http://schemas.microsoft.com/office/drawing/2010/main" w="9525">
+                <a14:hiddenLine xmlns:a14="http://schemas.microsoft.com/office/drawing/2010/main" xmlns:p="http://schemas.openxmlformats.org/presentationml/2006/main" xmlns:r="http://schemas.openxmlformats.org/officeDocument/2006/relationships" xmlns:a="http://schemas.openxmlformats.org/drawingml/2006/main" xmlns="" w="9525">
                   <a:solidFill>
                     <a:schemeClr val="tx1"/>
                   </a:solidFill>
@@ -3468,7 +3468,7 @@
             </a:ln>
             <a:extLst>
               <a:ext uri="{91240B29-F687-4F45-9708-019B960494DF}">
-                <a14:hiddenLine xmlns:a14="http://schemas.microsoft.com/office/drawing/2010/main" w="9525">
+                <a14:hiddenLine xmlns:a14="http://schemas.microsoft.com/office/drawing/2010/main" xmlns:p="http://schemas.openxmlformats.org/presentationml/2006/main" xmlns:r="http://schemas.openxmlformats.org/officeDocument/2006/relationships" xmlns:a="http://schemas.openxmlformats.org/drawingml/2006/main" xmlns="" w="9525">
                   <a:solidFill>
                     <a:schemeClr val="tx1"/>
                   </a:solidFill>
@@ -3667,7 +3667,7 @@
     </p:spTree>
     <p:extLst>
       <p:ext uri="{BB962C8B-B14F-4D97-AF65-F5344CB8AC3E}">
-        <p14:creationId xmlns:p14="http://schemas.microsoft.com/office/powerpoint/2010/main" val="760033320"/>
+        <p14:creationId xmlns:p14="http://schemas.microsoft.com/office/powerpoint/2010/main" xmlns:p="http://schemas.openxmlformats.org/presentationml/2006/main" xmlns:r="http://schemas.openxmlformats.org/officeDocument/2006/relationships" xmlns:a="http://schemas.openxmlformats.org/drawingml/2006/main" xmlns="" val="760033320"/>
       </p:ext>
     </p:extLst>
   </p:cSld>
@@ -3678,7 +3678,7 @@
 </file>
 
 <file path=ppt/slideLayouts/slideLayout14.xml><?xml version="1.0" encoding="utf-8"?>
-<p:sldLayout xmlns:a="http://schemas.openxmlformats.org/drawingml/2006/main" xmlns:r="http://schemas.openxmlformats.org/officeDocument/2006/relationships" xmlns:p="http://schemas.openxmlformats.org/presentationml/2006/main" type="obj" preserve="1">
+<p:sldLayout xmlns:a="http://schemas.openxmlformats.org/drawingml/2006/main" xmlns:r="http://schemas.openxmlformats.org/officeDocument/2006/relationships" xmlns:mc="http://schemas.openxmlformats.org/markup-compatibility/2006" xmlns:mv="urn:schemas-microsoft-com:mac:vml" xmlns:p="http://schemas.openxmlformats.org/presentationml/2006/main" mc:Ignorable="mv" mc:PreserveAttributes="mv:*" type="obj" preserve="1">
   <p:cSld name="Title and Content">
     <p:spTree>
       <p:nvGrpSpPr>
@@ -3807,7 +3807,7 @@
     </p:spTree>
     <p:extLst>
       <p:ext uri="{BB962C8B-B14F-4D97-AF65-F5344CB8AC3E}">
-        <p14:creationId xmlns:p14="http://schemas.microsoft.com/office/powerpoint/2010/main" val="1632672820"/>
+        <p14:creationId xmlns:p14="http://schemas.microsoft.com/office/powerpoint/2010/main" xmlns:p="http://schemas.openxmlformats.org/presentationml/2006/main" xmlns:r="http://schemas.openxmlformats.org/officeDocument/2006/relationships" xmlns:a="http://schemas.openxmlformats.org/drawingml/2006/main" xmlns="" val="1632672820"/>
       </p:ext>
     </p:extLst>
   </p:cSld>
@@ -3818,7 +3818,7 @@
 </file>
 
 <file path=ppt/slideLayouts/slideLayout15.xml><?xml version="1.0" encoding="utf-8"?>
-<p:sldLayout xmlns:a="http://schemas.openxmlformats.org/drawingml/2006/main" xmlns:r="http://schemas.openxmlformats.org/officeDocument/2006/relationships" xmlns:p="http://schemas.openxmlformats.org/presentationml/2006/main" type="secHead" preserve="1">
+<p:sldLayout xmlns:a="http://schemas.openxmlformats.org/drawingml/2006/main" xmlns:r="http://schemas.openxmlformats.org/officeDocument/2006/relationships" xmlns:mc="http://schemas.openxmlformats.org/markup-compatibility/2006" xmlns:mv="urn:schemas-microsoft-com:mac:vml" xmlns:p="http://schemas.openxmlformats.org/presentationml/2006/main" mc:Ignorable="mv" mc:PreserveAttributes="mv:*" type="secHead" preserve="1">
   <p:cSld name="Section Header">
     <p:spTree>
       <p:nvGrpSpPr>
@@ -3969,7 +3969,7 @@
     </p:spTree>
     <p:extLst>
       <p:ext uri="{BB962C8B-B14F-4D97-AF65-F5344CB8AC3E}">
-        <p14:creationId xmlns:p14="http://schemas.microsoft.com/office/powerpoint/2010/main" val="2990269342"/>
+        <p14:creationId xmlns:p14="http://schemas.microsoft.com/office/powerpoint/2010/main" xmlns:p="http://schemas.openxmlformats.org/presentationml/2006/main" xmlns:r="http://schemas.openxmlformats.org/officeDocument/2006/relationships" xmlns:a="http://schemas.openxmlformats.org/drawingml/2006/main" xmlns="" val="2990269342"/>
       </p:ext>
     </p:extLst>
   </p:cSld>
@@ -3980,7 +3980,7 @@
 </file>
 
 <file path=ppt/slideLayouts/slideLayout16.xml><?xml version="1.0" encoding="utf-8"?>
-<p:sldLayout xmlns:a="http://schemas.openxmlformats.org/drawingml/2006/main" xmlns:r="http://schemas.openxmlformats.org/officeDocument/2006/relationships" xmlns:p="http://schemas.openxmlformats.org/presentationml/2006/main" type="twoObj" preserve="1">
+<p:sldLayout xmlns:a="http://schemas.openxmlformats.org/drawingml/2006/main" xmlns:r="http://schemas.openxmlformats.org/officeDocument/2006/relationships" xmlns:mc="http://schemas.openxmlformats.org/markup-compatibility/2006" xmlns:mv="urn:schemas-microsoft-com:mac:vml" xmlns:p="http://schemas.openxmlformats.org/presentationml/2006/main" mc:Ignorable="mv" mc:PreserveAttributes="mv:*" type="twoObj" preserve="1">
   <p:cSld name="Two Content">
     <p:spTree>
       <p:nvGrpSpPr>
@@ -4227,7 +4227,7 @@
     </p:spTree>
     <p:extLst>
       <p:ext uri="{BB962C8B-B14F-4D97-AF65-F5344CB8AC3E}">
-        <p14:creationId xmlns:p14="http://schemas.microsoft.com/office/powerpoint/2010/main" val="2536726207"/>
+        <p14:creationId xmlns:p14="http://schemas.microsoft.com/office/powerpoint/2010/main" xmlns:p="http://schemas.openxmlformats.org/presentationml/2006/main" xmlns:r="http://schemas.openxmlformats.org/officeDocument/2006/relationships" xmlns:a="http://schemas.openxmlformats.org/drawingml/2006/main" xmlns="" val="2536726207"/>
       </p:ext>
     </p:extLst>
   </p:cSld>
@@ -4238,7 +4238,7 @@
 </file>
 
 <file path=ppt/slideLayouts/slideLayout17.xml><?xml version="1.0" encoding="utf-8"?>
-<p:sldLayout xmlns:a="http://schemas.openxmlformats.org/drawingml/2006/main" xmlns:r="http://schemas.openxmlformats.org/officeDocument/2006/relationships" xmlns:p="http://schemas.openxmlformats.org/presentationml/2006/main" type="twoTxTwoObj" preserve="1">
+<p:sldLayout xmlns:a="http://schemas.openxmlformats.org/drawingml/2006/main" xmlns:r="http://schemas.openxmlformats.org/officeDocument/2006/relationships" xmlns:mc="http://schemas.openxmlformats.org/markup-compatibility/2006" xmlns:mv="urn:schemas-microsoft-com:mac:vml" xmlns:p="http://schemas.openxmlformats.org/presentationml/2006/main" mc:Ignorable="mv" mc:PreserveAttributes="mv:*" type="twoTxTwoObj" preserve="1">
   <p:cSld name="Comparison">
     <p:spTree>
       <p:nvGrpSpPr>
@@ -4624,7 +4624,7 @@
     </p:spTree>
     <p:extLst>
       <p:ext uri="{BB962C8B-B14F-4D97-AF65-F5344CB8AC3E}">
-        <p14:creationId xmlns:p14="http://schemas.microsoft.com/office/powerpoint/2010/main" val="3085395522"/>
+        <p14:creationId xmlns:p14="http://schemas.microsoft.com/office/powerpoint/2010/main" xmlns:p="http://schemas.openxmlformats.org/presentationml/2006/main" xmlns:r="http://schemas.openxmlformats.org/officeDocument/2006/relationships" xmlns:a="http://schemas.openxmlformats.org/drawingml/2006/main" xmlns="" val="3085395522"/>
       </p:ext>
     </p:extLst>
   </p:cSld>
@@ -4635,7 +4635,7 @@
 </file>
 
 <file path=ppt/slideLayouts/slideLayout18.xml><?xml version="1.0" encoding="utf-8"?>
-<p:sldLayout xmlns:a="http://schemas.openxmlformats.org/drawingml/2006/main" xmlns:r="http://schemas.openxmlformats.org/officeDocument/2006/relationships" xmlns:p="http://schemas.openxmlformats.org/presentationml/2006/main" type="titleOnly" preserve="1">
+<p:sldLayout xmlns:a="http://schemas.openxmlformats.org/drawingml/2006/main" xmlns:r="http://schemas.openxmlformats.org/officeDocument/2006/relationships" xmlns:mc="http://schemas.openxmlformats.org/markup-compatibility/2006" xmlns:mv="urn:schemas-microsoft-com:mac:vml" xmlns:p="http://schemas.openxmlformats.org/presentationml/2006/main" mc:Ignorable="mv" mc:PreserveAttributes="mv:*" type="titleOnly" preserve="1">
   <p:cSld name="Title Only">
     <p:spTree>
       <p:nvGrpSpPr>
@@ -4712,7 +4712,7 @@
     </p:spTree>
     <p:extLst>
       <p:ext uri="{BB962C8B-B14F-4D97-AF65-F5344CB8AC3E}">
-        <p14:creationId xmlns:p14="http://schemas.microsoft.com/office/powerpoint/2010/main" val="3683629312"/>
+        <p14:creationId xmlns:p14="http://schemas.microsoft.com/office/powerpoint/2010/main" xmlns:p="http://schemas.openxmlformats.org/presentationml/2006/main" xmlns:r="http://schemas.openxmlformats.org/officeDocument/2006/relationships" xmlns:a="http://schemas.openxmlformats.org/drawingml/2006/main" xmlns="" val="3683629312"/>
       </p:ext>
     </p:extLst>
   </p:cSld>
@@ -4723,7 +4723,7 @@
 </file>
 
 <file path=ppt/slideLayouts/slideLayout19.xml><?xml version="1.0" encoding="utf-8"?>
-<p:sldLayout xmlns:a="http://schemas.openxmlformats.org/drawingml/2006/main" xmlns:r="http://schemas.openxmlformats.org/officeDocument/2006/relationships" xmlns:p="http://schemas.openxmlformats.org/presentationml/2006/main" type="blank" preserve="1">
+<p:sldLayout xmlns:a="http://schemas.openxmlformats.org/drawingml/2006/main" xmlns:r="http://schemas.openxmlformats.org/officeDocument/2006/relationships" xmlns:mc="http://schemas.openxmlformats.org/markup-compatibility/2006" xmlns:mv="urn:schemas-microsoft-com:mac:vml" xmlns:p="http://schemas.openxmlformats.org/presentationml/2006/main" mc:Ignorable="mv" mc:PreserveAttributes="mv:*" type="blank" preserve="1">
   <p:cSld name="Blank">
     <p:spTree>
       <p:nvGrpSpPr>
@@ -4777,7 +4777,7 @@
     </p:spTree>
     <p:extLst>
       <p:ext uri="{BB962C8B-B14F-4D97-AF65-F5344CB8AC3E}">
-        <p14:creationId xmlns:p14="http://schemas.microsoft.com/office/powerpoint/2010/main" val="3661616939"/>
+        <p14:creationId xmlns:p14="http://schemas.microsoft.com/office/powerpoint/2010/main" xmlns:p="http://schemas.openxmlformats.org/presentationml/2006/main" xmlns:r="http://schemas.openxmlformats.org/officeDocument/2006/relationships" xmlns:a="http://schemas.openxmlformats.org/drawingml/2006/main" xmlns="" val="3661616939"/>
       </p:ext>
     </p:extLst>
   </p:cSld>
@@ -4788,7 +4788,7 @@
 </file>
 
 <file path=ppt/slideLayouts/slideLayout2.xml><?xml version="1.0" encoding="utf-8"?>
-<p:sldLayout xmlns:a="http://schemas.openxmlformats.org/drawingml/2006/main" xmlns:r="http://schemas.openxmlformats.org/officeDocument/2006/relationships" xmlns:p="http://schemas.openxmlformats.org/presentationml/2006/main" type="obj" preserve="1">
+<p:sldLayout xmlns:a="http://schemas.openxmlformats.org/drawingml/2006/main" xmlns:r="http://schemas.openxmlformats.org/officeDocument/2006/relationships" xmlns:mc="http://schemas.openxmlformats.org/markup-compatibility/2006" xmlns:mv="urn:schemas-microsoft-com:mac:vml" xmlns:p="http://schemas.openxmlformats.org/presentationml/2006/main" mc:Ignorable="mv" mc:PreserveAttributes="mv:*" type="obj" preserve="1">
   <p:cSld name="Title and Content">
     <p:spTree>
       <p:nvGrpSpPr>
@@ -4948,7 +4948,7 @@
     </p:spTree>
     <p:extLst>
       <p:ext uri="{BB962C8B-B14F-4D97-AF65-F5344CB8AC3E}">
-        <p14:creationId xmlns:p14="http://schemas.microsoft.com/office/powerpoint/2010/main" val="3131122235"/>
+        <p14:creationId xmlns:p14="http://schemas.microsoft.com/office/powerpoint/2010/main" xmlns:p="http://schemas.openxmlformats.org/presentationml/2006/main" xmlns:r="http://schemas.openxmlformats.org/officeDocument/2006/relationships" xmlns:a="http://schemas.openxmlformats.org/drawingml/2006/main" xmlns="" val="3131122235"/>
       </p:ext>
     </p:extLst>
   </p:cSld>
@@ -4959,7 +4959,7 @@
 </file>
 
 <file path=ppt/slideLayouts/slideLayout20.xml><?xml version="1.0" encoding="utf-8"?>
-<p:sldLayout xmlns:a="http://schemas.openxmlformats.org/drawingml/2006/main" xmlns:r="http://schemas.openxmlformats.org/officeDocument/2006/relationships" xmlns:p="http://schemas.openxmlformats.org/presentationml/2006/main" type="objTx" preserve="1">
+<p:sldLayout xmlns:a="http://schemas.openxmlformats.org/drawingml/2006/main" xmlns:r="http://schemas.openxmlformats.org/officeDocument/2006/relationships" xmlns:mc="http://schemas.openxmlformats.org/markup-compatibility/2006" xmlns:mv="urn:schemas-microsoft-com:mac:vml" xmlns:p="http://schemas.openxmlformats.org/presentationml/2006/main" mc:Ignorable="mv" mc:PreserveAttributes="mv:*" type="objTx" preserve="1">
   <p:cSld name="Content with Caption">
     <p:spTree>
       <p:nvGrpSpPr>
@@ -5195,7 +5195,7 @@
     </p:spTree>
     <p:extLst>
       <p:ext uri="{BB962C8B-B14F-4D97-AF65-F5344CB8AC3E}">
-        <p14:creationId xmlns:p14="http://schemas.microsoft.com/office/powerpoint/2010/main" val="736100685"/>
+        <p14:creationId xmlns:p14="http://schemas.microsoft.com/office/powerpoint/2010/main" xmlns:p="http://schemas.openxmlformats.org/presentationml/2006/main" xmlns:r="http://schemas.openxmlformats.org/officeDocument/2006/relationships" xmlns:a="http://schemas.openxmlformats.org/drawingml/2006/main" xmlns="" val="736100685"/>
       </p:ext>
     </p:extLst>
   </p:cSld>
@@ -5206,7 +5206,7 @@
 </file>
 
 <file path=ppt/slideLayouts/slideLayout21.xml><?xml version="1.0" encoding="utf-8"?>
-<p:sldLayout xmlns:a="http://schemas.openxmlformats.org/drawingml/2006/main" xmlns:r="http://schemas.openxmlformats.org/officeDocument/2006/relationships" xmlns:p="http://schemas.openxmlformats.org/presentationml/2006/main" type="picTx" preserve="1">
+<p:sldLayout xmlns:a="http://schemas.openxmlformats.org/drawingml/2006/main" xmlns:r="http://schemas.openxmlformats.org/officeDocument/2006/relationships" xmlns:mc="http://schemas.openxmlformats.org/markup-compatibility/2006" xmlns:mv="urn:schemas-microsoft-com:mac:vml" xmlns:p="http://schemas.openxmlformats.org/presentationml/2006/main" mc:Ignorable="mv" mc:PreserveAttributes="mv:*" type="picTx" preserve="1">
   <p:cSld name="Picture with Caption">
     <p:spTree>
       <p:nvGrpSpPr>
@@ -5419,7 +5419,7 @@
     </p:spTree>
     <p:extLst>
       <p:ext uri="{BB962C8B-B14F-4D97-AF65-F5344CB8AC3E}">
-        <p14:creationId xmlns:p14="http://schemas.microsoft.com/office/powerpoint/2010/main" val="465457564"/>
+        <p14:creationId xmlns:p14="http://schemas.microsoft.com/office/powerpoint/2010/main" xmlns:p="http://schemas.openxmlformats.org/presentationml/2006/main" xmlns:r="http://schemas.openxmlformats.org/officeDocument/2006/relationships" xmlns:a="http://schemas.openxmlformats.org/drawingml/2006/main" xmlns="" val="465457564"/>
       </p:ext>
     </p:extLst>
   </p:cSld>
@@ -5430,7 +5430,7 @@
 </file>
 
 <file path=ppt/slideLayouts/slideLayout22.xml><?xml version="1.0" encoding="utf-8"?>
-<p:sldLayout xmlns:a="http://schemas.openxmlformats.org/drawingml/2006/main" xmlns:r="http://schemas.openxmlformats.org/officeDocument/2006/relationships" xmlns:p="http://schemas.openxmlformats.org/presentationml/2006/main" type="vertTx" preserve="1">
+<p:sldLayout xmlns:a="http://schemas.openxmlformats.org/drawingml/2006/main" xmlns:r="http://schemas.openxmlformats.org/officeDocument/2006/relationships" xmlns:mc="http://schemas.openxmlformats.org/markup-compatibility/2006" xmlns:mv="urn:schemas-microsoft-com:mac:vml" xmlns:p="http://schemas.openxmlformats.org/presentationml/2006/main" mc:Ignorable="mv" mc:PreserveAttributes="mv:*" type="vertTx" preserve="1">
   <p:cSld name="Title and Vertical Text">
     <p:spTree>
       <p:nvGrpSpPr>
@@ -5559,7 +5559,7 @@
     </p:spTree>
     <p:extLst>
       <p:ext uri="{BB962C8B-B14F-4D97-AF65-F5344CB8AC3E}">
-        <p14:creationId xmlns:p14="http://schemas.microsoft.com/office/powerpoint/2010/main" val="2900285960"/>
+        <p14:creationId xmlns:p14="http://schemas.microsoft.com/office/powerpoint/2010/main" xmlns:p="http://schemas.openxmlformats.org/presentationml/2006/main" xmlns:r="http://schemas.openxmlformats.org/officeDocument/2006/relationships" xmlns:a="http://schemas.openxmlformats.org/drawingml/2006/main" xmlns="" val="2900285960"/>
       </p:ext>
     </p:extLst>
   </p:cSld>
@@ -5570,7 +5570,7 @@
 </file>
 
 <file path=ppt/slideLayouts/slideLayout23.xml><?xml version="1.0" encoding="utf-8"?>
-<p:sldLayout xmlns:a="http://schemas.openxmlformats.org/drawingml/2006/main" xmlns:r="http://schemas.openxmlformats.org/officeDocument/2006/relationships" xmlns:p="http://schemas.openxmlformats.org/presentationml/2006/main" type="vertTitleAndTx" preserve="1">
+<p:sldLayout xmlns:a="http://schemas.openxmlformats.org/drawingml/2006/main" xmlns:r="http://schemas.openxmlformats.org/officeDocument/2006/relationships" xmlns:mc="http://schemas.openxmlformats.org/markup-compatibility/2006" xmlns:mv="urn:schemas-microsoft-com:mac:vml" xmlns:p="http://schemas.openxmlformats.org/presentationml/2006/main" mc:Ignorable="mv" mc:PreserveAttributes="mv:*" type="vertTitleAndTx" preserve="1">
   <p:cSld name="Vertical Title and Text">
     <p:spTree>
       <p:nvGrpSpPr>
@@ -5709,7 +5709,7 @@
     </p:spTree>
     <p:extLst>
       <p:ext uri="{BB962C8B-B14F-4D97-AF65-F5344CB8AC3E}">
-        <p14:creationId xmlns:p14="http://schemas.microsoft.com/office/powerpoint/2010/main" val="3451879814"/>
+        <p14:creationId xmlns:p14="http://schemas.microsoft.com/office/powerpoint/2010/main" xmlns:p="http://schemas.openxmlformats.org/presentationml/2006/main" xmlns:r="http://schemas.openxmlformats.org/officeDocument/2006/relationships" xmlns:a="http://schemas.openxmlformats.org/drawingml/2006/main" xmlns="" val="3451879814"/>
       </p:ext>
     </p:extLst>
   </p:cSld>
@@ -5720,7 +5720,7 @@
 </file>
 
 <file path=ppt/slideLayouts/slideLayout3.xml><?xml version="1.0" encoding="utf-8"?>
-<p:sldLayout xmlns:a="http://schemas.openxmlformats.org/drawingml/2006/main" xmlns:r="http://schemas.openxmlformats.org/officeDocument/2006/relationships" xmlns:p="http://schemas.openxmlformats.org/presentationml/2006/main" type="secHead" preserve="1">
+<p:sldLayout xmlns:a="http://schemas.openxmlformats.org/drawingml/2006/main" xmlns:r="http://schemas.openxmlformats.org/officeDocument/2006/relationships" xmlns:mc="http://schemas.openxmlformats.org/markup-compatibility/2006" xmlns:mv="urn:schemas-microsoft-com:mac:vml" xmlns:p="http://schemas.openxmlformats.org/presentationml/2006/main" mc:Ignorable="mv" mc:PreserveAttributes="mv:*" type="secHead" preserve="1">
   <p:cSld name="Section Header">
     <p:spTree>
       <p:nvGrpSpPr>
@@ -5902,7 +5902,7 @@
     </p:spTree>
     <p:extLst>
       <p:ext uri="{BB962C8B-B14F-4D97-AF65-F5344CB8AC3E}">
-        <p14:creationId xmlns:p14="http://schemas.microsoft.com/office/powerpoint/2010/main" val="2427079212"/>
+        <p14:creationId xmlns:p14="http://schemas.microsoft.com/office/powerpoint/2010/main" xmlns:p="http://schemas.openxmlformats.org/presentationml/2006/main" xmlns:r="http://schemas.openxmlformats.org/officeDocument/2006/relationships" xmlns:a="http://schemas.openxmlformats.org/drawingml/2006/main" xmlns="" val="2427079212"/>
       </p:ext>
     </p:extLst>
   </p:cSld>
@@ -5913,7 +5913,7 @@
 </file>
 
 <file path=ppt/slideLayouts/slideLayout4.xml><?xml version="1.0" encoding="utf-8"?>
-<p:sldLayout xmlns:a="http://schemas.openxmlformats.org/drawingml/2006/main" xmlns:r="http://schemas.openxmlformats.org/officeDocument/2006/relationships" xmlns:p="http://schemas.openxmlformats.org/presentationml/2006/main" type="twoObj" preserve="1">
+<p:sldLayout xmlns:a="http://schemas.openxmlformats.org/drawingml/2006/main" xmlns:r="http://schemas.openxmlformats.org/officeDocument/2006/relationships" xmlns:mc="http://schemas.openxmlformats.org/markup-compatibility/2006" xmlns:mv="urn:schemas-microsoft-com:mac:vml" xmlns:p="http://schemas.openxmlformats.org/presentationml/2006/main" mc:Ignorable="mv" mc:PreserveAttributes="mv:*" type="twoObj" preserve="1">
   <p:cSld name="Two Content">
     <p:spTree>
       <p:nvGrpSpPr>
@@ -6191,7 +6191,7 @@
     </p:spTree>
     <p:extLst>
       <p:ext uri="{BB962C8B-B14F-4D97-AF65-F5344CB8AC3E}">
-        <p14:creationId xmlns:p14="http://schemas.microsoft.com/office/powerpoint/2010/main" val="4054074126"/>
+        <p14:creationId xmlns:p14="http://schemas.microsoft.com/office/powerpoint/2010/main" xmlns:p="http://schemas.openxmlformats.org/presentationml/2006/main" xmlns:r="http://schemas.openxmlformats.org/officeDocument/2006/relationships" xmlns:a="http://schemas.openxmlformats.org/drawingml/2006/main" xmlns="" val="4054074126"/>
       </p:ext>
     </p:extLst>
   </p:cSld>
@@ -6202,7 +6202,7 @@
 </file>
 
 <file path=ppt/slideLayouts/slideLayout5.xml><?xml version="1.0" encoding="utf-8"?>
-<p:sldLayout xmlns:a="http://schemas.openxmlformats.org/drawingml/2006/main" xmlns:r="http://schemas.openxmlformats.org/officeDocument/2006/relationships" xmlns:p="http://schemas.openxmlformats.org/presentationml/2006/main" type="twoTxTwoObj" preserve="1">
+<p:sldLayout xmlns:a="http://schemas.openxmlformats.org/drawingml/2006/main" xmlns:r="http://schemas.openxmlformats.org/officeDocument/2006/relationships" xmlns:mc="http://schemas.openxmlformats.org/markup-compatibility/2006" xmlns:mv="urn:schemas-microsoft-com:mac:vml" xmlns:p="http://schemas.openxmlformats.org/presentationml/2006/main" mc:Ignorable="mv" mc:PreserveAttributes="mv:*" type="twoTxTwoObj" preserve="1">
   <p:cSld name="Comparison">
     <p:spTree>
       <p:nvGrpSpPr>
@@ -6619,7 +6619,7 @@
     </p:spTree>
     <p:extLst>
       <p:ext uri="{BB962C8B-B14F-4D97-AF65-F5344CB8AC3E}">
-        <p14:creationId xmlns:p14="http://schemas.microsoft.com/office/powerpoint/2010/main" val="596268466"/>
+        <p14:creationId xmlns:p14="http://schemas.microsoft.com/office/powerpoint/2010/main" xmlns:p="http://schemas.openxmlformats.org/presentationml/2006/main" xmlns:r="http://schemas.openxmlformats.org/officeDocument/2006/relationships" xmlns:a="http://schemas.openxmlformats.org/drawingml/2006/main" xmlns="" val="596268466"/>
       </p:ext>
     </p:extLst>
   </p:cSld>
@@ -6630,7 +6630,7 @@
 </file>
 
 <file path=ppt/slideLayouts/slideLayout6.xml><?xml version="1.0" encoding="utf-8"?>
-<p:sldLayout xmlns:a="http://schemas.openxmlformats.org/drawingml/2006/main" xmlns:r="http://schemas.openxmlformats.org/officeDocument/2006/relationships" xmlns:p="http://schemas.openxmlformats.org/presentationml/2006/main" type="titleOnly" preserve="1">
+<p:sldLayout xmlns:a="http://schemas.openxmlformats.org/drawingml/2006/main" xmlns:r="http://schemas.openxmlformats.org/officeDocument/2006/relationships" xmlns:mc="http://schemas.openxmlformats.org/markup-compatibility/2006" xmlns:mv="urn:schemas-microsoft-com:mac:vml" xmlns:p="http://schemas.openxmlformats.org/presentationml/2006/main" mc:Ignorable="mv" mc:PreserveAttributes="mv:*" type="titleOnly" preserve="1">
   <p:cSld name="Title Only">
     <p:spTree>
       <p:nvGrpSpPr>
@@ -6738,7 +6738,7 @@
     </p:spTree>
     <p:extLst>
       <p:ext uri="{BB962C8B-B14F-4D97-AF65-F5344CB8AC3E}">
-        <p14:creationId xmlns:p14="http://schemas.microsoft.com/office/powerpoint/2010/main" val="2818743489"/>
+        <p14:creationId xmlns:p14="http://schemas.microsoft.com/office/powerpoint/2010/main" xmlns:p="http://schemas.openxmlformats.org/presentationml/2006/main" xmlns:r="http://schemas.openxmlformats.org/officeDocument/2006/relationships" xmlns:a="http://schemas.openxmlformats.org/drawingml/2006/main" xmlns="" val="2818743489"/>
       </p:ext>
     </p:extLst>
   </p:cSld>
@@ -6749,7 +6749,7 @@
 </file>
 
 <file path=ppt/slideLayouts/slideLayout7.xml><?xml version="1.0" encoding="utf-8"?>
-<p:sldLayout xmlns:a="http://schemas.openxmlformats.org/drawingml/2006/main" xmlns:r="http://schemas.openxmlformats.org/officeDocument/2006/relationships" xmlns:p="http://schemas.openxmlformats.org/presentationml/2006/main" type="blank" preserve="1">
+<p:sldLayout xmlns:a="http://schemas.openxmlformats.org/drawingml/2006/main" xmlns:r="http://schemas.openxmlformats.org/officeDocument/2006/relationships" xmlns:mc="http://schemas.openxmlformats.org/markup-compatibility/2006" xmlns:mv="urn:schemas-microsoft-com:mac:vml" xmlns:p="http://schemas.openxmlformats.org/presentationml/2006/main" mc:Ignorable="mv" mc:PreserveAttributes="mv:*" type="blank" preserve="1">
   <p:cSld name="Blank">
     <p:spTree>
       <p:nvGrpSpPr>
@@ -6834,7 +6834,7 @@
     </p:spTree>
     <p:extLst>
       <p:ext uri="{BB962C8B-B14F-4D97-AF65-F5344CB8AC3E}">
-        <p14:creationId xmlns:p14="http://schemas.microsoft.com/office/powerpoint/2010/main" val="166600289"/>
+        <p14:creationId xmlns:p14="http://schemas.microsoft.com/office/powerpoint/2010/main" xmlns:p="http://schemas.openxmlformats.org/presentationml/2006/main" xmlns:r="http://schemas.openxmlformats.org/officeDocument/2006/relationships" xmlns:a="http://schemas.openxmlformats.org/drawingml/2006/main" xmlns="" val="166600289"/>
       </p:ext>
     </p:extLst>
   </p:cSld>
@@ -6845,7 +6845,7 @@
 </file>
 
 <file path=ppt/slideLayouts/slideLayout8.xml><?xml version="1.0" encoding="utf-8"?>
-<p:sldLayout xmlns:a="http://schemas.openxmlformats.org/drawingml/2006/main" xmlns:r="http://schemas.openxmlformats.org/officeDocument/2006/relationships" xmlns:p="http://schemas.openxmlformats.org/presentationml/2006/main" type="objTx" preserve="1">
+<p:sldLayout xmlns:a="http://schemas.openxmlformats.org/drawingml/2006/main" xmlns:r="http://schemas.openxmlformats.org/officeDocument/2006/relationships" xmlns:mc="http://schemas.openxmlformats.org/markup-compatibility/2006" xmlns:mv="urn:schemas-microsoft-com:mac:vml" xmlns:p="http://schemas.openxmlformats.org/presentationml/2006/main" mc:Ignorable="mv" mc:PreserveAttributes="mv:*" type="objTx" preserve="1">
   <p:cSld name="Content with Caption">
     <p:spTree>
       <p:nvGrpSpPr>
@@ -7112,7 +7112,7 @@
     </p:spTree>
     <p:extLst>
       <p:ext uri="{BB962C8B-B14F-4D97-AF65-F5344CB8AC3E}">
-        <p14:creationId xmlns:p14="http://schemas.microsoft.com/office/powerpoint/2010/main" val="2168143246"/>
+        <p14:creationId xmlns:p14="http://schemas.microsoft.com/office/powerpoint/2010/main" xmlns:p="http://schemas.openxmlformats.org/presentationml/2006/main" xmlns:r="http://schemas.openxmlformats.org/officeDocument/2006/relationships" xmlns:a="http://schemas.openxmlformats.org/drawingml/2006/main" xmlns="" val="2168143246"/>
       </p:ext>
     </p:extLst>
   </p:cSld>
@@ -7123,7 +7123,7 @@
 </file>
 
 <file path=ppt/slideLayouts/slideLayout9.xml><?xml version="1.0" encoding="utf-8"?>
-<p:sldLayout xmlns:a="http://schemas.openxmlformats.org/drawingml/2006/main" xmlns:r="http://schemas.openxmlformats.org/officeDocument/2006/relationships" xmlns:p="http://schemas.openxmlformats.org/presentationml/2006/main" type="picTx" preserve="1">
+<p:sldLayout xmlns:a="http://schemas.openxmlformats.org/drawingml/2006/main" xmlns:r="http://schemas.openxmlformats.org/officeDocument/2006/relationships" xmlns:mc="http://schemas.openxmlformats.org/markup-compatibility/2006" xmlns:mv="urn:schemas-microsoft-com:mac:vml" xmlns:p="http://schemas.openxmlformats.org/presentationml/2006/main" mc:Ignorable="mv" mc:PreserveAttributes="mv:*" type="picTx" preserve="1">
   <p:cSld name="Picture with Caption">
     <p:spTree>
       <p:nvGrpSpPr>
@@ -7367,7 +7367,7 @@
     </p:spTree>
     <p:extLst>
       <p:ext uri="{BB962C8B-B14F-4D97-AF65-F5344CB8AC3E}">
-        <p14:creationId xmlns:p14="http://schemas.microsoft.com/office/powerpoint/2010/main" val="359608907"/>
+        <p14:creationId xmlns:p14="http://schemas.microsoft.com/office/powerpoint/2010/main" xmlns:p="http://schemas.openxmlformats.org/presentationml/2006/main" xmlns:r="http://schemas.openxmlformats.org/officeDocument/2006/relationships" xmlns:a="http://schemas.openxmlformats.org/drawingml/2006/main" xmlns="" val="359608907"/>
       </p:ext>
     </p:extLst>
   </p:cSld>
@@ -7378,7 +7378,7 @@
 </file>
 
 <file path=ppt/slideMasters/slideMaster1.xml><?xml version="1.0" encoding="utf-8"?>
-<p:sldMaster xmlns:a="http://schemas.openxmlformats.org/drawingml/2006/main" xmlns:r="http://schemas.openxmlformats.org/officeDocument/2006/relationships" xmlns:p="http://schemas.openxmlformats.org/presentationml/2006/main">
+<p:sldMaster xmlns:a="http://schemas.openxmlformats.org/drawingml/2006/main" xmlns:r="http://schemas.openxmlformats.org/officeDocument/2006/relationships" xmlns:mc="http://schemas.openxmlformats.org/markup-compatibility/2006" xmlns:mv="urn:schemas-microsoft-com:mac:vml" xmlns:p="http://schemas.openxmlformats.org/presentationml/2006/main" mc:Ignorable="mv" mc:PreserveAttributes="mv:*">
   <p:cSld>
     <p:bg>
       <p:bgPr>
@@ -7427,14 +7427,14 @@
           <a:effectLst/>
           <a:extLst>
             <a:ext uri="{909E8E84-426E-40DD-AFC4-6F175D3DCCD1}">
-              <a14:hiddenFill xmlns:a14="http://schemas.microsoft.com/office/drawing/2010/main">
+              <a14:hiddenFill xmlns:a14="http://schemas.microsoft.com/office/drawing/2010/main" xmlns:p="http://schemas.openxmlformats.org/presentationml/2006/main" xmlns:r="http://schemas.openxmlformats.org/officeDocument/2006/relationships" xmlns:a="http://schemas.openxmlformats.org/drawingml/2006/main" xmlns="">
                 <a:solidFill>
                   <a:schemeClr val="accent1"/>
                 </a:solidFill>
               </a14:hiddenFill>
             </a:ext>
             <a:ext uri="{91240B29-F687-4F45-9708-019B960494DF}">
-              <a14:hiddenLine xmlns:a14="http://schemas.microsoft.com/office/drawing/2010/main" w="9525">
+              <a14:hiddenLine xmlns:a14="http://schemas.microsoft.com/office/drawing/2010/main" xmlns:p="http://schemas.openxmlformats.org/presentationml/2006/main" xmlns:r="http://schemas.openxmlformats.org/officeDocument/2006/relationships" xmlns:a="http://schemas.openxmlformats.org/drawingml/2006/main" xmlns="" w="9525">
                 <a:solidFill>
                   <a:schemeClr val="tx1"/>
                 </a:solidFill>
@@ -7444,7 +7444,7 @@
               </a14:hiddenLine>
             </a:ext>
             <a:ext uri="{AF507438-7753-43E0-B8FC-AC1667EBCBE1}">
-              <a14:hiddenEffects xmlns:a14="http://schemas.microsoft.com/office/drawing/2010/main">
+              <a14:hiddenEffects xmlns:a14="http://schemas.microsoft.com/office/drawing/2010/main" xmlns:p="http://schemas.openxmlformats.org/presentationml/2006/main" xmlns:r="http://schemas.openxmlformats.org/officeDocument/2006/relationships" xmlns:a="http://schemas.openxmlformats.org/drawingml/2006/main" xmlns="">
                 <a:effectLst>
                   <a:outerShdw dist="35921" dir="2700000" algn="ctr" rotWithShape="0">
                     <a:schemeClr val="bg2"/>
@@ -7495,14 +7495,14 @@
           <a:effectLst/>
           <a:extLst>
             <a:ext uri="{909E8E84-426E-40DD-AFC4-6F175D3DCCD1}">
-              <a14:hiddenFill xmlns:a14="http://schemas.microsoft.com/office/drawing/2010/main">
+              <a14:hiddenFill xmlns:a14="http://schemas.microsoft.com/office/drawing/2010/main" xmlns:p="http://schemas.openxmlformats.org/presentationml/2006/main" xmlns:r="http://schemas.openxmlformats.org/officeDocument/2006/relationships" xmlns:a="http://schemas.openxmlformats.org/drawingml/2006/main" xmlns="">
                 <a:solidFill>
                   <a:schemeClr val="accent1"/>
                 </a:solidFill>
               </a14:hiddenFill>
             </a:ext>
             <a:ext uri="{91240B29-F687-4F45-9708-019B960494DF}">
-              <a14:hiddenLine xmlns:a14="http://schemas.microsoft.com/office/drawing/2010/main" w="9525">
+              <a14:hiddenLine xmlns:a14="http://schemas.microsoft.com/office/drawing/2010/main" xmlns:p="http://schemas.openxmlformats.org/presentationml/2006/main" xmlns:r="http://schemas.openxmlformats.org/officeDocument/2006/relationships" xmlns:a="http://schemas.openxmlformats.org/drawingml/2006/main" xmlns="" w="9525">
                 <a:solidFill>
                   <a:schemeClr val="tx1"/>
                 </a:solidFill>
@@ -7512,7 +7512,7 @@
               </a14:hiddenLine>
             </a:ext>
             <a:ext uri="{AF507438-7753-43E0-B8FC-AC1667EBCBE1}">
-              <a14:hiddenEffects xmlns:a14="http://schemas.microsoft.com/office/drawing/2010/main">
+              <a14:hiddenEffects xmlns:a14="http://schemas.microsoft.com/office/drawing/2010/main" xmlns:p="http://schemas.openxmlformats.org/presentationml/2006/main" xmlns:r="http://schemas.openxmlformats.org/officeDocument/2006/relationships" xmlns:a="http://schemas.openxmlformats.org/drawingml/2006/main" xmlns="">
                 <a:effectLst>
                   <a:outerShdw dist="35921" dir="2700000" algn="ctr" rotWithShape="0">
                     <a:schemeClr val="bg2"/>
@@ -7591,14 +7591,14 @@
           <a:effectLst/>
           <a:extLst>
             <a:ext uri="{909E8E84-426E-40DD-AFC4-6F175D3DCCD1}">
-              <a14:hiddenFill xmlns:a14="http://schemas.microsoft.com/office/drawing/2010/main">
+              <a14:hiddenFill xmlns:a14="http://schemas.microsoft.com/office/drawing/2010/main" xmlns:p="http://schemas.openxmlformats.org/presentationml/2006/main" xmlns:r="http://schemas.openxmlformats.org/officeDocument/2006/relationships" xmlns:a="http://schemas.openxmlformats.org/drawingml/2006/main" xmlns="">
                 <a:solidFill>
                   <a:schemeClr val="accent1"/>
                 </a:solidFill>
               </a14:hiddenFill>
             </a:ext>
             <a:ext uri="{91240B29-F687-4F45-9708-019B960494DF}">
-              <a14:hiddenLine xmlns:a14="http://schemas.microsoft.com/office/drawing/2010/main" w="9525">
+              <a14:hiddenLine xmlns:a14="http://schemas.microsoft.com/office/drawing/2010/main" xmlns:p="http://schemas.openxmlformats.org/presentationml/2006/main" xmlns:r="http://schemas.openxmlformats.org/officeDocument/2006/relationships" xmlns:a="http://schemas.openxmlformats.org/drawingml/2006/main" xmlns="" w="9525">
                 <a:solidFill>
                   <a:schemeClr val="tx1"/>
                 </a:solidFill>
@@ -7608,7 +7608,7 @@
               </a14:hiddenLine>
             </a:ext>
             <a:ext uri="{AF507438-7753-43E0-B8FC-AC1667EBCBE1}">
-              <a14:hiddenEffects xmlns:a14="http://schemas.microsoft.com/office/drawing/2010/main">
+              <a14:hiddenEffects xmlns:a14="http://schemas.microsoft.com/office/drawing/2010/main" xmlns:p="http://schemas.openxmlformats.org/presentationml/2006/main" xmlns:r="http://schemas.openxmlformats.org/officeDocument/2006/relationships" xmlns:a="http://schemas.openxmlformats.org/drawingml/2006/main" xmlns="">
                 <a:effectLst>
                   <a:outerShdw dist="35921" dir="2700000" algn="ctr" rotWithShape="0">
                     <a:schemeClr val="bg2"/>
@@ -7672,12 +7672,12 @@
           <a:effectLst/>
           <a:extLst>
             <a:ext uri="{909E8E84-426E-40DD-AFC4-6F175D3DCCD1}">
-              <a14:hiddenFill xmlns:a14="http://schemas.microsoft.com/office/drawing/2010/main">
+              <a14:hiddenFill xmlns:a14="http://schemas.microsoft.com/office/drawing/2010/main" xmlns:p="http://schemas.openxmlformats.org/presentationml/2006/main" xmlns:r="http://schemas.openxmlformats.org/officeDocument/2006/relationships" xmlns:a="http://schemas.openxmlformats.org/drawingml/2006/main" xmlns="">
                 <a:noFill/>
               </a14:hiddenFill>
             </a:ext>
             <a:ext uri="{AF507438-7753-43E0-B8FC-AC1667EBCBE1}">
-              <a14:hiddenEffects xmlns:a14="http://schemas.microsoft.com/office/drawing/2010/main">
+              <a14:hiddenEffects xmlns:a14="http://schemas.microsoft.com/office/drawing/2010/main" xmlns:p="http://schemas.openxmlformats.org/presentationml/2006/main" xmlns:r="http://schemas.openxmlformats.org/officeDocument/2006/relationships" xmlns:a="http://schemas.openxmlformats.org/drawingml/2006/main" xmlns="">
                 <a:effectLst>
                   <a:outerShdw dist="35921" dir="2700000" algn="ctr" rotWithShape="0">
                     <a:schemeClr val="bg2"/>
@@ -7720,14 +7720,14 @@
           <a:effectLst/>
           <a:extLst>
             <a:ext uri="{909E8E84-426E-40DD-AFC4-6F175D3DCCD1}">
-              <a14:hiddenFill xmlns:a14="http://schemas.microsoft.com/office/drawing/2010/main">
+              <a14:hiddenFill xmlns:a14="http://schemas.microsoft.com/office/drawing/2010/main" xmlns:p="http://schemas.openxmlformats.org/presentationml/2006/main" xmlns:r="http://schemas.openxmlformats.org/officeDocument/2006/relationships" xmlns:a="http://schemas.openxmlformats.org/drawingml/2006/main" xmlns="">
                 <a:solidFill>
                   <a:schemeClr val="accent1"/>
                 </a:solidFill>
               </a14:hiddenFill>
             </a:ext>
             <a:ext uri="{91240B29-F687-4F45-9708-019B960494DF}">
-              <a14:hiddenLine xmlns:a14="http://schemas.microsoft.com/office/drawing/2010/main" w="9525">
+              <a14:hiddenLine xmlns:a14="http://schemas.microsoft.com/office/drawing/2010/main" xmlns:p="http://schemas.openxmlformats.org/presentationml/2006/main" xmlns:r="http://schemas.openxmlformats.org/officeDocument/2006/relationships" xmlns:a="http://schemas.openxmlformats.org/drawingml/2006/main" xmlns="" w="9525">
                 <a:solidFill>
                   <a:schemeClr val="tx1"/>
                 </a:solidFill>
@@ -7737,7 +7737,7 @@
               </a14:hiddenLine>
             </a:ext>
             <a:ext uri="{AF507438-7753-43E0-B8FC-AC1667EBCBE1}">
-              <a14:hiddenEffects xmlns:a14="http://schemas.microsoft.com/office/drawing/2010/main">
+              <a14:hiddenEffects xmlns:a14="http://schemas.microsoft.com/office/drawing/2010/main" xmlns:p="http://schemas.openxmlformats.org/presentationml/2006/main" xmlns:r="http://schemas.openxmlformats.org/officeDocument/2006/relationships" xmlns:a="http://schemas.openxmlformats.org/drawingml/2006/main" xmlns="">
                 <a:effectLst>
                   <a:outerShdw dist="35921" dir="2700000" algn="ctr" rotWithShape="0">
                     <a:schemeClr val="bg2"/>
@@ -7792,14 +7792,14 @@
           <a:effectLst/>
           <a:extLst>
             <a:ext uri="{909E8E84-426E-40DD-AFC4-6F175D3DCCD1}">
-              <a14:hiddenFill xmlns:a14="http://schemas.microsoft.com/office/drawing/2010/main">
+              <a14:hiddenFill xmlns:a14="http://schemas.microsoft.com/office/drawing/2010/main" xmlns:p="http://schemas.openxmlformats.org/presentationml/2006/main" xmlns:r="http://schemas.openxmlformats.org/officeDocument/2006/relationships" xmlns:a="http://schemas.openxmlformats.org/drawingml/2006/main" xmlns="">
                 <a:solidFill>
                   <a:schemeClr val="accent1"/>
                 </a:solidFill>
               </a14:hiddenFill>
             </a:ext>
             <a:ext uri="{91240B29-F687-4F45-9708-019B960494DF}">
-              <a14:hiddenLine xmlns:a14="http://schemas.microsoft.com/office/drawing/2010/main" w="9525">
+              <a14:hiddenLine xmlns:a14="http://schemas.microsoft.com/office/drawing/2010/main" xmlns:p="http://schemas.openxmlformats.org/presentationml/2006/main" xmlns:r="http://schemas.openxmlformats.org/officeDocument/2006/relationships" xmlns:a="http://schemas.openxmlformats.org/drawingml/2006/main" xmlns="" w="9525">
                 <a:solidFill>
                   <a:schemeClr val="tx1"/>
                 </a:solidFill>
@@ -7809,7 +7809,7 @@
               </a14:hiddenLine>
             </a:ext>
             <a:ext uri="{AF507438-7753-43E0-B8FC-AC1667EBCBE1}">
-              <a14:hiddenEffects xmlns:a14="http://schemas.microsoft.com/office/drawing/2010/main">
+              <a14:hiddenEffects xmlns:a14="http://schemas.microsoft.com/office/drawing/2010/main" xmlns:p="http://schemas.openxmlformats.org/presentationml/2006/main" xmlns:r="http://schemas.openxmlformats.org/officeDocument/2006/relationships" xmlns:a="http://schemas.openxmlformats.org/drawingml/2006/main" xmlns="">
                 <a:effectLst>
                   <a:outerShdw dist="35921" dir="2700000" algn="ctr" rotWithShape="0">
                     <a:schemeClr val="bg2"/>
@@ -8386,7 +8386,7 @@
 </file>
 
 <file path=ppt/slideMasters/slideMaster2.xml><?xml version="1.0" encoding="utf-8"?>
-<p:sldMaster xmlns:a="http://schemas.openxmlformats.org/drawingml/2006/main" xmlns:r="http://schemas.openxmlformats.org/officeDocument/2006/relationships" xmlns:p="http://schemas.openxmlformats.org/presentationml/2006/main" preserve="1">
+<p:sldMaster xmlns:a="http://schemas.openxmlformats.org/drawingml/2006/main" xmlns:r="http://schemas.openxmlformats.org/officeDocument/2006/relationships" xmlns:mc="http://schemas.openxmlformats.org/markup-compatibility/2006" xmlns:mv="urn:schemas-microsoft-com:mac:vml" xmlns:p="http://schemas.openxmlformats.org/presentationml/2006/main" mc:Ignorable="mv" mc:PreserveAttributes="mv:*" preserve="1">
   <p:cSld>
     <p:bg>
       <p:bgPr>
@@ -8435,14 +8435,14 @@
           <a:effectLst/>
           <a:extLst>
             <a:ext uri="{909E8E84-426E-40DD-AFC4-6F175D3DCCD1}">
-              <a14:hiddenFill xmlns:a14="http://schemas.microsoft.com/office/drawing/2010/main">
+              <a14:hiddenFill xmlns:a14="http://schemas.microsoft.com/office/drawing/2010/main" xmlns:p="http://schemas.openxmlformats.org/presentationml/2006/main" xmlns:r="http://schemas.openxmlformats.org/officeDocument/2006/relationships" xmlns:a="http://schemas.openxmlformats.org/drawingml/2006/main" xmlns="">
                 <a:solidFill>
                   <a:schemeClr val="accent1"/>
                 </a:solidFill>
               </a14:hiddenFill>
             </a:ext>
             <a:ext uri="{91240B29-F687-4F45-9708-019B960494DF}">
-              <a14:hiddenLine xmlns:a14="http://schemas.microsoft.com/office/drawing/2010/main" w="9525">
+              <a14:hiddenLine xmlns:a14="http://schemas.microsoft.com/office/drawing/2010/main" xmlns:p="http://schemas.openxmlformats.org/presentationml/2006/main" xmlns:r="http://schemas.openxmlformats.org/officeDocument/2006/relationships" xmlns:a="http://schemas.openxmlformats.org/drawingml/2006/main" xmlns="" w="9525">
                 <a:solidFill>
                   <a:schemeClr val="tx1"/>
                 </a:solidFill>
@@ -8452,7 +8452,7 @@
               </a14:hiddenLine>
             </a:ext>
             <a:ext uri="{AF507438-7753-43E0-B8FC-AC1667EBCBE1}">
-              <a14:hiddenEffects xmlns:a14="http://schemas.microsoft.com/office/drawing/2010/main">
+              <a14:hiddenEffects xmlns:a14="http://schemas.microsoft.com/office/drawing/2010/main" xmlns:p="http://schemas.openxmlformats.org/presentationml/2006/main" xmlns:r="http://schemas.openxmlformats.org/officeDocument/2006/relationships" xmlns:a="http://schemas.openxmlformats.org/drawingml/2006/main" xmlns="">
                 <a:effectLst>
                   <a:outerShdw dist="35921" dir="2700000" algn="ctr" rotWithShape="0">
                     <a:schemeClr val="bg2"/>
@@ -8520,12 +8520,12 @@
           <a:effectLst/>
           <a:extLst>
             <a:ext uri="{909E8E84-426E-40DD-AFC4-6F175D3DCCD1}">
-              <a14:hiddenFill xmlns:a14="http://schemas.microsoft.com/office/drawing/2010/main">
+              <a14:hiddenFill xmlns:a14="http://schemas.microsoft.com/office/drawing/2010/main" xmlns:p="http://schemas.openxmlformats.org/presentationml/2006/main" xmlns:r="http://schemas.openxmlformats.org/officeDocument/2006/relationships" xmlns:a="http://schemas.openxmlformats.org/drawingml/2006/main" xmlns="">
                 <a:noFill/>
               </a14:hiddenFill>
             </a:ext>
             <a:ext uri="{AF507438-7753-43E0-B8FC-AC1667EBCBE1}">
-              <a14:hiddenEffects xmlns:a14="http://schemas.microsoft.com/office/drawing/2010/main">
+              <a14:hiddenEffects xmlns:a14="http://schemas.microsoft.com/office/drawing/2010/main" xmlns:p="http://schemas.openxmlformats.org/presentationml/2006/main" xmlns:r="http://schemas.openxmlformats.org/officeDocument/2006/relationships" xmlns:a="http://schemas.openxmlformats.org/drawingml/2006/main" xmlns="">
                 <a:effectLst>
                   <a:outerShdw dist="35921" dir="2700000" algn="ctr" rotWithShape="0">
                     <a:schemeClr val="bg2"/>
@@ -8568,14 +8568,14 @@
           <a:effectLst/>
           <a:extLst>
             <a:ext uri="{909E8E84-426E-40DD-AFC4-6F175D3DCCD1}">
-              <a14:hiddenFill xmlns:a14="http://schemas.microsoft.com/office/drawing/2010/main">
+              <a14:hiddenFill xmlns:a14="http://schemas.microsoft.com/office/drawing/2010/main" xmlns:p="http://schemas.openxmlformats.org/presentationml/2006/main" xmlns:r="http://schemas.openxmlformats.org/officeDocument/2006/relationships" xmlns:a="http://schemas.openxmlformats.org/drawingml/2006/main" xmlns="">
                 <a:solidFill>
                   <a:schemeClr val="accent1"/>
                 </a:solidFill>
               </a14:hiddenFill>
             </a:ext>
             <a:ext uri="{91240B29-F687-4F45-9708-019B960494DF}">
-              <a14:hiddenLine xmlns:a14="http://schemas.microsoft.com/office/drawing/2010/main" w="9525">
+              <a14:hiddenLine xmlns:a14="http://schemas.microsoft.com/office/drawing/2010/main" xmlns:p="http://schemas.openxmlformats.org/presentationml/2006/main" xmlns:r="http://schemas.openxmlformats.org/officeDocument/2006/relationships" xmlns:a="http://schemas.openxmlformats.org/drawingml/2006/main" xmlns="" w="9525">
                 <a:solidFill>
                   <a:schemeClr val="tx1"/>
                 </a:solidFill>
@@ -8585,7 +8585,7 @@
               </a14:hiddenLine>
             </a:ext>
             <a:ext uri="{AF507438-7753-43E0-B8FC-AC1667EBCBE1}">
-              <a14:hiddenEffects xmlns:a14="http://schemas.microsoft.com/office/drawing/2010/main">
+              <a14:hiddenEffects xmlns:a14="http://schemas.microsoft.com/office/drawing/2010/main" xmlns:p="http://schemas.openxmlformats.org/presentationml/2006/main" xmlns:r="http://schemas.openxmlformats.org/officeDocument/2006/relationships" xmlns:a="http://schemas.openxmlformats.org/drawingml/2006/main" xmlns="">
                 <a:effectLst>
                   <a:outerShdw dist="35921" dir="2700000" algn="ctr" rotWithShape="0">
                     <a:schemeClr val="bg2"/>
@@ -8651,14 +8651,14 @@
           <a:effectLst/>
           <a:extLst>
             <a:ext uri="{909E8E84-426E-40DD-AFC4-6F175D3DCCD1}">
-              <a14:hiddenFill xmlns:a14="http://schemas.microsoft.com/office/drawing/2010/main">
+              <a14:hiddenFill xmlns:a14="http://schemas.microsoft.com/office/drawing/2010/main" xmlns:p="http://schemas.openxmlformats.org/presentationml/2006/main" xmlns:r="http://schemas.openxmlformats.org/officeDocument/2006/relationships" xmlns:a="http://schemas.openxmlformats.org/drawingml/2006/main" xmlns="">
                 <a:solidFill>
                   <a:schemeClr val="accent1"/>
                 </a:solidFill>
               </a14:hiddenFill>
             </a:ext>
             <a:ext uri="{91240B29-F687-4F45-9708-019B960494DF}">
-              <a14:hiddenLine xmlns:a14="http://schemas.microsoft.com/office/drawing/2010/main" w="9525">
+              <a14:hiddenLine xmlns:a14="http://schemas.microsoft.com/office/drawing/2010/main" xmlns:p="http://schemas.openxmlformats.org/presentationml/2006/main" xmlns:r="http://schemas.openxmlformats.org/officeDocument/2006/relationships" xmlns:a="http://schemas.openxmlformats.org/drawingml/2006/main" xmlns="" w="9525">
                 <a:solidFill>
                   <a:schemeClr val="tx1"/>
                 </a:solidFill>
@@ -8668,7 +8668,7 @@
               </a14:hiddenLine>
             </a:ext>
             <a:ext uri="{AF507438-7753-43E0-B8FC-AC1667EBCBE1}">
-              <a14:hiddenEffects xmlns:a14="http://schemas.microsoft.com/office/drawing/2010/main">
+              <a14:hiddenEffects xmlns:a14="http://schemas.microsoft.com/office/drawing/2010/main" xmlns:p="http://schemas.openxmlformats.org/presentationml/2006/main" xmlns:r="http://schemas.openxmlformats.org/officeDocument/2006/relationships" xmlns:a="http://schemas.openxmlformats.org/drawingml/2006/main" xmlns="">
                 <a:effectLst>
                   <a:outerShdw dist="35921" dir="2700000" algn="ctr" rotWithShape="0">
                     <a:schemeClr val="bg2"/>
@@ -8717,14 +8717,14 @@
           <a:effectLst/>
           <a:extLst>
             <a:ext uri="{909E8E84-426E-40DD-AFC4-6F175D3DCCD1}">
-              <a14:hiddenFill xmlns:a14="http://schemas.microsoft.com/office/drawing/2010/main">
+              <a14:hiddenFill xmlns:a14="http://schemas.microsoft.com/office/drawing/2010/main" xmlns:p="http://schemas.openxmlformats.org/presentationml/2006/main" xmlns:r="http://schemas.openxmlformats.org/officeDocument/2006/relationships" xmlns:a="http://schemas.openxmlformats.org/drawingml/2006/main" xmlns="">
                 <a:solidFill>
                   <a:schemeClr val="accent1"/>
                 </a:solidFill>
               </a14:hiddenFill>
             </a:ext>
             <a:ext uri="{91240B29-F687-4F45-9708-019B960494DF}">
-              <a14:hiddenLine xmlns:a14="http://schemas.microsoft.com/office/drawing/2010/main" w="9525" algn="ctr">
+              <a14:hiddenLine xmlns:a14="http://schemas.microsoft.com/office/drawing/2010/main" xmlns:p="http://schemas.openxmlformats.org/presentationml/2006/main" xmlns:r="http://schemas.openxmlformats.org/officeDocument/2006/relationships" xmlns:a="http://schemas.openxmlformats.org/drawingml/2006/main" xmlns="" w="9525" algn="ctr">
                 <a:solidFill>
                   <a:schemeClr val="tx1"/>
                 </a:solidFill>
@@ -8734,7 +8734,7 @@
               </a14:hiddenLine>
             </a:ext>
             <a:ext uri="{AF507438-7753-43E0-B8FC-AC1667EBCBE1}">
-              <a14:hiddenEffects xmlns:a14="http://schemas.microsoft.com/office/drawing/2010/main">
+              <a14:hiddenEffects xmlns:a14="http://schemas.microsoft.com/office/drawing/2010/main" xmlns:p="http://schemas.openxmlformats.org/presentationml/2006/main" xmlns:r="http://schemas.openxmlformats.org/officeDocument/2006/relationships" xmlns:a="http://schemas.openxmlformats.org/drawingml/2006/main" xmlns="">
                 <a:effectLst>
                   <a:outerShdw dist="35921" dir="2700000" algn="ctr" rotWithShape="0">
                     <a:schemeClr val="bg2"/>
@@ -8893,14 +8893,14 @@
           <a:effectLst/>
           <a:extLst>
             <a:ext uri="{909E8E84-426E-40DD-AFC4-6F175D3DCCD1}">
-              <a14:hiddenFill xmlns:a14="http://schemas.microsoft.com/office/drawing/2010/main">
+              <a14:hiddenFill xmlns:a14="http://schemas.microsoft.com/office/drawing/2010/main" xmlns:p="http://schemas.openxmlformats.org/presentationml/2006/main" xmlns:r="http://schemas.openxmlformats.org/officeDocument/2006/relationships" xmlns:a="http://schemas.openxmlformats.org/drawingml/2006/main" xmlns="">
                 <a:solidFill>
                   <a:schemeClr val="accent1"/>
                 </a:solidFill>
               </a14:hiddenFill>
             </a:ext>
             <a:ext uri="{91240B29-F687-4F45-9708-019B960494DF}">
-              <a14:hiddenLine xmlns:a14="http://schemas.microsoft.com/office/drawing/2010/main" w="9525" algn="ctr">
+              <a14:hiddenLine xmlns:a14="http://schemas.microsoft.com/office/drawing/2010/main" xmlns:p="http://schemas.openxmlformats.org/presentationml/2006/main" xmlns:r="http://schemas.openxmlformats.org/officeDocument/2006/relationships" xmlns:a="http://schemas.openxmlformats.org/drawingml/2006/main" xmlns="" w="9525" algn="ctr">
                 <a:solidFill>
                   <a:schemeClr val="tx1"/>
                 </a:solidFill>
@@ -8910,7 +8910,7 @@
               </a14:hiddenLine>
             </a:ext>
             <a:ext uri="{AF507438-7753-43E0-B8FC-AC1667EBCBE1}">
-              <a14:hiddenEffects xmlns:a14="http://schemas.microsoft.com/office/drawing/2010/main">
+              <a14:hiddenEffects xmlns:a14="http://schemas.microsoft.com/office/drawing/2010/main" xmlns:p="http://schemas.openxmlformats.org/presentationml/2006/main" xmlns:r="http://schemas.openxmlformats.org/officeDocument/2006/relationships" xmlns:a="http://schemas.openxmlformats.org/drawingml/2006/main" xmlns="">
                 <a:effectLst>
                   <a:outerShdw dist="35921" dir="2700000" algn="ctr" rotWithShape="0">
                     <a:schemeClr val="bg2"/>
@@ -9078,14 +9078,14 @@
           <a:effectLst/>
           <a:extLst>
             <a:ext uri="{909E8E84-426E-40DD-AFC4-6F175D3DCCD1}">
-              <a14:hiddenFill xmlns:a14="http://schemas.microsoft.com/office/drawing/2010/main">
+              <a14:hiddenFill xmlns:a14="http://schemas.microsoft.com/office/drawing/2010/main" xmlns:p="http://schemas.openxmlformats.org/presentationml/2006/main" xmlns:r="http://schemas.openxmlformats.org/officeDocument/2006/relationships" xmlns:a="http://schemas.openxmlformats.org/drawingml/2006/main" xmlns="">
                 <a:solidFill>
                   <a:schemeClr val="accent1"/>
                 </a:solidFill>
               </a14:hiddenFill>
             </a:ext>
             <a:ext uri="{91240B29-F687-4F45-9708-019B960494DF}">
-              <a14:hiddenLine xmlns:a14="http://schemas.microsoft.com/office/drawing/2010/main" w="9525" algn="ctr">
+              <a14:hiddenLine xmlns:a14="http://schemas.microsoft.com/office/drawing/2010/main" xmlns:p="http://schemas.openxmlformats.org/presentationml/2006/main" xmlns:r="http://schemas.openxmlformats.org/officeDocument/2006/relationships" xmlns:a="http://schemas.openxmlformats.org/drawingml/2006/main" xmlns="" w="9525" algn="ctr">
                 <a:solidFill>
                   <a:schemeClr val="tx1"/>
                 </a:solidFill>
@@ -9095,7 +9095,7 @@
               </a14:hiddenLine>
             </a:ext>
             <a:ext uri="{AF507438-7753-43E0-B8FC-AC1667EBCBE1}">
-              <a14:hiddenEffects xmlns:a14="http://schemas.microsoft.com/office/drawing/2010/main">
+              <a14:hiddenEffects xmlns:a14="http://schemas.microsoft.com/office/drawing/2010/main" xmlns:p="http://schemas.openxmlformats.org/presentationml/2006/main" xmlns:r="http://schemas.openxmlformats.org/officeDocument/2006/relationships" xmlns:a="http://schemas.openxmlformats.org/drawingml/2006/main" xmlns="">
                 <a:effectLst>
                   <a:outerShdw dist="35921" dir="2700000" algn="ctr" rotWithShape="0">
                     <a:schemeClr val="bg2"/>
@@ -9713,7 +9713,7 @@
 </file>
 
 <file path=ppt/slides/slide1.xml><?xml version="1.0" encoding="utf-8"?>
-<p:sld xmlns:a="http://schemas.openxmlformats.org/drawingml/2006/main" xmlns:r="http://schemas.openxmlformats.org/officeDocument/2006/relationships" xmlns:p="http://schemas.openxmlformats.org/presentationml/2006/main">
+<p:sld xmlns:a="http://schemas.openxmlformats.org/drawingml/2006/main" xmlns:r="http://schemas.openxmlformats.org/officeDocument/2006/relationships" xmlns:mc="http://schemas.openxmlformats.org/markup-compatibility/2006" xmlns:mv="urn:schemas-microsoft-com:mac:vml" xmlns:p="http://schemas.openxmlformats.org/presentationml/2006/main" mc:Ignorable="mv" mc:PreserveAttributes="mv:*">
   <p:cSld>
     <p:spTree>
       <p:nvGrpSpPr>
@@ -10150,14 +10150,14 @@
             <p:ph sz="half" idx="2"/>
             <p:extLst>
               <p:ext uri="{D42A27DB-BD31-4B8C-83A1-F6EECF244321}">
-                <p14:modId xmlns:p14="http://schemas.microsoft.com/office/powerpoint/2010/main" val="4031106991"/>
+                <p14:modId xmlns:p14="http://schemas.microsoft.com/office/powerpoint/2010/main" xmlns:p="http://schemas.openxmlformats.org/presentationml/2006/main" xmlns:r="http://schemas.openxmlformats.org/officeDocument/2006/relationships" xmlns:a="http://schemas.openxmlformats.org/drawingml/2006/main" xmlns="" val="4031106991"/>
               </p:ext>
             </p:extLst>
           </p:nvPr>
         </p:nvGraphicFramePr>
         <p:xfrm>
-          <a:off x="457200" y="1139338"/>
-          <a:ext cx="8444753" cy="5543510"/>
+          <a:off x="313267" y="1113938"/>
+          <a:ext cx="8444753" cy="6631754"/>
         </p:xfrm>
         <a:graphic>
           <a:graphicData uri="http://schemas.openxmlformats.org/drawingml/2006/table">
@@ -12666,7 +12666,7 @@
                   </a:tcPr>
                 </a:tc>
               </a:tr>
-              <a:tr h="213686">
+              <a:tr h="122697">
                 <a:tc gridSpan="2">
                   <a:txBody>
                     <a:bodyPr/>
@@ -12702,7 +12702,21 @@
                           <a:latin typeface="Arial" charset="0"/>
                           <a:cs typeface="Arial" charset="0"/>
                         </a:rPr>
-                        <a:t>NYC Open Data – Health</a:t>
+                        <a:t>NYC Open Data – </a:t>
+                      </a:r>
+                      <a:r>
+                        <a:rPr kumimoji="0" lang="en-US" altLang="en-US" sz="900" b="0" i="0" u="none" strike="noStrike" cap="none" normalizeH="0" baseline="0" dirty="0" smtClean="0">
+                          <a:ln>
+                            <a:noFill/>
+                          </a:ln>
+                          <a:solidFill>
+                            <a:schemeClr val="tx1"/>
+                          </a:solidFill>
+                          <a:effectLst/>
+                          <a:latin typeface="Arial" charset="0"/>
+                          <a:cs typeface="Arial" charset="0"/>
+                        </a:rPr>
+                        <a:t>Health</a:t>
                       </a:r>
                     </a:p>
                   </a:txBody>
@@ -12907,7 +12921,462 @@
                         <a:rPr lang="en-US" sz="900" dirty="0" smtClean="0"/>
                         <a:t>100MB</a:t>
                       </a:r>
+                    </a:p>
+                  </a:txBody>
+                  <a:tcPr marT="45747" marB="45747" horzOverflow="overflow">
+                    <a:lnL w="12700" cap="flat" cmpd="sng" algn="ctr">
+                      <a:solidFill>
+                        <a:schemeClr val="tx1"/>
+                      </a:solidFill>
+                      <a:prstDash val="solid"/>
+                      <a:round/>
+                      <a:headEnd type="none" w="med" len="med"/>
+                      <a:tailEnd type="none" w="med" len="med"/>
+                    </a:lnL>
+                    <a:lnR w="12700" cap="flat" cmpd="sng" algn="ctr">
+                      <a:solidFill>
+                        <a:schemeClr val="tx1"/>
+                      </a:solidFill>
+                      <a:prstDash val="solid"/>
+                      <a:round/>
+                      <a:headEnd type="none" w="med" len="med"/>
+                      <a:tailEnd type="none" w="med" len="med"/>
+                    </a:lnR>
+                    <a:lnT w="12700" cap="flat" cmpd="sng" algn="ctr">
+                      <a:solidFill>
+                        <a:schemeClr val="tx1"/>
+                      </a:solidFill>
+                      <a:prstDash val="solid"/>
+                      <a:round/>
+                      <a:headEnd type="none" w="med" len="med"/>
+                      <a:tailEnd type="none" w="med" len="med"/>
+                    </a:lnT>
+                    <a:lnB w="12700" cap="flat" cmpd="sng" algn="ctr">
+                      <a:solidFill>
+                        <a:schemeClr val="tx1"/>
+                      </a:solidFill>
+                      <a:prstDash val="solid"/>
+                      <a:round/>
+                      <a:headEnd type="none" w="med" len="med"/>
+                      <a:tailEnd type="none" w="med" len="med"/>
+                    </a:lnB>
+                    <a:lnTlToBr>
+                      <a:noFill/>
+                    </a:lnTlToBr>
+                    <a:lnBlToTr>
+                      <a:noFill/>
+                    </a:lnBlToTr>
+                    <a:noFill/>
+                  </a:tcPr>
+                </a:tc>
+              </a:tr>
+              <a:tr h="122697">
+                <a:tc gridSpan="2">
+                  <a:txBody>
+                    <a:bodyPr/>
+                    <a:lstStyle/>
+                    <a:p>
+                      <a:pPr marL="0" marR="0" lvl="0" indent="0" algn="l" defTabSz="914400" rtl="0" eaLnBrk="1" fontAlgn="base" latinLnBrk="0" hangingPunct="1">
+                        <a:lnSpc>
+                          <a:spcPct val="100000"/>
+                        </a:lnSpc>
+                        <a:spcBef>
+                          <a:spcPct val="20000"/>
+                        </a:spcBef>
+                        <a:spcAft>
+                          <a:spcPct val="0"/>
+                        </a:spcAft>
+                        <a:buClr>
+                          <a:schemeClr val="tx1"/>
+                        </a:buClr>
+                        <a:buSzTx/>
+                        <a:buFont typeface="Wingdings" pitchFamily="2" charset="2"/>
+                        <a:buNone/>
+                        <a:tabLst/>
+                      </a:pPr>
+                      <a:r>
+                        <a:rPr kumimoji="0" lang="en-US" altLang="en-US" sz="900" b="0" i="0" u="none" strike="noStrike" cap="none" normalizeH="0" baseline="0" dirty="0" smtClean="0">
+                          <a:ln>
+                            <a:noFill/>
+                          </a:ln>
+                          <a:solidFill>
+                            <a:schemeClr val="tx1"/>
+                          </a:solidFill>
+                          <a:effectLst/>
+                          <a:latin typeface="Arial" charset="0"/>
+                          <a:cs typeface="Arial" charset="0"/>
+                        </a:rPr>
+                        <a:t>NY state health statistics links</a:t>
+                      </a:r>
+                    </a:p>
+                  </a:txBody>
+                  <a:tcPr marT="45747" marB="45747" horzOverflow="overflow">
+                    <a:lnL w="12700" cap="flat" cmpd="sng" algn="ctr">
+                      <a:solidFill>
+                        <a:schemeClr val="tx1"/>
+                      </a:solidFill>
+                      <a:prstDash val="solid"/>
+                      <a:round/>
+                      <a:headEnd type="none" w="med" len="med"/>
+                      <a:tailEnd type="none" w="med" len="med"/>
+                    </a:lnL>
+                    <a:lnR w="12700" cap="flat" cmpd="sng" algn="ctr">
+                      <a:solidFill>
+                        <a:schemeClr val="tx1"/>
+                      </a:solidFill>
+                      <a:prstDash val="solid"/>
+                      <a:round/>
+                      <a:headEnd type="none" w="med" len="med"/>
+                      <a:tailEnd type="none" w="med" len="med"/>
+                    </a:lnR>
+                    <a:lnT w="12700" cap="flat" cmpd="sng" algn="ctr">
+                      <a:solidFill>
+                        <a:schemeClr val="tx1"/>
+                      </a:solidFill>
+                      <a:prstDash val="solid"/>
+                      <a:round/>
+                      <a:headEnd type="none" w="med" len="med"/>
+                      <a:tailEnd type="none" w="med" len="med"/>
+                    </a:lnT>
+                    <a:lnB w="12700" cap="flat" cmpd="sng" algn="ctr">
+                      <a:solidFill>
+                        <a:schemeClr val="tx1"/>
+                      </a:solidFill>
+                      <a:prstDash val="solid"/>
+                      <a:round/>
+                      <a:headEnd type="none" w="med" len="med"/>
+                      <a:tailEnd type="none" w="med" len="med"/>
+                    </a:lnB>
+                    <a:lnTlToBr>
+                      <a:noFill/>
+                    </a:lnTlToBr>
+                    <a:lnBlToTr>
+                      <a:noFill/>
+                    </a:lnBlToTr>
+                    <a:noFill/>
+                  </a:tcPr>
+                </a:tc>
+                <a:tc hMerge="1">
+                  <a:txBody>
+                    <a:bodyPr/>
+                    <a:lstStyle/>
+                    <a:p>
+                      <a:endParaRPr lang="en-US"/>
+                    </a:p>
+                  </a:txBody>
+                  <a:tcPr/>
+                </a:tc>
+                <a:tc>
+                  <a:txBody>
+                    <a:bodyPr/>
+                    <a:lstStyle/>
+                    <a:p>
+                      <a:pPr marL="0" marR="0" lvl="0" indent="0" algn="l" defTabSz="914400" rtl="0" eaLnBrk="1" fontAlgn="auto" latinLnBrk="0" hangingPunct="1">
+                        <a:lnSpc>
+                          <a:spcPct val="100000"/>
+                        </a:lnSpc>
+                        <a:spcBef>
+                          <a:spcPts val="0"/>
+                        </a:spcBef>
+                        <a:spcAft>
+                          <a:spcPts val="0"/>
+                        </a:spcAft>
+                        <a:buClrTx/>
+                        <a:buSzTx/>
+                        <a:buFontTx/>
+                        <a:buNone/>
+                        <a:tabLst/>
+                        <a:defRPr/>
+                      </a:pPr>
+                      <a:r>
+                        <a:rPr kumimoji="0" lang="en-US" altLang="en-US" sz="900" b="0" i="0" u="none" strike="noStrike" cap="none" normalizeH="0" baseline="0" dirty="0" smtClean="0">
+                          <a:ln>
+                            <a:noFill/>
+                          </a:ln>
+                          <a:solidFill>
+                            <a:schemeClr val="tx1"/>
+                          </a:solidFill>
+                          <a:effectLst/>
+                          <a:latin typeface="Arial" charset="0"/>
+                          <a:cs typeface="Arial" charset="0"/>
+                        </a:rPr>
+                        <a:t>https://health.data.ny.gov/Health/Hospital-Inpatient-Discharges-SPARCS-De-Identified/q6hk-esrj</a:t>
+                      </a:r>
                       <a:endParaRPr lang="en-US" sz="900" dirty="0"/>
+                    </a:p>
+                  </a:txBody>
+                  <a:tcPr marT="45747" marB="45747" horzOverflow="overflow">
+                    <a:lnL w="12700" cap="flat" cmpd="sng" algn="ctr">
+                      <a:solidFill>
+                        <a:schemeClr val="tx1"/>
+                      </a:solidFill>
+                      <a:prstDash val="solid"/>
+                      <a:round/>
+                      <a:headEnd type="none" w="med" len="med"/>
+                      <a:tailEnd type="none" w="med" len="med"/>
+                    </a:lnL>
+                    <a:lnR w="12700" cap="flat" cmpd="sng" algn="ctr">
+                      <a:solidFill>
+                        <a:schemeClr val="tx1"/>
+                      </a:solidFill>
+                      <a:prstDash val="solid"/>
+                      <a:round/>
+                      <a:headEnd type="none" w="med" len="med"/>
+                      <a:tailEnd type="none" w="med" len="med"/>
+                    </a:lnR>
+                    <a:lnT w="12700" cap="flat" cmpd="sng" algn="ctr">
+                      <a:solidFill>
+                        <a:schemeClr val="tx1"/>
+                      </a:solidFill>
+                      <a:prstDash val="solid"/>
+                      <a:round/>
+                      <a:headEnd type="none" w="med" len="med"/>
+                      <a:tailEnd type="none" w="med" len="med"/>
+                    </a:lnT>
+                    <a:lnB w="12700" cap="flat" cmpd="sng" algn="ctr">
+                      <a:solidFill>
+                        <a:schemeClr val="tx1"/>
+                      </a:solidFill>
+                      <a:prstDash val="solid"/>
+                      <a:round/>
+                      <a:headEnd type="none" w="med" len="med"/>
+                      <a:tailEnd type="none" w="med" len="med"/>
+                    </a:lnB>
+                    <a:lnTlToBr>
+                      <a:noFill/>
+                    </a:lnTlToBr>
+                    <a:lnBlToTr>
+                      <a:noFill/>
+                    </a:lnBlToTr>
+                    <a:noFill/>
+                  </a:tcPr>
+                </a:tc>
+                <a:tc>
+                  <a:txBody>
+                    <a:bodyPr/>
+                    <a:lstStyle/>
+                    <a:p>
+                      <a:r>
+                        <a:rPr lang="en-US" sz="900" dirty="0" smtClean="0"/>
+                        <a:t>&gt;1GB</a:t>
+                      </a:r>
+                    </a:p>
+                  </a:txBody>
+                  <a:tcPr marT="45747" marB="45747" horzOverflow="overflow">
+                    <a:lnL w="12700" cap="flat" cmpd="sng" algn="ctr">
+                      <a:solidFill>
+                        <a:schemeClr val="tx1"/>
+                      </a:solidFill>
+                      <a:prstDash val="solid"/>
+                      <a:round/>
+                      <a:headEnd type="none" w="med" len="med"/>
+                      <a:tailEnd type="none" w="med" len="med"/>
+                    </a:lnL>
+                    <a:lnR w="12700" cap="flat" cmpd="sng" algn="ctr">
+                      <a:solidFill>
+                        <a:schemeClr val="tx1"/>
+                      </a:solidFill>
+                      <a:prstDash val="solid"/>
+                      <a:round/>
+                      <a:headEnd type="none" w="med" len="med"/>
+                      <a:tailEnd type="none" w="med" len="med"/>
+                    </a:lnR>
+                    <a:lnT w="12700" cap="flat" cmpd="sng" algn="ctr">
+                      <a:solidFill>
+                        <a:schemeClr val="tx1"/>
+                      </a:solidFill>
+                      <a:prstDash val="solid"/>
+                      <a:round/>
+                      <a:headEnd type="none" w="med" len="med"/>
+                      <a:tailEnd type="none" w="med" len="med"/>
+                    </a:lnT>
+                    <a:lnB w="12700" cap="flat" cmpd="sng" algn="ctr">
+                      <a:solidFill>
+                        <a:schemeClr val="tx1"/>
+                      </a:solidFill>
+                      <a:prstDash val="solid"/>
+                      <a:round/>
+                      <a:headEnd type="none" w="med" len="med"/>
+                      <a:tailEnd type="none" w="med" len="med"/>
+                    </a:lnB>
+                    <a:lnTlToBr>
+                      <a:noFill/>
+                    </a:lnTlToBr>
+                    <a:lnBlToTr>
+                      <a:noFill/>
+                    </a:lnBlToTr>
+                    <a:noFill/>
+                  </a:tcPr>
+                </a:tc>
+              </a:tr>
+              <a:tr h="122697">
+                <a:tc gridSpan="2">
+                  <a:txBody>
+                    <a:bodyPr/>
+                    <a:lstStyle/>
+                    <a:p>
+                      <a:pPr marL="0" marR="0" lvl="0" indent="0" algn="l" defTabSz="914400" rtl="0" eaLnBrk="1" fontAlgn="base" latinLnBrk="0" hangingPunct="1">
+                        <a:lnSpc>
+                          <a:spcPct val="100000"/>
+                        </a:lnSpc>
+                        <a:spcBef>
+                          <a:spcPct val="20000"/>
+                        </a:spcBef>
+                        <a:spcAft>
+                          <a:spcPct val="0"/>
+                        </a:spcAft>
+                        <a:buClr>
+                          <a:schemeClr val="tx1"/>
+                        </a:buClr>
+                        <a:buSzTx/>
+                        <a:buFont typeface="Wingdings" pitchFamily="2" charset="2"/>
+                        <a:buNone/>
+                        <a:tabLst/>
+                      </a:pPr>
+                      <a:r>
+                        <a:rPr kumimoji="0" lang="en-US" altLang="en-US" sz="900" b="0" i="0" u="none" strike="noStrike" cap="none" normalizeH="0" baseline="0" dirty="0" smtClean="0">
+                          <a:ln>
+                            <a:noFill/>
+                          </a:ln>
+                          <a:solidFill>
+                            <a:schemeClr val="tx1"/>
+                          </a:solidFill>
+                          <a:effectLst/>
+                          <a:latin typeface="Arial" charset="0"/>
+                          <a:cs typeface="Arial" charset="0"/>
+                        </a:rPr>
+                        <a:t>BLS – unemployment rates by county</a:t>
+                      </a:r>
+                    </a:p>
+                  </a:txBody>
+                  <a:tcPr marT="45747" marB="45747" horzOverflow="overflow">
+                    <a:lnL w="12700" cap="flat" cmpd="sng" algn="ctr">
+                      <a:solidFill>
+                        <a:schemeClr val="tx1"/>
+                      </a:solidFill>
+                      <a:prstDash val="solid"/>
+                      <a:round/>
+                      <a:headEnd type="none" w="med" len="med"/>
+                      <a:tailEnd type="none" w="med" len="med"/>
+                    </a:lnL>
+                    <a:lnR w="12700" cap="flat" cmpd="sng" algn="ctr">
+                      <a:solidFill>
+                        <a:schemeClr val="tx1"/>
+                      </a:solidFill>
+                      <a:prstDash val="solid"/>
+                      <a:round/>
+                      <a:headEnd type="none" w="med" len="med"/>
+                      <a:tailEnd type="none" w="med" len="med"/>
+                    </a:lnR>
+                    <a:lnT w="12700" cap="flat" cmpd="sng" algn="ctr">
+                      <a:solidFill>
+                        <a:schemeClr val="tx1"/>
+                      </a:solidFill>
+                      <a:prstDash val="solid"/>
+                      <a:round/>
+                      <a:headEnd type="none" w="med" len="med"/>
+                      <a:tailEnd type="none" w="med" len="med"/>
+                    </a:lnT>
+                    <a:lnB w="12700" cap="flat" cmpd="sng" algn="ctr">
+                      <a:solidFill>
+                        <a:schemeClr val="tx1"/>
+                      </a:solidFill>
+                      <a:prstDash val="solid"/>
+                      <a:round/>
+                      <a:headEnd type="none" w="med" len="med"/>
+                      <a:tailEnd type="none" w="med" len="med"/>
+                    </a:lnB>
+                    <a:lnTlToBr>
+                      <a:noFill/>
+                    </a:lnTlToBr>
+                    <a:lnBlToTr>
+                      <a:noFill/>
+                    </a:lnBlToTr>
+                    <a:noFill/>
+                  </a:tcPr>
+                </a:tc>
+                <a:tc hMerge="1">
+                  <a:txBody>
+                    <a:bodyPr/>
+                    <a:lstStyle/>
+                    <a:p>
+                      <a:endParaRPr lang="en-US"/>
+                    </a:p>
+                  </a:txBody>
+                  <a:tcPr/>
+                </a:tc>
+                <a:tc>
+                  <a:txBody>
+                    <a:bodyPr/>
+                    <a:lstStyle/>
+                    <a:p>
+                      <a:r>
+                        <a:rPr lang="en-US" sz="900" dirty="0" smtClean="0"/>
+                        <a:t>http://</a:t>
+                      </a:r>
+                      <a:r>
+                        <a:rPr lang="en-US" sz="900" dirty="0" err="1" smtClean="0"/>
+                        <a:t>www.bls.gov/lau/#cntyaa</a:t>
+                      </a:r>
+                      <a:endParaRPr lang="en-US" sz="900" dirty="0"/>
+                    </a:p>
+                  </a:txBody>
+                  <a:tcPr marT="45747" marB="45747" horzOverflow="overflow">
+                    <a:lnL w="12700" cap="flat" cmpd="sng" algn="ctr">
+                      <a:solidFill>
+                        <a:schemeClr val="tx1"/>
+                      </a:solidFill>
+                      <a:prstDash val="solid"/>
+                      <a:round/>
+                      <a:headEnd type="none" w="med" len="med"/>
+                      <a:tailEnd type="none" w="med" len="med"/>
+                    </a:lnL>
+                    <a:lnR w="12700" cap="flat" cmpd="sng" algn="ctr">
+                      <a:solidFill>
+                        <a:schemeClr val="tx1"/>
+                      </a:solidFill>
+                      <a:prstDash val="solid"/>
+                      <a:round/>
+                      <a:headEnd type="none" w="med" len="med"/>
+                      <a:tailEnd type="none" w="med" len="med"/>
+                    </a:lnR>
+                    <a:lnT w="12700" cap="flat" cmpd="sng" algn="ctr">
+                      <a:solidFill>
+                        <a:schemeClr val="tx1"/>
+                      </a:solidFill>
+                      <a:prstDash val="solid"/>
+                      <a:round/>
+                      <a:headEnd type="none" w="med" len="med"/>
+                      <a:tailEnd type="none" w="med" len="med"/>
+                    </a:lnT>
+                    <a:lnB w="12700" cap="flat" cmpd="sng" algn="ctr">
+                      <a:solidFill>
+                        <a:schemeClr val="tx1"/>
+                      </a:solidFill>
+                      <a:prstDash val="solid"/>
+                      <a:round/>
+                      <a:headEnd type="none" w="med" len="med"/>
+                      <a:tailEnd type="none" w="med" len="med"/>
+                    </a:lnB>
+                    <a:lnTlToBr>
+                      <a:noFill/>
+                    </a:lnTlToBr>
+                    <a:lnBlToTr>
+                      <a:noFill/>
+                    </a:lnBlToTr>
+                    <a:noFill/>
+                  </a:tcPr>
+                </a:tc>
+                <a:tc>
+                  <a:txBody>
+                    <a:bodyPr/>
+                    <a:lstStyle/>
+                    <a:p>
+                      <a:r>
+                        <a:rPr lang="en-US" sz="900" smtClean="0"/>
+                        <a:t>&lt;10 MB</a:t>
+                      </a:r>
+                      <a:endParaRPr lang="en-US" sz="900" dirty="0" smtClean="0"/>
                     </a:p>
                   </a:txBody>
                   <a:tcPr marT="45747" marB="45747" horzOverflow="overflow">
@@ -13325,8 +13794,67 @@
                           <a:latin typeface="Arial" charset="0"/>
                           <a:cs typeface="Arial" charset="0"/>
                         </a:rPr>
-                        <a:t>   - E.g. tweets</a:t>
+                        <a:t>   </a:t>
                       </a:r>
+                      <a:r>
+                        <a:rPr kumimoji="0" lang="en-US" altLang="en-US" sz="900" b="0" i="0" u="none" strike="noStrike" cap="none" normalizeH="0" baseline="0" dirty="0" smtClean="0">
+                          <a:ln>
+                            <a:noFill/>
+                          </a:ln>
+                          <a:solidFill>
+                            <a:schemeClr val="tx1"/>
+                          </a:solidFill>
+                          <a:effectLst/>
+                          <a:latin typeface="Arial" charset="0"/>
+                          <a:cs typeface="Arial" charset="0"/>
+                        </a:rPr>
+                        <a:t>- Health Data NY</a:t>
+                      </a:r>
+                    </a:p>
+                    <a:p>
+                      <a:pPr marL="0" marR="0" lvl="0" indent="0" algn="l" defTabSz="914400" rtl="0" eaLnBrk="1" fontAlgn="base" latinLnBrk="0" hangingPunct="1">
+                        <a:lnSpc>
+                          <a:spcPct val="100000"/>
+                        </a:lnSpc>
+                        <a:spcBef>
+                          <a:spcPct val="20000"/>
+                        </a:spcBef>
+                        <a:spcAft>
+                          <a:spcPct val="0"/>
+                        </a:spcAft>
+                        <a:buClr>
+                          <a:schemeClr val="tx1"/>
+                        </a:buClr>
+                        <a:buSzTx/>
+                        <a:buFont typeface="Wingdings" pitchFamily="2" charset="2"/>
+                        <a:buNone/>
+                        <a:tabLst/>
+                      </a:pPr>
+                      <a:r>
+                        <a:rPr kumimoji="0" lang="en-US" altLang="en-US" sz="900" b="0" i="0" u="none" strike="noStrike" cap="none" normalizeH="0" baseline="0" dirty="0" smtClean="0">
+                          <a:ln>
+                            <a:noFill/>
+                          </a:ln>
+                          <a:solidFill>
+                            <a:schemeClr val="tx1"/>
+                          </a:solidFill>
+                          <a:effectLst/>
+                          <a:latin typeface="Arial" charset="0"/>
+                          <a:cs typeface="Arial" charset="0"/>
+                        </a:rPr>
+                        <a:t>   - Bureau of Labor statistics</a:t>
+                      </a:r>
+                      <a:endParaRPr kumimoji="0" lang="en-US" altLang="en-US" sz="900" b="0" i="0" u="none" strike="noStrike" cap="none" normalizeH="0" baseline="0" dirty="0" smtClean="0">
+                        <a:ln>
+                          <a:noFill/>
+                        </a:ln>
+                        <a:solidFill>
+                          <a:schemeClr val="tx1"/>
+                        </a:solidFill>
+                        <a:effectLst/>
+                        <a:latin typeface="Arial" charset="0"/>
+                        <a:cs typeface="Arial" charset="0"/>
+                      </a:endParaRPr>
                     </a:p>
                   </a:txBody>
                   <a:tcPr marT="45747" marB="45747" horzOverflow="overflow">
@@ -13569,8 +14097,121 @@
                           <a:latin typeface="Arial" charset="0"/>
                           <a:cs typeface="Arial" charset="0"/>
                         </a:rPr>
-                        <a:t>Data Characteristics</a:t>
+                        <a:t>Data </a:t>
                       </a:r>
+                      <a:r>
+                        <a:rPr kumimoji="0" lang="en-US" altLang="en-US" sz="1000" b="1" i="0" u="sng" strike="noStrike" cap="none" normalizeH="0" baseline="0" dirty="0" smtClean="0">
+                          <a:ln>
+                            <a:noFill/>
+                          </a:ln>
+                          <a:solidFill>
+                            <a:schemeClr val="tx1"/>
+                          </a:solidFill>
+                          <a:effectLst/>
+                          <a:latin typeface="Arial" charset="0"/>
+                          <a:cs typeface="Arial" charset="0"/>
+                        </a:rPr>
+                        <a:t>Characteristics</a:t>
+                      </a:r>
+                    </a:p>
+                    <a:p>
+                      <a:pPr marL="0" marR="0" lvl="0" indent="0" algn="l" defTabSz="914400" rtl="0" eaLnBrk="1" fontAlgn="base" latinLnBrk="0" hangingPunct="1">
+                        <a:lnSpc>
+                          <a:spcPct val="100000"/>
+                        </a:lnSpc>
+                        <a:spcBef>
+                          <a:spcPct val="20000"/>
+                        </a:spcBef>
+                        <a:spcAft>
+                          <a:spcPct val="0"/>
+                        </a:spcAft>
+                        <a:buClr>
+                          <a:schemeClr val="tx1"/>
+                        </a:buClr>
+                        <a:buSzTx/>
+                        <a:buFontTx/>
+                        <a:buChar char="-"/>
+                        <a:tabLst/>
+                      </a:pPr>
+                      <a:r>
+                        <a:rPr kumimoji="0" lang="en-US" altLang="en-US" sz="900" b="0" i="0" u="none" strike="noStrike" cap="none" normalizeH="0" baseline="0" dirty="0" smtClean="0">
+                          <a:ln>
+                            <a:noFill/>
+                          </a:ln>
+                          <a:solidFill>
+                            <a:schemeClr val="tx1"/>
+                          </a:solidFill>
+                          <a:effectLst/>
+                          <a:latin typeface="Arial" charset="0"/>
+                          <a:cs typeface="Arial" charset="0"/>
+                        </a:rPr>
+                        <a:t> Hospital inpatient discharges</a:t>
+                      </a:r>
+                    </a:p>
+                    <a:p>
+                      <a:pPr marL="0" marR="0" lvl="0" indent="0" algn="l" defTabSz="914400" rtl="0" eaLnBrk="1" fontAlgn="base" latinLnBrk="0" hangingPunct="1">
+                        <a:lnSpc>
+                          <a:spcPct val="100000"/>
+                        </a:lnSpc>
+                        <a:spcBef>
+                          <a:spcPct val="20000"/>
+                        </a:spcBef>
+                        <a:spcAft>
+                          <a:spcPct val="0"/>
+                        </a:spcAft>
+                        <a:buClr>
+                          <a:schemeClr val="tx1"/>
+                        </a:buClr>
+                        <a:buSzTx/>
+                        <a:buFontTx/>
+                        <a:buChar char="-"/>
+                        <a:tabLst/>
+                      </a:pPr>
+                      <a:r>
+                        <a:rPr kumimoji="0" lang="en-US" altLang="en-US" sz="900" b="0" i="0" u="none" strike="noStrike" cap="none" normalizeH="0" baseline="0" dirty="0" smtClean="0">
+                          <a:ln>
+                            <a:noFill/>
+                          </a:ln>
+                          <a:solidFill>
+                            <a:schemeClr val="tx1"/>
+                          </a:solidFill>
+                          <a:effectLst/>
+                          <a:latin typeface="Arial" charset="0"/>
+                          <a:cs typeface="Arial" charset="0"/>
+                        </a:rPr>
+                        <a:t> Employment / Unemployment rates</a:t>
+                      </a:r>
+                    </a:p>
+                    <a:p>
+                      <a:pPr marL="0" marR="0" lvl="0" indent="0" algn="l" defTabSz="914400" rtl="0" eaLnBrk="1" fontAlgn="base" latinLnBrk="0" hangingPunct="1">
+                        <a:lnSpc>
+                          <a:spcPct val="100000"/>
+                        </a:lnSpc>
+                        <a:spcBef>
+                          <a:spcPct val="20000"/>
+                        </a:spcBef>
+                        <a:spcAft>
+                          <a:spcPct val="0"/>
+                        </a:spcAft>
+                        <a:buClr>
+                          <a:schemeClr val="tx1"/>
+                        </a:buClr>
+                        <a:buSzTx/>
+                        <a:buFontTx/>
+                        <a:buChar char="-"/>
+                        <a:tabLst/>
+                      </a:pPr>
+                      <a:endParaRPr kumimoji="0" lang="en-US" altLang="en-US" sz="900" b="0" i="0" u="none" strike="noStrike" cap="none" normalizeH="0" baseline="0" dirty="0" smtClean="0">
+                        <a:ln>
+                          <a:noFill/>
+                        </a:ln>
+                        <a:solidFill>
+                          <a:schemeClr val="tx1"/>
+                        </a:solidFill>
+                        <a:effectLst/>
+                        <a:latin typeface="Arial" charset="0"/>
+                        <a:cs typeface="Arial" charset="0"/>
+                      </a:endParaRPr>
                     </a:p>
                     <a:p>
                       <a:pPr marL="0" marR="0" lvl="0" indent="0" algn="l" defTabSz="914400" rtl="0" eaLnBrk="1" fontAlgn="base" latinLnBrk="0" hangingPunct="1">
@@ -13811,6 +14452,17 @@
                         </a:rPr>
                         <a:t>Data Frequency</a:t>
                       </a:r>
+                      <a:endParaRPr kumimoji="0" lang="en-US" altLang="en-US" sz="1000" b="1" i="0" u="sng" strike="noStrike" cap="none" normalizeH="0" baseline="0" dirty="0" smtClean="0">
+                        <a:ln>
+                          <a:noFill/>
+                        </a:ln>
+                        <a:solidFill>
+                          <a:schemeClr val="tx1"/>
+                        </a:solidFill>
+                        <a:effectLst/>
+                        <a:latin typeface="Arial" charset="0"/>
+                        <a:cs typeface="Arial" charset="0"/>
+                      </a:endParaRPr>
                     </a:p>
                     <a:p>
                       <a:pPr marL="0" marR="0" lvl="0" indent="0" algn="l" defTabSz="914400" rtl="0" eaLnBrk="1" fontAlgn="base" latinLnBrk="0" hangingPunct="1">
@@ -13827,8 +14479,8 @@
                           <a:schemeClr val="tx1"/>
                         </a:buClr>
                         <a:buSzTx/>
-                        <a:buFont typeface="Wingdings" pitchFamily="2" charset="2"/>
-                        <a:buNone/>
+                        <a:buFontTx/>
+                        <a:buChar char="-"/>
                         <a:tabLst/>
                       </a:pPr>
                       <a:r>
@@ -13843,7 +14495,106 @@
                           <a:latin typeface="Arial" charset="0"/>
                           <a:cs typeface="Arial" charset="0"/>
                         </a:rPr>
-                        <a:t>- If </a:t>
+                        <a:t> Annual</a:t>
+                      </a:r>
+                    </a:p>
+                    <a:p>
+                      <a:pPr marL="0" marR="0" lvl="0" indent="0" algn="l" defTabSz="914400" rtl="0" eaLnBrk="1" fontAlgn="base" latinLnBrk="0" hangingPunct="1">
+                        <a:lnSpc>
+                          <a:spcPct val="100000"/>
+                        </a:lnSpc>
+                        <a:spcBef>
+                          <a:spcPct val="20000"/>
+                        </a:spcBef>
+                        <a:spcAft>
+                          <a:spcPct val="0"/>
+                        </a:spcAft>
+                        <a:buClr>
+                          <a:schemeClr val="tx1"/>
+                        </a:buClr>
+                        <a:buSzTx/>
+                        <a:buFontTx/>
+                        <a:buChar char="-"/>
+                        <a:tabLst/>
+                      </a:pPr>
+                      <a:r>
+                        <a:rPr kumimoji="0" lang="en-US" altLang="en-US" sz="900" b="0" i="0" u="none" strike="noStrike" cap="none" normalizeH="0" baseline="0" dirty="0" smtClean="0">
+                          <a:ln>
+                            <a:noFill/>
+                          </a:ln>
+                          <a:solidFill>
+                            <a:schemeClr val="tx1"/>
+                          </a:solidFill>
+                          <a:effectLst/>
+                          <a:latin typeface="Arial" charset="0"/>
+                          <a:cs typeface="Arial" charset="0"/>
+                        </a:rPr>
+                        <a:t> Annual</a:t>
+                      </a:r>
+                    </a:p>
+                    <a:p>
+                      <a:pPr marL="0" marR="0" lvl="0" indent="0" algn="l" defTabSz="914400" rtl="0" eaLnBrk="1" fontAlgn="base" latinLnBrk="0" hangingPunct="1">
+                        <a:lnSpc>
+                          <a:spcPct val="100000"/>
+                        </a:lnSpc>
+                        <a:spcBef>
+                          <a:spcPct val="20000"/>
+                        </a:spcBef>
+                        <a:spcAft>
+                          <a:spcPct val="0"/>
+                        </a:spcAft>
+                        <a:buClr>
+                          <a:schemeClr val="tx1"/>
+                        </a:buClr>
+                        <a:buSzTx/>
+                        <a:buFontTx/>
+                        <a:buChar char="-"/>
+                        <a:tabLst/>
+                      </a:pPr>
+                      <a:endParaRPr kumimoji="0" lang="en-US" altLang="en-US" sz="900" b="0" i="0" u="none" strike="noStrike" cap="none" normalizeH="0" baseline="0" dirty="0" smtClean="0">
+                        <a:ln>
+                          <a:noFill/>
+                        </a:ln>
+                        <a:solidFill>
+                          <a:schemeClr val="tx1"/>
+                        </a:solidFill>
+                        <a:effectLst/>
+                        <a:latin typeface="Arial" charset="0"/>
+                        <a:cs typeface="Arial" charset="0"/>
+                      </a:endParaRPr>
+                    </a:p>
+                    <a:p>
+                      <a:pPr marL="0" marR="0" lvl="0" indent="0" algn="l" defTabSz="914400" rtl="0" eaLnBrk="1" fontAlgn="base" latinLnBrk="0" hangingPunct="1">
+                        <a:lnSpc>
+                          <a:spcPct val="100000"/>
+                        </a:lnSpc>
+                        <a:spcBef>
+                          <a:spcPct val="20000"/>
+                        </a:spcBef>
+                        <a:spcAft>
+                          <a:spcPct val="0"/>
+                        </a:spcAft>
+                        <a:buClr>
+                          <a:schemeClr val="tx1"/>
+                        </a:buClr>
+                        <a:buSzTx/>
+                        <a:buFontTx/>
+                        <a:buChar char="-"/>
+                        <a:tabLst/>
+                      </a:pPr>
+                      <a:r>
+                        <a:rPr kumimoji="0" lang="en-US" altLang="en-US" sz="900" b="0" i="0" u="none" strike="noStrike" cap="none" normalizeH="0" baseline="0" dirty="0" smtClean="0">
+                          <a:ln>
+                            <a:noFill/>
+                          </a:ln>
+                          <a:solidFill>
+                            <a:schemeClr val="tx1"/>
+                          </a:solidFill>
+                          <a:effectLst/>
+                          <a:latin typeface="Arial" charset="0"/>
+                          <a:cs typeface="Arial" charset="0"/>
+                        </a:rPr>
+                        <a:t> If </a:t>
                       </a:r>
                       <a:r>
                         <a:rPr kumimoji="0" lang="en-US" altLang="en-US" sz="900" b="0" i="0" u="none" strike="noStrike" cap="none" normalizeH="0" baseline="0" dirty="0" err="1" smtClean="0">
@@ -15280,7 +16031,7 @@
     </p:spTree>
     <p:extLst>
       <p:ext uri="{BB962C8B-B14F-4D97-AF65-F5344CB8AC3E}">
-        <p14:creationId xmlns:p14="http://schemas.microsoft.com/office/powerpoint/2010/main" val="3852912342"/>
+        <p14:creationId xmlns:p14="http://schemas.microsoft.com/office/powerpoint/2010/main" xmlns:p="http://schemas.openxmlformats.org/presentationml/2006/main" xmlns:r="http://schemas.openxmlformats.org/officeDocument/2006/relationships" xmlns:a="http://schemas.openxmlformats.org/drawingml/2006/main" xmlns="" val="3852912342"/>
       </p:ext>
     </p:extLst>
   </p:cSld>

</xml_diff>

<commit_message>
Updated Project proposal to cover sections 1 - 5
</commit_message>
<xml_diff>
--- a/Proposal/Project Proposal.pptx
+++ b/Proposal/Project Proposal.pptx
@@ -6,10 +6,11 @@
     <p:sldMasterId id="2147483888" r:id="rId2"/>
   </p:sldMasterIdLst>
   <p:notesMasterIdLst>
-    <p:notesMasterId r:id="rId4"/>
+    <p:notesMasterId r:id="rId5"/>
   </p:notesMasterIdLst>
   <p:sldIdLst>
     <p:sldId id="491" r:id="rId3"/>
+    <p:sldId id="492" r:id="rId4"/>
   </p:sldIdLst>
   <p:sldSz cx="9144000" cy="6858000" type="screen4x3"/>
   <p:notesSz cx="7010400" cy="9296400"/>
@@ -9713,7 +9714,7 @@
 </file>
 
 <file path=ppt/slides/slide1.xml><?xml version="1.0" encoding="utf-8"?>
-<p:sld xmlns:a="http://schemas.openxmlformats.org/drawingml/2006/main" xmlns:r="http://schemas.openxmlformats.org/officeDocument/2006/relationships" xmlns:p="http://schemas.openxmlformats.org/presentationml/2006/main">
+<p:sld xmlns:a="http://schemas.openxmlformats.org/drawingml/2006/main" xmlns:r="http://schemas.openxmlformats.org/officeDocument/2006/relationships" xmlns:p="http://schemas.openxmlformats.org/presentationml/2006/main" showMasterSp="0">
   <p:cSld>
     <p:spTree>
       <p:nvGrpSpPr>
@@ -9740,6 +9741,10 @@
           </p:nvPr>
         </p:nvSpPr>
         <p:spPr>
+          <a:xfrm>
+            <a:off x="6597650" y="8528050"/>
+            <a:ext cx="2133600" cy="228600"/>
+          </a:xfrm>
           <a:noFill/>
         </p:spPr>
         <p:txBody>
@@ -9951,6 +9956,10 @@
           </p:nvPr>
         </p:nvSpPr>
         <p:spPr>
+          <a:xfrm>
+            <a:off x="3168650" y="8528050"/>
+            <a:ext cx="2895600" cy="228600"/>
+          </a:xfrm>
           <a:noFill/>
         </p:spPr>
         <p:txBody>
@@ -10150,14 +10159,14 @@
             <p:ph sz="half" idx="2"/>
             <p:extLst>
               <p:ext uri="{D42A27DB-BD31-4B8C-83A1-F6EECF244321}">
-                <p14:modId xmlns:p14="http://schemas.microsoft.com/office/powerpoint/2010/main" val="4031106991"/>
+                <p14:modId xmlns:p14="http://schemas.microsoft.com/office/powerpoint/2010/main" val="3062184352"/>
               </p:ext>
             </p:extLst>
           </p:nvPr>
         </p:nvGraphicFramePr>
         <p:xfrm>
-          <a:off x="457200" y="1139338"/>
-          <a:ext cx="8444753" cy="5543510"/>
+          <a:off x="370417" y="148738"/>
+          <a:ext cx="8444753" cy="6364892"/>
         </p:xfrm>
         <a:graphic>
           <a:graphicData uri="http://schemas.openxmlformats.org/drawingml/2006/table">
@@ -10595,7 +10604,47 @@
                             <a:schemeClr val="tx1"/>
                           </a:solidFill>
                         </a:rPr>
-                        <a:t> Using national employment statistics, public health data, and health care utilization metrics, we intend to explore whether there is a correlation between occupation and disease, and more importantly between unemployment, use of health care services and health outcomes by region.  We are attempting to answer the question: Do people get sicker when they have a job or not?  Is there a community or social impact that can be discerned from (or predicted by) specific economic trends?</a:t>
+                        <a:t> Using </a:t>
+                      </a:r>
+                      <a:r>
+                        <a:rPr lang="en-US" altLang="en-US" sz="900" baseline="0" dirty="0" smtClean="0">
+                          <a:solidFill>
+                            <a:schemeClr val="tx1"/>
+                          </a:solidFill>
+                        </a:rPr>
+                        <a:t>New York state employment statistics by county, in-patient hospital data by </a:t>
+                      </a:r>
+                      <a:r>
+                        <a:rPr lang="en-US" altLang="en-US" sz="900" baseline="0" dirty="0" err="1" smtClean="0">
+                          <a:solidFill>
+                            <a:schemeClr val="tx1"/>
+                          </a:solidFill>
+                        </a:rPr>
+                        <a:t>zipcode</a:t>
+                      </a:r>
+                      <a:r>
+                        <a:rPr lang="en-US" altLang="en-US" sz="900" baseline="0" dirty="0" smtClean="0">
+                          <a:solidFill>
+                            <a:schemeClr val="tx1"/>
+                          </a:solidFill>
+                        </a:rPr>
+                        <a:t>, and twitter updates, we intend to explore </a:t>
+                      </a:r>
+                      <a:r>
+                        <a:rPr lang="en-US" altLang="en-US" sz="900" baseline="0" dirty="0" smtClean="0">
+                          <a:solidFill>
+                            <a:schemeClr val="tx1"/>
+                          </a:solidFill>
+                        </a:rPr>
+                        <a:t>whether there is a correlation between </a:t>
+                      </a:r>
+                      <a:r>
+                        <a:rPr lang="en-US" altLang="en-US" sz="900" baseline="0" dirty="0" smtClean="0">
+                          <a:solidFill>
+                            <a:schemeClr val="tx1"/>
+                          </a:solidFill>
+                        </a:rPr>
+                        <a:t>unemployment and changes in health.  Assuming we can find a relationship between historical unemployment and hospital stays, we can than then use current twitter updates as a predictor of future declining health.</a:t>
                       </a:r>
                       <a:endParaRPr lang="en-US" altLang="en-US" sz="400" dirty="0" smtClean="0">
                         <a:solidFill>
@@ -11516,168 +11565,11 @@
                   </a:tcPr>
                 </a:tc>
               </a:tr>
-              <a:tr h="230486">
+              <a:tr h="122697">
                 <a:tc gridSpan="2">
                   <a:txBody>
                     <a:bodyPr/>
-                    <a:lstStyle>
-                      <a:lvl1pPr>
-                        <a:spcBef>
-                          <a:spcPct val="20000"/>
-                        </a:spcBef>
-                        <a:buClr>
-                          <a:schemeClr val="tx1"/>
-                        </a:buClr>
-                        <a:buFont typeface="Wingdings" pitchFamily="2" charset="2"/>
-                        <a:defRPr sz="2000">
-                          <a:solidFill>
-                            <a:schemeClr val="tx1"/>
-                          </a:solidFill>
-                          <a:latin typeface="Arial" charset="0"/>
-                          <a:cs typeface="Arial" charset="0"/>
-                        </a:defRPr>
-                      </a:lvl1pPr>
-                      <a:lvl2pPr>
-                        <a:spcBef>
-                          <a:spcPct val="20000"/>
-                        </a:spcBef>
-                        <a:buClr>
-                          <a:schemeClr val="tx1"/>
-                        </a:buClr>
-                        <a:buFont typeface="Wingdings" pitchFamily="2" charset="2"/>
-                        <a:defRPr>
-                          <a:solidFill>
-                            <a:schemeClr val="tx1"/>
-                          </a:solidFill>
-                          <a:latin typeface="Arial" charset="0"/>
-                          <a:cs typeface="Arial" charset="0"/>
-                        </a:defRPr>
-                      </a:lvl2pPr>
-                      <a:lvl3pPr>
-                        <a:spcBef>
-                          <a:spcPct val="20000"/>
-                        </a:spcBef>
-                        <a:buClr>
-                          <a:schemeClr val="tx1"/>
-                        </a:buClr>
-                        <a:buFont typeface="Wingdings" pitchFamily="2" charset="2"/>
-                        <a:defRPr sz="1600">
-                          <a:solidFill>
-                            <a:schemeClr val="tx1"/>
-                          </a:solidFill>
-                          <a:latin typeface="Arial" charset="0"/>
-                          <a:cs typeface="Arial" charset="0"/>
-                        </a:defRPr>
-                      </a:lvl3pPr>
-                      <a:lvl4pPr>
-                        <a:spcBef>
-                          <a:spcPct val="20000"/>
-                        </a:spcBef>
-                        <a:buClr>
-                          <a:schemeClr val="tx1"/>
-                        </a:buClr>
-                        <a:buFont typeface="Wingdings" pitchFamily="2" charset="2"/>
-                        <a:defRPr sz="1400">
-                          <a:solidFill>
-                            <a:schemeClr val="tx1"/>
-                          </a:solidFill>
-                          <a:latin typeface="Arial" charset="0"/>
-                          <a:cs typeface="Arial" charset="0"/>
-                        </a:defRPr>
-                      </a:lvl4pPr>
-                      <a:lvl5pPr>
-                        <a:spcBef>
-                          <a:spcPct val="20000"/>
-                        </a:spcBef>
-                        <a:buClr>
-                          <a:schemeClr val="tx1"/>
-                        </a:buClr>
-                        <a:buFont typeface="Wingdings" pitchFamily="2" charset="2"/>
-                        <a:defRPr sz="1400">
-                          <a:solidFill>
-                            <a:schemeClr val="tx1"/>
-                          </a:solidFill>
-                          <a:latin typeface="Arial" charset="0"/>
-                          <a:cs typeface="Arial" charset="0"/>
-                        </a:defRPr>
-                      </a:lvl5pPr>
-                      <a:lvl6pPr fontAlgn="base">
-                        <a:spcBef>
-                          <a:spcPct val="20000"/>
-                        </a:spcBef>
-                        <a:spcAft>
-                          <a:spcPct val="0"/>
-                        </a:spcAft>
-                        <a:buClr>
-                          <a:schemeClr val="tx1"/>
-                        </a:buClr>
-                        <a:buFont typeface="Wingdings" pitchFamily="2" charset="2"/>
-                        <a:defRPr sz="1400">
-                          <a:solidFill>
-                            <a:schemeClr val="tx1"/>
-                          </a:solidFill>
-                          <a:latin typeface="Arial" charset="0"/>
-                          <a:cs typeface="Arial" charset="0"/>
-                        </a:defRPr>
-                      </a:lvl6pPr>
-                      <a:lvl7pPr fontAlgn="base">
-                        <a:spcBef>
-                          <a:spcPct val="20000"/>
-                        </a:spcBef>
-                        <a:spcAft>
-                          <a:spcPct val="0"/>
-                        </a:spcAft>
-                        <a:buClr>
-                          <a:schemeClr val="tx1"/>
-                        </a:buClr>
-                        <a:buFont typeface="Wingdings" pitchFamily="2" charset="2"/>
-                        <a:defRPr sz="1400">
-                          <a:solidFill>
-                            <a:schemeClr val="tx1"/>
-                          </a:solidFill>
-                          <a:latin typeface="Arial" charset="0"/>
-                          <a:cs typeface="Arial" charset="0"/>
-                        </a:defRPr>
-                      </a:lvl7pPr>
-                      <a:lvl8pPr fontAlgn="base">
-                        <a:spcBef>
-                          <a:spcPct val="20000"/>
-                        </a:spcBef>
-                        <a:spcAft>
-                          <a:spcPct val="0"/>
-                        </a:spcAft>
-                        <a:buClr>
-                          <a:schemeClr val="tx1"/>
-                        </a:buClr>
-                        <a:buFont typeface="Wingdings" pitchFamily="2" charset="2"/>
-                        <a:defRPr sz="1400">
-                          <a:solidFill>
-                            <a:schemeClr val="tx1"/>
-                          </a:solidFill>
-                          <a:latin typeface="Arial" charset="0"/>
-                          <a:cs typeface="Arial" charset="0"/>
-                        </a:defRPr>
-                      </a:lvl8pPr>
-                      <a:lvl9pPr fontAlgn="base">
-                        <a:spcBef>
-                          <a:spcPct val="20000"/>
-                        </a:spcBef>
-                        <a:spcAft>
-                          <a:spcPct val="0"/>
-                        </a:spcAft>
-                        <a:buClr>
-                          <a:schemeClr val="tx1"/>
-                        </a:buClr>
-                        <a:buFont typeface="Wingdings" pitchFamily="2" charset="2"/>
-                        <a:defRPr sz="1400">
-                          <a:solidFill>
-                            <a:schemeClr val="tx1"/>
-                          </a:solidFill>
-                          <a:latin typeface="Arial" charset="0"/>
-                          <a:cs typeface="Arial" charset="0"/>
-                        </a:defRPr>
-                      </a:lvl9pPr>
-                    </a:lstStyle>
+                    <a:lstStyle/>
                     <a:p>
                       <a:pPr marL="0" marR="0" lvl="0" indent="0" algn="l" defTabSz="914400" rtl="0" eaLnBrk="1" fontAlgn="base" latinLnBrk="0" hangingPunct="1">
                         <a:lnSpc>
@@ -11709,7 +11601,7 @@
                           <a:latin typeface="Arial" charset="0"/>
                           <a:cs typeface="Arial" charset="0"/>
                         </a:rPr>
-                        <a:t>National Labor Statistics</a:t>
+                        <a:t>NY state health statistics links</a:t>
                       </a:r>
                     </a:p>
                   </a:txBody>
@@ -11762,264 +11654,34 @@
                 <a:tc hMerge="1">
                   <a:txBody>
                     <a:bodyPr/>
-                    <a:lstStyle>
-                      <a:lvl1pPr>
-                        <a:spcBef>
-                          <a:spcPct val="20000"/>
-                        </a:spcBef>
-                        <a:buClr>
-                          <a:schemeClr val="tx1"/>
-                        </a:buClr>
-                        <a:buFont typeface="Wingdings" pitchFamily="2" charset="2"/>
-                        <a:defRPr sz="2000">
-                          <a:solidFill>
-                            <a:schemeClr val="tx1"/>
-                          </a:solidFill>
-                          <a:latin typeface="Arial" charset="0"/>
-                          <a:cs typeface="Arial" charset="0"/>
-                        </a:defRPr>
-                      </a:lvl1pPr>
-                      <a:lvl2pPr>
-                        <a:spcBef>
-                          <a:spcPct val="20000"/>
-                        </a:spcBef>
-                        <a:buClr>
-                          <a:schemeClr val="tx1"/>
-                        </a:buClr>
-                        <a:buFont typeface="Wingdings" pitchFamily="2" charset="2"/>
-                        <a:defRPr>
-                          <a:solidFill>
-                            <a:schemeClr val="tx1"/>
-                          </a:solidFill>
-                          <a:latin typeface="Arial" charset="0"/>
-                          <a:cs typeface="Arial" charset="0"/>
-                        </a:defRPr>
-                      </a:lvl2pPr>
-                      <a:lvl3pPr>
-                        <a:spcBef>
-                          <a:spcPct val="20000"/>
-                        </a:spcBef>
-                        <a:buClr>
-                          <a:schemeClr val="tx1"/>
-                        </a:buClr>
-                        <a:buFont typeface="Wingdings" pitchFamily="2" charset="2"/>
-                        <a:defRPr sz="1600">
-                          <a:solidFill>
-                            <a:schemeClr val="tx1"/>
-                          </a:solidFill>
-                          <a:latin typeface="Arial" charset="0"/>
-                          <a:cs typeface="Arial" charset="0"/>
-                        </a:defRPr>
-                      </a:lvl3pPr>
-                      <a:lvl4pPr>
-                        <a:spcBef>
-                          <a:spcPct val="20000"/>
-                        </a:spcBef>
-                        <a:buClr>
-                          <a:schemeClr val="tx1"/>
-                        </a:buClr>
-                        <a:buFont typeface="Wingdings" pitchFamily="2" charset="2"/>
-                        <a:defRPr sz="1400">
-                          <a:solidFill>
-                            <a:schemeClr val="tx1"/>
-                          </a:solidFill>
-                          <a:latin typeface="Arial" charset="0"/>
-                          <a:cs typeface="Arial" charset="0"/>
-                        </a:defRPr>
-                      </a:lvl4pPr>
-                      <a:lvl5pPr>
-                        <a:spcBef>
-                          <a:spcPct val="20000"/>
-                        </a:spcBef>
-                        <a:buClr>
-                          <a:schemeClr val="tx1"/>
-                        </a:buClr>
-                        <a:buFont typeface="Wingdings" pitchFamily="2" charset="2"/>
-                        <a:defRPr sz="1400">
-                          <a:solidFill>
-                            <a:schemeClr val="tx1"/>
-                          </a:solidFill>
-                          <a:latin typeface="Arial" charset="0"/>
-                          <a:cs typeface="Arial" charset="0"/>
-                        </a:defRPr>
-                      </a:lvl5pPr>
-                      <a:lvl6pPr fontAlgn="base">
-                        <a:spcBef>
-                          <a:spcPct val="20000"/>
-                        </a:spcBef>
-                        <a:spcAft>
-                          <a:spcPct val="0"/>
-                        </a:spcAft>
-                        <a:buClr>
-                          <a:schemeClr val="tx1"/>
-                        </a:buClr>
-                        <a:buFont typeface="Wingdings" pitchFamily="2" charset="2"/>
-                        <a:defRPr sz="1400">
-                          <a:solidFill>
-                            <a:schemeClr val="tx1"/>
-                          </a:solidFill>
-                          <a:latin typeface="Arial" charset="0"/>
-                          <a:cs typeface="Arial" charset="0"/>
-                        </a:defRPr>
-                      </a:lvl6pPr>
-                      <a:lvl7pPr fontAlgn="base">
-                        <a:spcBef>
-                          <a:spcPct val="20000"/>
-                        </a:spcBef>
-                        <a:spcAft>
-                          <a:spcPct val="0"/>
-                        </a:spcAft>
-                        <a:buClr>
-                          <a:schemeClr val="tx1"/>
-                        </a:buClr>
-                        <a:buFont typeface="Wingdings" pitchFamily="2" charset="2"/>
-                        <a:defRPr sz="1400">
-                          <a:solidFill>
-                            <a:schemeClr val="tx1"/>
-                          </a:solidFill>
-                          <a:latin typeface="Arial" charset="0"/>
-                          <a:cs typeface="Arial" charset="0"/>
-                        </a:defRPr>
-                      </a:lvl7pPr>
-                      <a:lvl8pPr fontAlgn="base">
-                        <a:spcBef>
-                          <a:spcPct val="20000"/>
-                        </a:spcBef>
-                        <a:spcAft>
-                          <a:spcPct val="0"/>
-                        </a:spcAft>
-                        <a:buClr>
-                          <a:schemeClr val="tx1"/>
-                        </a:buClr>
-                        <a:buFont typeface="Wingdings" pitchFamily="2" charset="2"/>
-                        <a:defRPr sz="1400">
-                          <a:solidFill>
-                            <a:schemeClr val="tx1"/>
-                          </a:solidFill>
-                          <a:latin typeface="Arial" charset="0"/>
-                          <a:cs typeface="Arial" charset="0"/>
-                        </a:defRPr>
-                      </a:lvl8pPr>
-                      <a:lvl9pPr fontAlgn="base">
-                        <a:spcBef>
-                          <a:spcPct val="20000"/>
-                        </a:spcBef>
-                        <a:spcAft>
-                          <a:spcPct val="0"/>
-                        </a:spcAft>
-                        <a:buClr>
-                          <a:schemeClr val="tx1"/>
-                        </a:buClr>
-                        <a:buFont typeface="Wingdings" pitchFamily="2" charset="2"/>
-                        <a:defRPr sz="1400">
-                          <a:solidFill>
-                            <a:schemeClr val="tx1"/>
-                          </a:solidFill>
-                          <a:latin typeface="Arial" charset="0"/>
-                          <a:cs typeface="Arial" charset="0"/>
-                        </a:defRPr>
-                      </a:lvl9pPr>
-                    </a:lstStyle>
+                    <a:lstStyle/>
                     <a:p>
-                      <a:pPr marL="0" marR="0" lvl="0" indent="0" algn="l" defTabSz="914400" rtl="0" eaLnBrk="1" fontAlgn="base" latinLnBrk="0" hangingPunct="1">
-                        <a:lnSpc>
-                          <a:spcPct val="100000"/>
-                        </a:lnSpc>
-                        <a:spcBef>
-                          <a:spcPct val="20000"/>
-                        </a:spcBef>
-                        <a:spcAft>
-                          <a:spcPct val="0"/>
-                        </a:spcAft>
-                        <a:buClr>
-                          <a:schemeClr val="tx1"/>
-                        </a:buClr>
-                        <a:buSzTx/>
-                        <a:buFont typeface="Wingdings" pitchFamily="2" charset="2"/>
-                        <a:buNone/>
-                        <a:tabLst/>
-                      </a:pPr>
-                      <a:endParaRPr kumimoji="0" lang="en-US" altLang="en-US" sz="900" b="0" i="0" u="none" strike="noStrike" cap="none" normalizeH="0" baseline="0" dirty="0" smtClean="0">
-                        <a:ln>
-                          <a:noFill/>
-                        </a:ln>
-                        <a:solidFill>
-                          <a:schemeClr val="tx1"/>
-                        </a:solidFill>
-                        <a:effectLst/>
-                        <a:latin typeface="Arial" charset="0"/>
-                        <a:cs typeface="Arial" charset="0"/>
-                      </a:endParaRPr>
+                      <a:endParaRPr lang="en-US"/>
                     </a:p>
                   </a:txBody>
-                  <a:tcPr marT="45747" marB="45747" horzOverflow="overflow">
-                    <a:lnL w="12700" cap="flat" cmpd="sng" algn="ctr">
-                      <a:solidFill>
-                        <a:schemeClr val="tx1"/>
-                      </a:solidFill>
-                      <a:prstDash val="solid"/>
-                      <a:round/>
-                      <a:headEnd type="none" w="med" len="med"/>
-                      <a:tailEnd type="none" w="med" len="med"/>
-                    </a:lnL>
-                    <a:lnR w="12700" cap="flat" cmpd="sng" algn="ctr">
-                      <a:solidFill>
-                        <a:schemeClr val="tx1"/>
-                      </a:solidFill>
-                      <a:prstDash val="solid"/>
-                      <a:round/>
-                      <a:headEnd type="none" w="med" len="med"/>
-                      <a:tailEnd type="none" w="med" len="med"/>
-                    </a:lnR>
-                    <a:lnT w="12700" cap="flat" cmpd="sng" algn="ctr">
-                      <a:solidFill>
-                        <a:schemeClr val="tx1"/>
-                      </a:solidFill>
-                      <a:prstDash val="solid"/>
-                      <a:round/>
-                      <a:headEnd type="none" w="med" len="med"/>
-                      <a:tailEnd type="none" w="med" len="med"/>
-                    </a:lnT>
-                    <a:lnB w="12700" cap="flat" cmpd="sng" algn="ctr">
-                      <a:solidFill>
-                        <a:schemeClr val="tx1"/>
-                      </a:solidFill>
-                      <a:prstDash val="solid"/>
-                      <a:round/>
-                      <a:headEnd type="none" w="med" len="med"/>
-                      <a:tailEnd type="none" w="med" len="med"/>
-                    </a:lnB>
-                    <a:lnTlToBr>
-                      <a:noFill/>
-                    </a:lnTlToBr>
-                    <a:lnBlToTr>
-                      <a:noFill/>
-                    </a:lnBlToTr>
-                    <a:noFill/>
-                  </a:tcPr>
+                  <a:tcPr/>
                 </a:tc>
                 <a:tc>
                   <a:txBody>
                     <a:bodyPr/>
                     <a:lstStyle/>
                     <a:p>
-                      <a:pPr marL="0" marR="0" lvl="0" indent="0" algn="l" defTabSz="914400" rtl="0" eaLnBrk="1" fontAlgn="base" latinLnBrk="0" hangingPunct="1">
+                      <a:pPr marL="0" marR="0" lvl="0" indent="0" algn="l" defTabSz="914400" rtl="0" eaLnBrk="1" fontAlgn="auto" latinLnBrk="0" hangingPunct="1">
                         <a:lnSpc>
                           <a:spcPct val="100000"/>
                         </a:lnSpc>
                         <a:spcBef>
-                          <a:spcPct val="20000"/>
+                          <a:spcPts val="0"/>
                         </a:spcBef>
                         <a:spcAft>
-                          <a:spcPct val="0"/>
+                          <a:spcPts val="0"/>
                         </a:spcAft>
-                        <a:buClr>
-                          <a:schemeClr val="tx1"/>
-                        </a:buClr>
+                        <a:buClrTx/>
                         <a:buSzTx/>
-                        <a:buFont typeface="Wingdings" pitchFamily="2" charset="2"/>
+                        <a:buFontTx/>
                         <a:buNone/>
                         <a:tabLst/>
+                        <a:defRPr/>
                       </a:pPr>
                       <a:r>
                         <a:rPr kumimoji="0" lang="en-US" altLang="en-US" sz="900" b="0" i="0" u="none" strike="noStrike" cap="none" normalizeH="0" baseline="0" dirty="0" smtClean="0">
@@ -12032,24 +11694,10 @@
                           <a:effectLst/>
                           <a:latin typeface="Arial" charset="0"/>
                           <a:cs typeface="Arial" charset="0"/>
-                          <a:hlinkClick r:id="rId2"/>
                         </a:rPr>
-                        <a:t>http://aws.amazon.com/datasets/Economics/2287</a:t>
+                        <a:t>https://health.data.ny.gov/Health/Hospital-Inpatient-Discharges-SPARCS-De-Identified/q6hk-esrj</a:t>
                       </a:r>
-                      <a:r>
-                        <a:rPr kumimoji="0" lang="en-US" altLang="en-US" sz="900" b="0" i="0" u="none" strike="noStrike" cap="none" normalizeH="0" baseline="0" dirty="0" smtClean="0">
-                          <a:ln>
-                            <a:noFill/>
-                          </a:ln>
-                          <a:solidFill>
-                            <a:schemeClr val="tx1"/>
-                          </a:solidFill>
-                          <a:effectLst/>
-                          <a:latin typeface="Arial" charset="0"/>
-                          <a:cs typeface="Arial" charset="0"/>
-                        </a:rPr>
-                        <a:t> </a:t>
-                      </a:r>
+                      <a:endParaRPr lang="en-US" sz="900" dirty="0"/>
                     </a:p>
                   </a:txBody>
                   <a:tcPr marT="45747" marB="45747" horzOverflow="overflow">
@@ -12105,7 +11753,165 @@
                     <a:p>
                       <a:r>
                         <a:rPr lang="en-US" sz="900" dirty="0" smtClean="0"/>
-                        <a:t>15GB</a:t>
+                        <a:t>&gt;1GB</a:t>
+                      </a:r>
+                    </a:p>
+                  </a:txBody>
+                  <a:tcPr marT="45747" marB="45747" horzOverflow="overflow">
+                    <a:lnL w="12700" cap="flat" cmpd="sng" algn="ctr">
+                      <a:solidFill>
+                        <a:schemeClr val="tx1"/>
+                      </a:solidFill>
+                      <a:prstDash val="solid"/>
+                      <a:round/>
+                      <a:headEnd type="none" w="med" len="med"/>
+                      <a:tailEnd type="none" w="med" len="med"/>
+                    </a:lnL>
+                    <a:lnR w="12700" cap="flat" cmpd="sng" algn="ctr">
+                      <a:solidFill>
+                        <a:schemeClr val="tx1"/>
+                      </a:solidFill>
+                      <a:prstDash val="solid"/>
+                      <a:round/>
+                      <a:headEnd type="none" w="med" len="med"/>
+                      <a:tailEnd type="none" w="med" len="med"/>
+                    </a:lnR>
+                    <a:lnT w="12700" cap="flat" cmpd="sng" algn="ctr">
+                      <a:solidFill>
+                        <a:schemeClr val="tx1"/>
+                      </a:solidFill>
+                      <a:prstDash val="solid"/>
+                      <a:round/>
+                      <a:headEnd type="none" w="med" len="med"/>
+                      <a:tailEnd type="none" w="med" len="med"/>
+                    </a:lnT>
+                    <a:lnB w="12700" cap="flat" cmpd="sng" algn="ctr">
+                      <a:solidFill>
+                        <a:schemeClr val="tx1"/>
+                      </a:solidFill>
+                      <a:prstDash val="solid"/>
+                      <a:round/>
+                      <a:headEnd type="none" w="med" len="med"/>
+                      <a:tailEnd type="none" w="med" len="med"/>
+                    </a:lnB>
+                    <a:lnTlToBr>
+                      <a:noFill/>
+                    </a:lnTlToBr>
+                    <a:lnBlToTr>
+                      <a:noFill/>
+                    </a:lnBlToTr>
+                    <a:noFill/>
+                  </a:tcPr>
+                </a:tc>
+              </a:tr>
+              <a:tr h="122697">
+                <a:tc gridSpan="2">
+                  <a:txBody>
+                    <a:bodyPr/>
+                    <a:lstStyle/>
+                    <a:p>
+                      <a:pPr marL="0" marR="0" lvl="0" indent="0" algn="l" defTabSz="914400" rtl="0" eaLnBrk="1" fontAlgn="base" latinLnBrk="0" hangingPunct="1">
+                        <a:lnSpc>
+                          <a:spcPct val="100000"/>
+                        </a:lnSpc>
+                        <a:spcBef>
+                          <a:spcPct val="20000"/>
+                        </a:spcBef>
+                        <a:spcAft>
+                          <a:spcPct val="0"/>
+                        </a:spcAft>
+                        <a:buClr>
+                          <a:schemeClr val="tx1"/>
+                        </a:buClr>
+                        <a:buSzTx/>
+                        <a:buFont typeface="Wingdings" pitchFamily="2" charset="2"/>
+                        <a:buNone/>
+                        <a:tabLst/>
+                      </a:pPr>
+                      <a:r>
+                        <a:rPr kumimoji="0" lang="en-US" altLang="en-US" sz="900" b="0" i="0" u="none" strike="noStrike" cap="none" normalizeH="0" baseline="0" dirty="0" smtClean="0">
+                          <a:ln>
+                            <a:noFill/>
+                          </a:ln>
+                          <a:solidFill>
+                            <a:schemeClr val="tx1"/>
+                          </a:solidFill>
+                          <a:effectLst/>
+                          <a:latin typeface="Arial" charset="0"/>
+                          <a:cs typeface="Arial" charset="0"/>
+                        </a:rPr>
+                        <a:t>BLS – unemployment rates by county</a:t>
+                      </a:r>
+                    </a:p>
+                  </a:txBody>
+                  <a:tcPr marT="45747" marB="45747" horzOverflow="overflow">
+                    <a:lnL w="12700" cap="flat" cmpd="sng" algn="ctr">
+                      <a:solidFill>
+                        <a:schemeClr val="tx1"/>
+                      </a:solidFill>
+                      <a:prstDash val="solid"/>
+                      <a:round/>
+                      <a:headEnd type="none" w="med" len="med"/>
+                      <a:tailEnd type="none" w="med" len="med"/>
+                    </a:lnL>
+                    <a:lnR w="12700" cap="flat" cmpd="sng" algn="ctr">
+                      <a:solidFill>
+                        <a:schemeClr val="tx1"/>
+                      </a:solidFill>
+                      <a:prstDash val="solid"/>
+                      <a:round/>
+                      <a:headEnd type="none" w="med" len="med"/>
+                      <a:tailEnd type="none" w="med" len="med"/>
+                    </a:lnR>
+                    <a:lnT w="12700" cap="flat" cmpd="sng" algn="ctr">
+                      <a:solidFill>
+                        <a:schemeClr val="tx1"/>
+                      </a:solidFill>
+                      <a:prstDash val="solid"/>
+                      <a:round/>
+                      <a:headEnd type="none" w="med" len="med"/>
+                      <a:tailEnd type="none" w="med" len="med"/>
+                    </a:lnT>
+                    <a:lnB w="12700" cap="flat" cmpd="sng" algn="ctr">
+                      <a:solidFill>
+                        <a:schemeClr val="tx1"/>
+                      </a:solidFill>
+                      <a:prstDash val="solid"/>
+                      <a:round/>
+                      <a:headEnd type="none" w="med" len="med"/>
+                      <a:tailEnd type="none" w="med" len="med"/>
+                    </a:lnB>
+                    <a:lnTlToBr>
+                      <a:noFill/>
+                    </a:lnTlToBr>
+                    <a:lnBlToTr>
+                      <a:noFill/>
+                    </a:lnBlToTr>
+                    <a:noFill/>
+                  </a:tcPr>
+                </a:tc>
+                <a:tc hMerge="1">
+                  <a:txBody>
+                    <a:bodyPr/>
+                    <a:lstStyle/>
+                    <a:p>
+                      <a:endParaRPr lang="en-US"/>
+                    </a:p>
+                  </a:txBody>
+                  <a:tcPr/>
+                </a:tc>
+                <a:tc>
+                  <a:txBody>
+                    <a:bodyPr/>
+                    <a:lstStyle/>
+                    <a:p>
+                      <a:r>
+                        <a:rPr lang="en-US" sz="900" dirty="0" smtClean="0"/>
+                        <a:t>http://</a:t>
+                      </a:r>
+                      <a:r>
+                        <a:rPr lang="en-US" sz="900" dirty="0" err="1" smtClean="0"/>
+                        <a:t>www.bls.gov/lau/#cntyaa</a:t>
                       </a:r>
                       <a:endParaRPr lang="en-US" sz="900" dirty="0"/>
                     </a:p>
@@ -12156,8 +11962,65 @@
                     <a:noFill/>
                   </a:tcPr>
                 </a:tc>
+                <a:tc>
+                  <a:txBody>
+                    <a:bodyPr/>
+                    <a:lstStyle/>
+                    <a:p>
+                      <a:r>
+                        <a:rPr lang="en-US" sz="900" dirty="0" smtClean="0"/>
+                        <a:t>&lt;10 MB</a:t>
+                      </a:r>
+                    </a:p>
+                  </a:txBody>
+                  <a:tcPr marT="45747" marB="45747" horzOverflow="overflow">
+                    <a:lnL w="12700" cap="flat" cmpd="sng" algn="ctr">
+                      <a:solidFill>
+                        <a:schemeClr val="tx1"/>
+                      </a:solidFill>
+                      <a:prstDash val="solid"/>
+                      <a:round/>
+                      <a:headEnd type="none" w="med" len="med"/>
+                      <a:tailEnd type="none" w="med" len="med"/>
+                    </a:lnL>
+                    <a:lnR w="12700" cap="flat" cmpd="sng" algn="ctr">
+                      <a:solidFill>
+                        <a:schemeClr val="tx1"/>
+                      </a:solidFill>
+                      <a:prstDash val="solid"/>
+                      <a:round/>
+                      <a:headEnd type="none" w="med" len="med"/>
+                      <a:tailEnd type="none" w="med" len="med"/>
+                    </a:lnR>
+                    <a:lnT w="12700" cap="flat" cmpd="sng" algn="ctr">
+                      <a:solidFill>
+                        <a:schemeClr val="tx1"/>
+                      </a:solidFill>
+                      <a:prstDash val="solid"/>
+                      <a:round/>
+                      <a:headEnd type="none" w="med" len="med"/>
+                      <a:tailEnd type="none" w="med" len="med"/>
+                    </a:lnT>
+                    <a:lnB w="12700" cap="flat" cmpd="sng" algn="ctr">
+                      <a:solidFill>
+                        <a:schemeClr val="tx1"/>
+                      </a:solidFill>
+                      <a:prstDash val="solid"/>
+                      <a:round/>
+                      <a:headEnd type="none" w="med" len="med"/>
+                      <a:tailEnd type="none" w="med" len="med"/>
+                    </a:lnB>
+                    <a:lnTlToBr>
+                      <a:noFill/>
+                    </a:lnTlToBr>
+                    <a:lnBlToTr>
+                      <a:noFill/>
+                    </a:lnBlToTr>
+                    <a:noFill/>
+                  </a:tcPr>
+                </a:tc>
               </a:tr>
-              <a:tr h="174758">
+              <a:tr h="122697">
                 <a:tc gridSpan="2">
                   <a:txBody>
                     <a:bodyPr/>
@@ -12182,8 +12045,18 @@
                         <a:tabLst/>
                       </a:pPr>
                       <a:r>
-                        <a:rPr lang="en-US" sz="900" dirty="0" smtClean="0"/>
-                        <a:t>Center for Urban Science and Progress</a:t>
+                        <a:rPr kumimoji="0" lang="en-US" altLang="en-US" sz="900" b="0" i="0" u="none" strike="noStrike" cap="none" normalizeH="0" baseline="0" dirty="0" smtClean="0">
+                          <a:ln>
+                            <a:noFill/>
+                          </a:ln>
+                          <a:solidFill>
+                            <a:schemeClr val="tx1"/>
+                          </a:solidFill>
+                          <a:effectLst/>
+                          <a:latin typeface="Arial" charset="0"/>
+                          <a:cs typeface="Arial" charset="0"/>
+                        </a:rPr>
+                        <a:t>Twitter</a:t>
                       </a:r>
                       <a:endParaRPr kumimoji="0" lang="en-US" altLang="en-US" sz="900" b="0" i="0" u="none" strike="noStrike" cap="none" normalizeH="0" baseline="0" dirty="0" smtClean="0">
                         <a:ln>
@@ -12249,82 +12122,10 @@
                     <a:bodyPr/>
                     <a:lstStyle/>
                     <a:p>
-                      <a:pPr marL="0" marR="0" lvl="0" indent="0" algn="l" defTabSz="914400" rtl="0" eaLnBrk="1" fontAlgn="base" latinLnBrk="0" hangingPunct="1">
-                        <a:lnSpc>
-                          <a:spcPct val="100000"/>
-                        </a:lnSpc>
-                        <a:spcBef>
-                          <a:spcPct val="20000"/>
-                        </a:spcBef>
-                        <a:spcAft>
-                          <a:spcPct val="0"/>
-                        </a:spcAft>
-                        <a:buClr>
-                          <a:schemeClr val="tx1"/>
-                        </a:buClr>
-                        <a:buSzTx/>
-                        <a:buFont typeface="Wingdings" pitchFamily="2" charset="2"/>
-                        <a:buNone/>
-                        <a:tabLst/>
-                      </a:pPr>
-                      <a:endParaRPr kumimoji="0" lang="en-US" altLang="en-US" sz="900" b="0" i="0" u="none" strike="noStrike" cap="none" normalizeH="0" baseline="0" dirty="0" smtClean="0">
-                        <a:ln>
-                          <a:noFill/>
-                        </a:ln>
-                        <a:solidFill>
-                          <a:schemeClr val="tx1"/>
-                        </a:solidFill>
-                        <a:effectLst/>
-                        <a:latin typeface="Arial" charset="0"/>
-                        <a:cs typeface="Arial" charset="0"/>
-                      </a:endParaRPr>
+                      <a:endParaRPr lang="en-US"/>
                     </a:p>
                   </a:txBody>
-                  <a:tcPr marT="45747" marB="45747" horzOverflow="overflow">
-                    <a:lnL w="12700" cap="flat" cmpd="sng" algn="ctr">
-                      <a:solidFill>
-                        <a:schemeClr val="tx1"/>
-                      </a:solidFill>
-                      <a:prstDash val="solid"/>
-                      <a:round/>
-                      <a:headEnd type="none" w="med" len="med"/>
-                      <a:tailEnd type="none" w="med" len="med"/>
-                    </a:lnL>
-                    <a:lnR w="12700" cap="flat" cmpd="sng" algn="ctr">
-                      <a:solidFill>
-                        <a:schemeClr val="tx1"/>
-                      </a:solidFill>
-                      <a:prstDash val="solid"/>
-                      <a:round/>
-                      <a:headEnd type="none" w="med" len="med"/>
-                      <a:tailEnd type="none" w="med" len="med"/>
-                    </a:lnR>
-                    <a:lnT w="12700" cap="flat" cmpd="sng" algn="ctr">
-                      <a:solidFill>
-                        <a:schemeClr val="tx1"/>
-                      </a:solidFill>
-                      <a:prstDash val="solid"/>
-                      <a:round/>
-                      <a:headEnd type="none" w="med" len="med"/>
-                      <a:tailEnd type="none" w="med" len="med"/>
-                    </a:lnT>
-                    <a:lnB w="12700" cap="flat" cmpd="sng" algn="ctr">
-                      <a:solidFill>
-                        <a:schemeClr val="tx1"/>
-                      </a:solidFill>
-                      <a:prstDash val="solid"/>
-                      <a:round/>
-                      <a:headEnd type="none" w="med" len="med"/>
-                      <a:tailEnd type="none" w="med" len="med"/>
-                    </a:lnB>
-                    <a:lnTlToBr>
-                      <a:noFill/>
-                    </a:lnTlToBr>
-                    <a:lnBlToTr>
-                      <a:noFill/>
-                    </a:lnBlToTr>
-                    <a:noFill/>
-                  </a:tcPr>
+                  <a:tcPr/>
                 </a:tc>
                 <a:tc>
                   <a:txBody>
@@ -12332,12 +12133,12 @@
                     <a:lstStyle/>
                     <a:p>
                       <a:r>
-                        <a:rPr lang="en-US" sz="900" smtClean="0"/>
-                        <a:t>Anonymized public </a:t>
+                        <a:rPr lang="en-US" sz="900" dirty="0" smtClean="0"/>
+                        <a:t>Twitter status updates for specific days and geographic areas using a sample of keywords related to employment (“working”, ‘job”, “fired”</a:t>
                       </a:r>
                       <a:r>
-                        <a:rPr lang="en-US" sz="900" dirty="0" smtClean="0"/>
-                        <a:t>health metrics</a:t>
+                        <a:rPr lang="en-US" sz="900" baseline="0" dirty="0" smtClean="0"/>
+                        <a:t> etc.)</a:t>
                       </a:r>
                       <a:endParaRPr lang="en-US" sz="900" dirty="0"/>
                     </a:p>
@@ -12395,9 +12196,9 @@
                     <a:p>
                       <a:r>
                         <a:rPr lang="en-US" sz="900" dirty="0" smtClean="0"/>
-                        <a:t>Unknown</a:t>
+                        <a:t>&gt; 100MB</a:t>
                       </a:r>
-                      <a:endParaRPr lang="en-US" sz="900" dirty="0"/>
+                      <a:endParaRPr lang="en-US" sz="900" dirty="0" smtClean="0"/>
                     </a:p>
                   </a:txBody>
                   <a:tcPr marT="45747" marB="45747" horzOverflow="overflow">
@@ -12447,7 +12248,7 @@
                   </a:tcPr>
                 </a:tc>
               </a:tr>
-              <a:tr h="213686">
+              <a:tr h="122697">
                 <a:tc gridSpan="2">
                   <a:txBody>
                     <a:bodyPr/>
@@ -12470,6 +12271,7 @@
                         <a:buFont typeface="Wingdings" pitchFamily="2" charset="2"/>
                         <a:buNone/>
                         <a:tabLst/>
+                        <a:defRPr/>
                       </a:pPr>
                       <a:r>
                         <a:rPr kumimoji="0" lang="en-US" altLang="en-US" sz="900" b="0" i="0" u="none" strike="noStrike" cap="none" normalizeH="0" baseline="0" dirty="0" smtClean="0">
@@ -12548,17 +12350,27 @@
                     <a:bodyPr/>
                     <a:lstStyle/>
                     <a:p>
-                      <a:r>
-                        <a:rPr lang="en-US" sz="900" dirty="0" smtClean="0">
-                          <a:hlinkClick r:id="rId3"/>
-                        </a:rPr>
-                        <a:t>http://www2.census.gov/</a:t>
-                      </a:r>
+                      <a:pPr marL="0" marR="0" indent="0" algn="l" defTabSz="914400" rtl="0" eaLnBrk="1" fontAlgn="auto" latinLnBrk="0" hangingPunct="1">
+                        <a:lnSpc>
+                          <a:spcPct val="100000"/>
+                        </a:lnSpc>
+                        <a:spcBef>
+                          <a:spcPts val="0"/>
+                        </a:spcBef>
+                        <a:spcAft>
+                          <a:spcPts val="0"/>
+                        </a:spcAft>
+                        <a:buClrTx/>
+                        <a:buSzTx/>
+                        <a:buFontTx/>
+                        <a:buNone/>
+                        <a:tabLst/>
+                        <a:defRPr/>
+                      </a:pPr>
                       <a:r>
                         <a:rPr lang="en-US" sz="900" dirty="0" smtClean="0"/>
-                        <a:t> </a:t>
+                        <a:t>http://lehd.ces.census.gov/applications/qwi_online/</a:t>
                       </a:r>
-                      <a:endParaRPr lang="en-US" sz="900" dirty="0"/>
                     </a:p>
                   </a:txBody>
                   <a:tcPr marT="45747" marB="45747" horzOverflow="overflow">
@@ -12612,302 +12424,27 @@
                     <a:bodyPr/>
                     <a:lstStyle/>
                     <a:p>
-                      <a:r>
-                        <a:rPr lang="en-US" sz="900" dirty="0" smtClean="0"/>
-                        <a:t>~1GB</a:t>
-                      </a:r>
-                      <a:endParaRPr lang="en-US" sz="900" dirty="0"/>
-                    </a:p>
-                  </a:txBody>
-                  <a:tcPr marT="45747" marB="45747" horzOverflow="overflow">
-                    <a:lnL w="12700" cap="flat" cmpd="sng" algn="ctr">
-                      <a:solidFill>
-                        <a:schemeClr val="tx1"/>
-                      </a:solidFill>
-                      <a:prstDash val="solid"/>
-                      <a:round/>
-                      <a:headEnd type="none" w="med" len="med"/>
-                      <a:tailEnd type="none" w="med" len="med"/>
-                    </a:lnL>
-                    <a:lnR w="12700" cap="flat" cmpd="sng" algn="ctr">
-                      <a:solidFill>
-                        <a:schemeClr val="tx1"/>
-                      </a:solidFill>
-                      <a:prstDash val="solid"/>
-                      <a:round/>
-                      <a:headEnd type="none" w="med" len="med"/>
-                      <a:tailEnd type="none" w="med" len="med"/>
-                    </a:lnR>
-                    <a:lnT w="12700" cap="flat" cmpd="sng" algn="ctr">
-                      <a:solidFill>
-                        <a:schemeClr val="tx1"/>
-                      </a:solidFill>
-                      <a:prstDash val="solid"/>
-                      <a:round/>
-                      <a:headEnd type="none" w="med" len="med"/>
-                      <a:tailEnd type="none" w="med" len="med"/>
-                    </a:lnT>
-                    <a:lnB w="12700" cap="flat" cmpd="sng" algn="ctr">
-                      <a:solidFill>
-                        <a:schemeClr val="tx1"/>
-                      </a:solidFill>
-                      <a:prstDash val="solid"/>
-                      <a:round/>
-                      <a:headEnd type="none" w="med" len="med"/>
-                      <a:tailEnd type="none" w="med" len="med"/>
-                    </a:lnB>
-                    <a:lnTlToBr>
-                      <a:noFill/>
-                    </a:lnTlToBr>
-                    <a:lnBlToTr>
-                      <a:noFill/>
-                    </a:lnBlToTr>
-                    <a:noFill/>
-                  </a:tcPr>
-                </a:tc>
-              </a:tr>
-              <a:tr h="213686">
-                <a:tc gridSpan="2">
-                  <a:txBody>
-                    <a:bodyPr/>
-                    <a:lstStyle/>
-                    <a:p>
-                      <a:pPr marL="0" marR="0" lvl="0" indent="0" algn="l" defTabSz="914400" rtl="0" eaLnBrk="1" fontAlgn="base" latinLnBrk="0" hangingPunct="1">
+                      <a:pPr marL="0" marR="0" indent="0" algn="l" defTabSz="914400" rtl="0" eaLnBrk="1" fontAlgn="auto" latinLnBrk="0" hangingPunct="1">
                         <a:lnSpc>
                           <a:spcPct val="100000"/>
                         </a:lnSpc>
                         <a:spcBef>
-                          <a:spcPct val="20000"/>
+                          <a:spcPts val="0"/>
                         </a:spcBef>
                         <a:spcAft>
-                          <a:spcPct val="0"/>
+                          <a:spcPts val="0"/>
                         </a:spcAft>
-                        <a:buClr>
-                          <a:schemeClr val="tx1"/>
-                        </a:buClr>
+                        <a:buClrTx/>
                         <a:buSzTx/>
-                        <a:buFont typeface="Wingdings" pitchFamily="2" charset="2"/>
+                        <a:buFontTx/>
                         <a:buNone/>
                         <a:tabLst/>
+                        <a:defRPr/>
                       </a:pPr>
                       <a:r>
-                        <a:rPr kumimoji="0" lang="en-US" altLang="en-US" sz="900" b="0" i="0" u="none" strike="noStrike" cap="none" normalizeH="0" baseline="0" dirty="0" smtClean="0">
-                          <a:ln>
-                            <a:noFill/>
-                          </a:ln>
-                          <a:solidFill>
-                            <a:schemeClr val="tx1"/>
-                          </a:solidFill>
-                          <a:effectLst/>
-                          <a:latin typeface="Arial" charset="0"/>
-                          <a:cs typeface="Arial" charset="0"/>
-                        </a:rPr>
-                        <a:t>NYC Open Data – Health</a:t>
+                        <a:rPr lang="en-US" sz="900" dirty="0" smtClean="0"/>
+                        <a:t>~10MB</a:t>
                       </a:r>
-                    </a:p>
-                  </a:txBody>
-                  <a:tcPr marT="45747" marB="45747" horzOverflow="overflow">
-                    <a:lnL w="12700" cap="flat" cmpd="sng" algn="ctr">
-                      <a:solidFill>
-                        <a:schemeClr val="tx1"/>
-                      </a:solidFill>
-                      <a:prstDash val="solid"/>
-                      <a:round/>
-                      <a:headEnd type="none" w="med" len="med"/>
-                      <a:tailEnd type="none" w="med" len="med"/>
-                    </a:lnL>
-                    <a:lnR w="12700" cap="flat" cmpd="sng" algn="ctr">
-                      <a:solidFill>
-                        <a:schemeClr val="tx1"/>
-                      </a:solidFill>
-                      <a:prstDash val="solid"/>
-                      <a:round/>
-                      <a:headEnd type="none" w="med" len="med"/>
-                      <a:tailEnd type="none" w="med" len="med"/>
-                    </a:lnR>
-                    <a:lnT w="12700" cap="flat" cmpd="sng" algn="ctr">
-                      <a:solidFill>
-                        <a:schemeClr val="tx1"/>
-                      </a:solidFill>
-                      <a:prstDash val="solid"/>
-                      <a:round/>
-                      <a:headEnd type="none" w="med" len="med"/>
-                      <a:tailEnd type="none" w="med" len="med"/>
-                    </a:lnT>
-                    <a:lnB w="12700" cap="flat" cmpd="sng" algn="ctr">
-                      <a:solidFill>
-                        <a:schemeClr val="tx1"/>
-                      </a:solidFill>
-                      <a:prstDash val="solid"/>
-                      <a:round/>
-                      <a:headEnd type="none" w="med" len="med"/>
-                      <a:tailEnd type="none" w="med" len="med"/>
-                    </a:lnB>
-                    <a:lnTlToBr>
-                      <a:noFill/>
-                    </a:lnTlToBr>
-                    <a:lnBlToTr>
-                      <a:noFill/>
-                    </a:lnBlToTr>
-                    <a:noFill/>
-                  </a:tcPr>
-                </a:tc>
-                <a:tc hMerge="1">
-                  <a:txBody>
-                    <a:bodyPr/>
-                    <a:lstStyle/>
-                    <a:p>
-                      <a:pPr marL="0" marR="0" lvl="0" indent="0" algn="l" defTabSz="914400" rtl="0" eaLnBrk="1" fontAlgn="base" latinLnBrk="0" hangingPunct="1">
-                        <a:lnSpc>
-                          <a:spcPct val="100000"/>
-                        </a:lnSpc>
-                        <a:spcBef>
-                          <a:spcPct val="20000"/>
-                        </a:spcBef>
-                        <a:spcAft>
-                          <a:spcPct val="0"/>
-                        </a:spcAft>
-                        <a:buClr>
-                          <a:schemeClr val="tx1"/>
-                        </a:buClr>
-                        <a:buSzTx/>
-                        <a:buFont typeface="Wingdings" pitchFamily="2" charset="2"/>
-                        <a:buNone/>
-                        <a:tabLst/>
-                      </a:pPr>
-                      <a:endParaRPr kumimoji="0" lang="en-US" altLang="en-US" sz="900" b="0" i="0" u="none" strike="noStrike" cap="none" normalizeH="0" baseline="0" dirty="0" smtClean="0">
-                        <a:ln>
-                          <a:noFill/>
-                        </a:ln>
-                        <a:solidFill>
-                          <a:schemeClr val="tx1"/>
-                        </a:solidFill>
-                        <a:effectLst/>
-                        <a:latin typeface="Arial" charset="0"/>
-                        <a:cs typeface="Arial" charset="0"/>
-                      </a:endParaRPr>
-                    </a:p>
-                  </a:txBody>
-                  <a:tcPr marT="45747" marB="45747" horzOverflow="overflow">
-                    <a:lnL w="12700" cap="flat" cmpd="sng" algn="ctr">
-                      <a:solidFill>
-                        <a:schemeClr val="tx1"/>
-                      </a:solidFill>
-                      <a:prstDash val="solid"/>
-                      <a:round/>
-                      <a:headEnd type="none" w="med" len="med"/>
-                      <a:tailEnd type="none" w="med" len="med"/>
-                    </a:lnL>
-                    <a:lnR w="12700" cap="flat" cmpd="sng" algn="ctr">
-                      <a:solidFill>
-                        <a:schemeClr val="tx1"/>
-                      </a:solidFill>
-                      <a:prstDash val="solid"/>
-                      <a:round/>
-                      <a:headEnd type="none" w="med" len="med"/>
-                      <a:tailEnd type="none" w="med" len="med"/>
-                    </a:lnR>
-                    <a:lnT w="12700" cap="flat" cmpd="sng" algn="ctr">
-                      <a:solidFill>
-                        <a:schemeClr val="tx1"/>
-                      </a:solidFill>
-                      <a:prstDash val="solid"/>
-                      <a:round/>
-                      <a:headEnd type="none" w="med" len="med"/>
-                      <a:tailEnd type="none" w="med" len="med"/>
-                    </a:lnT>
-                    <a:lnB w="12700" cap="flat" cmpd="sng" algn="ctr">
-                      <a:solidFill>
-                        <a:schemeClr val="tx1"/>
-                      </a:solidFill>
-                      <a:prstDash val="solid"/>
-                      <a:round/>
-                      <a:headEnd type="none" w="med" len="med"/>
-                      <a:tailEnd type="none" w="med" len="med"/>
-                    </a:lnB>
-                    <a:lnTlToBr>
-                      <a:noFill/>
-                    </a:lnTlToBr>
-                    <a:lnBlToTr>
-                      <a:noFill/>
-                    </a:lnBlToTr>
-                    <a:noFill/>
-                  </a:tcPr>
-                </a:tc>
-                <a:tc>
-                  <a:txBody>
-                    <a:bodyPr/>
-                    <a:lstStyle/>
-                    <a:p>
-                      <a:r>
-                        <a:rPr lang="en-US" sz="900" dirty="0" smtClean="0">
-                          <a:hlinkClick r:id="rId4"/>
-                        </a:rPr>
-                        <a:t>https://nycopendata.socrata.com/data?cat=health</a:t>
-                      </a:r>
-                      <a:r>
-                        <a:rPr lang="en-US" sz="900" dirty="0" smtClean="0"/>
-                        <a:t> </a:t>
-                      </a:r>
-                      <a:endParaRPr lang="en-US" sz="900" dirty="0"/>
-                    </a:p>
-                  </a:txBody>
-                  <a:tcPr marT="45747" marB="45747" horzOverflow="overflow">
-                    <a:lnL w="12700" cap="flat" cmpd="sng" algn="ctr">
-                      <a:solidFill>
-                        <a:schemeClr val="tx1"/>
-                      </a:solidFill>
-                      <a:prstDash val="solid"/>
-                      <a:round/>
-                      <a:headEnd type="none" w="med" len="med"/>
-                      <a:tailEnd type="none" w="med" len="med"/>
-                    </a:lnL>
-                    <a:lnR w="12700" cap="flat" cmpd="sng" algn="ctr">
-                      <a:solidFill>
-                        <a:schemeClr val="tx1"/>
-                      </a:solidFill>
-                      <a:prstDash val="solid"/>
-                      <a:round/>
-                      <a:headEnd type="none" w="med" len="med"/>
-                      <a:tailEnd type="none" w="med" len="med"/>
-                    </a:lnR>
-                    <a:lnT w="12700" cap="flat" cmpd="sng" algn="ctr">
-                      <a:solidFill>
-                        <a:schemeClr val="tx1"/>
-                      </a:solidFill>
-                      <a:prstDash val="solid"/>
-                      <a:round/>
-                      <a:headEnd type="none" w="med" len="med"/>
-                      <a:tailEnd type="none" w="med" len="med"/>
-                    </a:lnT>
-                    <a:lnB w="12700" cap="flat" cmpd="sng" algn="ctr">
-                      <a:solidFill>
-                        <a:schemeClr val="tx1"/>
-                      </a:solidFill>
-                      <a:prstDash val="solid"/>
-                      <a:round/>
-                      <a:headEnd type="none" w="med" len="med"/>
-                      <a:tailEnd type="none" w="med" len="med"/>
-                    </a:lnB>
-                    <a:lnTlToBr>
-                      <a:noFill/>
-                    </a:lnTlToBr>
-                    <a:lnBlToTr>
-                      <a:noFill/>
-                    </a:lnBlToTr>
-                    <a:noFill/>
-                  </a:tcPr>
-                </a:tc>
-                <a:tc>
-                  <a:txBody>
-                    <a:bodyPr/>
-                    <a:lstStyle/>
-                    <a:p>
-                      <a:r>
-                        <a:rPr lang="en-US" sz="900" dirty="0" smtClean="0"/>
-                        <a:t>100MB</a:t>
-                      </a:r>
-                      <a:endParaRPr lang="en-US" sz="900" dirty="0"/>
                     </a:p>
                   </a:txBody>
                   <a:tcPr marT="45747" marB="45747" horzOverflow="overflow">
@@ -13325,8 +12862,33 @@
                           <a:latin typeface="Arial" charset="0"/>
                           <a:cs typeface="Arial" charset="0"/>
                         </a:rPr>
-                        <a:t>   - E.g. tweets</a:t>
+                        <a:t>   - Health Data </a:t>
                       </a:r>
+                      <a:r>
+                        <a:rPr kumimoji="0" lang="en-US" altLang="en-US" sz="900" b="0" i="0" u="none" strike="noStrike" cap="none" normalizeH="0" baseline="0" dirty="0" smtClean="0">
+                          <a:ln>
+                            <a:noFill/>
+                          </a:ln>
+                          <a:solidFill>
+                            <a:schemeClr val="tx1"/>
+                          </a:solidFill>
+                          <a:effectLst/>
+                          <a:latin typeface="Arial" charset="0"/>
+                          <a:cs typeface="Arial" charset="0"/>
+                        </a:rPr>
+                        <a:t>NY</a:t>
+                      </a:r>
+                      <a:endParaRPr kumimoji="0" lang="en-US" altLang="en-US" sz="900" b="0" i="0" u="none" strike="noStrike" cap="none" normalizeH="0" baseline="0" dirty="0" smtClean="0">
+                        <a:ln>
+                          <a:noFill/>
+                        </a:ln>
+                        <a:solidFill>
+                          <a:schemeClr val="tx1"/>
+                        </a:solidFill>
+                        <a:effectLst/>
+                        <a:latin typeface="Arial" charset="0"/>
+                        <a:cs typeface="Arial" charset="0"/>
+                      </a:endParaRPr>
                     </a:p>
                   </a:txBody>
                   <a:tcPr marT="45747" marB="45747" horzOverflow="overflow">
@@ -13588,7 +13150,7 @@
                         </a:buClr>
                         <a:buSzTx/>
                         <a:buFontTx/>
-                        <a:buNone/>
+                        <a:buChar char="-"/>
                         <a:tabLst/>
                       </a:pPr>
                       <a:r>
@@ -13603,7 +13165,49 @@
                           <a:latin typeface="Arial" charset="0"/>
                           <a:cs typeface="Arial" charset="0"/>
                         </a:rPr>
-                        <a:t>- Is data source a </a:t>
+                        <a:t> </a:t>
+                      </a:r>
+                      <a:r>
+                        <a:rPr kumimoji="0" lang="en-US" altLang="en-US" sz="900" b="0" i="0" u="none" strike="noStrike" cap="none" normalizeH="0" baseline="0" dirty="0" smtClean="0">
+                          <a:ln>
+                            <a:noFill/>
+                          </a:ln>
+                          <a:solidFill>
+                            <a:schemeClr val="tx1"/>
+                          </a:solidFill>
+                          <a:effectLst/>
+                          <a:latin typeface="Arial" charset="0"/>
+                          <a:cs typeface="Arial" charset="0"/>
+                        </a:rPr>
+                        <a:t>Historical hospital </a:t>
+                      </a:r>
+                      <a:r>
+                        <a:rPr kumimoji="0" lang="en-US" altLang="en-US" sz="900" b="0" i="0" u="none" strike="noStrike" cap="none" normalizeH="0" baseline="0" dirty="0" smtClean="0">
+                          <a:ln>
+                            <a:noFill/>
+                          </a:ln>
+                          <a:solidFill>
+                            <a:schemeClr val="tx1"/>
+                          </a:solidFill>
+                          <a:effectLst/>
+                          <a:latin typeface="Arial" charset="0"/>
+                          <a:cs typeface="Arial" charset="0"/>
+                        </a:rPr>
+                        <a:t>inpatient </a:t>
+                      </a:r>
+                      <a:r>
+                        <a:rPr kumimoji="0" lang="en-US" altLang="en-US" sz="900" b="0" i="0" u="none" strike="noStrike" cap="none" normalizeH="0" baseline="0" dirty="0" smtClean="0">
+                          <a:ln>
+                            <a:noFill/>
+                          </a:ln>
+                          <a:solidFill>
+                            <a:schemeClr val="tx1"/>
+                          </a:solidFill>
+                          <a:effectLst/>
+                          <a:latin typeface="Arial" charset="0"/>
+                          <a:cs typeface="Arial" charset="0"/>
+                        </a:rPr>
+                        <a:t>discharges for the state of NY by </a:t>
                       </a:r>
                       <a:r>
                         <a:rPr kumimoji="0" lang="en-US" altLang="en-US" sz="900" b="0" i="0" u="none" strike="noStrike" cap="none" normalizeH="0" baseline="0" dirty="0" err="1" smtClean="0">
@@ -13617,7 +13221,7 @@
                           <a:latin typeface="Arial" charset="0"/>
                           <a:cs typeface="Arial" charset="0"/>
                         </a:rPr>
-                        <a:t>realtime</a:t>
+                        <a:t>zipcode</a:t>
                       </a:r>
                       <a:r>
                         <a:rPr kumimoji="0" lang="en-US" altLang="en-US" sz="900" b="0" i="0" u="none" strike="noStrike" cap="none" normalizeH="0" baseline="0" dirty="0" smtClean="0">
@@ -13631,104 +13235,19 @@
                           <a:latin typeface="Arial" charset="0"/>
                           <a:cs typeface="Arial" charset="0"/>
                         </a:rPr>
-                        <a:t> source?</a:t>
+                        <a:t>. (CSV)</a:t>
                       </a:r>
-                    </a:p>
-                    <a:p>
-                      <a:pPr marL="0" marR="0" lvl="0" indent="0" algn="l" defTabSz="914400" rtl="0" eaLnBrk="1" fontAlgn="base" latinLnBrk="0" hangingPunct="1">
-                        <a:lnSpc>
-                          <a:spcPct val="100000"/>
-                        </a:lnSpc>
-                        <a:spcBef>
-                          <a:spcPct val="20000"/>
-                        </a:spcBef>
-                        <a:spcAft>
-                          <a:spcPct val="0"/>
-                        </a:spcAft>
-                        <a:buClr>
+                      <a:endParaRPr kumimoji="0" lang="en-US" altLang="en-US" sz="900" b="0" i="0" u="none" strike="noStrike" cap="none" normalizeH="0" baseline="0" dirty="0" smtClean="0">
+                        <a:ln>
+                          <a:noFill/>
+                        </a:ln>
+                        <a:solidFill>
                           <a:schemeClr val="tx1"/>
-                        </a:buClr>
-                        <a:buSzTx/>
-                        <a:buFontTx/>
-                        <a:buNone/>
-                        <a:tabLst/>
-                      </a:pPr>
-                      <a:r>
-                        <a:rPr kumimoji="0" lang="en-US" altLang="en-US" sz="900" b="0" i="0" u="none" strike="noStrike" cap="none" normalizeH="0" baseline="0" dirty="0" smtClean="0">
-                          <a:ln>
-                            <a:noFill/>
-                          </a:ln>
-                          <a:solidFill>
-                            <a:schemeClr val="tx1"/>
-                          </a:solidFill>
-                          <a:effectLst/>
-                          <a:latin typeface="Arial" charset="0"/>
-                          <a:cs typeface="Arial" charset="0"/>
-                        </a:rPr>
-                        <a:t>- Is it </a:t>
-                      </a:r>
-                      <a:r>
-                        <a:rPr kumimoji="0" lang="en-US" altLang="en-US" sz="900" b="0" i="0" u="none" strike="noStrike" cap="none" normalizeH="0" baseline="0" dirty="0" err="1" smtClean="0">
-                          <a:ln>
-                            <a:noFill/>
-                          </a:ln>
-                          <a:solidFill>
-                            <a:schemeClr val="tx1"/>
-                          </a:solidFill>
-                          <a:effectLst/>
-                          <a:latin typeface="Arial" charset="0"/>
-                          <a:cs typeface="Arial" charset="0"/>
-                        </a:rPr>
-                        <a:t>realtime</a:t>
-                      </a:r>
-                      <a:r>
-                        <a:rPr kumimoji="0" lang="en-US" altLang="en-US" sz="900" b="0" i="0" u="none" strike="noStrike" cap="none" normalizeH="0" baseline="0" dirty="0" smtClean="0">
-                          <a:ln>
-                            <a:noFill/>
-                          </a:ln>
-                          <a:solidFill>
-                            <a:schemeClr val="tx1"/>
-                          </a:solidFill>
-                          <a:effectLst/>
-                          <a:latin typeface="Arial" charset="0"/>
-                          <a:cs typeface="Arial" charset="0"/>
-                        </a:rPr>
-                        <a:t> and stored (e.g. a  log)? </a:t>
-                      </a:r>
-                    </a:p>
-                    <a:p>
-                      <a:pPr marL="0" marR="0" lvl="0" indent="0" algn="l" defTabSz="914400" rtl="0" eaLnBrk="1" fontAlgn="base" latinLnBrk="0" hangingPunct="1">
-                        <a:lnSpc>
-                          <a:spcPct val="100000"/>
-                        </a:lnSpc>
-                        <a:spcBef>
-                          <a:spcPct val="20000"/>
-                        </a:spcBef>
-                        <a:spcAft>
-                          <a:spcPct val="0"/>
-                        </a:spcAft>
-                        <a:buClr>
-                          <a:schemeClr val="tx1"/>
-                        </a:buClr>
-                        <a:buSzTx/>
-                        <a:buFont typeface="Wingdings" pitchFamily="2" charset="2"/>
-                        <a:buNone/>
-                        <a:tabLst/>
-                      </a:pPr>
-                      <a:r>
-                        <a:rPr kumimoji="0" lang="en-US" altLang="en-US" sz="900" b="0" i="0" u="none" strike="noStrike" cap="none" normalizeH="0" baseline="0" dirty="0" smtClean="0">
-                          <a:ln>
-                            <a:noFill/>
-                          </a:ln>
-                          <a:solidFill>
-                            <a:schemeClr val="tx1"/>
-                          </a:solidFill>
-                          <a:effectLst/>
-                          <a:latin typeface="Arial" charset="0"/>
-                          <a:cs typeface="Arial" charset="0"/>
-                        </a:rPr>
-                        <a:t>- Is it statically loaded data (e.g. historic)?</a:t>
-                      </a:r>
+                        </a:solidFill>
+                        <a:effectLst/>
+                        <a:latin typeface="Arial" charset="0"/>
+                        <a:cs typeface="Arial" charset="0"/>
+                      </a:endParaRPr>
                     </a:p>
                   </a:txBody>
                   <a:tcPr marT="45747" marB="45747" horzOverflow="overflow">
@@ -13827,8 +13346,8 @@
                           <a:schemeClr val="tx1"/>
                         </a:buClr>
                         <a:buSzTx/>
-                        <a:buFont typeface="Wingdings" pitchFamily="2" charset="2"/>
-                        <a:buNone/>
+                        <a:buFontTx/>
+                        <a:buChar char="-"/>
                         <a:tabLst/>
                       </a:pPr>
                       <a:r>
@@ -13843,21 +13362,7 @@
                           <a:latin typeface="Arial" charset="0"/>
                           <a:cs typeface="Arial" charset="0"/>
                         </a:rPr>
-                        <a:t>- If </a:t>
-                      </a:r>
-                      <a:r>
-                        <a:rPr kumimoji="0" lang="en-US" altLang="en-US" sz="900" b="0" i="0" u="none" strike="noStrike" cap="none" normalizeH="0" baseline="0" dirty="0" err="1" smtClean="0">
-                          <a:ln>
-                            <a:noFill/>
-                          </a:ln>
-                          <a:solidFill>
-                            <a:schemeClr val="tx1"/>
-                          </a:solidFill>
-                          <a:effectLst/>
-                          <a:latin typeface="Arial" charset="0"/>
-                          <a:cs typeface="Arial" charset="0"/>
-                        </a:rPr>
-                        <a:t>realtime</a:t>
+                        <a:t> </a:t>
                       </a:r>
                       <a:r>
                         <a:rPr kumimoji="0" lang="en-US" altLang="en-US" sz="900" b="0" i="0" u="none" strike="noStrike" cap="none" normalizeH="0" baseline="0" dirty="0" smtClean="0">
@@ -13871,8 +13376,19 @@
                           <a:latin typeface="Arial" charset="0"/>
                           <a:cs typeface="Arial" charset="0"/>
                         </a:rPr>
-                        <a:t> data, what is the frequency?</a:t>
+                        <a:t>Annual (2009-2012)</a:t>
                       </a:r>
+                      <a:endParaRPr kumimoji="0" lang="en-US" altLang="en-US" sz="900" b="0" i="0" u="none" strike="noStrike" cap="none" normalizeH="0" baseline="0" dirty="0" smtClean="0">
+                        <a:ln>
+                          <a:noFill/>
+                        </a:ln>
+                        <a:solidFill>
+                          <a:schemeClr val="tx1"/>
+                        </a:solidFill>
+                        <a:effectLst/>
+                        <a:latin typeface="Arial" charset="0"/>
+                        <a:cs typeface="Arial" charset="0"/>
+                      </a:endParaRPr>
                     </a:p>
                   </a:txBody>
                   <a:tcPr marT="45747" marB="45747" horzOverflow="overflow">
@@ -14102,8 +13618,19 @@
                           <a:latin typeface="Arial" charset="0"/>
                           <a:cs typeface="Arial" charset="0"/>
                         </a:rPr>
-                        <a:t>Data Source 1..n</a:t>
+                        <a:t>- Bureau of Labor statistics/Census</a:t>
                       </a:r>
+                      <a:endParaRPr kumimoji="0" lang="en-US" altLang="en-US" sz="900" b="0" i="0" u="none" strike="noStrike" cap="none" normalizeH="0" baseline="0" dirty="0" smtClean="0">
+                        <a:ln>
+                          <a:noFill/>
+                        </a:ln>
+                        <a:solidFill>
+                          <a:schemeClr val="tx1"/>
+                        </a:solidFill>
+                        <a:effectLst/>
+                        <a:latin typeface="Arial" charset="0"/>
+                        <a:cs typeface="Arial" charset="0"/>
+                      </a:endParaRPr>
                     </a:p>
                   </a:txBody>
                   <a:tcPr marT="45747" marB="45747" horzOverflow="overflow">
@@ -14333,18 +13860,22 @@
                         <a:buFont typeface="Wingdings" pitchFamily="2" charset="2"/>
                         <a:buNone/>
                         <a:tabLst/>
+                        <a:defRPr/>
                       </a:pPr>
-                      <a:endParaRPr kumimoji="0" lang="en-US" altLang="en-US" sz="900" b="0" i="0" u="none" strike="noStrike" cap="none" normalizeH="0" baseline="0" dirty="0" smtClean="0">
-                        <a:ln>
-                          <a:noFill/>
-                        </a:ln>
-                        <a:solidFill>
-                          <a:schemeClr val="tx1"/>
-                        </a:solidFill>
-                        <a:effectLst/>
-                        <a:latin typeface="Arial" charset="0"/>
-                        <a:cs typeface="Arial" charset="0"/>
-                      </a:endParaRPr>
+                      <a:r>
+                        <a:rPr kumimoji="0" lang="en-US" altLang="en-US" sz="900" b="0" i="0" u="none" strike="noStrike" cap="none" normalizeH="0" baseline="0" dirty="0" smtClean="0">
+                          <a:ln>
+                            <a:noFill/>
+                          </a:ln>
+                          <a:solidFill>
+                            <a:schemeClr val="tx1"/>
+                          </a:solidFill>
+                          <a:effectLst/>
+                          <a:latin typeface="Arial" charset="0"/>
+                          <a:cs typeface="Arial" charset="0"/>
+                        </a:rPr>
+                        <a:t>- Employment / Unemployment rates by county for the country.  We will focus on NY state because that overlaps with the health data we have by year and location.  We hope to use Census data to get finer-grained breakdowns of employment by job type. (TXT)</a:t>
+                      </a:r>
                     </a:p>
                   </a:txBody>
                   <a:tcPr marT="45747" marB="45747" horzOverflow="overflow">
@@ -14395,6 +13926,615 @@
                     <a:bodyPr/>
                     <a:lstStyle/>
                     <a:p>
+                      <a:pPr marL="0" marR="0" lvl="0" indent="0" algn="l" defTabSz="914400" rtl="0" eaLnBrk="1" fontAlgn="auto" latinLnBrk="0" hangingPunct="1">
+                        <a:lnSpc>
+                          <a:spcPct val="100000"/>
+                        </a:lnSpc>
+                        <a:spcBef>
+                          <a:spcPts val="0"/>
+                        </a:spcBef>
+                        <a:spcAft>
+                          <a:spcPts val="0"/>
+                        </a:spcAft>
+                        <a:buClrTx/>
+                        <a:buSzTx/>
+                        <a:buFontTx/>
+                        <a:buNone/>
+                        <a:tabLst/>
+                        <a:defRPr/>
+                      </a:pPr>
+                      <a:r>
+                        <a:rPr kumimoji="0" lang="en-US" altLang="en-US" sz="900" b="0" i="0" u="none" strike="noStrike" cap="none" normalizeH="0" baseline="0" dirty="0" smtClean="0">
+                          <a:ln>
+                            <a:noFill/>
+                          </a:ln>
+                          <a:solidFill>
+                            <a:schemeClr val="tx1"/>
+                          </a:solidFill>
+                          <a:effectLst/>
+                          <a:latin typeface="Arial" charset="0"/>
+                          <a:cs typeface="Arial" charset="0"/>
+                        </a:rPr>
+                        <a:t>- Annual (2009-2012)</a:t>
+                      </a:r>
+                    </a:p>
+                    <a:p>
+                      <a:endParaRPr lang="en-US" sz="900" dirty="0"/>
+                    </a:p>
+                  </a:txBody>
+                  <a:tcPr marT="45747" marB="45747" horzOverflow="overflow">
+                    <a:lnL w="12700" cap="flat" cmpd="sng" algn="ctr">
+                      <a:solidFill>
+                        <a:schemeClr val="tx1"/>
+                      </a:solidFill>
+                      <a:prstDash val="solid"/>
+                      <a:round/>
+                      <a:headEnd type="none" w="med" len="med"/>
+                      <a:tailEnd type="none" w="med" len="med"/>
+                    </a:lnL>
+                    <a:lnR w="12700" cap="flat" cmpd="sng" algn="ctr">
+                      <a:solidFill>
+                        <a:schemeClr val="tx1"/>
+                      </a:solidFill>
+                      <a:prstDash val="solid"/>
+                      <a:round/>
+                      <a:headEnd type="none" w="med" len="med"/>
+                      <a:tailEnd type="none" w="med" len="med"/>
+                    </a:lnR>
+                    <a:solidFill>
+                      <a:schemeClr val="bg1"/>
+                    </a:solidFill>
+                  </a:tcPr>
+                </a:tc>
+              </a:tr>
+              <a:tr h="218233">
+                <a:tc>
+                  <a:txBody>
+                    <a:bodyPr/>
+                    <a:lstStyle/>
+                    <a:p>
+                      <a:pPr marL="0" marR="0" lvl="0" indent="0" algn="l" defTabSz="914400" rtl="0" eaLnBrk="1" fontAlgn="base" latinLnBrk="0" hangingPunct="1">
+                        <a:lnSpc>
+                          <a:spcPct val="100000"/>
+                        </a:lnSpc>
+                        <a:spcBef>
+                          <a:spcPct val="20000"/>
+                        </a:spcBef>
+                        <a:spcAft>
+                          <a:spcPct val="0"/>
+                        </a:spcAft>
+                        <a:buClr>
+                          <a:schemeClr val="tx1"/>
+                        </a:buClr>
+                        <a:buSzTx/>
+                        <a:buFont typeface="Wingdings" pitchFamily="2" charset="2"/>
+                        <a:buNone/>
+                        <a:tabLst/>
+                      </a:pPr>
+                      <a:r>
+                        <a:rPr kumimoji="0" lang="en-US" altLang="en-US" sz="900" b="0" i="0" u="none" strike="noStrike" cap="none" normalizeH="0" baseline="0" dirty="0" smtClean="0">
+                          <a:ln>
+                            <a:noFill/>
+                          </a:ln>
+                          <a:solidFill>
+                            <a:schemeClr val="tx1"/>
+                          </a:solidFill>
+                          <a:effectLst/>
+                          <a:latin typeface="Arial" charset="0"/>
+                          <a:cs typeface="Arial" charset="0"/>
+                        </a:rPr>
+                        <a:t>- Status date and geo-tagged specific historical status messages for NY</a:t>
+                      </a:r>
+                      <a:endParaRPr kumimoji="0" lang="en-US" altLang="en-US" sz="900" b="0" i="0" u="none" strike="noStrike" cap="none" normalizeH="0" baseline="0" dirty="0" smtClean="0">
+                        <a:ln>
+                          <a:noFill/>
+                        </a:ln>
+                        <a:solidFill>
+                          <a:schemeClr val="tx1"/>
+                        </a:solidFill>
+                        <a:effectLst/>
+                        <a:latin typeface="Arial" charset="0"/>
+                        <a:cs typeface="Arial" charset="0"/>
+                      </a:endParaRPr>
+                    </a:p>
+                  </a:txBody>
+                  <a:tcPr marT="45747" marB="45747" horzOverflow="overflow">
+                    <a:lnL w="12700" cap="flat" cmpd="sng" algn="ctr">
+                      <a:solidFill>
+                        <a:schemeClr val="tx1"/>
+                      </a:solidFill>
+                      <a:prstDash val="solid"/>
+                      <a:round/>
+                      <a:headEnd type="none" w="med" len="med"/>
+                      <a:tailEnd type="none" w="med" len="med"/>
+                    </a:lnL>
+                    <a:lnR w="12700" cap="flat" cmpd="sng" algn="ctr">
+                      <a:solidFill>
+                        <a:schemeClr val="tx1"/>
+                      </a:solidFill>
+                      <a:prstDash val="solid"/>
+                      <a:round/>
+                      <a:headEnd type="none" w="med" len="med"/>
+                      <a:tailEnd type="none" w="med" len="med"/>
+                    </a:lnR>
+                    <a:lnT w="12700" cap="flat" cmpd="sng" algn="ctr">
+                      <a:solidFill>
+                        <a:schemeClr val="tx1"/>
+                      </a:solidFill>
+                      <a:prstDash val="solid"/>
+                      <a:round/>
+                      <a:headEnd type="none" w="med" len="med"/>
+                      <a:tailEnd type="none" w="med" len="med"/>
+                    </a:lnT>
+                    <a:lnB w="12700" cap="flat" cmpd="sng" algn="ctr">
+                      <a:solidFill>
+                        <a:schemeClr val="tx1"/>
+                      </a:solidFill>
+                      <a:prstDash val="solid"/>
+                      <a:round/>
+                      <a:headEnd type="none" w="med" len="med"/>
+                      <a:tailEnd type="none" w="med" len="med"/>
+                    </a:lnB>
+                    <a:lnTlToBr>
+                      <a:noFill/>
+                    </a:lnTlToBr>
+                    <a:lnBlToTr>
+                      <a:noFill/>
+                    </a:lnBlToTr>
+                    <a:solidFill>
+                      <a:schemeClr val="bg1"/>
+                    </a:solidFill>
+                  </a:tcPr>
+                </a:tc>
+                <a:tc gridSpan="2">
+                  <a:txBody>
+                    <a:bodyPr/>
+                    <a:lstStyle/>
+                    <a:p>
+                      <a:pPr marL="0" marR="0" lvl="0" indent="0" algn="l" defTabSz="914400" rtl="0" eaLnBrk="1" fontAlgn="base" latinLnBrk="0" hangingPunct="1">
+                        <a:lnSpc>
+                          <a:spcPct val="100000"/>
+                        </a:lnSpc>
+                        <a:spcBef>
+                          <a:spcPct val="20000"/>
+                        </a:spcBef>
+                        <a:spcAft>
+                          <a:spcPct val="0"/>
+                        </a:spcAft>
+                        <a:buClr>
+                          <a:schemeClr val="tx1"/>
+                        </a:buClr>
+                        <a:buSzTx/>
+                        <a:buFont typeface="Wingdings" pitchFamily="2" charset="2"/>
+                        <a:buNone/>
+                        <a:tabLst/>
+                        <a:defRPr/>
+                      </a:pPr>
+                      <a:r>
+                        <a:rPr kumimoji="0" lang="en-US" altLang="en-US" sz="900" b="0" i="0" u="none" strike="noStrike" cap="none" normalizeH="0" baseline="0" dirty="0" smtClean="0">
+                          <a:ln>
+                            <a:noFill/>
+                          </a:ln>
+                          <a:solidFill>
+                            <a:schemeClr val="tx1"/>
+                          </a:solidFill>
+                          <a:effectLst/>
+                          <a:latin typeface="Arial" charset="0"/>
+                          <a:cs typeface="Arial" charset="0"/>
+                        </a:rPr>
+                        <a:t>- Using historic twitter status messages based on keyword, and location, we want to attempt to correlate keywords to the reported unemployment numbers.  Then, because we can get twitter messages in </a:t>
+                      </a:r>
+                      <a:r>
+                        <a:rPr kumimoji="0" lang="en-US" altLang="en-US" sz="900" b="0" i="0" u="none" strike="noStrike" cap="none" normalizeH="0" baseline="0" dirty="0" err="1" smtClean="0">
+                          <a:ln>
+                            <a:noFill/>
+                          </a:ln>
+                          <a:solidFill>
+                            <a:schemeClr val="tx1"/>
+                          </a:solidFill>
+                          <a:effectLst/>
+                          <a:latin typeface="Arial" charset="0"/>
+                          <a:cs typeface="Arial" charset="0"/>
+                        </a:rPr>
+                        <a:t>realtime</a:t>
+                      </a:r>
+                      <a:r>
+                        <a:rPr kumimoji="0" lang="en-US" altLang="en-US" sz="900" b="0" i="0" u="none" strike="noStrike" cap="none" normalizeH="0" baseline="0" dirty="0" smtClean="0">
+                          <a:ln>
+                            <a:noFill/>
+                          </a:ln>
+                          <a:solidFill>
+                            <a:schemeClr val="tx1"/>
+                          </a:solidFill>
+                          <a:effectLst/>
+                          <a:latin typeface="Arial" charset="0"/>
+                          <a:cs typeface="Arial" charset="0"/>
+                        </a:rPr>
+                        <a:t>, we can use that as a predictor of health statistics (API)</a:t>
+                      </a:r>
+                    </a:p>
+                  </a:txBody>
+                  <a:tcPr marT="45747" marB="45747" horzOverflow="overflow">
+                    <a:lnL w="12700" cap="flat" cmpd="sng" algn="ctr">
+                      <a:solidFill>
+                        <a:schemeClr val="tx1"/>
+                      </a:solidFill>
+                      <a:prstDash val="solid"/>
+                      <a:round/>
+                      <a:headEnd type="none" w="med" len="med"/>
+                      <a:tailEnd type="none" w="med" len="med"/>
+                    </a:lnL>
+                    <a:lnR w="12700" cap="flat" cmpd="sng" algn="ctr">
+                      <a:solidFill>
+                        <a:schemeClr val="tx1"/>
+                      </a:solidFill>
+                      <a:prstDash val="solid"/>
+                      <a:round/>
+                      <a:headEnd type="none" w="med" len="med"/>
+                      <a:tailEnd type="none" w="med" len="med"/>
+                    </a:lnR>
+                    <a:lnT w="12700" cap="flat" cmpd="sng" algn="ctr">
+                      <a:solidFill>
+                        <a:schemeClr val="tx1"/>
+                      </a:solidFill>
+                      <a:prstDash val="solid"/>
+                      <a:round/>
+                      <a:headEnd type="none" w="med" len="med"/>
+                      <a:tailEnd type="none" w="med" len="med"/>
+                    </a:lnT>
+                    <a:lnB w="12700" cap="flat" cmpd="sng" algn="ctr">
+                      <a:solidFill>
+                        <a:schemeClr val="tx1"/>
+                      </a:solidFill>
+                      <a:prstDash val="solid"/>
+                      <a:round/>
+                      <a:headEnd type="none" w="med" len="med"/>
+                      <a:tailEnd type="none" w="med" len="med"/>
+                    </a:lnB>
+                    <a:solidFill>
+                      <a:schemeClr val="bg1"/>
+                    </a:solidFill>
+                  </a:tcPr>
+                </a:tc>
+                <a:tc hMerge="1">
+                  <a:txBody>
+                    <a:bodyPr/>
+                    <a:lstStyle/>
+                    <a:p>
+                      <a:endParaRPr lang="en-US"/>
+                    </a:p>
+                  </a:txBody>
+                  <a:tcPr/>
+                </a:tc>
+                <a:tc>
+                  <a:txBody>
+                    <a:bodyPr/>
+                    <a:lstStyle/>
+                    <a:p>
+                      <a:pPr marL="0" marR="0" lvl="0" indent="0" algn="l" defTabSz="914400" rtl="0" eaLnBrk="1" fontAlgn="base" latinLnBrk="0" hangingPunct="1">
+                        <a:lnSpc>
+                          <a:spcPct val="100000"/>
+                        </a:lnSpc>
+                        <a:spcBef>
+                          <a:spcPct val="20000"/>
+                        </a:spcBef>
+                        <a:spcAft>
+                          <a:spcPct val="0"/>
+                        </a:spcAft>
+                        <a:buClr>
+                          <a:schemeClr val="tx1"/>
+                        </a:buClr>
+                        <a:buSzTx/>
+                        <a:buFontTx/>
+                        <a:buNone/>
+                        <a:tabLst/>
+                      </a:pPr>
+                      <a:r>
+                        <a:rPr kumimoji="0" lang="en-US" altLang="en-US" sz="900" b="0" i="0" u="none" strike="noStrike" cap="none" normalizeH="0" baseline="0" dirty="0" smtClean="0">
+                          <a:ln>
+                            <a:noFill/>
+                          </a:ln>
+                          <a:solidFill>
+                            <a:schemeClr val="tx1"/>
+                          </a:solidFill>
+                          <a:effectLst/>
+                          <a:latin typeface="Arial" charset="0"/>
+                          <a:cs typeface="Arial" charset="0"/>
+                        </a:rPr>
+                        <a:t>- 100 per day historical (2009-2012)</a:t>
+                      </a:r>
+                    </a:p>
+                    <a:p>
+                      <a:pPr marL="0" marR="0" lvl="0" indent="0" algn="l" defTabSz="914400" rtl="0" eaLnBrk="1" fontAlgn="base" latinLnBrk="0" hangingPunct="1">
+                        <a:lnSpc>
+                          <a:spcPct val="100000"/>
+                        </a:lnSpc>
+                        <a:spcBef>
+                          <a:spcPct val="20000"/>
+                        </a:spcBef>
+                        <a:spcAft>
+                          <a:spcPct val="0"/>
+                        </a:spcAft>
+                        <a:buClr>
+                          <a:schemeClr val="tx1"/>
+                        </a:buClr>
+                        <a:buSzTx/>
+                        <a:buFontTx/>
+                        <a:buNone/>
+                        <a:tabLst/>
+                      </a:pPr>
+                      <a:r>
+                        <a:rPr kumimoji="0" lang="en-US" altLang="en-US" sz="900" b="0" i="0" u="none" strike="noStrike" cap="none" normalizeH="0" baseline="0" dirty="0" smtClean="0">
+                          <a:ln>
+                            <a:noFill/>
+                          </a:ln>
+                          <a:solidFill>
+                            <a:schemeClr val="tx1"/>
+                          </a:solidFill>
+                          <a:effectLst/>
+                          <a:latin typeface="Arial" charset="0"/>
+                          <a:cs typeface="Arial" charset="0"/>
+                        </a:rPr>
+                        <a:t>- </a:t>
+                      </a:r>
+                      <a:r>
+                        <a:rPr kumimoji="0" lang="en-US" altLang="en-US" sz="900" b="0" i="0" u="none" strike="noStrike" cap="none" normalizeH="0" baseline="0" dirty="0" err="1" smtClean="0">
+                          <a:ln>
+                            <a:noFill/>
+                          </a:ln>
+                          <a:solidFill>
+                            <a:schemeClr val="tx1"/>
+                          </a:solidFill>
+                          <a:effectLst/>
+                          <a:latin typeface="Arial" charset="0"/>
+                          <a:cs typeface="Arial" charset="0"/>
+                        </a:rPr>
+                        <a:t>Realtime</a:t>
+                      </a:r>
+                      <a:r>
+                        <a:rPr kumimoji="0" lang="en-US" altLang="en-US" sz="900" b="0" i="0" u="none" strike="noStrike" cap="none" normalizeH="0" baseline="0" dirty="0" smtClean="0">
+                          <a:ln>
+                            <a:noFill/>
+                          </a:ln>
+                          <a:solidFill>
+                            <a:schemeClr val="tx1"/>
+                          </a:solidFill>
+                          <a:effectLst/>
+                          <a:latin typeface="Arial" charset="0"/>
+                          <a:cs typeface="Arial" charset="0"/>
+                        </a:rPr>
+                        <a:t>…</a:t>
+                      </a:r>
+                    </a:p>
+                    <a:p>
+                      <a:endParaRPr lang="en-US" sz="900" dirty="0"/>
+                    </a:p>
+                  </a:txBody>
+                  <a:tcPr marT="45747" marB="45747" horzOverflow="overflow">
+                    <a:lnL w="12700" cap="flat" cmpd="sng" algn="ctr">
+                      <a:solidFill>
+                        <a:schemeClr val="tx1"/>
+                      </a:solidFill>
+                      <a:prstDash val="solid"/>
+                      <a:round/>
+                      <a:headEnd type="none" w="med" len="med"/>
+                      <a:tailEnd type="none" w="med" len="med"/>
+                    </a:lnL>
+                    <a:lnR w="12700" cap="flat" cmpd="sng" algn="ctr">
+                      <a:solidFill>
+                        <a:schemeClr val="tx1"/>
+                      </a:solidFill>
+                      <a:prstDash val="solid"/>
+                      <a:round/>
+                      <a:headEnd type="none" w="med" len="med"/>
+                      <a:tailEnd type="none" w="med" len="med"/>
+                    </a:lnR>
+                    <a:solidFill>
+                      <a:schemeClr val="bg1"/>
+                    </a:solidFill>
+                  </a:tcPr>
+                </a:tc>
+              </a:tr>
+              <a:tr h="218233">
+                <a:tc>
+                  <a:txBody>
+                    <a:bodyPr/>
+                    <a:lstStyle/>
+                    <a:p>
+                      <a:pPr marL="0" marR="0" lvl="0" indent="0" algn="l" defTabSz="914400" rtl="0" eaLnBrk="1" fontAlgn="base" latinLnBrk="0" hangingPunct="1">
+                        <a:lnSpc>
+                          <a:spcPct val="100000"/>
+                        </a:lnSpc>
+                        <a:spcBef>
+                          <a:spcPct val="20000"/>
+                        </a:spcBef>
+                        <a:spcAft>
+                          <a:spcPct val="0"/>
+                        </a:spcAft>
+                        <a:buClr>
+                          <a:schemeClr val="tx1"/>
+                        </a:buClr>
+                        <a:buSzTx/>
+                        <a:buFont typeface="Wingdings" pitchFamily="2" charset="2"/>
+                        <a:buNone/>
+                        <a:tabLst/>
+                      </a:pPr>
+                      <a:r>
+                        <a:rPr kumimoji="0" lang="en-US" altLang="en-US" sz="900" b="0" i="0" u="none" strike="noStrike" cap="none" normalizeH="0" baseline="0" dirty="0" smtClean="0">
+                          <a:ln>
+                            <a:noFill/>
+                          </a:ln>
+                          <a:solidFill>
+                            <a:schemeClr val="tx1"/>
+                          </a:solidFill>
+                          <a:effectLst/>
+                          <a:latin typeface="Arial" charset="0"/>
+                          <a:cs typeface="Arial" charset="0"/>
+                        </a:rPr>
+                        <a:t>- NY employment by job category (white collar/blue collar/service..)</a:t>
+                      </a:r>
+                      <a:endParaRPr kumimoji="0" lang="en-US" altLang="en-US" sz="900" b="0" i="0" u="none" strike="noStrike" cap="none" normalizeH="0" baseline="0" dirty="0" smtClean="0">
+                        <a:ln>
+                          <a:noFill/>
+                        </a:ln>
+                        <a:solidFill>
+                          <a:schemeClr val="tx1"/>
+                        </a:solidFill>
+                        <a:effectLst/>
+                        <a:latin typeface="Arial" charset="0"/>
+                        <a:cs typeface="Arial" charset="0"/>
+                      </a:endParaRPr>
+                    </a:p>
+                  </a:txBody>
+                  <a:tcPr marT="45747" marB="45747" horzOverflow="overflow">
+                    <a:lnL w="12700" cap="flat" cmpd="sng" algn="ctr">
+                      <a:solidFill>
+                        <a:schemeClr val="tx1"/>
+                      </a:solidFill>
+                      <a:prstDash val="solid"/>
+                      <a:round/>
+                      <a:headEnd type="none" w="med" len="med"/>
+                      <a:tailEnd type="none" w="med" len="med"/>
+                    </a:lnL>
+                    <a:lnR w="12700" cap="flat" cmpd="sng" algn="ctr">
+                      <a:solidFill>
+                        <a:schemeClr val="tx1"/>
+                      </a:solidFill>
+                      <a:prstDash val="solid"/>
+                      <a:round/>
+                      <a:headEnd type="none" w="med" len="med"/>
+                      <a:tailEnd type="none" w="med" len="med"/>
+                    </a:lnR>
+                    <a:lnT w="12700" cap="flat" cmpd="sng" algn="ctr">
+                      <a:solidFill>
+                        <a:schemeClr val="tx1"/>
+                      </a:solidFill>
+                      <a:prstDash val="solid"/>
+                      <a:round/>
+                      <a:headEnd type="none" w="med" len="med"/>
+                      <a:tailEnd type="none" w="med" len="med"/>
+                    </a:lnT>
+                    <a:lnB w="12700" cap="flat" cmpd="sng" algn="ctr">
+                      <a:solidFill>
+                        <a:schemeClr val="tx1"/>
+                      </a:solidFill>
+                      <a:prstDash val="solid"/>
+                      <a:round/>
+                      <a:headEnd type="none" w="med" len="med"/>
+                      <a:tailEnd type="none" w="med" len="med"/>
+                    </a:lnB>
+                    <a:lnTlToBr>
+                      <a:noFill/>
+                    </a:lnTlToBr>
+                    <a:lnBlToTr>
+                      <a:noFill/>
+                    </a:lnBlToTr>
+                    <a:solidFill>
+                      <a:schemeClr val="bg1"/>
+                    </a:solidFill>
+                  </a:tcPr>
+                </a:tc>
+                <a:tc gridSpan="2">
+                  <a:txBody>
+                    <a:bodyPr/>
+                    <a:lstStyle/>
+                    <a:p>
+                      <a:pPr marL="0" marR="0" lvl="0" indent="0" algn="l" defTabSz="914400" rtl="0" eaLnBrk="1" fontAlgn="base" latinLnBrk="0" hangingPunct="1">
+                        <a:lnSpc>
+                          <a:spcPct val="100000"/>
+                        </a:lnSpc>
+                        <a:spcBef>
+                          <a:spcPct val="20000"/>
+                        </a:spcBef>
+                        <a:spcAft>
+                          <a:spcPct val="0"/>
+                        </a:spcAft>
+                        <a:buClr>
+                          <a:schemeClr val="tx1"/>
+                        </a:buClr>
+                        <a:buSzTx/>
+                        <a:buFont typeface="Wingdings" pitchFamily="2" charset="2"/>
+                        <a:buNone/>
+                        <a:tabLst/>
+                        <a:defRPr/>
+                      </a:pPr>
+                      <a:r>
+                        <a:rPr kumimoji="0" lang="en-US" altLang="en-US" sz="900" b="0" i="0" u="none" strike="noStrike" cap="none" normalizeH="0" baseline="0" dirty="0" smtClean="0">
+                          <a:ln>
+                            <a:noFill/>
+                          </a:ln>
+                          <a:solidFill>
+                            <a:schemeClr val="tx1"/>
+                          </a:solidFill>
+                          <a:effectLst/>
+                          <a:latin typeface="Arial" charset="0"/>
+                          <a:cs typeface="Arial" charset="0"/>
+                        </a:rPr>
+                        <a:t>- This data comes as historical aggregate employment and net job flows by industry (CSV).  This directly gives us numbers on how many people started or stopped working in a certain type of job.</a:t>
+                      </a:r>
+                    </a:p>
+                  </a:txBody>
+                  <a:tcPr marT="45747" marB="45747" horzOverflow="overflow">
+                    <a:lnL w="12700" cap="flat" cmpd="sng" algn="ctr">
+                      <a:solidFill>
+                        <a:schemeClr val="tx1"/>
+                      </a:solidFill>
+                      <a:prstDash val="solid"/>
+                      <a:round/>
+                      <a:headEnd type="none" w="med" len="med"/>
+                      <a:tailEnd type="none" w="med" len="med"/>
+                    </a:lnL>
+                    <a:lnR w="12700" cap="flat" cmpd="sng" algn="ctr">
+                      <a:solidFill>
+                        <a:schemeClr val="tx1"/>
+                      </a:solidFill>
+                      <a:prstDash val="solid"/>
+                      <a:round/>
+                      <a:headEnd type="none" w="med" len="med"/>
+                      <a:tailEnd type="none" w="med" len="med"/>
+                    </a:lnR>
+                    <a:lnT w="12700" cap="flat" cmpd="sng" algn="ctr">
+                      <a:solidFill>
+                        <a:schemeClr val="tx1"/>
+                      </a:solidFill>
+                      <a:prstDash val="solid"/>
+                      <a:round/>
+                      <a:headEnd type="none" w="med" len="med"/>
+                      <a:tailEnd type="none" w="med" len="med"/>
+                    </a:lnT>
+                    <a:lnB w="12700" cap="flat" cmpd="sng" algn="ctr">
+                      <a:solidFill>
+                        <a:schemeClr val="tx1"/>
+                      </a:solidFill>
+                      <a:prstDash val="solid"/>
+                      <a:round/>
+                      <a:headEnd type="none" w="med" len="med"/>
+                      <a:tailEnd type="none" w="med" len="med"/>
+                    </a:lnB>
+                    <a:solidFill>
+                      <a:schemeClr val="bg1"/>
+                    </a:solidFill>
+                  </a:tcPr>
+                </a:tc>
+                <a:tc hMerge="1">
+                  <a:txBody>
+                    <a:bodyPr/>
+                    <a:lstStyle/>
+                    <a:p>
+                      <a:endParaRPr lang="en-US"/>
+                    </a:p>
+                  </a:txBody>
+                  <a:tcPr/>
+                </a:tc>
+                <a:tc>
+                  <a:txBody>
+                    <a:bodyPr/>
+                    <a:lstStyle/>
+                    <a:p>
+                      <a:r>
+                        <a:rPr lang="en-US" sz="900" dirty="0" smtClean="0"/>
+                        <a:t>- Quarterly (2009-2012)</a:t>
+                      </a:r>
                       <a:endParaRPr lang="en-US" sz="900" dirty="0"/>
                     </a:p>
                   </a:txBody>
@@ -14716,6 +14856,22 @@
                         <a:defRPr/>
                       </a:pPr>
                       <a:r>
+                        <a:rPr kumimoji="0" lang="en-US" altLang="en-US" sz="1100" b="0" i="0" u="none" strike="noStrike" kern="1200" cap="none" spc="0" normalizeH="0" baseline="0" noProof="0" dirty="0" err="1" smtClean="0">
+                          <a:ln>
+                            <a:noFill/>
+                          </a:ln>
+                          <a:solidFill>
+                            <a:srgbClr val="000000"/>
+                          </a:solidFill>
+                          <a:effectLst/>
+                          <a:uLnTx/>
+                          <a:uFillTx/>
+                          <a:latin typeface="Arial"/>
+                          <a:cs typeface="Arial"/>
+                        </a:rPr>
+                        <a:t>MapReduce</a:t>
+                      </a:r>
+                      <a:r>
                         <a:rPr kumimoji="0" lang="en-US" altLang="en-US" sz="1100" b="0" i="0" u="none" strike="noStrike" kern="1200" cap="none" spc="0" normalizeH="0" baseline="0" noProof="0" dirty="0" smtClean="0">
                           <a:ln>
                             <a:noFill/>
@@ -14729,8 +14885,21 @@
                           <a:latin typeface="Arial"/>
                           <a:cs typeface="Arial"/>
                         </a:rPr>
-                        <a:t>Describe technologies. Will your project make use of MapReduce? Pig? Twitter? HDFS? Flume? HBase? Hive? Impala? Other?</a:t>
+                        <a:t>, Pig, Other technologies: Twitter API</a:t>
                       </a:r>
+                      <a:endParaRPr kumimoji="0" lang="en-US" altLang="en-US" sz="1100" b="0" i="0" u="none" strike="noStrike" kern="1200" cap="none" spc="0" normalizeH="0" baseline="0" noProof="0" dirty="0" smtClean="0">
+                        <a:ln>
+                          <a:noFill/>
+                        </a:ln>
+                        <a:solidFill>
+                          <a:srgbClr val="000000"/>
+                        </a:solidFill>
+                        <a:effectLst/>
+                        <a:uLnTx/>
+                        <a:uFillTx/>
+                        <a:latin typeface="Arial"/>
+                        <a:cs typeface="Arial"/>
+                      </a:endParaRPr>
                     </a:p>
                   </a:txBody>
                   <a:tcPr marT="45747" marB="45747" horzOverflow="overflow">
@@ -15041,8 +15210,876 @@
                   <a:tcPr/>
                 </a:tc>
               </a:tr>
+            </a:tbl>
+          </a:graphicData>
+        </a:graphic>
+      </p:graphicFrame>
+    </p:spTree>
+    <p:extLst>
+      <p:ext uri="{BB962C8B-B14F-4D97-AF65-F5344CB8AC3E}">
+        <p14:creationId xmlns:p14="http://schemas.microsoft.com/office/powerpoint/2010/main" val="3852912342"/>
+      </p:ext>
+    </p:extLst>
+  </p:cSld>
+  <p:clrMapOvr>
+    <a:masterClrMapping/>
+  </p:clrMapOvr>
+  <p:timing>
+    <p:tnLst>
+      <p:par>
+        <p:cTn id="1" dur="indefinite" restart="never" nodeType="tmRoot"/>
+      </p:par>
+    </p:tnLst>
+  </p:timing>
+</p:sld>
+</file>
+
+<file path=ppt/slides/slide2.xml><?xml version="1.0" encoding="utf-8"?>
+<p:sld xmlns:a="http://schemas.openxmlformats.org/drawingml/2006/main" xmlns:r="http://schemas.openxmlformats.org/officeDocument/2006/relationships" xmlns:p="http://schemas.openxmlformats.org/presentationml/2006/main" showMasterSp="0">
+  <p:cSld>
+    <p:spTree>
+      <p:nvGrpSpPr>
+        <p:cNvPr id="1" name=""/>
+        <p:cNvGrpSpPr/>
+        <p:nvPr/>
+      </p:nvGrpSpPr>
+      <p:grpSpPr>
+        <a:xfrm>
+          <a:off x="0" y="0"/>
+          <a:ext cx="0" cy="0"/>
+          <a:chOff x="0" y="0"/>
+          <a:chExt cx="0" cy="0"/>
+        </a:xfrm>
+      </p:grpSpPr>
+      <p:sp>
+        <p:nvSpPr>
+          <p:cNvPr id="29698" name="Slide Number Placeholder 4"/>
+          <p:cNvSpPr>
+            <a:spLocks noGrp="1"/>
+          </p:cNvSpPr>
+          <p:nvPr>
+            <p:ph type="sldNum" sz="quarter" idx="10"/>
+          </p:nvPr>
+        </p:nvSpPr>
+        <p:spPr>
+          <a:noFill/>
+        </p:spPr>
+        <p:txBody>
+          <a:bodyPr/>
+          <a:lstStyle>
+            <a:lvl1pPr eaLnBrk="0" hangingPunct="0">
+              <a:spcBef>
+                <a:spcPct val="20000"/>
+              </a:spcBef>
+              <a:buClr>
+                <a:schemeClr val="tx1"/>
+              </a:buClr>
+              <a:buFont typeface="Wingdings" pitchFamily="2" charset="2"/>
+              <a:buChar char="p"/>
+              <a:defRPr sz="2400">
+                <a:solidFill>
+                  <a:schemeClr val="tx1"/>
+                </a:solidFill>
+                <a:latin typeface="Arial" charset="0"/>
+                <a:cs typeface="Arial" charset="0"/>
+              </a:defRPr>
+            </a:lvl1pPr>
+            <a:lvl2pPr marL="742950" indent="-285750" eaLnBrk="0" hangingPunct="0">
+              <a:spcBef>
+                <a:spcPct val="20000"/>
+              </a:spcBef>
+              <a:buClr>
+                <a:schemeClr val="tx1"/>
+              </a:buClr>
+              <a:buFont typeface="Wingdings" pitchFamily="2" charset="2"/>
+              <a:buChar char="n"/>
+              <a:defRPr sz="2000">
+                <a:solidFill>
+                  <a:schemeClr val="tx1"/>
+                </a:solidFill>
+                <a:latin typeface="Arial" charset="0"/>
+                <a:cs typeface="Arial" charset="0"/>
+              </a:defRPr>
+            </a:lvl2pPr>
+            <a:lvl3pPr marL="1143000" indent="-228600" eaLnBrk="0" hangingPunct="0">
+              <a:spcBef>
+                <a:spcPct val="20000"/>
+              </a:spcBef>
+              <a:buClr>
+                <a:schemeClr val="tx1"/>
+              </a:buClr>
+              <a:buFont typeface="Wingdings" pitchFamily="2" charset="2"/>
+              <a:buChar char="p"/>
+              <a:defRPr>
+                <a:solidFill>
+                  <a:schemeClr val="tx1"/>
+                </a:solidFill>
+                <a:latin typeface="Arial" charset="0"/>
+                <a:cs typeface="Arial" charset="0"/>
+              </a:defRPr>
+            </a:lvl3pPr>
+            <a:lvl4pPr marL="1600200" indent="-228600" eaLnBrk="0" hangingPunct="0">
+              <a:spcBef>
+                <a:spcPct val="20000"/>
+              </a:spcBef>
+              <a:buClr>
+                <a:schemeClr val="tx1"/>
+              </a:buClr>
+              <a:buFont typeface="Wingdings" pitchFamily="2" charset="2"/>
+              <a:buChar char="§"/>
+              <a:defRPr sz="1600">
+                <a:solidFill>
+                  <a:schemeClr val="tx1"/>
+                </a:solidFill>
+                <a:latin typeface="Arial" charset="0"/>
+                <a:cs typeface="Arial" charset="0"/>
+              </a:defRPr>
+            </a:lvl4pPr>
+            <a:lvl5pPr marL="2057400" indent="-228600" eaLnBrk="0" hangingPunct="0">
+              <a:spcBef>
+                <a:spcPct val="20000"/>
+              </a:spcBef>
+              <a:buClr>
+                <a:schemeClr val="tx1"/>
+              </a:buClr>
+              <a:buFont typeface="Wingdings" pitchFamily="2" charset="2"/>
+              <a:buChar char="§"/>
+              <a:defRPr sz="1600">
+                <a:solidFill>
+                  <a:schemeClr val="tx1"/>
+                </a:solidFill>
+                <a:latin typeface="Arial" charset="0"/>
+                <a:cs typeface="Arial" charset="0"/>
+              </a:defRPr>
+            </a:lvl5pPr>
+            <a:lvl6pPr marL="2514600" indent="-228600" eaLnBrk="0" fontAlgn="base" hangingPunct="0">
+              <a:spcBef>
+                <a:spcPct val="20000"/>
+              </a:spcBef>
+              <a:spcAft>
+                <a:spcPct val="0"/>
+              </a:spcAft>
+              <a:buClr>
+                <a:schemeClr val="tx1"/>
+              </a:buClr>
+              <a:buFont typeface="Wingdings" pitchFamily="2" charset="2"/>
+              <a:buChar char="§"/>
+              <a:defRPr sz="1600">
+                <a:solidFill>
+                  <a:schemeClr val="tx1"/>
+                </a:solidFill>
+                <a:latin typeface="Arial" charset="0"/>
+                <a:cs typeface="Arial" charset="0"/>
+              </a:defRPr>
+            </a:lvl6pPr>
+            <a:lvl7pPr marL="2971800" indent="-228600" eaLnBrk="0" fontAlgn="base" hangingPunct="0">
+              <a:spcBef>
+                <a:spcPct val="20000"/>
+              </a:spcBef>
+              <a:spcAft>
+                <a:spcPct val="0"/>
+              </a:spcAft>
+              <a:buClr>
+                <a:schemeClr val="tx1"/>
+              </a:buClr>
+              <a:buFont typeface="Wingdings" pitchFamily="2" charset="2"/>
+              <a:buChar char="§"/>
+              <a:defRPr sz="1600">
+                <a:solidFill>
+                  <a:schemeClr val="tx1"/>
+                </a:solidFill>
+                <a:latin typeface="Arial" charset="0"/>
+                <a:cs typeface="Arial" charset="0"/>
+              </a:defRPr>
+            </a:lvl7pPr>
+            <a:lvl8pPr marL="3429000" indent="-228600" eaLnBrk="0" fontAlgn="base" hangingPunct="0">
+              <a:spcBef>
+                <a:spcPct val="20000"/>
+              </a:spcBef>
+              <a:spcAft>
+                <a:spcPct val="0"/>
+              </a:spcAft>
+              <a:buClr>
+                <a:schemeClr val="tx1"/>
+              </a:buClr>
+              <a:buFont typeface="Wingdings" pitchFamily="2" charset="2"/>
+              <a:buChar char="§"/>
+              <a:defRPr sz="1600">
+                <a:solidFill>
+                  <a:schemeClr val="tx1"/>
+                </a:solidFill>
+                <a:latin typeface="Arial" charset="0"/>
+                <a:cs typeface="Arial" charset="0"/>
+              </a:defRPr>
+            </a:lvl8pPr>
+            <a:lvl9pPr marL="3886200" indent="-228600" eaLnBrk="0" fontAlgn="base" hangingPunct="0">
+              <a:spcBef>
+                <a:spcPct val="20000"/>
+              </a:spcBef>
+              <a:spcAft>
+                <a:spcPct val="0"/>
+              </a:spcAft>
+              <a:buClr>
+                <a:schemeClr val="tx1"/>
+              </a:buClr>
+              <a:buFont typeface="Wingdings" pitchFamily="2" charset="2"/>
+              <a:buChar char="§"/>
+              <a:defRPr sz="1600">
+                <a:solidFill>
+                  <a:schemeClr val="tx1"/>
+                </a:solidFill>
+                <a:latin typeface="Arial" charset="0"/>
+                <a:cs typeface="Arial" charset="0"/>
+              </a:defRPr>
+            </a:lvl9pPr>
+          </a:lstStyle>
+          <a:p>
+            <a:pPr eaLnBrk="1" hangingPunct="1">
+              <a:spcBef>
+                <a:spcPct val="0"/>
+              </a:spcBef>
+              <a:buClrTx/>
+              <a:buFontTx/>
+              <a:buNone/>
+            </a:pPr>
+            <a:fld id="{2D85BBC0-0B15-40EC-BAC6-58D4FC367C62}" type="slidenum">
+              <a:rPr lang="en-US" altLang="en-US" sz="900" smtClean="0">
+                <a:latin typeface="Verdana" pitchFamily="34" charset="0"/>
+              </a:rPr>
+              <a:pPr eaLnBrk="1" hangingPunct="1">
+                <a:spcBef>
+                  <a:spcPct val="0"/>
+                </a:spcBef>
+                <a:buClrTx/>
+                <a:buFontTx/>
+                <a:buNone/>
+              </a:pPr>
+              <a:t>2</a:t>
+            </a:fld>
+            <a:endParaRPr lang="en-US" altLang="en-US" sz="900" smtClean="0">
+              <a:latin typeface="Verdana" pitchFamily="34" charset="0"/>
+            </a:endParaRPr>
+          </a:p>
+        </p:txBody>
+      </p:sp>
+      <p:sp>
+        <p:nvSpPr>
+          <p:cNvPr id="29699" name="Footer Placeholder 5"/>
+          <p:cNvSpPr>
+            <a:spLocks noGrp="1"/>
+          </p:cNvSpPr>
+          <p:nvPr>
+            <p:ph type="ftr" sz="quarter" idx="11"/>
+          </p:nvPr>
+        </p:nvSpPr>
+        <p:spPr>
+          <a:noFill/>
+        </p:spPr>
+        <p:txBody>
+          <a:bodyPr/>
+          <a:lstStyle>
+            <a:lvl1pPr eaLnBrk="0" hangingPunct="0">
+              <a:spcBef>
+                <a:spcPct val="20000"/>
+              </a:spcBef>
+              <a:buClr>
+                <a:schemeClr val="tx1"/>
+              </a:buClr>
+              <a:buFont typeface="Wingdings" pitchFamily="2" charset="2"/>
+              <a:buChar char="p"/>
+              <a:defRPr sz="2400">
+                <a:solidFill>
+                  <a:schemeClr val="tx1"/>
+                </a:solidFill>
+                <a:latin typeface="Arial" charset="0"/>
+                <a:cs typeface="Arial" charset="0"/>
+              </a:defRPr>
+            </a:lvl1pPr>
+            <a:lvl2pPr marL="742950" indent="-285750" eaLnBrk="0" hangingPunct="0">
+              <a:spcBef>
+                <a:spcPct val="20000"/>
+              </a:spcBef>
+              <a:buClr>
+                <a:schemeClr val="tx1"/>
+              </a:buClr>
+              <a:buFont typeface="Wingdings" pitchFamily="2" charset="2"/>
+              <a:buChar char="n"/>
+              <a:defRPr sz="2000">
+                <a:solidFill>
+                  <a:schemeClr val="tx1"/>
+                </a:solidFill>
+                <a:latin typeface="Arial" charset="0"/>
+                <a:cs typeface="Arial" charset="0"/>
+              </a:defRPr>
+            </a:lvl2pPr>
+            <a:lvl3pPr marL="1143000" indent="-228600" eaLnBrk="0" hangingPunct="0">
+              <a:spcBef>
+                <a:spcPct val="20000"/>
+              </a:spcBef>
+              <a:buClr>
+                <a:schemeClr val="tx1"/>
+              </a:buClr>
+              <a:buFont typeface="Wingdings" pitchFamily="2" charset="2"/>
+              <a:buChar char="p"/>
+              <a:defRPr>
+                <a:solidFill>
+                  <a:schemeClr val="tx1"/>
+                </a:solidFill>
+                <a:latin typeface="Arial" charset="0"/>
+                <a:cs typeface="Arial" charset="0"/>
+              </a:defRPr>
+            </a:lvl3pPr>
+            <a:lvl4pPr marL="1600200" indent="-228600" eaLnBrk="0" hangingPunct="0">
+              <a:spcBef>
+                <a:spcPct val="20000"/>
+              </a:spcBef>
+              <a:buClr>
+                <a:schemeClr val="tx1"/>
+              </a:buClr>
+              <a:buFont typeface="Wingdings" pitchFamily="2" charset="2"/>
+              <a:buChar char="§"/>
+              <a:defRPr sz="1600">
+                <a:solidFill>
+                  <a:schemeClr val="tx1"/>
+                </a:solidFill>
+                <a:latin typeface="Arial" charset="0"/>
+                <a:cs typeface="Arial" charset="0"/>
+              </a:defRPr>
+            </a:lvl4pPr>
+            <a:lvl5pPr marL="2057400" indent="-228600" eaLnBrk="0" hangingPunct="0">
+              <a:spcBef>
+                <a:spcPct val="20000"/>
+              </a:spcBef>
+              <a:buClr>
+                <a:schemeClr val="tx1"/>
+              </a:buClr>
+              <a:buFont typeface="Wingdings" pitchFamily="2" charset="2"/>
+              <a:buChar char="§"/>
+              <a:defRPr sz="1600">
+                <a:solidFill>
+                  <a:schemeClr val="tx1"/>
+                </a:solidFill>
+                <a:latin typeface="Arial" charset="0"/>
+                <a:cs typeface="Arial" charset="0"/>
+              </a:defRPr>
+            </a:lvl5pPr>
+            <a:lvl6pPr marL="2514600" indent="-228600" eaLnBrk="0" fontAlgn="base" hangingPunct="0">
+              <a:spcBef>
+                <a:spcPct val="20000"/>
+              </a:spcBef>
+              <a:spcAft>
+                <a:spcPct val="0"/>
+              </a:spcAft>
+              <a:buClr>
+                <a:schemeClr val="tx1"/>
+              </a:buClr>
+              <a:buFont typeface="Wingdings" pitchFamily="2" charset="2"/>
+              <a:buChar char="§"/>
+              <a:defRPr sz="1600">
+                <a:solidFill>
+                  <a:schemeClr val="tx1"/>
+                </a:solidFill>
+                <a:latin typeface="Arial" charset="0"/>
+                <a:cs typeface="Arial" charset="0"/>
+              </a:defRPr>
+            </a:lvl6pPr>
+            <a:lvl7pPr marL="2971800" indent="-228600" eaLnBrk="0" fontAlgn="base" hangingPunct="0">
+              <a:spcBef>
+                <a:spcPct val="20000"/>
+              </a:spcBef>
+              <a:spcAft>
+                <a:spcPct val="0"/>
+              </a:spcAft>
+              <a:buClr>
+                <a:schemeClr val="tx1"/>
+              </a:buClr>
+              <a:buFont typeface="Wingdings" pitchFamily="2" charset="2"/>
+              <a:buChar char="§"/>
+              <a:defRPr sz="1600">
+                <a:solidFill>
+                  <a:schemeClr val="tx1"/>
+                </a:solidFill>
+                <a:latin typeface="Arial" charset="0"/>
+                <a:cs typeface="Arial" charset="0"/>
+              </a:defRPr>
+            </a:lvl7pPr>
+            <a:lvl8pPr marL="3429000" indent="-228600" eaLnBrk="0" fontAlgn="base" hangingPunct="0">
+              <a:spcBef>
+                <a:spcPct val="20000"/>
+              </a:spcBef>
+              <a:spcAft>
+                <a:spcPct val="0"/>
+              </a:spcAft>
+              <a:buClr>
+                <a:schemeClr val="tx1"/>
+              </a:buClr>
+              <a:buFont typeface="Wingdings" pitchFamily="2" charset="2"/>
+              <a:buChar char="§"/>
+              <a:defRPr sz="1600">
+                <a:solidFill>
+                  <a:schemeClr val="tx1"/>
+                </a:solidFill>
+                <a:latin typeface="Arial" charset="0"/>
+                <a:cs typeface="Arial" charset="0"/>
+              </a:defRPr>
+            </a:lvl8pPr>
+            <a:lvl9pPr marL="3886200" indent="-228600" eaLnBrk="0" fontAlgn="base" hangingPunct="0">
+              <a:spcBef>
+                <a:spcPct val="20000"/>
+              </a:spcBef>
+              <a:spcAft>
+                <a:spcPct val="0"/>
+              </a:spcAft>
+              <a:buClr>
+                <a:schemeClr val="tx1"/>
+              </a:buClr>
+              <a:buFont typeface="Wingdings" pitchFamily="2" charset="2"/>
+              <a:buChar char="§"/>
+              <a:defRPr sz="1600">
+                <a:solidFill>
+                  <a:schemeClr val="tx1"/>
+                </a:solidFill>
+                <a:latin typeface="Arial" charset="0"/>
+                <a:cs typeface="Arial" charset="0"/>
+              </a:defRPr>
+            </a:lvl9pPr>
+          </a:lstStyle>
+          <a:p>
+            <a:pPr eaLnBrk="1" hangingPunct="1">
+              <a:spcBef>
+                <a:spcPct val="0"/>
+              </a:spcBef>
+              <a:buClrTx/>
+              <a:buFontTx/>
+              <a:buNone/>
+            </a:pPr>
+            <a:r>
+              <a:rPr lang="en-US" altLang="en-US" sz="900" smtClean="0">
+                <a:latin typeface="Verdana" pitchFamily="34" charset="0"/>
+              </a:rPr>
+              <a:t>Realtime and Big Data Analytics</a:t>
+            </a:r>
+          </a:p>
+        </p:txBody>
+      </p:sp>
+      <p:graphicFrame>
+        <p:nvGraphicFramePr>
+          <p:cNvPr id="415817" name="Group 73"/>
+          <p:cNvGraphicFramePr>
+            <a:graphicFrameLocks noGrp="1"/>
+          </p:cNvGraphicFramePr>
+          <p:nvPr>
+            <p:ph sz="half" idx="2"/>
+            <p:extLst>
+              <p:ext uri="{D42A27DB-BD31-4B8C-83A1-F6EECF244321}">
+                <p14:modId xmlns:p14="http://schemas.microsoft.com/office/powerpoint/2010/main" val="2684002353"/>
+              </p:ext>
+            </p:extLst>
+          </p:nvPr>
+        </p:nvGraphicFramePr>
+        <p:xfrm>
+          <a:off x="313267" y="1113938"/>
+          <a:ext cx="8444753" cy="4694190"/>
+        </p:xfrm>
+        <a:graphic>
+          <a:graphicData uri="http://schemas.openxmlformats.org/drawingml/2006/table">
+            <a:tbl>
+              <a:tblPr/>
+              <a:tblGrid>
+                <a:gridCol w="8444753"/>
+              </a:tblGrid>
+              <a:tr h="429486">
+                <a:tc>
+                  <a:txBody>
+                    <a:bodyPr/>
+                    <a:lstStyle/>
+                    <a:p>
+                      <a:pPr marL="438150" indent="-381000" algn="ctr" eaLnBrk="1" hangingPunct="1">
+                        <a:buFont typeface="Wingdings" pitchFamily="2" charset="2"/>
+                        <a:buNone/>
+                      </a:pPr>
+                      <a:endParaRPr lang="en-US" altLang="en-US" sz="700" b="1" i="1" dirty="0" smtClean="0">
+                        <a:solidFill>
+                          <a:schemeClr val="tx1"/>
+                        </a:solidFill>
+                      </a:endParaRPr>
+                    </a:p>
+                    <a:p>
+                      <a:pPr marL="438150" indent="-381000" algn="ctr" eaLnBrk="1" hangingPunct="1">
+                        <a:buFont typeface="Wingdings" pitchFamily="2" charset="2"/>
+                        <a:buNone/>
+                      </a:pPr>
+                      <a:r>
+                        <a:rPr lang="en-US" altLang="en-US" sz="1400" b="1" i="1" dirty="0" smtClean="0">
+                          <a:solidFill>
+                            <a:schemeClr val="tx1"/>
+                          </a:solidFill>
+                        </a:rPr>
+                        <a:t>Realtime and</a:t>
+                      </a:r>
+                      <a:r>
+                        <a:rPr lang="en-US" altLang="en-US" sz="1400" b="1" i="1" baseline="0" dirty="0" smtClean="0">
+                          <a:solidFill>
+                            <a:schemeClr val="tx1"/>
+                          </a:solidFill>
+                        </a:rPr>
+                        <a:t> Big Data Analytics </a:t>
+                      </a:r>
+                      <a:r>
+                        <a:rPr lang="en-US" altLang="en-US" sz="1400" b="1" i="1" dirty="0" smtClean="0">
+                          <a:solidFill>
+                            <a:schemeClr val="tx1"/>
+                          </a:solidFill>
+                        </a:rPr>
+                        <a:t>Project Proposal</a:t>
+                      </a:r>
+                    </a:p>
+                    <a:p>
+                      <a:pPr marL="438150" indent="-381000" eaLnBrk="1" hangingPunct="1">
+                        <a:buFont typeface="Wingdings" pitchFamily="2" charset="2"/>
+                        <a:buNone/>
+                      </a:pPr>
+                      <a:endParaRPr lang="en-US" altLang="en-US" sz="400" dirty="0" smtClean="0">
+                        <a:solidFill>
+                          <a:schemeClr val="tx1"/>
+                        </a:solidFill>
+                      </a:endParaRPr>
+                    </a:p>
+                  </a:txBody>
+                  <a:tcPr marT="45747" marB="45747" horzOverflow="overflow">
+                    <a:lnL w="12700" cap="flat" cmpd="sng" algn="ctr">
+                      <a:solidFill>
+                        <a:schemeClr val="tx1"/>
+                      </a:solidFill>
+                      <a:prstDash val="solid"/>
+                      <a:round/>
+                      <a:headEnd type="none" w="med" len="med"/>
+                      <a:tailEnd type="none" w="med" len="med"/>
+                    </a:lnL>
+                    <a:lnR w="12700" cap="flat" cmpd="sng" algn="ctr">
+                      <a:solidFill>
+                        <a:schemeClr val="tx1"/>
+                      </a:solidFill>
+                      <a:prstDash val="solid"/>
+                      <a:round/>
+                      <a:headEnd type="none" w="med" len="med"/>
+                      <a:tailEnd type="none" w="med" len="med"/>
+                    </a:lnR>
+                    <a:lnT w="12700" cap="flat" cmpd="sng" algn="ctr">
+                      <a:solidFill>
+                        <a:schemeClr val="tx1"/>
+                      </a:solidFill>
+                      <a:prstDash val="solid"/>
+                      <a:round/>
+                      <a:headEnd type="none" w="med" len="med"/>
+                      <a:tailEnd type="none" w="med" len="med"/>
+                    </a:lnT>
+                    <a:lnB w="12700" cap="flat" cmpd="sng" algn="ctr">
+                      <a:solidFill>
+                        <a:schemeClr val="tx1"/>
+                      </a:solidFill>
+                      <a:prstDash val="solid"/>
+                      <a:round/>
+                      <a:headEnd type="none" w="med" len="med"/>
+                      <a:tailEnd type="none" w="med" len="med"/>
+                    </a:lnB>
+                    <a:lnTlToBr>
+                      <a:noFill/>
+                    </a:lnTlToBr>
+                    <a:lnBlToTr>
+                      <a:noFill/>
+                    </a:lnBlToTr>
+                    <a:noFill/>
+                  </a:tcPr>
+                </a:tc>
+              </a:tr>
+              <a:tr h="218740">
+                <a:tc>
+                  <a:txBody>
+                    <a:bodyPr/>
+                    <a:lstStyle/>
+                    <a:p>
+                      <a:pPr marL="438150" indent="-381000" eaLnBrk="1" hangingPunct="1">
+                        <a:buFont typeface="Wingdings" pitchFamily="2" charset="2"/>
+                        <a:buNone/>
+                      </a:pPr>
+                      <a:r>
+                        <a:rPr lang="en-US" altLang="en-US" sz="900" b="1" i="1" dirty="0" smtClean="0">
+                          <a:solidFill>
+                            <a:srgbClr val="0070C0"/>
+                          </a:solidFill>
+                        </a:rPr>
+                        <a:t>Part 1.</a:t>
+                      </a:r>
+                      <a:r>
+                        <a:rPr lang="en-US" altLang="en-US" sz="900" b="1" i="1" baseline="0" dirty="0" smtClean="0">
+                          <a:solidFill>
+                            <a:srgbClr val="0070C0"/>
+                          </a:solidFill>
+                        </a:rPr>
+                        <a:t> General Information</a:t>
+                      </a:r>
+                      <a:endParaRPr lang="en-US" altLang="en-US" sz="900" b="1" i="1" dirty="0" smtClean="0">
+                        <a:solidFill>
+                          <a:srgbClr val="0070C0"/>
+                        </a:solidFill>
+                      </a:endParaRPr>
+                    </a:p>
+                  </a:txBody>
+                  <a:tcPr marT="45747" marB="45747" horzOverflow="overflow">
+                    <a:lnL w="12700" cap="flat" cmpd="sng" algn="ctr">
+                      <a:solidFill>
+                        <a:schemeClr val="tx1"/>
+                      </a:solidFill>
+                      <a:prstDash val="solid"/>
+                      <a:round/>
+                      <a:headEnd type="none" w="med" len="med"/>
+                      <a:tailEnd type="none" w="med" len="med"/>
+                    </a:lnL>
+                    <a:lnR w="12700" cap="flat" cmpd="sng" algn="ctr">
+                      <a:solidFill>
+                        <a:schemeClr val="tx1"/>
+                      </a:solidFill>
+                      <a:prstDash val="solid"/>
+                      <a:round/>
+                      <a:headEnd type="none" w="med" len="med"/>
+                      <a:tailEnd type="none" w="med" len="med"/>
+                    </a:lnR>
+                    <a:lnT w="12700" cap="flat" cmpd="sng" algn="ctr">
+                      <a:solidFill>
+                        <a:schemeClr val="tx1"/>
+                      </a:solidFill>
+                      <a:prstDash val="solid"/>
+                      <a:round/>
+                      <a:headEnd type="none" w="med" len="med"/>
+                      <a:tailEnd type="none" w="med" len="med"/>
+                    </a:lnT>
+                    <a:lnB w="12700" cap="flat" cmpd="sng" algn="ctr">
+                      <a:solidFill>
+                        <a:schemeClr val="tx1"/>
+                      </a:solidFill>
+                      <a:prstDash val="solid"/>
+                      <a:round/>
+                      <a:headEnd type="none" w="med" len="med"/>
+                      <a:tailEnd type="none" w="med" len="med"/>
+                    </a:lnB>
+                    <a:lnTlToBr>
+                      <a:noFill/>
+                    </a:lnTlToBr>
+                    <a:lnBlToTr>
+                      <a:noFill/>
+                    </a:lnBlToTr>
+                    <a:noFill/>
+                  </a:tcPr>
+                </a:tc>
+              </a:tr>
+              <a:tr h="965467">
+                <a:tc>
+                  <a:txBody>
+                    <a:bodyPr/>
+                    <a:lstStyle/>
+                    <a:p>
+                      <a:pPr marL="438150" indent="-381000" eaLnBrk="1" hangingPunct="1">
+                        <a:buFont typeface="Wingdings" pitchFamily="2" charset="2"/>
+                        <a:buNone/>
+                      </a:pPr>
+                      <a:r>
+                        <a:rPr lang="en-US" altLang="en-US" sz="900" dirty="0" smtClean="0">
+                          <a:solidFill>
+                            <a:schemeClr val="tx1"/>
+                          </a:solidFill>
+                        </a:rPr>
+                        <a:t>Team Name (optional): </a:t>
+                      </a:r>
+                    </a:p>
+                    <a:p>
+                      <a:pPr marL="438150" indent="-381000" eaLnBrk="1" hangingPunct="1">
+                        <a:buFont typeface="Wingdings" pitchFamily="2" charset="2"/>
+                        <a:buNone/>
+                      </a:pPr>
+                      <a:r>
+                        <a:rPr lang="en-US" altLang="en-US" sz="900" dirty="0" smtClean="0">
+                          <a:solidFill>
+                            <a:schemeClr val="tx1"/>
+                          </a:solidFill>
+                        </a:rPr>
+                        <a:t>Team Members: Chris Keitel, George </a:t>
+                      </a:r>
+                      <a:r>
+                        <a:rPr lang="en-US" altLang="en-US" sz="900" dirty="0" err="1" smtClean="0">
+                          <a:solidFill>
+                            <a:schemeClr val="tx1"/>
+                          </a:solidFill>
+                        </a:rPr>
+                        <a:t>Dagher</a:t>
+                      </a:r>
+                      <a:r>
+                        <a:rPr lang="en-US" altLang="en-US" sz="900" dirty="0" smtClean="0">
+                          <a:solidFill>
+                            <a:schemeClr val="tx1"/>
+                          </a:solidFill>
+                        </a:rPr>
+                        <a:t>, </a:t>
+                      </a:r>
+                      <a:r>
+                        <a:rPr lang="en-US" altLang="en-US" sz="900" dirty="0" err="1" smtClean="0">
+                          <a:solidFill>
+                            <a:schemeClr val="tx1"/>
+                          </a:solidFill>
+                        </a:rPr>
+                        <a:t>Khen</a:t>
+                      </a:r>
+                      <a:r>
+                        <a:rPr lang="en-US" altLang="en-US" sz="900" dirty="0" smtClean="0">
+                          <a:solidFill>
+                            <a:schemeClr val="tx1"/>
+                          </a:solidFill>
+                        </a:rPr>
+                        <a:t> Price</a:t>
+                      </a:r>
+                    </a:p>
+                    <a:p>
+                      <a:pPr marL="438150" indent="-381000" eaLnBrk="1" hangingPunct="1">
+                        <a:buFont typeface="Wingdings" pitchFamily="2" charset="2"/>
+                        <a:buNone/>
+                      </a:pPr>
+                      <a:r>
+                        <a:rPr lang="en-US" altLang="en-US" sz="900" dirty="0" smtClean="0">
+                          <a:solidFill>
+                            <a:schemeClr val="tx1"/>
+                          </a:solidFill>
+                        </a:rPr>
+                        <a:t>Project Title: Is working healthy?</a:t>
+                      </a:r>
+                    </a:p>
+                    <a:p>
+                      <a:pPr marL="438150" indent="-381000" eaLnBrk="1" hangingPunct="1">
+                        <a:buFont typeface="Wingdings" pitchFamily="2" charset="2"/>
+                        <a:buNone/>
+                      </a:pPr>
+                      <a:endParaRPr lang="en-US" altLang="en-US" sz="500" dirty="0" smtClean="0">
+                        <a:solidFill>
+                          <a:schemeClr val="tx1"/>
+                        </a:solidFill>
+                      </a:endParaRPr>
+                    </a:p>
+                    <a:p>
+                      <a:pPr marL="438150" indent="-381000" eaLnBrk="1" hangingPunct="1">
+                        <a:buFont typeface="Wingdings" pitchFamily="2" charset="2"/>
+                        <a:buNone/>
+                      </a:pPr>
+                      <a:r>
+                        <a:rPr lang="en-US" altLang="en-US" sz="900" dirty="0" smtClean="0">
+                          <a:solidFill>
+                            <a:schemeClr val="tx1"/>
+                          </a:solidFill>
+                        </a:rPr>
+                        <a:t>Project Description:</a:t>
+                      </a:r>
+                      <a:r>
+                        <a:rPr lang="en-US" altLang="en-US" sz="900" baseline="0" dirty="0" smtClean="0">
+                          <a:solidFill>
+                            <a:schemeClr val="tx1"/>
+                          </a:solidFill>
+                        </a:rPr>
+                        <a:t> Using </a:t>
+                      </a:r>
+                      <a:r>
+                        <a:rPr lang="en-US" altLang="en-US" sz="900" baseline="0" dirty="0" smtClean="0">
+                          <a:solidFill>
+                            <a:schemeClr val="tx1"/>
+                          </a:solidFill>
+                        </a:rPr>
+                        <a:t>New York state employment statistics by county, in-patient hospital data by </a:t>
+                      </a:r>
+                      <a:r>
+                        <a:rPr lang="en-US" altLang="en-US" sz="900" baseline="0" dirty="0" err="1" smtClean="0">
+                          <a:solidFill>
+                            <a:schemeClr val="tx1"/>
+                          </a:solidFill>
+                        </a:rPr>
+                        <a:t>zipcode</a:t>
+                      </a:r>
+                      <a:r>
+                        <a:rPr lang="en-US" altLang="en-US" sz="900" baseline="0" dirty="0" smtClean="0">
+                          <a:solidFill>
+                            <a:schemeClr val="tx1"/>
+                          </a:solidFill>
+                        </a:rPr>
+                        <a:t>, and twitter updates, we intend to explore </a:t>
+                      </a:r>
+                      <a:r>
+                        <a:rPr lang="en-US" altLang="en-US" sz="900" baseline="0" dirty="0" smtClean="0">
+                          <a:solidFill>
+                            <a:schemeClr val="tx1"/>
+                          </a:solidFill>
+                        </a:rPr>
+                        <a:t>whether there is a correlation between </a:t>
+                      </a:r>
+                      <a:r>
+                        <a:rPr lang="en-US" altLang="en-US" sz="900" baseline="0" dirty="0" smtClean="0">
+                          <a:solidFill>
+                            <a:schemeClr val="tx1"/>
+                          </a:solidFill>
+                        </a:rPr>
+                        <a:t>unemployment and changes in health.  Assuming we can find a relationship between historical unemployment and hospital stays, we can than then use current twitter updates as a predictor of future declining health.</a:t>
+                      </a:r>
+                      <a:endParaRPr lang="en-US" altLang="en-US" sz="400" dirty="0" smtClean="0">
+                        <a:solidFill>
+                          <a:schemeClr val="tx1"/>
+                        </a:solidFill>
+                      </a:endParaRPr>
+                    </a:p>
+                  </a:txBody>
+                  <a:tcPr marT="45747" marB="45747" horzOverflow="overflow">
+                    <a:lnL w="12700" cap="flat" cmpd="sng" algn="ctr">
+                      <a:solidFill>
+                        <a:schemeClr val="tx1"/>
+                      </a:solidFill>
+                      <a:prstDash val="solid"/>
+                      <a:round/>
+                      <a:headEnd type="none" w="med" len="med"/>
+                      <a:tailEnd type="none" w="med" len="med"/>
+                    </a:lnL>
+                    <a:lnR w="12700" cap="flat" cmpd="sng" algn="ctr">
+                      <a:solidFill>
+                        <a:schemeClr val="tx1"/>
+                      </a:solidFill>
+                      <a:prstDash val="solid"/>
+                      <a:round/>
+                      <a:headEnd type="none" w="med" len="med"/>
+                      <a:tailEnd type="none" w="med" len="med"/>
+                    </a:lnR>
+                    <a:lnT w="12700" cap="flat" cmpd="sng" algn="ctr">
+                      <a:solidFill>
+                        <a:schemeClr val="tx1"/>
+                      </a:solidFill>
+                      <a:prstDash val="solid"/>
+                      <a:round/>
+                      <a:headEnd type="none" w="med" len="med"/>
+                      <a:tailEnd type="none" w="med" len="med"/>
+                    </a:lnT>
+                    <a:lnB w="12700" cap="flat" cmpd="sng" algn="ctr">
+                      <a:solidFill>
+                        <a:schemeClr val="tx1"/>
+                      </a:solidFill>
+                      <a:prstDash val="solid"/>
+                      <a:round/>
+                      <a:headEnd type="none" w="med" len="med"/>
+                      <a:tailEnd type="none" w="med" len="med"/>
+                    </a:lnB>
+                    <a:lnTlToBr>
+                      <a:noFill/>
+                    </a:lnTlToBr>
+                    <a:lnBlToTr>
+                      <a:noFill/>
+                    </a:lnBlToTr>
+                    <a:noFill/>
+                  </a:tcPr>
+                </a:tc>
+              </a:tr>
               <a:tr h="209264">
-                <a:tc gridSpan="4">
+                <a:tc>
                   <a:txBody>
                     <a:bodyPr/>
                     <a:lstStyle/>
@@ -15122,42 +16159,391 @@
                     </a:solidFill>
                   </a:tcPr>
                 </a:tc>
-                <a:tc hMerge="1">
+              </a:tr>
+              <a:tr h="310696">
+                <a:tc>
                   <a:txBody>
                     <a:bodyPr/>
                     <a:lstStyle/>
                     <a:p>
-                      <a:endParaRPr lang="en-US"/>
+                      <a:pPr marL="438150" marR="0" lvl="0" indent="-381000" algn="l" defTabSz="914400" rtl="0" eaLnBrk="1" fontAlgn="auto" latinLnBrk="0" hangingPunct="1">
+                        <a:lnSpc>
+                          <a:spcPct val="100000"/>
+                        </a:lnSpc>
+                        <a:spcBef>
+                          <a:spcPts val="0"/>
+                        </a:spcBef>
+                        <a:spcAft>
+                          <a:spcPts val="0"/>
+                        </a:spcAft>
+                        <a:buClrTx/>
+                        <a:buSzTx/>
+                        <a:buFont typeface="Wingdings" pitchFamily="2" charset="2"/>
+                        <a:buNone/>
+                        <a:tabLst/>
+                        <a:defRPr/>
+                      </a:pPr>
+                      <a:r>
+                        <a:rPr lang="en-US" sz="1100" dirty="0" err="1" smtClean="0"/>
+                        <a:t>Halleröd</a:t>
+                      </a:r>
+                      <a:r>
+                        <a:rPr lang="en-US" sz="1100" dirty="0" smtClean="0"/>
+                        <a:t>, </a:t>
+                      </a:r>
+                      <a:r>
+                        <a:rPr lang="en-US" sz="1100" dirty="0" err="1" smtClean="0"/>
+                        <a:t>Björn</a:t>
+                      </a:r>
+                      <a:r>
+                        <a:rPr lang="en-US" sz="1100" dirty="0" smtClean="0"/>
+                        <a:t>, and Jan-Eric </a:t>
+                      </a:r>
+                      <a:r>
+                        <a:rPr lang="en-US" sz="1100" dirty="0" err="1" smtClean="0"/>
+                        <a:t>Gustafsson</a:t>
+                      </a:r>
+                      <a:r>
+                        <a:rPr lang="en-US" sz="1100" dirty="0" smtClean="0"/>
+                        <a:t>. "A longitudinal analysis of the </a:t>
+                      </a:r>
+                      <a:r>
+                        <a:rPr lang="en-US" sz="1100" b="0" dirty="0" smtClean="0"/>
+                        <a:t>relationship between changes in socio-economic status and changes in health.“</a:t>
+                      </a:r>
                     </a:p>
-                  </a:txBody>
-                  <a:tcPr/>
-                </a:tc>
-                <a:tc hMerge="1">
-                  <a:txBody>
-                    <a:bodyPr/>
-                    <a:lstStyle/>
                     <a:p>
-                      <a:endParaRPr lang="en-US"/>
+                      <a:pPr marL="438150" marR="0" lvl="0" indent="-381000" algn="l" defTabSz="914400" rtl="0" eaLnBrk="1" fontAlgn="auto" latinLnBrk="0" hangingPunct="1">
+                        <a:lnSpc>
+                          <a:spcPct val="100000"/>
+                        </a:lnSpc>
+                        <a:spcBef>
+                          <a:spcPts val="0"/>
+                        </a:spcBef>
+                        <a:spcAft>
+                          <a:spcPts val="0"/>
+                        </a:spcAft>
+                        <a:buClrTx/>
+                        <a:buSzTx/>
+                        <a:buFont typeface="Wingdings" pitchFamily="2" charset="2"/>
+                        <a:buNone/>
+                        <a:tabLst/>
+                        <a:defRPr/>
+                      </a:pPr>
+                      <a:endParaRPr kumimoji="0" lang="en-US" altLang="en-US" sz="1100" b="0" i="0" u="none" strike="noStrike" kern="1200" cap="none" spc="0" normalizeH="0" baseline="0" noProof="0" dirty="0" smtClean="0">
+                        <a:ln>
+                          <a:noFill/>
+                        </a:ln>
+                        <a:solidFill>
+                          <a:srgbClr val="000000"/>
+                        </a:solidFill>
+                        <a:effectLst/>
+                        <a:uLnTx/>
+                        <a:uFillTx/>
+                        <a:latin typeface="+mn-lt"/>
+                        <a:cs typeface="+mn-cs"/>
+                      </a:endParaRPr>
                     </a:p>
-                  </a:txBody>
-                  <a:tcPr/>
-                </a:tc>
-                <a:tc hMerge="1">
-                  <a:txBody>
-                    <a:bodyPr/>
-                    <a:lstStyle/>
                     <a:p>
-                      <a:endParaRPr lang="en-US"/>
+                      <a:pPr marL="438150" marR="0" lvl="0" indent="-381000" algn="l" defTabSz="914400" rtl="0" eaLnBrk="1" fontAlgn="auto" latinLnBrk="0" hangingPunct="1">
+                        <a:lnSpc>
+                          <a:spcPct val="100000"/>
+                        </a:lnSpc>
+                        <a:spcBef>
+                          <a:spcPts val="0"/>
+                        </a:spcBef>
+                        <a:spcAft>
+                          <a:spcPts val="0"/>
+                        </a:spcAft>
+                        <a:buClrTx/>
+                        <a:buSzTx/>
+                        <a:buFont typeface="Wingdings" pitchFamily="2" charset="2"/>
+                        <a:buNone/>
+                        <a:tabLst/>
+                        <a:defRPr/>
+                      </a:pPr>
+                      <a:r>
+                        <a:rPr lang="en-US" sz="1100" dirty="0" err="1" smtClean="0"/>
+                        <a:t>Morefield</a:t>
+                      </a:r>
+                      <a:r>
+                        <a:rPr lang="en-US" sz="1100" dirty="0" smtClean="0"/>
+                        <a:t>, G. Brant, David C. </a:t>
+                      </a:r>
+                      <a:r>
+                        <a:rPr lang="en-US" sz="1100" dirty="0" err="1" smtClean="0"/>
+                        <a:t>Ribar</a:t>
+                      </a:r>
+                      <a:r>
+                        <a:rPr lang="en-US" sz="1100" dirty="0" smtClean="0"/>
+                        <a:t>, and Christopher J. </a:t>
+                      </a:r>
+                      <a:r>
+                        <a:rPr lang="en-US" sz="1100" dirty="0" err="1" smtClean="0"/>
+                        <a:t>Ruhm</a:t>
+                      </a:r>
+                      <a:r>
+                        <a:rPr lang="en-US" sz="1100" dirty="0" smtClean="0"/>
+                        <a:t>. </a:t>
+                      </a:r>
+                      <a:r>
+                        <a:rPr lang="en-US" sz="1100" b="0" dirty="0" smtClean="0"/>
+                        <a:t>“Occupational status and health transitions.”</a:t>
+                      </a:r>
                     </a:p>
-                  </a:txBody>
-                  <a:tcPr/>
-                </a:tc>
-              </a:tr>
-              <a:tr h="310696">
-                <a:tc gridSpan="4">
-                  <a:txBody>
-                    <a:bodyPr/>
-                    <a:lstStyle/>
+                    <a:p>
+                      <a:pPr marL="438150" marR="0" lvl="0" indent="-381000" algn="l" defTabSz="914400" rtl="0" eaLnBrk="1" fontAlgn="auto" latinLnBrk="0" hangingPunct="1">
+                        <a:lnSpc>
+                          <a:spcPct val="100000"/>
+                        </a:lnSpc>
+                        <a:spcBef>
+                          <a:spcPts val="0"/>
+                        </a:spcBef>
+                        <a:spcAft>
+                          <a:spcPts val="0"/>
+                        </a:spcAft>
+                        <a:buClrTx/>
+                        <a:buSzTx/>
+                        <a:buFont typeface="Wingdings" pitchFamily="2" charset="2"/>
+                        <a:buNone/>
+                        <a:tabLst/>
+                        <a:defRPr/>
+                      </a:pPr>
+                      <a:endParaRPr kumimoji="0" lang="en-US" altLang="en-US" sz="1100" b="0" i="0" u="none" strike="noStrike" kern="1200" cap="none" spc="0" normalizeH="0" baseline="0" noProof="0" dirty="0" smtClean="0">
+                        <a:ln>
+                          <a:noFill/>
+                        </a:ln>
+                        <a:solidFill>
+                          <a:srgbClr val="000000"/>
+                        </a:solidFill>
+                        <a:effectLst/>
+                        <a:uLnTx/>
+                        <a:uFillTx/>
+                        <a:latin typeface="+mn-lt"/>
+                        <a:cs typeface="+mn-cs"/>
+                      </a:endParaRPr>
+                    </a:p>
+                    <a:p>
+                      <a:pPr marL="438150" marR="0" lvl="0" indent="-381000" algn="l" defTabSz="914400" rtl="0" eaLnBrk="1" fontAlgn="auto" latinLnBrk="0" hangingPunct="1">
+                        <a:lnSpc>
+                          <a:spcPct val="100000"/>
+                        </a:lnSpc>
+                        <a:spcBef>
+                          <a:spcPts val="0"/>
+                        </a:spcBef>
+                        <a:spcAft>
+                          <a:spcPts val="0"/>
+                        </a:spcAft>
+                        <a:buClrTx/>
+                        <a:buSzTx/>
+                        <a:buFont typeface="Wingdings" pitchFamily="2" charset="2"/>
+                        <a:buNone/>
+                        <a:tabLst/>
+                        <a:defRPr/>
+                      </a:pPr>
+                      <a:r>
+                        <a:rPr lang="en-US" sz="1100" dirty="0" smtClean="0"/>
+                        <a:t>Nixon, Ashley E., et al. </a:t>
+                      </a:r>
+                      <a:r>
+                        <a:rPr lang="en-US" sz="1100" b="0" dirty="0" smtClean="0"/>
+                        <a:t>"Can work make you sick? A meta-analysis of the relationships between job stressors and physical symptoms.“</a:t>
+                      </a:r>
+                    </a:p>
+                    <a:p>
+                      <a:pPr marL="438150" marR="0" lvl="0" indent="-381000" algn="l" defTabSz="914400" rtl="0" eaLnBrk="1" fontAlgn="auto" latinLnBrk="0" hangingPunct="1">
+                        <a:lnSpc>
+                          <a:spcPct val="100000"/>
+                        </a:lnSpc>
+                        <a:spcBef>
+                          <a:spcPts val="0"/>
+                        </a:spcBef>
+                        <a:spcAft>
+                          <a:spcPts val="0"/>
+                        </a:spcAft>
+                        <a:buClrTx/>
+                        <a:buSzTx/>
+                        <a:buFont typeface="Wingdings" pitchFamily="2" charset="2"/>
+                        <a:buNone/>
+                        <a:tabLst/>
+                        <a:defRPr/>
+                      </a:pPr>
+                      <a:endParaRPr kumimoji="0" lang="en-US" altLang="en-US" sz="1100" b="0" i="0" u="none" strike="noStrike" kern="1200" cap="none" spc="0" normalizeH="0" baseline="0" noProof="0" dirty="0" smtClean="0">
+                        <a:ln>
+                          <a:noFill/>
+                        </a:ln>
+                        <a:solidFill>
+                          <a:srgbClr val="000000"/>
+                        </a:solidFill>
+                        <a:effectLst/>
+                        <a:uLnTx/>
+                        <a:uFillTx/>
+                        <a:latin typeface="+mn-lt"/>
+                        <a:cs typeface="+mn-cs"/>
+                      </a:endParaRPr>
+                    </a:p>
+                    <a:p>
+                      <a:pPr marL="438150" marR="0" lvl="0" indent="-381000" algn="l" defTabSz="914400" rtl="0" eaLnBrk="1" fontAlgn="auto" latinLnBrk="0" hangingPunct="1">
+                        <a:lnSpc>
+                          <a:spcPct val="100000"/>
+                        </a:lnSpc>
+                        <a:spcBef>
+                          <a:spcPts val="0"/>
+                        </a:spcBef>
+                        <a:spcAft>
+                          <a:spcPts val="0"/>
+                        </a:spcAft>
+                        <a:buClrTx/>
+                        <a:buSzTx/>
+                        <a:buFont typeface="Wingdings" pitchFamily="2" charset="2"/>
+                        <a:buNone/>
+                        <a:tabLst/>
+                        <a:defRPr/>
+                      </a:pPr>
+                      <a:r>
+                        <a:rPr lang="en-US" sz="1100" baseline="0" dirty="0" smtClean="0"/>
+                        <a:t>Ross, </a:t>
+                      </a:r>
+                      <a:r>
+                        <a:rPr lang="en-US" sz="1100" dirty="0" smtClean="0"/>
+                        <a:t>Catherine E</a:t>
+                      </a:r>
+                      <a:r>
+                        <a:rPr lang="en-US" sz="1100" baseline="0" dirty="0" smtClean="0"/>
+                        <a:t>, and John </a:t>
+                      </a:r>
+                      <a:r>
+                        <a:rPr lang="en-US" sz="1100" baseline="0" dirty="0" err="1" smtClean="0"/>
+                        <a:t>Mirowksky</a:t>
+                      </a:r>
+                      <a:r>
+                        <a:rPr lang="en-US" sz="1100" baseline="0" dirty="0" smtClean="0"/>
+                        <a:t>.  </a:t>
+                      </a:r>
+                      <a:r>
+                        <a:rPr lang="en-US" sz="1100" dirty="0" smtClean="0"/>
+                        <a:t>“Does Employment Affect Health?”</a:t>
+                      </a:r>
+                    </a:p>
+                    <a:p>
+                      <a:pPr marL="438150" marR="0" lvl="0" indent="-381000" algn="l" defTabSz="914400" rtl="0" eaLnBrk="1" fontAlgn="auto" latinLnBrk="0" hangingPunct="1">
+                        <a:lnSpc>
+                          <a:spcPct val="100000"/>
+                        </a:lnSpc>
+                        <a:spcBef>
+                          <a:spcPts val="0"/>
+                        </a:spcBef>
+                        <a:spcAft>
+                          <a:spcPts val="0"/>
+                        </a:spcAft>
+                        <a:buClrTx/>
+                        <a:buSzTx/>
+                        <a:buFont typeface="Wingdings" pitchFamily="2" charset="2"/>
+                        <a:buNone/>
+                        <a:tabLst/>
+                        <a:defRPr/>
+                      </a:pPr>
+                      <a:endParaRPr kumimoji="0" lang="en-US" altLang="en-US" sz="1100" b="0" i="0" u="none" strike="noStrike" kern="1200" cap="none" spc="0" normalizeH="0" baseline="0" noProof="0" dirty="0" smtClean="0">
+                        <a:ln>
+                          <a:noFill/>
+                        </a:ln>
+                        <a:solidFill>
+                          <a:srgbClr val="000000"/>
+                        </a:solidFill>
+                        <a:effectLst/>
+                        <a:uLnTx/>
+                        <a:uFillTx/>
+                        <a:latin typeface="+mn-lt"/>
+                        <a:cs typeface="+mn-cs"/>
+                      </a:endParaRPr>
+                    </a:p>
+                    <a:p>
+                      <a:pPr marL="438150" marR="0" lvl="0" indent="-381000" algn="l" defTabSz="914400" rtl="0" eaLnBrk="1" fontAlgn="auto" latinLnBrk="0" hangingPunct="1">
+                        <a:lnSpc>
+                          <a:spcPct val="100000"/>
+                        </a:lnSpc>
+                        <a:spcBef>
+                          <a:spcPts val="0"/>
+                        </a:spcBef>
+                        <a:spcAft>
+                          <a:spcPts val="0"/>
+                        </a:spcAft>
+                        <a:buClrTx/>
+                        <a:buSzTx/>
+                        <a:buFont typeface="Wingdings" pitchFamily="2" charset="2"/>
+                        <a:buNone/>
+                        <a:tabLst/>
+                        <a:defRPr/>
+                      </a:pPr>
+                      <a:r>
+                        <a:rPr lang="en-US" sz="1100" dirty="0" smtClean="0"/>
+                        <a:t>Jin, </a:t>
+                      </a:r>
+                      <a:r>
+                        <a:rPr lang="en-US" sz="1100" dirty="0" smtClean="0"/>
+                        <a:t>Robert L.,</a:t>
+                      </a:r>
+                      <a:r>
+                        <a:rPr lang="en-US" sz="1100" dirty="0" smtClean="0"/>
+                        <a:t> </a:t>
+                      </a:r>
+                      <a:r>
+                        <a:rPr lang="en-US" sz="1100" dirty="0" err="1" smtClean="0"/>
+                        <a:t>Chandrakant</a:t>
+                      </a:r>
+                      <a:r>
+                        <a:rPr lang="en-US" sz="1100" dirty="0" smtClean="0"/>
+                        <a:t> P. Shah,</a:t>
+                      </a:r>
+                      <a:r>
+                        <a:rPr lang="en-US" sz="1100" baseline="0" dirty="0" smtClean="0"/>
+                        <a:t> and </a:t>
+                      </a:r>
+                      <a:r>
+                        <a:rPr lang="en-US" sz="1100" baseline="0" dirty="0" err="1" smtClean="0"/>
+                        <a:t>Tomislav</a:t>
+                      </a:r>
+                      <a:r>
+                        <a:rPr lang="en-US" sz="1100" baseline="0" dirty="0" smtClean="0"/>
+                        <a:t> J. Svoboda.  </a:t>
+                      </a:r>
+                      <a:r>
+                        <a:rPr lang="en-US" sz="1100" dirty="0" smtClean="0"/>
+                        <a:t>“The Impact of Unemployment on Health: A Review of the Evidence”</a:t>
+                      </a:r>
+                    </a:p>
+                    <a:p>
+                      <a:pPr marL="438150" marR="0" lvl="0" indent="-381000" algn="l" defTabSz="914400" rtl="0" eaLnBrk="1" fontAlgn="auto" latinLnBrk="0" hangingPunct="1">
+                        <a:lnSpc>
+                          <a:spcPct val="100000"/>
+                        </a:lnSpc>
+                        <a:spcBef>
+                          <a:spcPts val="0"/>
+                        </a:spcBef>
+                        <a:spcAft>
+                          <a:spcPts val="0"/>
+                        </a:spcAft>
+                        <a:buClrTx/>
+                        <a:buSzTx/>
+                        <a:buFont typeface="Wingdings" pitchFamily="2" charset="2"/>
+                        <a:buNone/>
+                        <a:tabLst/>
+                        <a:defRPr/>
+                      </a:pPr>
+                      <a:endParaRPr kumimoji="0" lang="en-US" altLang="en-US" sz="1100" b="0" i="0" u="none" strike="noStrike" kern="1200" cap="none" spc="0" normalizeH="0" baseline="0" noProof="0" dirty="0" smtClean="0">
+                        <a:ln>
+                          <a:noFill/>
+                        </a:ln>
+                        <a:solidFill>
+                          <a:srgbClr val="000000"/>
+                        </a:solidFill>
+                        <a:effectLst/>
+                        <a:uLnTx/>
+                        <a:uFillTx/>
+                        <a:latin typeface="+mn-lt"/>
+                        <a:cs typeface="+mn-cs"/>
+                      </a:endParaRPr>
+                    </a:p>
                     <a:p>
                       <a:pPr marL="438150" marR="0" lvl="0" indent="-381000" algn="l" defTabSz="914400" rtl="0" eaLnBrk="1" fontAlgn="auto" latinLnBrk="0" hangingPunct="1">
                         <a:lnSpc>
@@ -15190,7 +16576,170 @@
                           <a:latin typeface="+mn-lt"/>
                           <a:cs typeface="+mn-cs"/>
                         </a:rPr>
-                        <a:t>References – Please add references to all papers/articles read by the team.</a:t>
+                        <a:t>Bernstein AB, </a:t>
+                      </a:r>
+                      <a:r>
+                        <a:rPr kumimoji="0" lang="en-US" altLang="en-US" sz="1100" b="0" i="0" u="none" strike="noStrike" kern="1200" cap="none" spc="0" normalizeH="0" baseline="0" noProof="0" dirty="0" err="1" smtClean="0">
+                          <a:ln>
+                            <a:noFill/>
+                          </a:ln>
+                          <a:solidFill>
+                            <a:srgbClr val="000000"/>
+                          </a:solidFill>
+                          <a:effectLst/>
+                          <a:uLnTx/>
+                          <a:uFillTx/>
+                          <a:latin typeface="+mn-lt"/>
+                          <a:cs typeface="+mn-cs"/>
+                        </a:rPr>
+                        <a:t>Hing</a:t>
+                      </a:r>
+                      <a:r>
+                        <a:rPr kumimoji="0" lang="en-US" altLang="en-US" sz="1100" b="0" i="0" u="none" strike="noStrike" kern="1200" cap="none" spc="0" normalizeH="0" baseline="0" noProof="0" dirty="0" smtClean="0">
+                          <a:ln>
+                            <a:noFill/>
+                          </a:ln>
+                          <a:solidFill>
+                            <a:srgbClr val="000000"/>
+                          </a:solidFill>
+                          <a:effectLst/>
+                          <a:uLnTx/>
+                          <a:uFillTx/>
+                          <a:latin typeface="+mn-lt"/>
+                          <a:cs typeface="+mn-cs"/>
+                        </a:rPr>
+                        <a:t> E, Moss AJ, Allen KF, </a:t>
+                      </a:r>
+                      <a:r>
+                        <a:rPr kumimoji="0" lang="en-US" altLang="en-US" sz="1100" b="0" i="0" u="none" strike="noStrike" kern="1200" cap="none" spc="0" normalizeH="0" baseline="0" noProof="0" dirty="0" err="1" smtClean="0">
+                          <a:ln>
+                            <a:noFill/>
+                          </a:ln>
+                          <a:solidFill>
+                            <a:srgbClr val="000000"/>
+                          </a:solidFill>
+                          <a:effectLst/>
+                          <a:uLnTx/>
+                          <a:uFillTx/>
+                          <a:latin typeface="+mn-lt"/>
+                          <a:cs typeface="+mn-cs"/>
+                        </a:rPr>
+                        <a:t>Siller</a:t>
+                      </a:r>
+                      <a:r>
+                        <a:rPr kumimoji="0" lang="en-US" altLang="en-US" sz="1100" b="0" i="0" u="none" strike="noStrike" kern="1200" cap="none" spc="0" normalizeH="0" baseline="0" noProof="0" dirty="0" smtClean="0">
+                          <a:ln>
+                            <a:noFill/>
+                          </a:ln>
+                          <a:solidFill>
+                            <a:srgbClr val="000000"/>
+                          </a:solidFill>
+                          <a:effectLst/>
+                          <a:uLnTx/>
+                          <a:uFillTx/>
+                          <a:latin typeface="+mn-lt"/>
+                          <a:cs typeface="+mn-cs"/>
+                        </a:rPr>
+                        <a:t> AB, </a:t>
+                      </a:r>
+                      <a:r>
+                        <a:rPr kumimoji="0" lang="en-US" altLang="en-US" sz="1100" b="0" i="0" u="none" strike="noStrike" kern="1200" cap="none" spc="0" normalizeH="0" baseline="0" noProof="0" dirty="0" err="1" smtClean="0">
+                          <a:ln>
+                            <a:noFill/>
+                          </a:ln>
+                          <a:solidFill>
+                            <a:srgbClr val="000000"/>
+                          </a:solidFill>
+                          <a:effectLst/>
+                          <a:uLnTx/>
+                          <a:uFillTx/>
+                          <a:latin typeface="+mn-lt"/>
+                          <a:cs typeface="+mn-cs"/>
+                        </a:rPr>
+                        <a:t>Tiggle</a:t>
+                      </a:r>
+                      <a:r>
+                        <a:rPr kumimoji="0" lang="en-US" altLang="en-US" sz="1100" b="0" i="0" u="none" strike="noStrike" kern="1200" cap="none" spc="0" normalizeH="0" baseline="0" noProof="0" dirty="0" smtClean="0">
+                          <a:ln>
+                            <a:noFill/>
+                          </a:ln>
+                          <a:solidFill>
+                            <a:srgbClr val="000000"/>
+                          </a:solidFill>
+                          <a:effectLst/>
+                          <a:uLnTx/>
+                          <a:uFillTx/>
+                          <a:latin typeface="+mn-lt"/>
+                          <a:cs typeface="+mn-cs"/>
+                        </a:rPr>
+                        <a:t> RB.  “Health care in America: Trends in utilization”</a:t>
+                      </a:r>
+                    </a:p>
+                    <a:p>
+                      <a:pPr marL="438150" marR="0" lvl="0" indent="-381000" algn="l" defTabSz="914400" rtl="0" eaLnBrk="1" fontAlgn="auto" latinLnBrk="0" hangingPunct="1">
+                        <a:lnSpc>
+                          <a:spcPct val="100000"/>
+                        </a:lnSpc>
+                        <a:spcBef>
+                          <a:spcPts val="0"/>
+                        </a:spcBef>
+                        <a:spcAft>
+                          <a:spcPts val="0"/>
+                        </a:spcAft>
+                        <a:buClrTx/>
+                        <a:buSzTx/>
+                        <a:buFont typeface="Wingdings" pitchFamily="2" charset="2"/>
+                        <a:buNone/>
+                        <a:tabLst/>
+                        <a:defRPr/>
+                      </a:pPr>
+                      <a:endParaRPr kumimoji="0" lang="en-US" altLang="en-US" sz="1100" b="0" i="0" u="none" strike="noStrike" kern="1200" cap="none" spc="0" normalizeH="0" baseline="0" noProof="0" dirty="0" smtClean="0">
+                        <a:ln>
+                          <a:noFill/>
+                        </a:ln>
+                        <a:solidFill>
+                          <a:srgbClr val="000000"/>
+                        </a:solidFill>
+                        <a:effectLst/>
+                        <a:uLnTx/>
+                        <a:uFillTx/>
+                        <a:latin typeface="+mn-lt"/>
+                        <a:cs typeface="+mn-cs"/>
+                      </a:endParaRPr>
+                    </a:p>
+                    <a:p>
+                      <a:pPr marL="438150" marR="0" lvl="0" indent="-381000" algn="l" defTabSz="914400" rtl="0" eaLnBrk="1" fontAlgn="auto" latinLnBrk="0" hangingPunct="1">
+                        <a:lnSpc>
+                          <a:spcPct val="100000"/>
+                        </a:lnSpc>
+                        <a:spcBef>
+                          <a:spcPts val="0"/>
+                        </a:spcBef>
+                        <a:spcAft>
+                          <a:spcPts val="0"/>
+                        </a:spcAft>
+                        <a:buClrTx/>
+                        <a:buSzTx/>
+                        <a:buFont typeface="Wingdings" pitchFamily="2" charset="2"/>
+                        <a:buNone/>
+                        <a:tabLst/>
+                        <a:defRPr/>
+                      </a:pPr>
+                      <a:r>
+                        <a:rPr kumimoji="0" lang="en-US" altLang="en-US" sz="1100" b="0" i="0" u="none" strike="noStrike" kern="1200" cap="none" spc="0" normalizeH="0" baseline="0" noProof="0" dirty="0" smtClean="0">
+                          <a:ln>
+                            <a:noFill/>
+                          </a:ln>
+                          <a:solidFill>
+                            <a:srgbClr val="000000"/>
+                          </a:solidFill>
+                          <a:effectLst/>
+                          <a:uLnTx/>
+                          <a:uFillTx/>
+                          <a:latin typeface="+mn-lt"/>
+                          <a:cs typeface="+mn-cs"/>
+                        </a:rPr>
+                        <a:t>Adler, Nancy E., and Katherine Newman.  “Socioeconomic Disparities In Health: Pathways and Policies”</a:t>
                       </a:r>
                     </a:p>
                   </a:txBody>
@@ -15242,36 +16791,6 @@
                     </a:solidFill>
                   </a:tcPr>
                 </a:tc>
-                <a:tc hMerge="1">
-                  <a:txBody>
-                    <a:bodyPr/>
-                    <a:lstStyle/>
-                    <a:p>
-                      <a:endParaRPr lang="en-US"/>
-                    </a:p>
-                  </a:txBody>
-                  <a:tcPr/>
-                </a:tc>
-                <a:tc hMerge="1">
-                  <a:txBody>
-                    <a:bodyPr/>
-                    <a:lstStyle/>
-                    <a:p>
-                      <a:endParaRPr lang="en-US"/>
-                    </a:p>
-                  </a:txBody>
-                  <a:tcPr/>
-                </a:tc>
-                <a:tc hMerge="1">
-                  <a:txBody>
-                    <a:bodyPr/>
-                    <a:lstStyle/>
-                    <a:p>
-                      <a:endParaRPr lang="en-US"/>
-                    </a:p>
-                  </a:txBody>
-                  <a:tcPr/>
-                </a:tc>
               </a:tr>
             </a:tbl>
           </a:graphicData>
@@ -15280,7 +16799,7 @@
     </p:spTree>
     <p:extLst>
       <p:ext uri="{BB962C8B-B14F-4D97-AF65-F5344CB8AC3E}">
-        <p14:creationId xmlns:p14="http://schemas.microsoft.com/office/powerpoint/2010/main" val="3852912342"/>
+        <p14:creationId xmlns:p14="http://schemas.microsoft.com/office/powerpoint/2010/main" val="1728810535"/>
       </p:ext>
     </p:extLst>
   </p:cSld>

</xml_diff>

<commit_message>
Deleted duplicate section from second page
'general information' section appeared twice.
</commit_message>
<xml_diff>
--- a/Proposal/Project Proposal.pptx
+++ b/Proposal/Project Proposal.pptx
@@ -6,10 +6,11 @@
     <p:sldMasterId id="2147483888" r:id="rId2"/>
   </p:sldMasterIdLst>
   <p:notesMasterIdLst>
-    <p:notesMasterId r:id="rId4"/>
+    <p:notesMasterId r:id="rId5"/>
   </p:notesMasterIdLst>
   <p:sldIdLst>
     <p:sldId id="491" r:id="rId3"/>
+    <p:sldId id="492" r:id="rId4"/>
   </p:sldIdLst>
   <p:sldSz cx="9144000" cy="6858000" type="screen4x3"/>
   <p:notesSz cx="7010400" cy="9296400"/>
@@ -9713,7 +9714,7 @@
 </file>
 
 <file path=ppt/slides/slide1.xml><?xml version="1.0" encoding="utf-8"?>
-<p:sld xmlns:a="http://schemas.openxmlformats.org/drawingml/2006/main" xmlns:r="http://schemas.openxmlformats.org/officeDocument/2006/relationships" xmlns:mc="http://schemas.openxmlformats.org/markup-compatibility/2006" xmlns:mv="urn:schemas-microsoft-com:mac:vml" xmlns:p="http://schemas.openxmlformats.org/presentationml/2006/main" mc:Ignorable="mv" mc:PreserveAttributes="mv:*">
+<p:sld xmlns:a="http://schemas.openxmlformats.org/drawingml/2006/main" xmlns:r="http://schemas.openxmlformats.org/officeDocument/2006/relationships" xmlns:mc="http://schemas.openxmlformats.org/markup-compatibility/2006" xmlns:mv="urn:schemas-microsoft-com:mac:vml" xmlns:p="http://schemas.openxmlformats.org/presentationml/2006/main" mc:Ignorable="mv" mc:PreserveAttributes="mv:*" showMasterSp="0">
   <p:cSld>
     <p:spTree>
       <p:nvGrpSpPr>
@@ -9740,6 +9741,10 @@
           </p:nvPr>
         </p:nvSpPr>
         <p:spPr>
+          <a:xfrm>
+            <a:off x="6597650" y="8528050"/>
+            <a:ext cx="2133600" cy="228600"/>
+          </a:xfrm>
           <a:noFill/>
         </p:spPr>
         <p:txBody>
@@ -9951,6 +9956,10 @@
           </p:nvPr>
         </p:nvSpPr>
         <p:spPr>
+          <a:xfrm>
+            <a:off x="3168650" y="8528050"/>
+            <a:ext cx="2895600" cy="228600"/>
+          </a:xfrm>
           <a:noFill/>
         </p:spPr>
         <p:txBody>
@@ -10150,14 +10159,14 @@
             <p:ph sz="half" idx="2"/>
             <p:extLst>
               <p:ext uri="{D42A27DB-BD31-4B8C-83A1-F6EECF244321}">
-                <p14:modId xmlns:p14="http://schemas.microsoft.com/office/powerpoint/2010/main" xmlns:p="http://schemas.openxmlformats.org/presentationml/2006/main" xmlns:r="http://schemas.openxmlformats.org/officeDocument/2006/relationships" xmlns:a="http://schemas.openxmlformats.org/drawingml/2006/main" xmlns="" val="4031106991"/>
+                <p14:modId xmlns:p14="http://schemas.microsoft.com/office/powerpoint/2010/main" xmlns:p="http://schemas.openxmlformats.org/presentationml/2006/main" xmlns:r="http://schemas.openxmlformats.org/officeDocument/2006/relationships" xmlns:a="http://schemas.openxmlformats.org/drawingml/2006/main" xmlns="" val="3062184352"/>
               </p:ext>
             </p:extLst>
           </p:nvPr>
         </p:nvGraphicFramePr>
         <p:xfrm>
-          <a:off x="313267" y="1113938"/>
-          <a:ext cx="8444753" cy="6631754"/>
+          <a:off x="370417" y="148738"/>
+          <a:ext cx="8444753" cy="6364891"/>
         </p:xfrm>
         <a:graphic>
           <a:graphicData uri="http://schemas.openxmlformats.org/drawingml/2006/table">
@@ -10595,7 +10604,23 @@
                             <a:schemeClr val="tx1"/>
                           </a:solidFill>
                         </a:rPr>
-                        <a:t> Using national employment statistics, public health data, and health care utilization metrics, we intend to explore whether there is a correlation between occupation and disease, and more importantly between unemployment, use of health care services and health outcomes by region.  We are attempting to answer the question: Do people get sicker when they have a job or not?  Is there a community or social impact that can be discerned from (or predicted by) specific economic trends?</a:t>
+                        <a:t> Using New York state employment statistics by county, in-patient hospital data by </a:t>
+                      </a:r>
+                      <a:r>
+                        <a:rPr lang="en-US" altLang="en-US" sz="900" baseline="0" dirty="0" err="1" smtClean="0">
+                          <a:solidFill>
+                            <a:schemeClr val="tx1"/>
+                          </a:solidFill>
+                        </a:rPr>
+                        <a:t>zipcode</a:t>
+                      </a:r>
+                      <a:r>
+                        <a:rPr lang="en-US" altLang="en-US" sz="900" baseline="0" dirty="0" smtClean="0">
+                          <a:solidFill>
+                            <a:schemeClr val="tx1"/>
+                          </a:solidFill>
+                        </a:rPr>
+                        <a:t>, and twitter updates, we intend to explore whether there is a correlation between unemployment and changes in health.  Assuming we can find a relationship between historical unemployment and hospital stays, we can than then use current twitter updates as a predictor of future declining health.</a:t>
                       </a:r>
                       <a:endParaRPr lang="en-US" altLang="en-US" sz="400" dirty="0" smtClean="0">
                         <a:solidFill>
@@ -11516,1460 +11541,6 @@
                   </a:tcPr>
                 </a:tc>
               </a:tr>
-              <a:tr h="230486">
-                <a:tc gridSpan="2">
-                  <a:txBody>
-                    <a:bodyPr/>
-                    <a:lstStyle>
-                      <a:lvl1pPr>
-                        <a:spcBef>
-                          <a:spcPct val="20000"/>
-                        </a:spcBef>
-                        <a:buClr>
-                          <a:schemeClr val="tx1"/>
-                        </a:buClr>
-                        <a:buFont typeface="Wingdings" pitchFamily="2" charset="2"/>
-                        <a:defRPr sz="2000">
-                          <a:solidFill>
-                            <a:schemeClr val="tx1"/>
-                          </a:solidFill>
-                          <a:latin typeface="Arial" charset="0"/>
-                          <a:cs typeface="Arial" charset="0"/>
-                        </a:defRPr>
-                      </a:lvl1pPr>
-                      <a:lvl2pPr>
-                        <a:spcBef>
-                          <a:spcPct val="20000"/>
-                        </a:spcBef>
-                        <a:buClr>
-                          <a:schemeClr val="tx1"/>
-                        </a:buClr>
-                        <a:buFont typeface="Wingdings" pitchFamily="2" charset="2"/>
-                        <a:defRPr>
-                          <a:solidFill>
-                            <a:schemeClr val="tx1"/>
-                          </a:solidFill>
-                          <a:latin typeface="Arial" charset="0"/>
-                          <a:cs typeface="Arial" charset="0"/>
-                        </a:defRPr>
-                      </a:lvl2pPr>
-                      <a:lvl3pPr>
-                        <a:spcBef>
-                          <a:spcPct val="20000"/>
-                        </a:spcBef>
-                        <a:buClr>
-                          <a:schemeClr val="tx1"/>
-                        </a:buClr>
-                        <a:buFont typeface="Wingdings" pitchFamily="2" charset="2"/>
-                        <a:defRPr sz="1600">
-                          <a:solidFill>
-                            <a:schemeClr val="tx1"/>
-                          </a:solidFill>
-                          <a:latin typeface="Arial" charset="0"/>
-                          <a:cs typeface="Arial" charset="0"/>
-                        </a:defRPr>
-                      </a:lvl3pPr>
-                      <a:lvl4pPr>
-                        <a:spcBef>
-                          <a:spcPct val="20000"/>
-                        </a:spcBef>
-                        <a:buClr>
-                          <a:schemeClr val="tx1"/>
-                        </a:buClr>
-                        <a:buFont typeface="Wingdings" pitchFamily="2" charset="2"/>
-                        <a:defRPr sz="1400">
-                          <a:solidFill>
-                            <a:schemeClr val="tx1"/>
-                          </a:solidFill>
-                          <a:latin typeface="Arial" charset="0"/>
-                          <a:cs typeface="Arial" charset="0"/>
-                        </a:defRPr>
-                      </a:lvl4pPr>
-                      <a:lvl5pPr>
-                        <a:spcBef>
-                          <a:spcPct val="20000"/>
-                        </a:spcBef>
-                        <a:buClr>
-                          <a:schemeClr val="tx1"/>
-                        </a:buClr>
-                        <a:buFont typeface="Wingdings" pitchFamily="2" charset="2"/>
-                        <a:defRPr sz="1400">
-                          <a:solidFill>
-                            <a:schemeClr val="tx1"/>
-                          </a:solidFill>
-                          <a:latin typeface="Arial" charset="0"/>
-                          <a:cs typeface="Arial" charset="0"/>
-                        </a:defRPr>
-                      </a:lvl5pPr>
-                      <a:lvl6pPr fontAlgn="base">
-                        <a:spcBef>
-                          <a:spcPct val="20000"/>
-                        </a:spcBef>
-                        <a:spcAft>
-                          <a:spcPct val="0"/>
-                        </a:spcAft>
-                        <a:buClr>
-                          <a:schemeClr val="tx1"/>
-                        </a:buClr>
-                        <a:buFont typeface="Wingdings" pitchFamily="2" charset="2"/>
-                        <a:defRPr sz="1400">
-                          <a:solidFill>
-                            <a:schemeClr val="tx1"/>
-                          </a:solidFill>
-                          <a:latin typeface="Arial" charset="0"/>
-                          <a:cs typeface="Arial" charset="0"/>
-                        </a:defRPr>
-                      </a:lvl6pPr>
-                      <a:lvl7pPr fontAlgn="base">
-                        <a:spcBef>
-                          <a:spcPct val="20000"/>
-                        </a:spcBef>
-                        <a:spcAft>
-                          <a:spcPct val="0"/>
-                        </a:spcAft>
-                        <a:buClr>
-                          <a:schemeClr val="tx1"/>
-                        </a:buClr>
-                        <a:buFont typeface="Wingdings" pitchFamily="2" charset="2"/>
-                        <a:defRPr sz="1400">
-                          <a:solidFill>
-                            <a:schemeClr val="tx1"/>
-                          </a:solidFill>
-                          <a:latin typeface="Arial" charset="0"/>
-                          <a:cs typeface="Arial" charset="0"/>
-                        </a:defRPr>
-                      </a:lvl7pPr>
-                      <a:lvl8pPr fontAlgn="base">
-                        <a:spcBef>
-                          <a:spcPct val="20000"/>
-                        </a:spcBef>
-                        <a:spcAft>
-                          <a:spcPct val="0"/>
-                        </a:spcAft>
-                        <a:buClr>
-                          <a:schemeClr val="tx1"/>
-                        </a:buClr>
-                        <a:buFont typeface="Wingdings" pitchFamily="2" charset="2"/>
-                        <a:defRPr sz="1400">
-                          <a:solidFill>
-                            <a:schemeClr val="tx1"/>
-                          </a:solidFill>
-                          <a:latin typeface="Arial" charset="0"/>
-                          <a:cs typeface="Arial" charset="0"/>
-                        </a:defRPr>
-                      </a:lvl8pPr>
-                      <a:lvl9pPr fontAlgn="base">
-                        <a:spcBef>
-                          <a:spcPct val="20000"/>
-                        </a:spcBef>
-                        <a:spcAft>
-                          <a:spcPct val="0"/>
-                        </a:spcAft>
-                        <a:buClr>
-                          <a:schemeClr val="tx1"/>
-                        </a:buClr>
-                        <a:buFont typeface="Wingdings" pitchFamily="2" charset="2"/>
-                        <a:defRPr sz="1400">
-                          <a:solidFill>
-                            <a:schemeClr val="tx1"/>
-                          </a:solidFill>
-                          <a:latin typeface="Arial" charset="0"/>
-                          <a:cs typeface="Arial" charset="0"/>
-                        </a:defRPr>
-                      </a:lvl9pPr>
-                    </a:lstStyle>
-                    <a:p>
-                      <a:pPr marL="0" marR="0" lvl="0" indent="0" algn="l" defTabSz="914400" rtl="0" eaLnBrk="1" fontAlgn="base" latinLnBrk="0" hangingPunct="1">
-                        <a:lnSpc>
-                          <a:spcPct val="100000"/>
-                        </a:lnSpc>
-                        <a:spcBef>
-                          <a:spcPct val="20000"/>
-                        </a:spcBef>
-                        <a:spcAft>
-                          <a:spcPct val="0"/>
-                        </a:spcAft>
-                        <a:buClr>
-                          <a:schemeClr val="tx1"/>
-                        </a:buClr>
-                        <a:buSzTx/>
-                        <a:buFont typeface="Wingdings" pitchFamily="2" charset="2"/>
-                        <a:buNone/>
-                        <a:tabLst/>
-                      </a:pPr>
-                      <a:r>
-                        <a:rPr kumimoji="0" lang="en-US" altLang="en-US" sz="900" b="0" i="0" u="none" strike="noStrike" cap="none" normalizeH="0" baseline="0" dirty="0" smtClean="0">
-                          <a:ln>
-                            <a:noFill/>
-                          </a:ln>
-                          <a:solidFill>
-                            <a:schemeClr val="tx1"/>
-                          </a:solidFill>
-                          <a:effectLst/>
-                          <a:latin typeface="Arial" charset="0"/>
-                          <a:cs typeface="Arial" charset="0"/>
-                        </a:rPr>
-                        <a:t>National Labor Statistics</a:t>
-                      </a:r>
-                    </a:p>
-                  </a:txBody>
-                  <a:tcPr marT="45747" marB="45747" horzOverflow="overflow">
-                    <a:lnL w="12700" cap="flat" cmpd="sng" algn="ctr">
-                      <a:solidFill>
-                        <a:schemeClr val="tx1"/>
-                      </a:solidFill>
-                      <a:prstDash val="solid"/>
-                      <a:round/>
-                      <a:headEnd type="none" w="med" len="med"/>
-                      <a:tailEnd type="none" w="med" len="med"/>
-                    </a:lnL>
-                    <a:lnR w="12700" cap="flat" cmpd="sng" algn="ctr">
-                      <a:solidFill>
-                        <a:schemeClr val="tx1"/>
-                      </a:solidFill>
-                      <a:prstDash val="solid"/>
-                      <a:round/>
-                      <a:headEnd type="none" w="med" len="med"/>
-                      <a:tailEnd type="none" w="med" len="med"/>
-                    </a:lnR>
-                    <a:lnT w="12700" cap="flat" cmpd="sng" algn="ctr">
-                      <a:solidFill>
-                        <a:schemeClr val="tx1"/>
-                      </a:solidFill>
-                      <a:prstDash val="solid"/>
-                      <a:round/>
-                      <a:headEnd type="none" w="med" len="med"/>
-                      <a:tailEnd type="none" w="med" len="med"/>
-                    </a:lnT>
-                    <a:lnB w="12700" cap="flat" cmpd="sng" algn="ctr">
-                      <a:solidFill>
-                        <a:schemeClr val="tx1"/>
-                      </a:solidFill>
-                      <a:prstDash val="solid"/>
-                      <a:round/>
-                      <a:headEnd type="none" w="med" len="med"/>
-                      <a:tailEnd type="none" w="med" len="med"/>
-                    </a:lnB>
-                    <a:lnTlToBr>
-                      <a:noFill/>
-                    </a:lnTlToBr>
-                    <a:lnBlToTr>
-                      <a:noFill/>
-                    </a:lnBlToTr>
-                    <a:noFill/>
-                  </a:tcPr>
-                </a:tc>
-                <a:tc hMerge="1">
-                  <a:txBody>
-                    <a:bodyPr/>
-                    <a:lstStyle>
-                      <a:lvl1pPr>
-                        <a:spcBef>
-                          <a:spcPct val="20000"/>
-                        </a:spcBef>
-                        <a:buClr>
-                          <a:schemeClr val="tx1"/>
-                        </a:buClr>
-                        <a:buFont typeface="Wingdings" pitchFamily="2" charset="2"/>
-                        <a:defRPr sz="2000">
-                          <a:solidFill>
-                            <a:schemeClr val="tx1"/>
-                          </a:solidFill>
-                          <a:latin typeface="Arial" charset="0"/>
-                          <a:cs typeface="Arial" charset="0"/>
-                        </a:defRPr>
-                      </a:lvl1pPr>
-                      <a:lvl2pPr>
-                        <a:spcBef>
-                          <a:spcPct val="20000"/>
-                        </a:spcBef>
-                        <a:buClr>
-                          <a:schemeClr val="tx1"/>
-                        </a:buClr>
-                        <a:buFont typeface="Wingdings" pitchFamily="2" charset="2"/>
-                        <a:defRPr>
-                          <a:solidFill>
-                            <a:schemeClr val="tx1"/>
-                          </a:solidFill>
-                          <a:latin typeface="Arial" charset="0"/>
-                          <a:cs typeface="Arial" charset="0"/>
-                        </a:defRPr>
-                      </a:lvl2pPr>
-                      <a:lvl3pPr>
-                        <a:spcBef>
-                          <a:spcPct val="20000"/>
-                        </a:spcBef>
-                        <a:buClr>
-                          <a:schemeClr val="tx1"/>
-                        </a:buClr>
-                        <a:buFont typeface="Wingdings" pitchFamily="2" charset="2"/>
-                        <a:defRPr sz="1600">
-                          <a:solidFill>
-                            <a:schemeClr val="tx1"/>
-                          </a:solidFill>
-                          <a:latin typeface="Arial" charset="0"/>
-                          <a:cs typeface="Arial" charset="0"/>
-                        </a:defRPr>
-                      </a:lvl3pPr>
-                      <a:lvl4pPr>
-                        <a:spcBef>
-                          <a:spcPct val="20000"/>
-                        </a:spcBef>
-                        <a:buClr>
-                          <a:schemeClr val="tx1"/>
-                        </a:buClr>
-                        <a:buFont typeface="Wingdings" pitchFamily="2" charset="2"/>
-                        <a:defRPr sz="1400">
-                          <a:solidFill>
-                            <a:schemeClr val="tx1"/>
-                          </a:solidFill>
-                          <a:latin typeface="Arial" charset="0"/>
-                          <a:cs typeface="Arial" charset="0"/>
-                        </a:defRPr>
-                      </a:lvl4pPr>
-                      <a:lvl5pPr>
-                        <a:spcBef>
-                          <a:spcPct val="20000"/>
-                        </a:spcBef>
-                        <a:buClr>
-                          <a:schemeClr val="tx1"/>
-                        </a:buClr>
-                        <a:buFont typeface="Wingdings" pitchFamily="2" charset="2"/>
-                        <a:defRPr sz="1400">
-                          <a:solidFill>
-                            <a:schemeClr val="tx1"/>
-                          </a:solidFill>
-                          <a:latin typeface="Arial" charset="0"/>
-                          <a:cs typeface="Arial" charset="0"/>
-                        </a:defRPr>
-                      </a:lvl5pPr>
-                      <a:lvl6pPr fontAlgn="base">
-                        <a:spcBef>
-                          <a:spcPct val="20000"/>
-                        </a:spcBef>
-                        <a:spcAft>
-                          <a:spcPct val="0"/>
-                        </a:spcAft>
-                        <a:buClr>
-                          <a:schemeClr val="tx1"/>
-                        </a:buClr>
-                        <a:buFont typeface="Wingdings" pitchFamily="2" charset="2"/>
-                        <a:defRPr sz="1400">
-                          <a:solidFill>
-                            <a:schemeClr val="tx1"/>
-                          </a:solidFill>
-                          <a:latin typeface="Arial" charset="0"/>
-                          <a:cs typeface="Arial" charset="0"/>
-                        </a:defRPr>
-                      </a:lvl6pPr>
-                      <a:lvl7pPr fontAlgn="base">
-                        <a:spcBef>
-                          <a:spcPct val="20000"/>
-                        </a:spcBef>
-                        <a:spcAft>
-                          <a:spcPct val="0"/>
-                        </a:spcAft>
-                        <a:buClr>
-                          <a:schemeClr val="tx1"/>
-                        </a:buClr>
-                        <a:buFont typeface="Wingdings" pitchFamily="2" charset="2"/>
-                        <a:defRPr sz="1400">
-                          <a:solidFill>
-                            <a:schemeClr val="tx1"/>
-                          </a:solidFill>
-                          <a:latin typeface="Arial" charset="0"/>
-                          <a:cs typeface="Arial" charset="0"/>
-                        </a:defRPr>
-                      </a:lvl7pPr>
-                      <a:lvl8pPr fontAlgn="base">
-                        <a:spcBef>
-                          <a:spcPct val="20000"/>
-                        </a:spcBef>
-                        <a:spcAft>
-                          <a:spcPct val="0"/>
-                        </a:spcAft>
-                        <a:buClr>
-                          <a:schemeClr val="tx1"/>
-                        </a:buClr>
-                        <a:buFont typeface="Wingdings" pitchFamily="2" charset="2"/>
-                        <a:defRPr sz="1400">
-                          <a:solidFill>
-                            <a:schemeClr val="tx1"/>
-                          </a:solidFill>
-                          <a:latin typeface="Arial" charset="0"/>
-                          <a:cs typeface="Arial" charset="0"/>
-                        </a:defRPr>
-                      </a:lvl8pPr>
-                      <a:lvl9pPr fontAlgn="base">
-                        <a:spcBef>
-                          <a:spcPct val="20000"/>
-                        </a:spcBef>
-                        <a:spcAft>
-                          <a:spcPct val="0"/>
-                        </a:spcAft>
-                        <a:buClr>
-                          <a:schemeClr val="tx1"/>
-                        </a:buClr>
-                        <a:buFont typeface="Wingdings" pitchFamily="2" charset="2"/>
-                        <a:defRPr sz="1400">
-                          <a:solidFill>
-                            <a:schemeClr val="tx1"/>
-                          </a:solidFill>
-                          <a:latin typeface="Arial" charset="0"/>
-                          <a:cs typeface="Arial" charset="0"/>
-                        </a:defRPr>
-                      </a:lvl9pPr>
-                    </a:lstStyle>
-                    <a:p>
-                      <a:pPr marL="0" marR="0" lvl="0" indent="0" algn="l" defTabSz="914400" rtl="0" eaLnBrk="1" fontAlgn="base" latinLnBrk="0" hangingPunct="1">
-                        <a:lnSpc>
-                          <a:spcPct val="100000"/>
-                        </a:lnSpc>
-                        <a:spcBef>
-                          <a:spcPct val="20000"/>
-                        </a:spcBef>
-                        <a:spcAft>
-                          <a:spcPct val="0"/>
-                        </a:spcAft>
-                        <a:buClr>
-                          <a:schemeClr val="tx1"/>
-                        </a:buClr>
-                        <a:buSzTx/>
-                        <a:buFont typeface="Wingdings" pitchFamily="2" charset="2"/>
-                        <a:buNone/>
-                        <a:tabLst/>
-                      </a:pPr>
-                      <a:endParaRPr kumimoji="0" lang="en-US" altLang="en-US" sz="900" b="0" i="0" u="none" strike="noStrike" cap="none" normalizeH="0" baseline="0" dirty="0" smtClean="0">
-                        <a:ln>
-                          <a:noFill/>
-                        </a:ln>
-                        <a:solidFill>
-                          <a:schemeClr val="tx1"/>
-                        </a:solidFill>
-                        <a:effectLst/>
-                        <a:latin typeface="Arial" charset="0"/>
-                        <a:cs typeface="Arial" charset="0"/>
-                      </a:endParaRPr>
-                    </a:p>
-                  </a:txBody>
-                  <a:tcPr marT="45747" marB="45747" horzOverflow="overflow">
-                    <a:lnL w="12700" cap="flat" cmpd="sng" algn="ctr">
-                      <a:solidFill>
-                        <a:schemeClr val="tx1"/>
-                      </a:solidFill>
-                      <a:prstDash val="solid"/>
-                      <a:round/>
-                      <a:headEnd type="none" w="med" len="med"/>
-                      <a:tailEnd type="none" w="med" len="med"/>
-                    </a:lnL>
-                    <a:lnR w="12700" cap="flat" cmpd="sng" algn="ctr">
-                      <a:solidFill>
-                        <a:schemeClr val="tx1"/>
-                      </a:solidFill>
-                      <a:prstDash val="solid"/>
-                      <a:round/>
-                      <a:headEnd type="none" w="med" len="med"/>
-                      <a:tailEnd type="none" w="med" len="med"/>
-                    </a:lnR>
-                    <a:lnT w="12700" cap="flat" cmpd="sng" algn="ctr">
-                      <a:solidFill>
-                        <a:schemeClr val="tx1"/>
-                      </a:solidFill>
-                      <a:prstDash val="solid"/>
-                      <a:round/>
-                      <a:headEnd type="none" w="med" len="med"/>
-                      <a:tailEnd type="none" w="med" len="med"/>
-                    </a:lnT>
-                    <a:lnB w="12700" cap="flat" cmpd="sng" algn="ctr">
-                      <a:solidFill>
-                        <a:schemeClr val="tx1"/>
-                      </a:solidFill>
-                      <a:prstDash val="solid"/>
-                      <a:round/>
-                      <a:headEnd type="none" w="med" len="med"/>
-                      <a:tailEnd type="none" w="med" len="med"/>
-                    </a:lnB>
-                    <a:lnTlToBr>
-                      <a:noFill/>
-                    </a:lnTlToBr>
-                    <a:lnBlToTr>
-                      <a:noFill/>
-                    </a:lnBlToTr>
-                    <a:noFill/>
-                  </a:tcPr>
-                </a:tc>
-                <a:tc>
-                  <a:txBody>
-                    <a:bodyPr/>
-                    <a:lstStyle/>
-                    <a:p>
-                      <a:pPr marL="0" marR="0" lvl="0" indent="0" algn="l" defTabSz="914400" rtl="0" eaLnBrk="1" fontAlgn="base" latinLnBrk="0" hangingPunct="1">
-                        <a:lnSpc>
-                          <a:spcPct val="100000"/>
-                        </a:lnSpc>
-                        <a:spcBef>
-                          <a:spcPct val="20000"/>
-                        </a:spcBef>
-                        <a:spcAft>
-                          <a:spcPct val="0"/>
-                        </a:spcAft>
-                        <a:buClr>
-                          <a:schemeClr val="tx1"/>
-                        </a:buClr>
-                        <a:buSzTx/>
-                        <a:buFont typeface="Wingdings" pitchFamily="2" charset="2"/>
-                        <a:buNone/>
-                        <a:tabLst/>
-                      </a:pPr>
-                      <a:r>
-                        <a:rPr kumimoji="0" lang="en-US" altLang="en-US" sz="900" b="0" i="0" u="none" strike="noStrike" cap="none" normalizeH="0" baseline="0" dirty="0" smtClean="0">
-                          <a:ln>
-                            <a:noFill/>
-                          </a:ln>
-                          <a:solidFill>
-                            <a:schemeClr val="tx1"/>
-                          </a:solidFill>
-                          <a:effectLst/>
-                          <a:latin typeface="Arial" charset="0"/>
-                          <a:cs typeface="Arial" charset="0"/>
-                          <a:hlinkClick r:id="rId2"/>
-                        </a:rPr>
-                        <a:t>http://aws.amazon.com/datasets/Economics/2287</a:t>
-                      </a:r>
-                      <a:r>
-                        <a:rPr kumimoji="0" lang="en-US" altLang="en-US" sz="900" b="0" i="0" u="none" strike="noStrike" cap="none" normalizeH="0" baseline="0" dirty="0" smtClean="0">
-                          <a:ln>
-                            <a:noFill/>
-                          </a:ln>
-                          <a:solidFill>
-                            <a:schemeClr val="tx1"/>
-                          </a:solidFill>
-                          <a:effectLst/>
-                          <a:latin typeface="Arial" charset="0"/>
-                          <a:cs typeface="Arial" charset="0"/>
-                        </a:rPr>
-                        <a:t> </a:t>
-                      </a:r>
-                    </a:p>
-                  </a:txBody>
-                  <a:tcPr marT="45747" marB="45747" horzOverflow="overflow">
-                    <a:lnL w="12700" cap="flat" cmpd="sng" algn="ctr">
-                      <a:solidFill>
-                        <a:schemeClr val="tx1"/>
-                      </a:solidFill>
-                      <a:prstDash val="solid"/>
-                      <a:round/>
-                      <a:headEnd type="none" w="med" len="med"/>
-                      <a:tailEnd type="none" w="med" len="med"/>
-                    </a:lnL>
-                    <a:lnR w="12700" cap="flat" cmpd="sng" algn="ctr">
-                      <a:solidFill>
-                        <a:schemeClr val="tx1"/>
-                      </a:solidFill>
-                      <a:prstDash val="solid"/>
-                      <a:round/>
-                      <a:headEnd type="none" w="med" len="med"/>
-                      <a:tailEnd type="none" w="med" len="med"/>
-                    </a:lnR>
-                    <a:lnT w="12700" cap="flat" cmpd="sng" algn="ctr">
-                      <a:solidFill>
-                        <a:schemeClr val="tx1"/>
-                      </a:solidFill>
-                      <a:prstDash val="solid"/>
-                      <a:round/>
-                      <a:headEnd type="none" w="med" len="med"/>
-                      <a:tailEnd type="none" w="med" len="med"/>
-                    </a:lnT>
-                    <a:lnB w="12700" cap="flat" cmpd="sng" algn="ctr">
-                      <a:solidFill>
-                        <a:schemeClr val="tx1"/>
-                      </a:solidFill>
-                      <a:prstDash val="solid"/>
-                      <a:round/>
-                      <a:headEnd type="none" w="med" len="med"/>
-                      <a:tailEnd type="none" w="med" len="med"/>
-                    </a:lnB>
-                    <a:lnTlToBr>
-                      <a:noFill/>
-                    </a:lnTlToBr>
-                    <a:lnBlToTr>
-                      <a:noFill/>
-                    </a:lnBlToTr>
-                    <a:noFill/>
-                  </a:tcPr>
-                </a:tc>
-                <a:tc>
-                  <a:txBody>
-                    <a:bodyPr/>
-                    <a:lstStyle/>
-                    <a:p>
-                      <a:r>
-                        <a:rPr lang="en-US" sz="900" dirty="0" smtClean="0"/>
-                        <a:t>15GB</a:t>
-                      </a:r>
-                      <a:endParaRPr lang="en-US" sz="900" dirty="0"/>
-                    </a:p>
-                  </a:txBody>
-                  <a:tcPr marT="45747" marB="45747" horzOverflow="overflow">
-                    <a:lnL w="12700" cap="flat" cmpd="sng" algn="ctr">
-                      <a:solidFill>
-                        <a:schemeClr val="tx1"/>
-                      </a:solidFill>
-                      <a:prstDash val="solid"/>
-                      <a:round/>
-                      <a:headEnd type="none" w="med" len="med"/>
-                      <a:tailEnd type="none" w="med" len="med"/>
-                    </a:lnL>
-                    <a:lnR w="12700" cap="flat" cmpd="sng" algn="ctr">
-                      <a:solidFill>
-                        <a:schemeClr val="tx1"/>
-                      </a:solidFill>
-                      <a:prstDash val="solid"/>
-                      <a:round/>
-                      <a:headEnd type="none" w="med" len="med"/>
-                      <a:tailEnd type="none" w="med" len="med"/>
-                    </a:lnR>
-                    <a:lnT w="12700" cap="flat" cmpd="sng" algn="ctr">
-                      <a:solidFill>
-                        <a:schemeClr val="tx1"/>
-                      </a:solidFill>
-                      <a:prstDash val="solid"/>
-                      <a:round/>
-                      <a:headEnd type="none" w="med" len="med"/>
-                      <a:tailEnd type="none" w="med" len="med"/>
-                    </a:lnT>
-                    <a:lnB w="12700" cap="flat" cmpd="sng" algn="ctr">
-                      <a:solidFill>
-                        <a:schemeClr val="tx1"/>
-                      </a:solidFill>
-                      <a:prstDash val="solid"/>
-                      <a:round/>
-                      <a:headEnd type="none" w="med" len="med"/>
-                      <a:tailEnd type="none" w="med" len="med"/>
-                    </a:lnB>
-                    <a:lnTlToBr>
-                      <a:noFill/>
-                    </a:lnTlToBr>
-                    <a:lnBlToTr>
-                      <a:noFill/>
-                    </a:lnBlToTr>
-                    <a:noFill/>
-                  </a:tcPr>
-                </a:tc>
-              </a:tr>
-              <a:tr h="174758">
-                <a:tc gridSpan="2">
-                  <a:txBody>
-                    <a:bodyPr/>
-                    <a:lstStyle/>
-                    <a:p>
-                      <a:pPr marL="0" marR="0" lvl="0" indent="0" algn="l" defTabSz="914400" rtl="0" eaLnBrk="1" fontAlgn="base" latinLnBrk="0" hangingPunct="1">
-                        <a:lnSpc>
-                          <a:spcPct val="100000"/>
-                        </a:lnSpc>
-                        <a:spcBef>
-                          <a:spcPct val="20000"/>
-                        </a:spcBef>
-                        <a:spcAft>
-                          <a:spcPct val="0"/>
-                        </a:spcAft>
-                        <a:buClr>
-                          <a:schemeClr val="tx1"/>
-                        </a:buClr>
-                        <a:buSzTx/>
-                        <a:buFont typeface="Wingdings" pitchFamily="2" charset="2"/>
-                        <a:buNone/>
-                        <a:tabLst/>
-                      </a:pPr>
-                      <a:r>
-                        <a:rPr lang="en-US" sz="900" dirty="0" smtClean="0"/>
-                        <a:t>Center for Urban Science and Progress</a:t>
-                      </a:r>
-                      <a:endParaRPr kumimoji="0" lang="en-US" altLang="en-US" sz="900" b="0" i="0" u="none" strike="noStrike" cap="none" normalizeH="0" baseline="0" dirty="0" smtClean="0">
-                        <a:ln>
-                          <a:noFill/>
-                        </a:ln>
-                        <a:solidFill>
-                          <a:schemeClr val="tx1"/>
-                        </a:solidFill>
-                        <a:effectLst/>
-                        <a:latin typeface="Arial" charset="0"/>
-                        <a:cs typeface="Arial" charset="0"/>
-                      </a:endParaRPr>
-                    </a:p>
-                  </a:txBody>
-                  <a:tcPr marT="45747" marB="45747" horzOverflow="overflow">
-                    <a:lnL w="12700" cap="flat" cmpd="sng" algn="ctr">
-                      <a:solidFill>
-                        <a:schemeClr val="tx1"/>
-                      </a:solidFill>
-                      <a:prstDash val="solid"/>
-                      <a:round/>
-                      <a:headEnd type="none" w="med" len="med"/>
-                      <a:tailEnd type="none" w="med" len="med"/>
-                    </a:lnL>
-                    <a:lnR w="12700" cap="flat" cmpd="sng" algn="ctr">
-                      <a:solidFill>
-                        <a:schemeClr val="tx1"/>
-                      </a:solidFill>
-                      <a:prstDash val="solid"/>
-                      <a:round/>
-                      <a:headEnd type="none" w="med" len="med"/>
-                      <a:tailEnd type="none" w="med" len="med"/>
-                    </a:lnR>
-                    <a:lnT w="12700" cap="flat" cmpd="sng" algn="ctr">
-                      <a:solidFill>
-                        <a:schemeClr val="tx1"/>
-                      </a:solidFill>
-                      <a:prstDash val="solid"/>
-                      <a:round/>
-                      <a:headEnd type="none" w="med" len="med"/>
-                      <a:tailEnd type="none" w="med" len="med"/>
-                    </a:lnT>
-                    <a:lnB w="12700" cap="flat" cmpd="sng" algn="ctr">
-                      <a:solidFill>
-                        <a:schemeClr val="tx1"/>
-                      </a:solidFill>
-                      <a:prstDash val="solid"/>
-                      <a:round/>
-                      <a:headEnd type="none" w="med" len="med"/>
-                      <a:tailEnd type="none" w="med" len="med"/>
-                    </a:lnB>
-                    <a:lnTlToBr>
-                      <a:noFill/>
-                    </a:lnTlToBr>
-                    <a:lnBlToTr>
-                      <a:noFill/>
-                    </a:lnBlToTr>
-                    <a:noFill/>
-                  </a:tcPr>
-                </a:tc>
-                <a:tc hMerge="1">
-                  <a:txBody>
-                    <a:bodyPr/>
-                    <a:lstStyle/>
-                    <a:p>
-                      <a:pPr marL="0" marR="0" lvl="0" indent="0" algn="l" defTabSz="914400" rtl="0" eaLnBrk="1" fontAlgn="base" latinLnBrk="0" hangingPunct="1">
-                        <a:lnSpc>
-                          <a:spcPct val="100000"/>
-                        </a:lnSpc>
-                        <a:spcBef>
-                          <a:spcPct val="20000"/>
-                        </a:spcBef>
-                        <a:spcAft>
-                          <a:spcPct val="0"/>
-                        </a:spcAft>
-                        <a:buClr>
-                          <a:schemeClr val="tx1"/>
-                        </a:buClr>
-                        <a:buSzTx/>
-                        <a:buFont typeface="Wingdings" pitchFamily="2" charset="2"/>
-                        <a:buNone/>
-                        <a:tabLst/>
-                      </a:pPr>
-                      <a:endParaRPr kumimoji="0" lang="en-US" altLang="en-US" sz="900" b="0" i="0" u="none" strike="noStrike" cap="none" normalizeH="0" baseline="0" dirty="0" smtClean="0">
-                        <a:ln>
-                          <a:noFill/>
-                        </a:ln>
-                        <a:solidFill>
-                          <a:schemeClr val="tx1"/>
-                        </a:solidFill>
-                        <a:effectLst/>
-                        <a:latin typeface="Arial" charset="0"/>
-                        <a:cs typeface="Arial" charset="0"/>
-                      </a:endParaRPr>
-                    </a:p>
-                  </a:txBody>
-                  <a:tcPr marT="45747" marB="45747" horzOverflow="overflow">
-                    <a:lnL w="12700" cap="flat" cmpd="sng" algn="ctr">
-                      <a:solidFill>
-                        <a:schemeClr val="tx1"/>
-                      </a:solidFill>
-                      <a:prstDash val="solid"/>
-                      <a:round/>
-                      <a:headEnd type="none" w="med" len="med"/>
-                      <a:tailEnd type="none" w="med" len="med"/>
-                    </a:lnL>
-                    <a:lnR w="12700" cap="flat" cmpd="sng" algn="ctr">
-                      <a:solidFill>
-                        <a:schemeClr val="tx1"/>
-                      </a:solidFill>
-                      <a:prstDash val="solid"/>
-                      <a:round/>
-                      <a:headEnd type="none" w="med" len="med"/>
-                      <a:tailEnd type="none" w="med" len="med"/>
-                    </a:lnR>
-                    <a:lnT w="12700" cap="flat" cmpd="sng" algn="ctr">
-                      <a:solidFill>
-                        <a:schemeClr val="tx1"/>
-                      </a:solidFill>
-                      <a:prstDash val="solid"/>
-                      <a:round/>
-                      <a:headEnd type="none" w="med" len="med"/>
-                      <a:tailEnd type="none" w="med" len="med"/>
-                    </a:lnT>
-                    <a:lnB w="12700" cap="flat" cmpd="sng" algn="ctr">
-                      <a:solidFill>
-                        <a:schemeClr val="tx1"/>
-                      </a:solidFill>
-                      <a:prstDash val="solid"/>
-                      <a:round/>
-                      <a:headEnd type="none" w="med" len="med"/>
-                      <a:tailEnd type="none" w="med" len="med"/>
-                    </a:lnB>
-                    <a:lnTlToBr>
-                      <a:noFill/>
-                    </a:lnTlToBr>
-                    <a:lnBlToTr>
-                      <a:noFill/>
-                    </a:lnBlToTr>
-                    <a:noFill/>
-                  </a:tcPr>
-                </a:tc>
-                <a:tc>
-                  <a:txBody>
-                    <a:bodyPr/>
-                    <a:lstStyle/>
-                    <a:p>
-                      <a:r>
-                        <a:rPr lang="en-US" sz="900" smtClean="0"/>
-                        <a:t>Anonymized public </a:t>
-                      </a:r>
-                      <a:r>
-                        <a:rPr lang="en-US" sz="900" dirty="0" smtClean="0"/>
-                        <a:t>health metrics</a:t>
-                      </a:r>
-                      <a:endParaRPr lang="en-US" sz="900" dirty="0"/>
-                    </a:p>
-                  </a:txBody>
-                  <a:tcPr marT="45747" marB="45747" horzOverflow="overflow">
-                    <a:lnL w="12700" cap="flat" cmpd="sng" algn="ctr">
-                      <a:solidFill>
-                        <a:schemeClr val="tx1"/>
-                      </a:solidFill>
-                      <a:prstDash val="solid"/>
-                      <a:round/>
-                      <a:headEnd type="none" w="med" len="med"/>
-                      <a:tailEnd type="none" w="med" len="med"/>
-                    </a:lnL>
-                    <a:lnR w="12700" cap="flat" cmpd="sng" algn="ctr">
-                      <a:solidFill>
-                        <a:schemeClr val="tx1"/>
-                      </a:solidFill>
-                      <a:prstDash val="solid"/>
-                      <a:round/>
-                      <a:headEnd type="none" w="med" len="med"/>
-                      <a:tailEnd type="none" w="med" len="med"/>
-                    </a:lnR>
-                    <a:lnT w="12700" cap="flat" cmpd="sng" algn="ctr">
-                      <a:solidFill>
-                        <a:schemeClr val="tx1"/>
-                      </a:solidFill>
-                      <a:prstDash val="solid"/>
-                      <a:round/>
-                      <a:headEnd type="none" w="med" len="med"/>
-                      <a:tailEnd type="none" w="med" len="med"/>
-                    </a:lnT>
-                    <a:lnB w="12700" cap="flat" cmpd="sng" algn="ctr">
-                      <a:solidFill>
-                        <a:schemeClr val="tx1"/>
-                      </a:solidFill>
-                      <a:prstDash val="solid"/>
-                      <a:round/>
-                      <a:headEnd type="none" w="med" len="med"/>
-                      <a:tailEnd type="none" w="med" len="med"/>
-                    </a:lnB>
-                    <a:lnTlToBr>
-                      <a:noFill/>
-                    </a:lnTlToBr>
-                    <a:lnBlToTr>
-                      <a:noFill/>
-                    </a:lnBlToTr>
-                    <a:noFill/>
-                  </a:tcPr>
-                </a:tc>
-                <a:tc>
-                  <a:txBody>
-                    <a:bodyPr/>
-                    <a:lstStyle/>
-                    <a:p>
-                      <a:r>
-                        <a:rPr lang="en-US" sz="900" dirty="0" smtClean="0"/>
-                        <a:t>Unknown</a:t>
-                      </a:r>
-                      <a:endParaRPr lang="en-US" sz="900" dirty="0"/>
-                    </a:p>
-                  </a:txBody>
-                  <a:tcPr marT="45747" marB="45747" horzOverflow="overflow">
-                    <a:lnL w="12700" cap="flat" cmpd="sng" algn="ctr">
-                      <a:solidFill>
-                        <a:schemeClr val="tx1"/>
-                      </a:solidFill>
-                      <a:prstDash val="solid"/>
-                      <a:round/>
-                      <a:headEnd type="none" w="med" len="med"/>
-                      <a:tailEnd type="none" w="med" len="med"/>
-                    </a:lnL>
-                    <a:lnR w="12700" cap="flat" cmpd="sng" algn="ctr">
-                      <a:solidFill>
-                        <a:schemeClr val="tx1"/>
-                      </a:solidFill>
-                      <a:prstDash val="solid"/>
-                      <a:round/>
-                      <a:headEnd type="none" w="med" len="med"/>
-                      <a:tailEnd type="none" w="med" len="med"/>
-                    </a:lnR>
-                    <a:lnT w="12700" cap="flat" cmpd="sng" algn="ctr">
-                      <a:solidFill>
-                        <a:schemeClr val="tx1"/>
-                      </a:solidFill>
-                      <a:prstDash val="solid"/>
-                      <a:round/>
-                      <a:headEnd type="none" w="med" len="med"/>
-                      <a:tailEnd type="none" w="med" len="med"/>
-                    </a:lnT>
-                    <a:lnB w="12700" cap="flat" cmpd="sng" algn="ctr">
-                      <a:solidFill>
-                        <a:schemeClr val="tx1"/>
-                      </a:solidFill>
-                      <a:prstDash val="solid"/>
-                      <a:round/>
-                      <a:headEnd type="none" w="med" len="med"/>
-                      <a:tailEnd type="none" w="med" len="med"/>
-                    </a:lnB>
-                    <a:lnTlToBr>
-                      <a:noFill/>
-                    </a:lnTlToBr>
-                    <a:lnBlToTr>
-                      <a:noFill/>
-                    </a:lnBlToTr>
-                    <a:noFill/>
-                  </a:tcPr>
-                </a:tc>
-              </a:tr>
-              <a:tr h="213686">
-                <a:tc gridSpan="2">
-                  <a:txBody>
-                    <a:bodyPr/>
-                    <a:lstStyle/>
-                    <a:p>
-                      <a:pPr marL="0" marR="0" lvl="0" indent="0" algn="l" defTabSz="914400" rtl="0" eaLnBrk="1" fontAlgn="base" latinLnBrk="0" hangingPunct="1">
-                        <a:lnSpc>
-                          <a:spcPct val="100000"/>
-                        </a:lnSpc>
-                        <a:spcBef>
-                          <a:spcPct val="20000"/>
-                        </a:spcBef>
-                        <a:spcAft>
-                          <a:spcPct val="0"/>
-                        </a:spcAft>
-                        <a:buClr>
-                          <a:schemeClr val="tx1"/>
-                        </a:buClr>
-                        <a:buSzTx/>
-                        <a:buFont typeface="Wingdings" pitchFamily="2" charset="2"/>
-                        <a:buNone/>
-                        <a:tabLst/>
-                      </a:pPr>
-                      <a:r>
-                        <a:rPr kumimoji="0" lang="en-US" altLang="en-US" sz="900" b="0" i="0" u="none" strike="noStrike" cap="none" normalizeH="0" baseline="0" dirty="0" smtClean="0">
-                          <a:ln>
-                            <a:noFill/>
-                          </a:ln>
-                          <a:solidFill>
-                            <a:schemeClr val="tx1"/>
-                          </a:solidFill>
-                          <a:effectLst/>
-                          <a:latin typeface="Arial" charset="0"/>
-                          <a:cs typeface="Arial" charset="0"/>
-                        </a:rPr>
-                        <a:t>US Census Data</a:t>
-                      </a:r>
-                    </a:p>
-                  </a:txBody>
-                  <a:tcPr marT="45747" marB="45747" horzOverflow="overflow">
-                    <a:lnL w="12700" cap="flat" cmpd="sng" algn="ctr">
-                      <a:solidFill>
-                        <a:schemeClr val="tx1"/>
-                      </a:solidFill>
-                      <a:prstDash val="solid"/>
-                      <a:round/>
-                      <a:headEnd type="none" w="med" len="med"/>
-                      <a:tailEnd type="none" w="med" len="med"/>
-                    </a:lnL>
-                    <a:lnR w="12700" cap="flat" cmpd="sng" algn="ctr">
-                      <a:solidFill>
-                        <a:schemeClr val="tx1"/>
-                      </a:solidFill>
-                      <a:prstDash val="solid"/>
-                      <a:round/>
-                      <a:headEnd type="none" w="med" len="med"/>
-                      <a:tailEnd type="none" w="med" len="med"/>
-                    </a:lnR>
-                    <a:lnT w="12700" cap="flat" cmpd="sng" algn="ctr">
-                      <a:solidFill>
-                        <a:schemeClr val="tx1"/>
-                      </a:solidFill>
-                      <a:prstDash val="solid"/>
-                      <a:round/>
-                      <a:headEnd type="none" w="med" len="med"/>
-                      <a:tailEnd type="none" w="med" len="med"/>
-                    </a:lnT>
-                    <a:lnB w="12700" cap="flat" cmpd="sng" algn="ctr">
-                      <a:solidFill>
-                        <a:schemeClr val="tx1"/>
-                      </a:solidFill>
-                      <a:prstDash val="solid"/>
-                      <a:round/>
-                      <a:headEnd type="none" w="med" len="med"/>
-                      <a:tailEnd type="none" w="med" len="med"/>
-                    </a:lnB>
-                    <a:lnTlToBr>
-                      <a:noFill/>
-                    </a:lnTlToBr>
-                    <a:lnBlToTr>
-                      <a:noFill/>
-                    </a:lnBlToTr>
-                    <a:noFill/>
-                  </a:tcPr>
-                </a:tc>
-                <a:tc hMerge="1">
-                  <a:txBody>
-                    <a:bodyPr/>
-                    <a:lstStyle/>
-                    <a:p>
-                      <a:endParaRPr lang="en-US"/>
-                    </a:p>
-                  </a:txBody>
-                  <a:tcPr/>
-                </a:tc>
-                <a:tc>
-                  <a:txBody>
-                    <a:bodyPr/>
-                    <a:lstStyle/>
-                    <a:p>
-                      <a:r>
-                        <a:rPr lang="en-US" sz="900" dirty="0" smtClean="0">
-                          <a:hlinkClick r:id="rId3"/>
-                        </a:rPr>
-                        <a:t>http://www2.census.gov/</a:t>
-                      </a:r>
-                      <a:r>
-                        <a:rPr lang="en-US" sz="900" dirty="0" smtClean="0"/>
-                        <a:t> </a:t>
-                      </a:r>
-                      <a:endParaRPr lang="en-US" sz="900" dirty="0"/>
-                    </a:p>
-                  </a:txBody>
-                  <a:tcPr marT="45747" marB="45747" horzOverflow="overflow">
-                    <a:lnL w="12700" cap="flat" cmpd="sng" algn="ctr">
-                      <a:solidFill>
-                        <a:schemeClr val="tx1"/>
-                      </a:solidFill>
-                      <a:prstDash val="solid"/>
-                      <a:round/>
-                      <a:headEnd type="none" w="med" len="med"/>
-                      <a:tailEnd type="none" w="med" len="med"/>
-                    </a:lnL>
-                    <a:lnR w="12700" cap="flat" cmpd="sng" algn="ctr">
-                      <a:solidFill>
-                        <a:schemeClr val="tx1"/>
-                      </a:solidFill>
-                      <a:prstDash val="solid"/>
-                      <a:round/>
-                      <a:headEnd type="none" w="med" len="med"/>
-                      <a:tailEnd type="none" w="med" len="med"/>
-                    </a:lnR>
-                    <a:lnT w="12700" cap="flat" cmpd="sng" algn="ctr">
-                      <a:solidFill>
-                        <a:schemeClr val="tx1"/>
-                      </a:solidFill>
-                      <a:prstDash val="solid"/>
-                      <a:round/>
-                      <a:headEnd type="none" w="med" len="med"/>
-                      <a:tailEnd type="none" w="med" len="med"/>
-                    </a:lnT>
-                    <a:lnB w="12700" cap="flat" cmpd="sng" algn="ctr">
-                      <a:solidFill>
-                        <a:schemeClr val="tx1"/>
-                      </a:solidFill>
-                      <a:prstDash val="solid"/>
-                      <a:round/>
-                      <a:headEnd type="none" w="med" len="med"/>
-                      <a:tailEnd type="none" w="med" len="med"/>
-                    </a:lnB>
-                    <a:lnTlToBr>
-                      <a:noFill/>
-                    </a:lnTlToBr>
-                    <a:lnBlToTr>
-                      <a:noFill/>
-                    </a:lnBlToTr>
-                    <a:noFill/>
-                  </a:tcPr>
-                </a:tc>
-                <a:tc>
-                  <a:txBody>
-                    <a:bodyPr/>
-                    <a:lstStyle/>
-                    <a:p>
-                      <a:r>
-                        <a:rPr lang="en-US" sz="900" dirty="0" smtClean="0"/>
-                        <a:t>~1GB</a:t>
-                      </a:r>
-                      <a:endParaRPr lang="en-US" sz="900" dirty="0"/>
-                    </a:p>
-                  </a:txBody>
-                  <a:tcPr marT="45747" marB="45747" horzOverflow="overflow">
-                    <a:lnL w="12700" cap="flat" cmpd="sng" algn="ctr">
-                      <a:solidFill>
-                        <a:schemeClr val="tx1"/>
-                      </a:solidFill>
-                      <a:prstDash val="solid"/>
-                      <a:round/>
-                      <a:headEnd type="none" w="med" len="med"/>
-                      <a:tailEnd type="none" w="med" len="med"/>
-                    </a:lnL>
-                    <a:lnR w="12700" cap="flat" cmpd="sng" algn="ctr">
-                      <a:solidFill>
-                        <a:schemeClr val="tx1"/>
-                      </a:solidFill>
-                      <a:prstDash val="solid"/>
-                      <a:round/>
-                      <a:headEnd type="none" w="med" len="med"/>
-                      <a:tailEnd type="none" w="med" len="med"/>
-                    </a:lnR>
-                    <a:lnT w="12700" cap="flat" cmpd="sng" algn="ctr">
-                      <a:solidFill>
-                        <a:schemeClr val="tx1"/>
-                      </a:solidFill>
-                      <a:prstDash val="solid"/>
-                      <a:round/>
-                      <a:headEnd type="none" w="med" len="med"/>
-                      <a:tailEnd type="none" w="med" len="med"/>
-                    </a:lnT>
-                    <a:lnB w="12700" cap="flat" cmpd="sng" algn="ctr">
-                      <a:solidFill>
-                        <a:schemeClr val="tx1"/>
-                      </a:solidFill>
-                      <a:prstDash val="solid"/>
-                      <a:round/>
-                      <a:headEnd type="none" w="med" len="med"/>
-                      <a:tailEnd type="none" w="med" len="med"/>
-                    </a:lnB>
-                    <a:lnTlToBr>
-                      <a:noFill/>
-                    </a:lnTlToBr>
-                    <a:lnBlToTr>
-                      <a:noFill/>
-                    </a:lnBlToTr>
-                    <a:noFill/>
-                  </a:tcPr>
-                </a:tc>
-              </a:tr>
-              <a:tr h="122697">
-                <a:tc gridSpan="2">
-                  <a:txBody>
-                    <a:bodyPr/>
-                    <a:lstStyle/>
-                    <a:p>
-                      <a:pPr marL="0" marR="0" lvl="0" indent="0" algn="l" defTabSz="914400" rtl="0" eaLnBrk="1" fontAlgn="base" latinLnBrk="0" hangingPunct="1">
-                        <a:lnSpc>
-                          <a:spcPct val="100000"/>
-                        </a:lnSpc>
-                        <a:spcBef>
-                          <a:spcPct val="20000"/>
-                        </a:spcBef>
-                        <a:spcAft>
-                          <a:spcPct val="0"/>
-                        </a:spcAft>
-                        <a:buClr>
-                          <a:schemeClr val="tx1"/>
-                        </a:buClr>
-                        <a:buSzTx/>
-                        <a:buFont typeface="Wingdings" pitchFamily="2" charset="2"/>
-                        <a:buNone/>
-                        <a:tabLst/>
-                      </a:pPr>
-                      <a:r>
-                        <a:rPr kumimoji="0" lang="en-US" altLang="en-US" sz="900" b="0" i="0" u="none" strike="noStrike" cap="none" normalizeH="0" baseline="0" dirty="0" smtClean="0">
-                          <a:ln>
-                            <a:noFill/>
-                          </a:ln>
-                          <a:solidFill>
-                            <a:schemeClr val="tx1"/>
-                          </a:solidFill>
-                          <a:effectLst/>
-                          <a:latin typeface="Arial" charset="0"/>
-                          <a:cs typeface="Arial" charset="0"/>
-                        </a:rPr>
-                        <a:t>NYC Open Data – </a:t>
-                      </a:r>
-                      <a:r>
-                        <a:rPr kumimoji="0" lang="en-US" altLang="en-US" sz="900" b="0" i="0" u="none" strike="noStrike" cap="none" normalizeH="0" baseline="0" dirty="0" smtClean="0">
-                          <a:ln>
-                            <a:noFill/>
-                          </a:ln>
-                          <a:solidFill>
-                            <a:schemeClr val="tx1"/>
-                          </a:solidFill>
-                          <a:effectLst/>
-                          <a:latin typeface="Arial" charset="0"/>
-                          <a:cs typeface="Arial" charset="0"/>
-                        </a:rPr>
-                        <a:t>Health</a:t>
-                      </a:r>
-                    </a:p>
-                  </a:txBody>
-                  <a:tcPr marT="45747" marB="45747" horzOverflow="overflow">
-                    <a:lnL w="12700" cap="flat" cmpd="sng" algn="ctr">
-                      <a:solidFill>
-                        <a:schemeClr val="tx1"/>
-                      </a:solidFill>
-                      <a:prstDash val="solid"/>
-                      <a:round/>
-                      <a:headEnd type="none" w="med" len="med"/>
-                      <a:tailEnd type="none" w="med" len="med"/>
-                    </a:lnL>
-                    <a:lnR w="12700" cap="flat" cmpd="sng" algn="ctr">
-                      <a:solidFill>
-                        <a:schemeClr val="tx1"/>
-                      </a:solidFill>
-                      <a:prstDash val="solid"/>
-                      <a:round/>
-                      <a:headEnd type="none" w="med" len="med"/>
-                      <a:tailEnd type="none" w="med" len="med"/>
-                    </a:lnR>
-                    <a:lnT w="12700" cap="flat" cmpd="sng" algn="ctr">
-                      <a:solidFill>
-                        <a:schemeClr val="tx1"/>
-                      </a:solidFill>
-                      <a:prstDash val="solid"/>
-                      <a:round/>
-                      <a:headEnd type="none" w="med" len="med"/>
-                      <a:tailEnd type="none" w="med" len="med"/>
-                    </a:lnT>
-                    <a:lnB w="12700" cap="flat" cmpd="sng" algn="ctr">
-                      <a:solidFill>
-                        <a:schemeClr val="tx1"/>
-                      </a:solidFill>
-                      <a:prstDash val="solid"/>
-                      <a:round/>
-                      <a:headEnd type="none" w="med" len="med"/>
-                      <a:tailEnd type="none" w="med" len="med"/>
-                    </a:lnB>
-                    <a:lnTlToBr>
-                      <a:noFill/>
-                    </a:lnTlToBr>
-                    <a:lnBlToTr>
-                      <a:noFill/>
-                    </a:lnBlToTr>
-                    <a:noFill/>
-                  </a:tcPr>
-                </a:tc>
-                <a:tc hMerge="1">
-                  <a:txBody>
-                    <a:bodyPr/>
-                    <a:lstStyle/>
-                    <a:p>
-                      <a:pPr marL="0" marR="0" lvl="0" indent="0" algn="l" defTabSz="914400" rtl="0" eaLnBrk="1" fontAlgn="base" latinLnBrk="0" hangingPunct="1">
-                        <a:lnSpc>
-                          <a:spcPct val="100000"/>
-                        </a:lnSpc>
-                        <a:spcBef>
-                          <a:spcPct val="20000"/>
-                        </a:spcBef>
-                        <a:spcAft>
-                          <a:spcPct val="0"/>
-                        </a:spcAft>
-                        <a:buClr>
-                          <a:schemeClr val="tx1"/>
-                        </a:buClr>
-                        <a:buSzTx/>
-                        <a:buFont typeface="Wingdings" pitchFamily="2" charset="2"/>
-                        <a:buNone/>
-                        <a:tabLst/>
-                      </a:pPr>
-                      <a:endParaRPr kumimoji="0" lang="en-US" altLang="en-US" sz="900" b="0" i="0" u="none" strike="noStrike" cap="none" normalizeH="0" baseline="0" dirty="0" smtClean="0">
-                        <a:ln>
-                          <a:noFill/>
-                        </a:ln>
-                        <a:solidFill>
-                          <a:schemeClr val="tx1"/>
-                        </a:solidFill>
-                        <a:effectLst/>
-                        <a:latin typeface="Arial" charset="0"/>
-                        <a:cs typeface="Arial" charset="0"/>
-                      </a:endParaRPr>
-                    </a:p>
-                  </a:txBody>
-                  <a:tcPr marT="45747" marB="45747" horzOverflow="overflow">
-                    <a:lnL w="12700" cap="flat" cmpd="sng" algn="ctr">
-                      <a:solidFill>
-                        <a:schemeClr val="tx1"/>
-                      </a:solidFill>
-                      <a:prstDash val="solid"/>
-                      <a:round/>
-                      <a:headEnd type="none" w="med" len="med"/>
-                      <a:tailEnd type="none" w="med" len="med"/>
-                    </a:lnL>
-                    <a:lnR w="12700" cap="flat" cmpd="sng" algn="ctr">
-                      <a:solidFill>
-                        <a:schemeClr val="tx1"/>
-                      </a:solidFill>
-                      <a:prstDash val="solid"/>
-                      <a:round/>
-                      <a:headEnd type="none" w="med" len="med"/>
-                      <a:tailEnd type="none" w="med" len="med"/>
-                    </a:lnR>
-                    <a:lnT w="12700" cap="flat" cmpd="sng" algn="ctr">
-                      <a:solidFill>
-                        <a:schemeClr val="tx1"/>
-                      </a:solidFill>
-                      <a:prstDash val="solid"/>
-                      <a:round/>
-                      <a:headEnd type="none" w="med" len="med"/>
-                      <a:tailEnd type="none" w="med" len="med"/>
-                    </a:lnT>
-                    <a:lnB w="12700" cap="flat" cmpd="sng" algn="ctr">
-                      <a:solidFill>
-                        <a:schemeClr val="tx1"/>
-                      </a:solidFill>
-                      <a:prstDash val="solid"/>
-                      <a:round/>
-                      <a:headEnd type="none" w="med" len="med"/>
-                      <a:tailEnd type="none" w="med" len="med"/>
-                    </a:lnB>
-                    <a:lnTlToBr>
-                      <a:noFill/>
-                    </a:lnTlToBr>
-                    <a:lnBlToTr>
-                      <a:noFill/>
-                    </a:lnBlToTr>
-                    <a:noFill/>
-                  </a:tcPr>
-                </a:tc>
-                <a:tc>
-                  <a:txBody>
-                    <a:bodyPr/>
-                    <a:lstStyle/>
-                    <a:p>
-                      <a:r>
-                        <a:rPr lang="en-US" sz="900" dirty="0" smtClean="0">
-                          <a:hlinkClick r:id="rId4"/>
-                        </a:rPr>
-                        <a:t>https://nycopendata.socrata.com/data?cat=health</a:t>
-                      </a:r>
-                      <a:r>
-                        <a:rPr lang="en-US" sz="900" dirty="0" smtClean="0"/>
-                        <a:t> </a:t>
-                      </a:r>
-                      <a:endParaRPr lang="en-US" sz="900" dirty="0"/>
-                    </a:p>
-                  </a:txBody>
-                  <a:tcPr marT="45747" marB="45747" horzOverflow="overflow">
-                    <a:lnL w="12700" cap="flat" cmpd="sng" algn="ctr">
-                      <a:solidFill>
-                        <a:schemeClr val="tx1"/>
-                      </a:solidFill>
-                      <a:prstDash val="solid"/>
-                      <a:round/>
-                      <a:headEnd type="none" w="med" len="med"/>
-                      <a:tailEnd type="none" w="med" len="med"/>
-                    </a:lnL>
-                    <a:lnR w="12700" cap="flat" cmpd="sng" algn="ctr">
-                      <a:solidFill>
-                        <a:schemeClr val="tx1"/>
-                      </a:solidFill>
-                      <a:prstDash val="solid"/>
-                      <a:round/>
-                      <a:headEnd type="none" w="med" len="med"/>
-                      <a:tailEnd type="none" w="med" len="med"/>
-                    </a:lnR>
-                    <a:lnT w="12700" cap="flat" cmpd="sng" algn="ctr">
-                      <a:solidFill>
-                        <a:schemeClr val="tx1"/>
-                      </a:solidFill>
-                      <a:prstDash val="solid"/>
-                      <a:round/>
-                      <a:headEnd type="none" w="med" len="med"/>
-                      <a:tailEnd type="none" w="med" len="med"/>
-                    </a:lnT>
-                    <a:lnB w="12700" cap="flat" cmpd="sng" algn="ctr">
-                      <a:solidFill>
-                        <a:schemeClr val="tx1"/>
-                      </a:solidFill>
-                      <a:prstDash val="solid"/>
-                      <a:round/>
-                      <a:headEnd type="none" w="med" len="med"/>
-                      <a:tailEnd type="none" w="med" len="med"/>
-                    </a:lnB>
-                    <a:lnTlToBr>
-                      <a:noFill/>
-                    </a:lnTlToBr>
-                    <a:lnBlToTr>
-                      <a:noFill/>
-                    </a:lnBlToTr>
-                    <a:noFill/>
-                  </a:tcPr>
-                </a:tc>
-                <a:tc>
-                  <a:txBody>
-                    <a:bodyPr/>
-                    <a:lstStyle/>
-                    <a:p>
-                      <a:r>
-                        <a:rPr lang="en-US" sz="900" dirty="0" smtClean="0"/>
-                        <a:t>100MB</a:t>
-                      </a:r>
-                    </a:p>
-                  </a:txBody>
-                  <a:tcPr marT="45747" marB="45747" horzOverflow="overflow">
-                    <a:lnL w="12700" cap="flat" cmpd="sng" algn="ctr">
-                      <a:solidFill>
-                        <a:schemeClr val="tx1"/>
-                      </a:solidFill>
-                      <a:prstDash val="solid"/>
-                      <a:round/>
-                      <a:headEnd type="none" w="med" len="med"/>
-                      <a:tailEnd type="none" w="med" len="med"/>
-                    </a:lnL>
-                    <a:lnR w="12700" cap="flat" cmpd="sng" algn="ctr">
-                      <a:solidFill>
-                        <a:schemeClr val="tx1"/>
-                      </a:solidFill>
-                      <a:prstDash val="solid"/>
-                      <a:round/>
-                      <a:headEnd type="none" w="med" len="med"/>
-                      <a:tailEnd type="none" w="med" len="med"/>
-                    </a:lnR>
-                    <a:lnT w="12700" cap="flat" cmpd="sng" algn="ctr">
-                      <a:solidFill>
-                        <a:schemeClr val="tx1"/>
-                      </a:solidFill>
-                      <a:prstDash val="solid"/>
-                      <a:round/>
-                      <a:headEnd type="none" w="med" len="med"/>
-                      <a:tailEnd type="none" w="med" len="med"/>
-                    </a:lnT>
-                    <a:lnB w="12700" cap="flat" cmpd="sng" algn="ctr">
-                      <a:solidFill>
-                        <a:schemeClr val="tx1"/>
-                      </a:solidFill>
-                      <a:prstDash val="solid"/>
-                      <a:round/>
-                      <a:headEnd type="none" w="med" len="med"/>
-                      <a:tailEnd type="none" w="med" len="med"/>
-                    </a:lnB>
-                    <a:lnTlToBr>
-                      <a:noFill/>
-                    </a:lnTlToBr>
-                    <a:lnBlToTr>
-                      <a:noFill/>
-                    </a:lnBlToTr>
-                    <a:noFill/>
-                  </a:tcPr>
-                </a:tc>
-              </a:tr>
               <a:tr h="122697">
                 <a:tc gridSpan="2">
                   <a:txBody>
@@ -13373,10 +11944,471 @@
                     <a:lstStyle/>
                     <a:p>
                       <a:r>
-                        <a:rPr lang="en-US" sz="900" smtClean="0"/>
+                        <a:rPr lang="en-US" sz="900" dirty="0" smtClean="0"/>
                         <a:t>&lt;10 MB</a:t>
                       </a:r>
-                      <a:endParaRPr lang="en-US" sz="900" dirty="0" smtClean="0"/>
+                    </a:p>
+                  </a:txBody>
+                  <a:tcPr marT="45747" marB="45747" horzOverflow="overflow">
+                    <a:lnL w="12700" cap="flat" cmpd="sng" algn="ctr">
+                      <a:solidFill>
+                        <a:schemeClr val="tx1"/>
+                      </a:solidFill>
+                      <a:prstDash val="solid"/>
+                      <a:round/>
+                      <a:headEnd type="none" w="med" len="med"/>
+                      <a:tailEnd type="none" w="med" len="med"/>
+                    </a:lnL>
+                    <a:lnR w="12700" cap="flat" cmpd="sng" algn="ctr">
+                      <a:solidFill>
+                        <a:schemeClr val="tx1"/>
+                      </a:solidFill>
+                      <a:prstDash val="solid"/>
+                      <a:round/>
+                      <a:headEnd type="none" w="med" len="med"/>
+                      <a:tailEnd type="none" w="med" len="med"/>
+                    </a:lnR>
+                    <a:lnT w="12700" cap="flat" cmpd="sng" algn="ctr">
+                      <a:solidFill>
+                        <a:schemeClr val="tx1"/>
+                      </a:solidFill>
+                      <a:prstDash val="solid"/>
+                      <a:round/>
+                      <a:headEnd type="none" w="med" len="med"/>
+                      <a:tailEnd type="none" w="med" len="med"/>
+                    </a:lnT>
+                    <a:lnB w="12700" cap="flat" cmpd="sng" algn="ctr">
+                      <a:solidFill>
+                        <a:schemeClr val="tx1"/>
+                      </a:solidFill>
+                      <a:prstDash val="solid"/>
+                      <a:round/>
+                      <a:headEnd type="none" w="med" len="med"/>
+                      <a:tailEnd type="none" w="med" len="med"/>
+                    </a:lnB>
+                    <a:lnTlToBr>
+                      <a:noFill/>
+                    </a:lnTlToBr>
+                    <a:lnBlToTr>
+                      <a:noFill/>
+                    </a:lnBlToTr>
+                    <a:noFill/>
+                  </a:tcPr>
+                </a:tc>
+              </a:tr>
+              <a:tr h="122697">
+                <a:tc gridSpan="2">
+                  <a:txBody>
+                    <a:bodyPr/>
+                    <a:lstStyle/>
+                    <a:p>
+                      <a:pPr marL="0" marR="0" lvl="0" indent="0" algn="l" defTabSz="914400" rtl="0" eaLnBrk="1" fontAlgn="base" latinLnBrk="0" hangingPunct="1">
+                        <a:lnSpc>
+                          <a:spcPct val="100000"/>
+                        </a:lnSpc>
+                        <a:spcBef>
+                          <a:spcPct val="20000"/>
+                        </a:spcBef>
+                        <a:spcAft>
+                          <a:spcPct val="0"/>
+                        </a:spcAft>
+                        <a:buClr>
+                          <a:schemeClr val="tx1"/>
+                        </a:buClr>
+                        <a:buSzTx/>
+                        <a:buFont typeface="Wingdings" pitchFamily="2" charset="2"/>
+                        <a:buNone/>
+                        <a:tabLst/>
+                      </a:pPr>
+                      <a:r>
+                        <a:rPr kumimoji="0" lang="en-US" altLang="en-US" sz="900" b="0" i="0" u="none" strike="noStrike" cap="none" normalizeH="0" baseline="0" dirty="0" smtClean="0">
+                          <a:ln>
+                            <a:noFill/>
+                          </a:ln>
+                          <a:solidFill>
+                            <a:schemeClr val="tx1"/>
+                          </a:solidFill>
+                          <a:effectLst/>
+                          <a:latin typeface="Arial" charset="0"/>
+                          <a:cs typeface="Arial" charset="0"/>
+                        </a:rPr>
+                        <a:t>Twitter</a:t>
+                      </a:r>
+                    </a:p>
+                  </a:txBody>
+                  <a:tcPr marT="45747" marB="45747" horzOverflow="overflow">
+                    <a:lnL w="12700" cap="flat" cmpd="sng" algn="ctr">
+                      <a:solidFill>
+                        <a:schemeClr val="tx1"/>
+                      </a:solidFill>
+                      <a:prstDash val="solid"/>
+                      <a:round/>
+                      <a:headEnd type="none" w="med" len="med"/>
+                      <a:tailEnd type="none" w="med" len="med"/>
+                    </a:lnL>
+                    <a:lnR w="12700" cap="flat" cmpd="sng" algn="ctr">
+                      <a:solidFill>
+                        <a:schemeClr val="tx1"/>
+                      </a:solidFill>
+                      <a:prstDash val="solid"/>
+                      <a:round/>
+                      <a:headEnd type="none" w="med" len="med"/>
+                      <a:tailEnd type="none" w="med" len="med"/>
+                    </a:lnR>
+                    <a:lnT w="12700" cap="flat" cmpd="sng" algn="ctr">
+                      <a:solidFill>
+                        <a:schemeClr val="tx1"/>
+                      </a:solidFill>
+                      <a:prstDash val="solid"/>
+                      <a:round/>
+                      <a:headEnd type="none" w="med" len="med"/>
+                      <a:tailEnd type="none" w="med" len="med"/>
+                    </a:lnT>
+                    <a:lnB w="12700" cap="flat" cmpd="sng" algn="ctr">
+                      <a:solidFill>
+                        <a:schemeClr val="tx1"/>
+                      </a:solidFill>
+                      <a:prstDash val="solid"/>
+                      <a:round/>
+                      <a:headEnd type="none" w="med" len="med"/>
+                      <a:tailEnd type="none" w="med" len="med"/>
+                    </a:lnB>
+                    <a:lnTlToBr>
+                      <a:noFill/>
+                    </a:lnTlToBr>
+                    <a:lnBlToTr>
+                      <a:noFill/>
+                    </a:lnBlToTr>
+                    <a:noFill/>
+                  </a:tcPr>
+                </a:tc>
+                <a:tc hMerge="1">
+                  <a:txBody>
+                    <a:bodyPr/>
+                    <a:lstStyle/>
+                    <a:p>
+                      <a:endParaRPr lang="en-US"/>
+                    </a:p>
+                  </a:txBody>
+                  <a:tcPr/>
+                </a:tc>
+                <a:tc>
+                  <a:txBody>
+                    <a:bodyPr/>
+                    <a:lstStyle/>
+                    <a:p>
+                      <a:r>
+                        <a:rPr lang="en-US" sz="900" dirty="0" smtClean="0"/>
+                        <a:t>Twitter status updates for specific days and geographic areas using a sample of keywords related to employment (“working”, ‘job”, “fired”</a:t>
+                      </a:r>
+                      <a:r>
+                        <a:rPr lang="en-US" sz="900" baseline="0" dirty="0" smtClean="0"/>
+                        <a:t> etc.)</a:t>
+                      </a:r>
+                      <a:endParaRPr lang="en-US" sz="900" dirty="0"/>
+                    </a:p>
+                  </a:txBody>
+                  <a:tcPr marT="45747" marB="45747" horzOverflow="overflow">
+                    <a:lnL w="12700" cap="flat" cmpd="sng" algn="ctr">
+                      <a:solidFill>
+                        <a:schemeClr val="tx1"/>
+                      </a:solidFill>
+                      <a:prstDash val="solid"/>
+                      <a:round/>
+                      <a:headEnd type="none" w="med" len="med"/>
+                      <a:tailEnd type="none" w="med" len="med"/>
+                    </a:lnL>
+                    <a:lnR w="12700" cap="flat" cmpd="sng" algn="ctr">
+                      <a:solidFill>
+                        <a:schemeClr val="tx1"/>
+                      </a:solidFill>
+                      <a:prstDash val="solid"/>
+                      <a:round/>
+                      <a:headEnd type="none" w="med" len="med"/>
+                      <a:tailEnd type="none" w="med" len="med"/>
+                    </a:lnR>
+                    <a:lnT w="12700" cap="flat" cmpd="sng" algn="ctr">
+                      <a:solidFill>
+                        <a:schemeClr val="tx1"/>
+                      </a:solidFill>
+                      <a:prstDash val="solid"/>
+                      <a:round/>
+                      <a:headEnd type="none" w="med" len="med"/>
+                      <a:tailEnd type="none" w="med" len="med"/>
+                    </a:lnT>
+                    <a:lnB w="12700" cap="flat" cmpd="sng" algn="ctr">
+                      <a:solidFill>
+                        <a:schemeClr val="tx1"/>
+                      </a:solidFill>
+                      <a:prstDash val="solid"/>
+                      <a:round/>
+                      <a:headEnd type="none" w="med" len="med"/>
+                      <a:tailEnd type="none" w="med" len="med"/>
+                    </a:lnB>
+                    <a:lnTlToBr>
+                      <a:noFill/>
+                    </a:lnTlToBr>
+                    <a:lnBlToTr>
+                      <a:noFill/>
+                    </a:lnBlToTr>
+                    <a:noFill/>
+                  </a:tcPr>
+                </a:tc>
+                <a:tc>
+                  <a:txBody>
+                    <a:bodyPr/>
+                    <a:lstStyle/>
+                    <a:p>
+                      <a:r>
+                        <a:rPr lang="en-US" sz="900" dirty="0" smtClean="0"/>
+                        <a:t>&gt; 100MB</a:t>
+                      </a:r>
+                    </a:p>
+                  </a:txBody>
+                  <a:tcPr marT="45747" marB="45747" horzOverflow="overflow">
+                    <a:lnL w="12700" cap="flat" cmpd="sng" algn="ctr">
+                      <a:solidFill>
+                        <a:schemeClr val="tx1"/>
+                      </a:solidFill>
+                      <a:prstDash val="solid"/>
+                      <a:round/>
+                      <a:headEnd type="none" w="med" len="med"/>
+                      <a:tailEnd type="none" w="med" len="med"/>
+                    </a:lnL>
+                    <a:lnR w="12700" cap="flat" cmpd="sng" algn="ctr">
+                      <a:solidFill>
+                        <a:schemeClr val="tx1"/>
+                      </a:solidFill>
+                      <a:prstDash val="solid"/>
+                      <a:round/>
+                      <a:headEnd type="none" w="med" len="med"/>
+                      <a:tailEnd type="none" w="med" len="med"/>
+                    </a:lnR>
+                    <a:lnT w="12700" cap="flat" cmpd="sng" algn="ctr">
+                      <a:solidFill>
+                        <a:schemeClr val="tx1"/>
+                      </a:solidFill>
+                      <a:prstDash val="solid"/>
+                      <a:round/>
+                      <a:headEnd type="none" w="med" len="med"/>
+                      <a:tailEnd type="none" w="med" len="med"/>
+                    </a:lnT>
+                    <a:lnB w="12700" cap="flat" cmpd="sng" algn="ctr">
+                      <a:solidFill>
+                        <a:schemeClr val="tx1"/>
+                      </a:solidFill>
+                      <a:prstDash val="solid"/>
+                      <a:round/>
+                      <a:headEnd type="none" w="med" len="med"/>
+                      <a:tailEnd type="none" w="med" len="med"/>
+                    </a:lnB>
+                    <a:lnTlToBr>
+                      <a:noFill/>
+                    </a:lnTlToBr>
+                    <a:lnBlToTr>
+                      <a:noFill/>
+                    </a:lnBlToTr>
+                    <a:noFill/>
+                  </a:tcPr>
+                </a:tc>
+              </a:tr>
+              <a:tr h="122697">
+                <a:tc gridSpan="2">
+                  <a:txBody>
+                    <a:bodyPr/>
+                    <a:lstStyle/>
+                    <a:p>
+                      <a:pPr marL="0" marR="0" lvl="0" indent="0" algn="l" defTabSz="914400" rtl="0" eaLnBrk="1" fontAlgn="base" latinLnBrk="0" hangingPunct="1">
+                        <a:lnSpc>
+                          <a:spcPct val="100000"/>
+                        </a:lnSpc>
+                        <a:spcBef>
+                          <a:spcPct val="20000"/>
+                        </a:spcBef>
+                        <a:spcAft>
+                          <a:spcPct val="0"/>
+                        </a:spcAft>
+                        <a:buClr>
+                          <a:schemeClr val="tx1"/>
+                        </a:buClr>
+                        <a:buSzTx/>
+                        <a:buFont typeface="Wingdings" pitchFamily="2" charset="2"/>
+                        <a:buNone/>
+                        <a:tabLst/>
+                        <a:defRPr/>
+                      </a:pPr>
+                      <a:r>
+                        <a:rPr kumimoji="0" lang="en-US" altLang="en-US" sz="900" b="0" i="0" u="none" strike="noStrike" cap="none" normalizeH="0" baseline="0" dirty="0" smtClean="0">
+                          <a:ln>
+                            <a:noFill/>
+                          </a:ln>
+                          <a:solidFill>
+                            <a:schemeClr val="tx1"/>
+                          </a:solidFill>
+                          <a:effectLst/>
+                          <a:latin typeface="Arial" charset="0"/>
+                          <a:cs typeface="Arial" charset="0"/>
+                        </a:rPr>
+                        <a:t>US Census Data</a:t>
+                      </a:r>
+                    </a:p>
+                  </a:txBody>
+                  <a:tcPr marT="45747" marB="45747" horzOverflow="overflow">
+                    <a:lnL w="12700" cap="flat" cmpd="sng" algn="ctr">
+                      <a:solidFill>
+                        <a:schemeClr val="tx1"/>
+                      </a:solidFill>
+                      <a:prstDash val="solid"/>
+                      <a:round/>
+                      <a:headEnd type="none" w="med" len="med"/>
+                      <a:tailEnd type="none" w="med" len="med"/>
+                    </a:lnL>
+                    <a:lnR w="12700" cap="flat" cmpd="sng" algn="ctr">
+                      <a:solidFill>
+                        <a:schemeClr val="tx1"/>
+                      </a:solidFill>
+                      <a:prstDash val="solid"/>
+                      <a:round/>
+                      <a:headEnd type="none" w="med" len="med"/>
+                      <a:tailEnd type="none" w="med" len="med"/>
+                    </a:lnR>
+                    <a:lnT w="12700" cap="flat" cmpd="sng" algn="ctr">
+                      <a:solidFill>
+                        <a:schemeClr val="tx1"/>
+                      </a:solidFill>
+                      <a:prstDash val="solid"/>
+                      <a:round/>
+                      <a:headEnd type="none" w="med" len="med"/>
+                      <a:tailEnd type="none" w="med" len="med"/>
+                    </a:lnT>
+                    <a:lnB w="12700" cap="flat" cmpd="sng" algn="ctr">
+                      <a:solidFill>
+                        <a:schemeClr val="tx1"/>
+                      </a:solidFill>
+                      <a:prstDash val="solid"/>
+                      <a:round/>
+                      <a:headEnd type="none" w="med" len="med"/>
+                      <a:tailEnd type="none" w="med" len="med"/>
+                    </a:lnB>
+                    <a:lnTlToBr>
+                      <a:noFill/>
+                    </a:lnTlToBr>
+                    <a:lnBlToTr>
+                      <a:noFill/>
+                    </a:lnBlToTr>
+                    <a:noFill/>
+                  </a:tcPr>
+                </a:tc>
+                <a:tc hMerge="1">
+                  <a:txBody>
+                    <a:bodyPr/>
+                    <a:lstStyle/>
+                    <a:p>
+                      <a:endParaRPr lang="en-US"/>
+                    </a:p>
+                  </a:txBody>
+                  <a:tcPr/>
+                </a:tc>
+                <a:tc>
+                  <a:txBody>
+                    <a:bodyPr/>
+                    <a:lstStyle/>
+                    <a:p>
+                      <a:pPr marL="0" marR="0" indent="0" algn="l" defTabSz="914400" rtl="0" eaLnBrk="1" fontAlgn="auto" latinLnBrk="0" hangingPunct="1">
+                        <a:lnSpc>
+                          <a:spcPct val="100000"/>
+                        </a:lnSpc>
+                        <a:spcBef>
+                          <a:spcPts val="0"/>
+                        </a:spcBef>
+                        <a:spcAft>
+                          <a:spcPts val="0"/>
+                        </a:spcAft>
+                        <a:buClrTx/>
+                        <a:buSzTx/>
+                        <a:buFontTx/>
+                        <a:buNone/>
+                        <a:tabLst/>
+                        <a:defRPr/>
+                      </a:pPr>
+                      <a:r>
+                        <a:rPr lang="en-US" sz="900" dirty="0" smtClean="0"/>
+                        <a:t>http://lehd.ces.census.gov/applications/qwi_online/</a:t>
+                      </a:r>
+                    </a:p>
+                  </a:txBody>
+                  <a:tcPr marT="45747" marB="45747" horzOverflow="overflow">
+                    <a:lnL w="12700" cap="flat" cmpd="sng" algn="ctr">
+                      <a:solidFill>
+                        <a:schemeClr val="tx1"/>
+                      </a:solidFill>
+                      <a:prstDash val="solid"/>
+                      <a:round/>
+                      <a:headEnd type="none" w="med" len="med"/>
+                      <a:tailEnd type="none" w="med" len="med"/>
+                    </a:lnL>
+                    <a:lnR w="12700" cap="flat" cmpd="sng" algn="ctr">
+                      <a:solidFill>
+                        <a:schemeClr val="tx1"/>
+                      </a:solidFill>
+                      <a:prstDash val="solid"/>
+                      <a:round/>
+                      <a:headEnd type="none" w="med" len="med"/>
+                      <a:tailEnd type="none" w="med" len="med"/>
+                    </a:lnR>
+                    <a:lnT w="12700" cap="flat" cmpd="sng" algn="ctr">
+                      <a:solidFill>
+                        <a:schemeClr val="tx1"/>
+                      </a:solidFill>
+                      <a:prstDash val="solid"/>
+                      <a:round/>
+                      <a:headEnd type="none" w="med" len="med"/>
+                      <a:tailEnd type="none" w="med" len="med"/>
+                    </a:lnT>
+                    <a:lnB w="12700" cap="flat" cmpd="sng" algn="ctr">
+                      <a:solidFill>
+                        <a:schemeClr val="tx1"/>
+                      </a:solidFill>
+                      <a:prstDash val="solid"/>
+                      <a:round/>
+                      <a:headEnd type="none" w="med" len="med"/>
+                      <a:tailEnd type="none" w="med" len="med"/>
+                    </a:lnB>
+                    <a:lnTlToBr>
+                      <a:noFill/>
+                    </a:lnTlToBr>
+                    <a:lnBlToTr>
+                      <a:noFill/>
+                    </a:lnBlToTr>
+                    <a:noFill/>
+                  </a:tcPr>
+                </a:tc>
+                <a:tc>
+                  <a:txBody>
+                    <a:bodyPr/>
+                    <a:lstStyle/>
+                    <a:p>
+                      <a:pPr marL="0" marR="0" indent="0" algn="l" defTabSz="914400" rtl="0" eaLnBrk="1" fontAlgn="auto" latinLnBrk="0" hangingPunct="1">
+                        <a:lnSpc>
+                          <a:spcPct val="100000"/>
+                        </a:lnSpc>
+                        <a:spcBef>
+                          <a:spcPts val="0"/>
+                        </a:spcBef>
+                        <a:spcAft>
+                          <a:spcPts val="0"/>
+                        </a:spcAft>
+                        <a:buClrTx/>
+                        <a:buSzTx/>
+                        <a:buFontTx/>
+                        <a:buNone/>
+                        <a:tabLst/>
+                        <a:defRPr/>
+                      </a:pPr>
+                      <a:r>
+                        <a:rPr lang="en-US" sz="900" dirty="0" smtClean="0"/>
+                        <a:t>~10MB</a:t>
+                      </a:r>
                     </a:p>
                   </a:txBody>
                   <a:tcPr marT="45747" marB="45747" horzOverflow="overflow">
@@ -13794,67 +12826,8 @@
                           <a:latin typeface="Arial" charset="0"/>
                           <a:cs typeface="Arial" charset="0"/>
                         </a:rPr>
-                        <a:t>   </a:t>
+                        <a:t>   - Health Data NY</a:t>
                       </a:r>
-                      <a:r>
-                        <a:rPr kumimoji="0" lang="en-US" altLang="en-US" sz="900" b="0" i="0" u="none" strike="noStrike" cap="none" normalizeH="0" baseline="0" dirty="0" smtClean="0">
-                          <a:ln>
-                            <a:noFill/>
-                          </a:ln>
-                          <a:solidFill>
-                            <a:schemeClr val="tx1"/>
-                          </a:solidFill>
-                          <a:effectLst/>
-                          <a:latin typeface="Arial" charset="0"/>
-                          <a:cs typeface="Arial" charset="0"/>
-                        </a:rPr>
-                        <a:t>- Health Data NY</a:t>
-                      </a:r>
-                    </a:p>
-                    <a:p>
-                      <a:pPr marL="0" marR="0" lvl="0" indent="0" algn="l" defTabSz="914400" rtl="0" eaLnBrk="1" fontAlgn="base" latinLnBrk="0" hangingPunct="1">
-                        <a:lnSpc>
-                          <a:spcPct val="100000"/>
-                        </a:lnSpc>
-                        <a:spcBef>
-                          <a:spcPct val="20000"/>
-                        </a:spcBef>
-                        <a:spcAft>
-                          <a:spcPct val="0"/>
-                        </a:spcAft>
-                        <a:buClr>
-                          <a:schemeClr val="tx1"/>
-                        </a:buClr>
-                        <a:buSzTx/>
-                        <a:buFont typeface="Wingdings" pitchFamily="2" charset="2"/>
-                        <a:buNone/>
-                        <a:tabLst/>
-                      </a:pPr>
-                      <a:r>
-                        <a:rPr kumimoji="0" lang="en-US" altLang="en-US" sz="900" b="0" i="0" u="none" strike="noStrike" cap="none" normalizeH="0" baseline="0" dirty="0" smtClean="0">
-                          <a:ln>
-                            <a:noFill/>
-                          </a:ln>
-                          <a:solidFill>
-                            <a:schemeClr val="tx1"/>
-                          </a:solidFill>
-                          <a:effectLst/>
-                          <a:latin typeface="Arial" charset="0"/>
-                          <a:cs typeface="Arial" charset="0"/>
-                        </a:rPr>
-                        <a:t>   - Bureau of Labor statistics</a:t>
-                      </a:r>
-                      <a:endParaRPr kumimoji="0" lang="en-US" altLang="en-US" sz="900" b="0" i="0" u="none" strike="noStrike" cap="none" normalizeH="0" baseline="0" dirty="0" smtClean="0">
-                        <a:ln>
-                          <a:noFill/>
-                        </a:ln>
-                        <a:solidFill>
-                          <a:schemeClr val="tx1"/>
-                        </a:solidFill>
-                        <a:effectLst/>
-                        <a:latin typeface="Arial" charset="0"/>
-                        <a:cs typeface="Arial" charset="0"/>
-                      </a:endParaRPr>
                     </a:p>
                   </a:txBody>
                   <a:tcPr marT="45747" marB="45747" horzOverflow="overflow">
@@ -14097,21 +13070,7 @@
                           <a:latin typeface="Arial" charset="0"/>
                           <a:cs typeface="Arial" charset="0"/>
                         </a:rPr>
-                        <a:t>Data </a:t>
-                      </a:r>
-                      <a:r>
-                        <a:rPr kumimoji="0" lang="en-US" altLang="en-US" sz="1000" b="1" i="0" u="sng" strike="noStrike" cap="none" normalizeH="0" baseline="0" dirty="0" smtClean="0">
-                          <a:ln>
-                            <a:noFill/>
-                          </a:ln>
-                          <a:solidFill>
-                            <a:schemeClr val="tx1"/>
-                          </a:solidFill>
-                          <a:effectLst/>
-                          <a:latin typeface="Arial" charset="0"/>
-                          <a:cs typeface="Arial" charset="0"/>
-                        </a:rPr>
-                        <a:t>Characteristics</a:t>
+                        <a:t>Data Characteristics</a:t>
                       </a:r>
                     </a:p>
                     <a:p>
@@ -14145,106 +13104,7 @@
                           <a:latin typeface="Arial" charset="0"/>
                           <a:cs typeface="Arial" charset="0"/>
                         </a:rPr>
-                        <a:t> Hospital inpatient discharges</a:t>
-                      </a:r>
-                    </a:p>
-                    <a:p>
-                      <a:pPr marL="0" marR="0" lvl="0" indent="0" algn="l" defTabSz="914400" rtl="0" eaLnBrk="1" fontAlgn="base" latinLnBrk="0" hangingPunct="1">
-                        <a:lnSpc>
-                          <a:spcPct val="100000"/>
-                        </a:lnSpc>
-                        <a:spcBef>
-                          <a:spcPct val="20000"/>
-                        </a:spcBef>
-                        <a:spcAft>
-                          <a:spcPct val="0"/>
-                        </a:spcAft>
-                        <a:buClr>
-                          <a:schemeClr val="tx1"/>
-                        </a:buClr>
-                        <a:buSzTx/>
-                        <a:buFontTx/>
-                        <a:buChar char="-"/>
-                        <a:tabLst/>
-                      </a:pPr>
-                      <a:r>
-                        <a:rPr kumimoji="0" lang="en-US" altLang="en-US" sz="900" b="0" i="0" u="none" strike="noStrike" cap="none" normalizeH="0" baseline="0" dirty="0" smtClean="0">
-                          <a:ln>
-                            <a:noFill/>
-                          </a:ln>
-                          <a:solidFill>
-                            <a:schemeClr val="tx1"/>
-                          </a:solidFill>
-                          <a:effectLst/>
-                          <a:latin typeface="Arial" charset="0"/>
-                          <a:cs typeface="Arial" charset="0"/>
-                        </a:rPr>
-                        <a:t> Employment / Unemployment rates</a:t>
-                      </a:r>
-                    </a:p>
-                    <a:p>
-                      <a:pPr marL="0" marR="0" lvl="0" indent="0" algn="l" defTabSz="914400" rtl="0" eaLnBrk="1" fontAlgn="base" latinLnBrk="0" hangingPunct="1">
-                        <a:lnSpc>
-                          <a:spcPct val="100000"/>
-                        </a:lnSpc>
-                        <a:spcBef>
-                          <a:spcPct val="20000"/>
-                        </a:spcBef>
-                        <a:spcAft>
-                          <a:spcPct val="0"/>
-                        </a:spcAft>
-                        <a:buClr>
-                          <a:schemeClr val="tx1"/>
-                        </a:buClr>
-                        <a:buSzTx/>
-                        <a:buFontTx/>
-                        <a:buChar char="-"/>
-                        <a:tabLst/>
-                      </a:pPr>
-                      <a:endParaRPr kumimoji="0" lang="en-US" altLang="en-US" sz="900" b="0" i="0" u="none" strike="noStrike" cap="none" normalizeH="0" baseline="0" dirty="0" smtClean="0">
-                        <a:ln>
-                          <a:noFill/>
-                        </a:ln>
-                        <a:solidFill>
-                          <a:schemeClr val="tx1"/>
-                        </a:solidFill>
-                        <a:effectLst/>
-                        <a:latin typeface="Arial" charset="0"/>
-                        <a:cs typeface="Arial" charset="0"/>
-                      </a:endParaRPr>
-                    </a:p>
-                    <a:p>
-                      <a:pPr marL="0" marR="0" lvl="0" indent="0" algn="l" defTabSz="914400" rtl="0" eaLnBrk="1" fontAlgn="base" latinLnBrk="0" hangingPunct="1">
-                        <a:lnSpc>
-                          <a:spcPct val="100000"/>
-                        </a:lnSpc>
-                        <a:spcBef>
-                          <a:spcPct val="20000"/>
-                        </a:spcBef>
-                        <a:spcAft>
-                          <a:spcPct val="0"/>
-                        </a:spcAft>
-                        <a:buClr>
-                          <a:schemeClr val="tx1"/>
-                        </a:buClr>
-                        <a:buSzTx/>
-                        <a:buFontTx/>
-                        <a:buNone/>
-                        <a:tabLst/>
-                      </a:pPr>
-                      <a:r>
-                        <a:rPr kumimoji="0" lang="en-US" altLang="en-US" sz="900" b="0" i="0" u="none" strike="noStrike" cap="none" normalizeH="0" baseline="0" dirty="0" smtClean="0">
-                          <a:ln>
-                            <a:noFill/>
-                          </a:ln>
-                          <a:solidFill>
-                            <a:schemeClr val="tx1"/>
-                          </a:solidFill>
-                          <a:effectLst/>
-                          <a:latin typeface="Arial" charset="0"/>
-                          <a:cs typeface="Arial" charset="0"/>
-                        </a:rPr>
-                        <a:t>- Is data source a </a:t>
+                        <a:t> Historical hospital inpatient discharges for the state of NY by </a:t>
                       </a:r>
                       <a:r>
                         <a:rPr kumimoji="0" lang="en-US" altLang="en-US" sz="900" b="0" i="0" u="none" strike="noStrike" cap="none" normalizeH="0" baseline="0" dirty="0" err="1" smtClean="0">
@@ -14258,7 +13118,7 @@
                           <a:latin typeface="Arial" charset="0"/>
                           <a:cs typeface="Arial" charset="0"/>
                         </a:rPr>
-                        <a:t>realtime</a:t>
+                        <a:t>zipcode</a:t>
                       </a:r>
                       <a:r>
                         <a:rPr kumimoji="0" lang="en-US" altLang="en-US" sz="900" b="0" i="0" u="none" strike="noStrike" cap="none" normalizeH="0" baseline="0" dirty="0" smtClean="0">
@@ -14272,103 +13132,7 @@
                           <a:latin typeface="Arial" charset="0"/>
                           <a:cs typeface="Arial" charset="0"/>
                         </a:rPr>
-                        <a:t> source?</a:t>
-                      </a:r>
-                    </a:p>
-                    <a:p>
-                      <a:pPr marL="0" marR="0" lvl="0" indent="0" algn="l" defTabSz="914400" rtl="0" eaLnBrk="1" fontAlgn="base" latinLnBrk="0" hangingPunct="1">
-                        <a:lnSpc>
-                          <a:spcPct val="100000"/>
-                        </a:lnSpc>
-                        <a:spcBef>
-                          <a:spcPct val="20000"/>
-                        </a:spcBef>
-                        <a:spcAft>
-                          <a:spcPct val="0"/>
-                        </a:spcAft>
-                        <a:buClr>
-                          <a:schemeClr val="tx1"/>
-                        </a:buClr>
-                        <a:buSzTx/>
-                        <a:buFontTx/>
-                        <a:buNone/>
-                        <a:tabLst/>
-                      </a:pPr>
-                      <a:r>
-                        <a:rPr kumimoji="0" lang="en-US" altLang="en-US" sz="900" b="0" i="0" u="none" strike="noStrike" cap="none" normalizeH="0" baseline="0" dirty="0" smtClean="0">
-                          <a:ln>
-                            <a:noFill/>
-                          </a:ln>
-                          <a:solidFill>
-                            <a:schemeClr val="tx1"/>
-                          </a:solidFill>
-                          <a:effectLst/>
-                          <a:latin typeface="Arial" charset="0"/>
-                          <a:cs typeface="Arial" charset="0"/>
-                        </a:rPr>
-                        <a:t>- Is it </a:t>
-                      </a:r>
-                      <a:r>
-                        <a:rPr kumimoji="0" lang="en-US" altLang="en-US" sz="900" b="0" i="0" u="none" strike="noStrike" cap="none" normalizeH="0" baseline="0" dirty="0" err="1" smtClean="0">
-                          <a:ln>
-                            <a:noFill/>
-                          </a:ln>
-                          <a:solidFill>
-                            <a:schemeClr val="tx1"/>
-                          </a:solidFill>
-                          <a:effectLst/>
-                          <a:latin typeface="Arial" charset="0"/>
-                          <a:cs typeface="Arial" charset="0"/>
-                        </a:rPr>
-                        <a:t>realtime</a:t>
-                      </a:r>
-                      <a:r>
-                        <a:rPr kumimoji="0" lang="en-US" altLang="en-US" sz="900" b="0" i="0" u="none" strike="noStrike" cap="none" normalizeH="0" baseline="0" dirty="0" smtClean="0">
-                          <a:ln>
-                            <a:noFill/>
-                          </a:ln>
-                          <a:solidFill>
-                            <a:schemeClr val="tx1"/>
-                          </a:solidFill>
-                          <a:effectLst/>
-                          <a:latin typeface="Arial" charset="0"/>
-                          <a:cs typeface="Arial" charset="0"/>
-                        </a:rPr>
-                        <a:t> and stored (e.g. a  log)? </a:t>
-                      </a:r>
-                    </a:p>
-                    <a:p>
-                      <a:pPr marL="0" marR="0" lvl="0" indent="0" algn="l" defTabSz="914400" rtl="0" eaLnBrk="1" fontAlgn="base" latinLnBrk="0" hangingPunct="1">
-                        <a:lnSpc>
-                          <a:spcPct val="100000"/>
-                        </a:lnSpc>
-                        <a:spcBef>
-                          <a:spcPct val="20000"/>
-                        </a:spcBef>
-                        <a:spcAft>
-                          <a:spcPct val="0"/>
-                        </a:spcAft>
-                        <a:buClr>
-                          <a:schemeClr val="tx1"/>
-                        </a:buClr>
-                        <a:buSzTx/>
-                        <a:buFont typeface="Wingdings" pitchFamily="2" charset="2"/>
-                        <a:buNone/>
-                        <a:tabLst/>
-                      </a:pPr>
-                      <a:r>
-                        <a:rPr kumimoji="0" lang="en-US" altLang="en-US" sz="900" b="0" i="0" u="none" strike="noStrike" cap="none" normalizeH="0" baseline="0" dirty="0" smtClean="0">
-                          <a:ln>
-                            <a:noFill/>
-                          </a:ln>
-                          <a:solidFill>
-                            <a:schemeClr val="tx1"/>
-                          </a:solidFill>
-                          <a:effectLst/>
-                          <a:latin typeface="Arial" charset="0"/>
-                          <a:cs typeface="Arial" charset="0"/>
-                        </a:rPr>
-                        <a:t>- Is it statically loaded data (e.g. historic)?</a:t>
+                        <a:t>. (CSV)</a:t>
                       </a:r>
                     </a:p>
                   </a:txBody>
@@ -14452,17 +13216,6 @@
                         </a:rPr>
                         <a:t>Data Frequency</a:t>
                       </a:r>
-                      <a:endParaRPr kumimoji="0" lang="en-US" altLang="en-US" sz="1000" b="1" i="0" u="sng" strike="noStrike" cap="none" normalizeH="0" baseline="0" dirty="0" smtClean="0">
-                        <a:ln>
-                          <a:noFill/>
-                        </a:ln>
-                        <a:solidFill>
-                          <a:schemeClr val="tx1"/>
-                        </a:solidFill>
-                        <a:effectLst/>
-                        <a:latin typeface="Arial" charset="0"/>
-                        <a:cs typeface="Arial" charset="0"/>
-                      </a:endParaRPr>
                     </a:p>
                     <a:p>
                       <a:pPr marL="0" marR="0" lvl="0" indent="0" algn="l" defTabSz="914400" rtl="0" eaLnBrk="1" fontAlgn="base" latinLnBrk="0" hangingPunct="1">
@@ -14495,134 +13248,7 @@
                           <a:latin typeface="Arial" charset="0"/>
                           <a:cs typeface="Arial" charset="0"/>
                         </a:rPr>
-                        <a:t> Annual</a:t>
-                      </a:r>
-                    </a:p>
-                    <a:p>
-                      <a:pPr marL="0" marR="0" lvl="0" indent="0" algn="l" defTabSz="914400" rtl="0" eaLnBrk="1" fontAlgn="base" latinLnBrk="0" hangingPunct="1">
-                        <a:lnSpc>
-                          <a:spcPct val="100000"/>
-                        </a:lnSpc>
-                        <a:spcBef>
-                          <a:spcPct val="20000"/>
-                        </a:spcBef>
-                        <a:spcAft>
-                          <a:spcPct val="0"/>
-                        </a:spcAft>
-                        <a:buClr>
-                          <a:schemeClr val="tx1"/>
-                        </a:buClr>
-                        <a:buSzTx/>
-                        <a:buFontTx/>
-                        <a:buChar char="-"/>
-                        <a:tabLst/>
-                      </a:pPr>
-                      <a:r>
-                        <a:rPr kumimoji="0" lang="en-US" altLang="en-US" sz="900" b="0" i="0" u="none" strike="noStrike" cap="none" normalizeH="0" baseline="0" dirty="0" smtClean="0">
-                          <a:ln>
-                            <a:noFill/>
-                          </a:ln>
-                          <a:solidFill>
-                            <a:schemeClr val="tx1"/>
-                          </a:solidFill>
-                          <a:effectLst/>
-                          <a:latin typeface="Arial" charset="0"/>
-                          <a:cs typeface="Arial" charset="0"/>
-                        </a:rPr>
-                        <a:t> Annual</a:t>
-                      </a:r>
-                    </a:p>
-                    <a:p>
-                      <a:pPr marL="0" marR="0" lvl="0" indent="0" algn="l" defTabSz="914400" rtl="0" eaLnBrk="1" fontAlgn="base" latinLnBrk="0" hangingPunct="1">
-                        <a:lnSpc>
-                          <a:spcPct val="100000"/>
-                        </a:lnSpc>
-                        <a:spcBef>
-                          <a:spcPct val="20000"/>
-                        </a:spcBef>
-                        <a:spcAft>
-                          <a:spcPct val="0"/>
-                        </a:spcAft>
-                        <a:buClr>
-                          <a:schemeClr val="tx1"/>
-                        </a:buClr>
-                        <a:buSzTx/>
-                        <a:buFontTx/>
-                        <a:buChar char="-"/>
-                        <a:tabLst/>
-                      </a:pPr>
-                      <a:endParaRPr kumimoji="0" lang="en-US" altLang="en-US" sz="900" b="0" i="0" u="none" strike="noStrike" cap="none" normalizeH="0" baseline="0" dirty="0" smtClean="0">
-                        <a:ln>
-                          <a:noFill/>
-                        </a:ln>
-                        <a:solidFill>
-                          <a:schemeClr val="tx1"/>
-                        </a:solidFill>
-                        <a:effectLst/>
-                        <a:latin typeface="Arial" charset="0"/>
-                        <a:cs typeface="Arial" charset="0"/>
-                      </a:endParaRPr>
-                    </a:p>
-                    <a:p>
-                      <a:pPr marL="0" marR="0" lvl="0" indent="0" algn="l" defTabSz="914400" rtl="0" eaLnBrk="1" fontAlgn="base" latinLnBrk="0" hangingPunct="1">
-                        <a:lnSpc>
-                          <a:spcPct val="100000"/>
-                        </a:lnSpc>
-                        <a:spcBef>
-                          <a:spcPct val="20000"/>
-                        </a:spcBef>
-                        <a:spcAft>
-                          <a:spcPct val="0"/>
-                        </a:spcAft>
-                        <a:buClr>
-                          <a:schemeClr val="tx1"/>
-                        </a:buClr>
-                        <a:buSzTx/>
-                        <a:buFontTx/>
-                        <a:buChar char="-"/>
-                        <a:tabLst/>
-                      </a:pPr>
-                      <a:r>
-                        <a:rPr kumimoji="0" lang="en-US" altLang="en-US" sz="900" b="0" i="0" u="none" strike="noStrike" cap="none" normalizeH="0" baseline="0" dirty="0" smtClean="0">
-                          <a:ln>
-                            <a:noFill/>
-                          </a:ln>
-                          <a:solidFill>
-                            <a:schemeClr val="tx1"/>
-                          </a:solidFill>
-                          <a:effectLst/>
-                          <a:latin typeface="Arial" charset="0"/>
-                          <a:cs typeface="Arial" charset="0"/>
-                        </a:rPr>
-                        <a:t> If </a:t>
-                      </a:r>
-                      <a:r>
-                        <a:rPr kumimoji="0" lang="en-US" altLang="en-US" sz="900" b="0" i="0" u="none" strike="noStrike" cap="none" normalizeH="0" baseline="0" dirty="0" err="1" smtClean="0">
-                          <a:ln>
-                            <a:noFill/>
-                          </a:ln>
-                          <a:solidFill>
-                            <a:schemeClr val="tx1"/>
-                          </a:solidFill>
-                          <a:effectLst/>
-                          <a:latin typeface="Arial" charset="0"/>
-                          <a:cs typeface="Arial" charset="0"/>
-                        </a:rPr>
-                        <a:t>realtime</a:t>
-                      </a:r>
-                      <a:r>
-                        <a:rPr kumimoji="0" lang="en-US" altLang="en-US" sz="900" b="0" i="0" u="none" strike="noStrike" cap="none" normalizeH="0" baseline="0" dirty="0" smtClean="0">
-                          <a:ln>
-                            <a:noFill/>
-                          </a:ln>
-                          <a:solidFill>
-                            <a:schemeClr val="tx1"/>
-                          </a:solidFill>
-                          <a:effectLst/>
-                          <a:latin typeface="Arial" charset="0"/>
-                          <a:cs typeface="Arial" charset="0"/>
-                        </a:rPr>
-                        <a:t> data, what is the frequency?</a:t>
+                        <a:t> Annual (2009-2012)</a:t>
                       </a:r>
                     </a:p>
                   </a:txBody>
@@ -14853,7 +13479,7 @@
                           <a:latin typeface="Arial" charset="0"/>
                           <a:cs typeface="Arial" charset="0"/>
                         </a:rPr>
-                        <a:t>Data Source 1..n</a:t>
+                        <a:t>- Bureau of Labor statistics/Census</a:t>
                       </a:r>
                     </a:p>
                   </a:txBody>
@@ -15084,18 +13710,22 @@
                         <a:buFont typeface="Wingdings" pitchFamily="2" charset="2"/>
                         <a:buNone/>
                         <a:tabLst/>
+                        <a:defRPr/>
                       </a:pPr>
-                      <a:endParaRPr kumimoji="0" lang="en-US" altLang="en-US" sz="900" b="0" i="0" u="none" strike="noStrike" cap="none" normalizeH="0" baseline="0" dirty="0" smtClean="0">
-                        <a:ln>
-                          <a:noFill/>
-                        </a:ln>
-                        <a:solidFill>
-                          <a:schemeClr val="tx1"/>
-                        </a:solidFill>
-                        <a:effectLst/>
-                        <a:latin typeface="Arial" charset="0"/>
-                        <a:cs typeface="Arial" charset="0"/>
-                      </a:endParaRPr>
+                      <a:r>
+                        <a:rPr kumimoji="0" lang="en-US" altLang="en-US" sz="900" b="0" i="0" u="none" strike="noStrike" cap="none" normalizeH="0" baseline="0" dirty="0" smtClean="0">
+                          <a:ln>
+                            <a:noFill/>
+                          </a:ln>
+                          <a:solidFill>
+                            <a:schemeClr val="tx1"/>
+                          </a:solidFill>
+                          <a:effectLst/>
+                          <a:latin typeface="Arial" charset="0"/>
+                          <a:cs typeface="Arial" charset="0"/>
+                        </a:rPr>
+                        <a:t>- Employment / Unemployment rates by county for the country.  We will focus on NY state because that overlaps with the health data we have by year and location.  We hope to use Census data to get finer-grained breakdowns of employment by job type. (TXT)</a:t>
+                      </a:r>
                     </a:p>
                   </a:txBody>
                   <a:tcPr marT="45747" marB="45747" horzOverflow="overflow">
@@ -15146,6 +13776,593 @@
                     <a:bodyPr/>
                     <a:lstStyle/>
                     <a:p>
+                      <a:pPr marL="0" marR="0" lvl="0" indent="0" algn="l" defTabSz="914400" rtl="0" eaLnBrk="1" fontAlgn="auto" latinLnBrk="0" hangingPunct="1">
+                        <a:lnSpc>
+                          <a:spcPct val="100000"/>
+                        </a:lnSpc>
+                        <a:spcBef>
+                          <a:spcPts val="0"/>
+                        </a:spcBef>
+                        <a:spcAft>
+                          <a:spcPts val="0"/>
+                        </a:spcAft>
+                        <a:buClrTx/>
+                        <a:buSzTx/>
+                        <a:buFontTx/>
+                        <a:buNone/>
+                        <a:tabLst/>
+                        <a:defRPr/>
+                      </a:pPr>
+                      <a:r>
+                        <a:rPr kumimoji="0" lang="en-US" altLang="en-US" sz="900" b="0" i="0" u="none" strike="noStrike" cap="none" normalizeH="0" baseline="0" dirty="0" smtClean="0">
+                          <a:ln>
+                            <a:noFill/>
+                          </a:ln>
+                          <a:solidFill>
+                            <a:schemeClr val="tx1"/>
+                          </a:solidFill>
+                          <a:effectLst/>
+                          <a:latin typeface="Arial" charset="0"/>
+                          <a:cs typeface="Arial" charset="0"/>
+                        </a:rPr>
+                        <a:t>- Annual (2009-2012)</a:t>
+                      </a:r>
+                    </a:p>
+                    <a:p>
+                      <a:endParaRPr lang="en-US" sz="900" dirty="0"/>
+                    </a:p>
+                  </a:txBody>
+                  <a:tcPr marT="45747" marB="45747" horzOverflow="overflow">
+                    <a:lnL w="12700" cap="flat" cmpd="sng" algn="ctr">
+                      <a:solidFill>
+                        <a:schemeClr val="tx1"/>
+                      </a:solidFill>
+                      <a:prstDash val="solid"/>
+                      <a:round/>
+                      <a:headEnd type="none" w="med" len="med"/>
+                      <a:tailEnd type="none" w="med" len="med"/>
+                    </a:lnL>
+                    <a:lnR w="12700" cap="flat" cmpd="sng" algn="ctr">
+                      <a:solidFill>
+                        <a:schemeClr val="tx1"/>
+                      </a:solidFill>
+                      <a:prstDash val="solid"/>
+                      <a:round/>
+                      <a:headEnd type="none" w="med" len="med"/>
+                      <a:tailEnd type="none" w="med" len="med"/>
+                    </a:lnR>
+                    <a:solidFill>
+                      <a:schemeClr val="bg1"/>
+                    </a:solidFill>
+                  </a:tcPr>
+                </a:tc>
+              </a:tr>
+              <a:tr h="218233">
+                <a:tc>
+                  <a:txBody>
+                    <a:bodyPr/>
+                    <a:lstStyle/>
+                    <a:p>
+                      <a:pPr marL="0" marR="0" lvl="0" indent="0" algn="l" defTabSz="914400" rtl="0" eaLnBrk="1" fontAlgn="base" latinLnBrk="0" hangingPunct="1">
+                        <a:lnSpc>
+                          <a:spcPct val="100000"/>
+                        </a:lnSpc>
+                        <a:spcBef>
+                          <a:spcPct val="20000"/>
+                        </a:spcBef>
+                        <a:spcAft>
+                          <a:spcPct val="0"/>
+                        </a:spcAft>
+                        <a:buClr>
+                          <a:schemeClr val="tx1"/>
+                        </a:buClr>
+                        <a:buSzTx/>
+                        <a:buFont typeface="Wingdings" pitchFamily="2" charset="2"/>
+                        <a:buNone/>
+                        <a:tabLst/>
+                      </a:pPr>
+                      <a:r>
+                        <a:rPr kumimoji="0" lang="en-US" altLang="en-US" sz="900" b="0" i="0" u="none" strike="noStrike" cap="none" normalizeH="0" baseline="0" dirty="0" smtClean="0">
+                          <a:ln>
+                            <a:noFill/>
+                          </a:ln>
+                          <a:solidFill>
+                            <a:schemeClr val="tx1"/>
+                          </a:solidFill>
+                          <a:effectLst/>
+                          <a:latin typeface="Arial" charset="0"/>
+                          <a:cs typeface="Arial" charset="0"/>
+                        </a:rPr>
+                        <a:t>- Status date and geo-tagged specific historical status messages for NY</a:t>
+                      </a:r>
+                    </a:p>
+                  </a:txBody>
+                  <a:tcPr marT="45747" marB="45747" horzOverflow="overflow">
+                    <a:lnL w="12700" cap="flat" cmpd="sng" algn="ctr">
+                      <a:solidFill>
+                        <a:schemeClr val="tx1"/>
+                      </a:solidFill>
+                      <a:prstDash val="solid"/>
+                      <a:round/>
+                      <a:headEnd type="none" w="med" len="med"/>
+                      <a:tailEnd type="none" w="med" len="med"/>
+                    </a:lnL>
+                    <a:lnR w="12700" cap="flat" cmpd="sng" algn="ctr">
+                      <a:solidFill>
+                        <a:schemeClr val="tx1"/>
+                      </a:solidFill>
+                      <a:prstDash val="solid"/>
+                      <a:round/>
+                      <a:headEnd type="none" w="med" len="med"/>
+                      <a:tailEnd type="none" w="med" len="med"/>
+                    </a:lnR>
+                    <a:lnT w="12700" cap="flat" cmpd="sng" algn="ctr">
+                      <a:solidFill>
+                        <a:schemeClr val="tx1"/>
+                      </a:solidFill>
+                      <a:prstDash val="solid"/>
+                      <a:round/>
+                      <a:headEnd type="none" w="med" len="med"/>
+                      <a:tailEnd type="none" w="med" len="med"/>
+                    </a:lnT>
+                    <a:lnB w="12700" cap="flat" cmpd="sng" algn="ctr">
+                      <a:solidFill>
+                        <a:schemeClr val="tx1"/>
+                      </a:solidFill>
+                      <a:prstDash val="solid"/>
+                      <a:round/>
+                      <a:headEnd type="none" w="med" len="med"/>
+                      <a:tailEnd type="none" w="med" len="med"/>
+                    </a:lnB>
+                    <a:lnTlToBr>
+                      <a:noFill/>
+                    </a:lnTlToBr>
+                    <a:lnBlToTr>
+                      <a:noFill/>
+                    </a:lnBlToTr>
+                    <a:solidFill>
+                      <a:schemeClr val="bg1"/>
+                    </a:solidFill>
+                  </a:tcPr>
+                </a:tc>
+                <a:tc gridSpan="2">
+                  <a:txBody>
+                    <a:bodyPr/>
+                    <a:lstStyle/>
+                    <a:p>
+                      <a:pPr marL="0" marR="0" lvl="0" indent="0" algn="l" defTabSz="914400" rtl="0" eaLnBrk="1" fontAlgn="base" latinLnBrk="0" hangingPunct="1">
+                        <a:lnSpc>
+                          <a:spcPct val="100000"/>
+                        </a:lnSpc>
+                        <a:spcBef>
+                          <a:spcPct val="20000"/>
+                        </a:spcBef>
+                        <a:spcAft>
+                          <a:spcPct val="0"/>
+                        </a:spcAft>
+                        <a:buClr>
+                          <a:schemeClr val="tx1"/>
+                        </a:buClr>
+                        <a:buSzTx/>
+                        <a:buFont typeface="Wingdings" pitchFamily="2" charset="2"/>
+                        <a:buNone/>
+                        <a:tabLst/>
+                        <a:defRPr/>
+                      </a:pPr>
+                      <a:r>
+                        <a:rPr kumimoji="0" lang="en-US" altLang="en-US" sz="900" b="0" i="0" u="none" strike="noStrike" cap="none" normalizeH="0" baseline="0" dirty="0" smtClean="0">
+                          <a:ln>
+                            <a:noFill/>
+                          </a:ln>
+                          <a:solidFill>
+                            <a:schemeClr val="tx1"/>
+                          </a:solidFill>
+                          <a:effectLst/>
+                          <a:latin typeface="Arial" charset="0"/>
+                          <a:cs typeface="Arial" charset="0"/>
+                        </a:rPr>
+                        <a:t>- Using historic twitter status messages based on keyword, and location, we want to attempt to correlate keywords to the reported unemployment numbers.  Then, because we can get twitter messages in </a:t>
+                      </a:r>
+                      <a:r>
+                        <a:rPr kumimoji="0" lang="en-US" altLang="en-US" sz="900" b="0" i="0" u="none" strike="noStrike" cap="none" normalizeH="0" baseline="0" dirty="0" err="1" smtClean="0">
+                          <a:ln>
+                            <a:noFill/>
+                          </a:ln>
+                          <a:solidFill>
+                            <a:schemeClr val="tx1"/>
+                          </a:solidFill>
+                          <a:effectLst/>
+                          <a:latin typeface="Arial" charset="0"/>
+                          <a:cs typeface="Arial" charset="0"/>
+                        </a:rPr>
+                        <a:t>realtime</a:t>
+                      </a:r>
+                      <a:r>
+                        <a:rPr kumimoji="0" lang="en-US" altLang="en-US" sz="900" b="0" i="0" u="none" strike="noStrike" cap="none" normalizeH="0" baseline="0" dirty="0" smtClean="0">
+                          <a:ln>
+                            <a:noFill/>
+                          </a:ln>
+                          <a:solidFill>
+                            <a:schemeClr val="tx1"/>
+                          </a:solidFill>
+                          <a:effectLst/>
+                          <a:latin typeface="Arial" charset="0"/>
+                          <a:cs typeface="Arial" charset="0"/>
+                        </a:rPr>
+                        <a:t>, we can use that as a predictor of health statistics (API)</a:t>
+                      </a:r>
+                    </a:p>
+                  </a:txBody>
+                  <a:tcPr marT="45747" marB="45747" horzOverflow="overflow">
+                    <a:lnL w="12700" cap="flat" cmpd="sng" algn="ctr">
+                      <a:solidFill>
+                        <a:schemeClr val="tx1"/>
+                      </a:solidFill>
+                      <a:prstDash val="solid"/>
+                      <a:round/>
+                      <a:headEnd type="none" w="med" len="med"/>
+                      <a:tailEnd type="none" w="med" len="med"/>
+                    </a:lnL>
+                    <a:lnR w="12700" cap="flat" cmpd="sng" algn="ctr">
+                      <a:solidFill>
+                        <a:schemeClr val="tx1"/>
+                      </a:solidFill>
+                      <a:prstDash val="solid"/>
+                      <a:round/>
+                      <a:headEnd type="none" w="med" len="med"/>
+                      <a:tailEnd type="none" w="med" len="med"/>
+                    </a:lnR>
+                    <a:lnT w="12700" cap="flat" cmpd="sng" algn="ctr">
+                      <a:solidFill>
+                        <a:schemeClr val="tx1"/>
+                      </a:solidFill>
+                      <a:prstDash val="solid"/>
+                      <a:round/>
+                      <a:headEnd type="none" w="med" len="med"/>
+                      <a:tailEnd type="none" w="med" len="med"/>
+                    </a:lnT>
+                    <a:lnB w="12700" cap="flat" cmpd="sng" algn="ctr">
+                      <a:solidFill>
+                        <a:schemeClr val="tx1"/>
+                      </a:solidFill>
+                      <a:prstDash val="solid"/>
+                      <a:round/>
+                      <a:headEnd type="none" w="med" len="med"/>
+                      <a:tailEnd type="none" w="med" len="med"/>
+                    </a:lnB>
+                    <a:solidFill>
+                      <a:schemeClr val="bg1"/>
+                    </a:solidFill>
+                  </a:tcPr>
+                </a:tc>
+                <a:tc hMerge="1">
+                  <a:txBody>
+                    <a:bodyPr/>
+                    <a:lstStyle/>
+                    <a:p>
+                      <a:endParaRPr lang="en-US"/>
+                    </a:p>
+                  </a:txBody>
+                  <a:tcPr/>
+                </a:tc>
+                <a:tc>
+                  <a:txBody>
+                    <a:bodyPr/>
+                    <a:lstStyle/>
+                    <a:p>
+                      <a:pPr marL="0" marR="0" lvl="0" indent="0" algn="l" defTabSz="914400" rtl="0" eaLnBrk="1" fontAlgn="base" latinLnBrk="0" hangingPunct="1">
+                        <a:lnSpc>
+                          <a:spcPct val="100000"/>
+                        </a:lnSpc>
+                        <a:spcBef>
+                          <a:spcPct val="20000"/>
+                        </a:spcBef>
+                        <a:spcAft>
+                          <a:spcPct val="0"/>
+                        </a:spcAft>
+                        <a:buClr>
+                          <a:schemeClr val="tx1"/>
+                        </a:buClr>
+                        <a:buSzTx/>
+                        <a:buFontTx/>
+                        <a:buNone/>
+                        <a:tabLst/>
+                      </a:pPr>
+                      <a:r>
+                        <a:rPr kumimoji="0" lang="en-US" altLang="en-US" sz="900" b="0" i="0" u="none" strike="noStrike" cap="none" normalizeH="0" baseline="0" dirty="0" smtClean="0">
+                          <a:ln>
+                            <a:noFill/>
+                          </a:ln>
+                          <a:solidFill>
+                            <a:schemeClr val="tx1"/>
+                          </a:solidFill>
+                          <a:effectLst/>
+                          <a:latin typeface="Arial" charset="0"/>
+                          <a:cs typeface="Arial" charset="0"/>
+                        </a:rPr>
+                        <a:t>- 100 per day historical (2009-2012)</a:t>
+                      </a:r>
+                    </a:p>
+                    <a:p>
+                      <a:pPr marL="0" marR="0" lvl="0" indent="0" algn="l" defTabSz="914400" rtl="0" eaLnBrk="1" fontAlgn="base" latinLnBrk="0" hangingPunct="1">
+                        <a:lnSpc>
+                          <a:spcPct val="100000"/>
+                        </a:lnSpc>
+                        <a:spcBef>
+                          <a:spcPct val="20000"/>
+                        </a:spcBef>
+                        <a:spcAft>
+                          <a:spcPct val="0"/>
+                        </a:spcAft>
+                        <a:buClr>
+                          <a:schemeClr val="tx1"/>
+                        </a:buClr>
+                        <a:buSzTx/>
+                        <a:buFontTx/>
+                        <a:buNone/>
+                        <a:tabLst/>
+                      </a:pPr>
+                      <a:r>
+                        <a:rPr kumimoji="0" lang="en-US" altLang="en-US" sz="900" b="0" i="0" u="none" strike="noStrike" cap="none" normalizeH="0" baseline="0" dirty="0" smtClean="0">
+                          <a:ln>
+                            <a:noFill/>
+                          </a:ln>
+                          <a:solidFill>
+                            <a:schemeClr val="tx1"/>
+                          </a:solidFill>
+                          <a:effectLst/>
+                          <a:latin typeface="Arial" charset="0"/>
+                          <a:cs typeface="Arial" charset="0"/>
+                        </a:rPr>
+                        <a:t>- </a:t>
+                      </a:r>
+                      <a:r>
+                        <a:rPr kumimoji="0" lang="en-US" altLang="en-US" sz="900" b="0" i="0" u="none" strike="noStrike" cap="none" normalizeH="0" baseline="0" dirty="0" err="1" smtClean="0">
+                          <a:ln>
+                            <a:noFill/>
+                          </a:ln>
+                          <a:solidFill>
+                            <a:schemeClr val="tx1"/>
+                          </a:solidFill>
+                          <a:effectLst/>
+                          <a:latin typeface="Arial" charset="0"/>
+                          <a:cs typeface="Arial" charset="0"/>
+                        </a:rPr>
+                        <a:t>Realtime</a:t>
+                      </a:r>
+                      <a:r>
+                        <a:rPr kumimoji="0" lang="en-US" altLang="en-US" sz="900" b="0" i="0" u="none" strike="noStrike" cap="none" normalizeH="0" baseline="0" dirty="0" smtClean="0">
+                          <a:ln>
+                            <a:noFill/>
+                          </a:ln>
+                          <a:solidFill>
+                            <a:schemeClr val="tx1"/>
+                          </a:solidFill>
+                          <a:effectLst/>
+                          <a:latin typeface="Arial" charset="0"/>
+                          <a:cs typeface="Arial" charset="0"/>
+                        </a:rPr>
+                        <a:t>…</a:t>
+                      </a:r>
+                    </a:p>
+                    <a:p>
+                      <a:endParaRPr lang="en-US" sz="900" dirty="0"/>
+                    </a:p>
+                  </a:txBody>
+                  <a:tcPr marT="45747" marB="45747" horzOverflow="overflow">
+                    <a:lnL w="12700" cap="flat" cmpd="sng" algn="ctr">
+                      <a:solidFill>
+                        <a:schemeClr val="tx1"/>
+                      </a:solidFill>
+                      <a:prstDash val="solid"/>
+                      <a:round/>
+                      <a:headEnd type="none" w="med" len="med"/>
+                      <a:tailEnd type="none" w="med" len="med"/>
+                    </a:lnL>
+                    <a:lnR w="12700" cap="flat" cmpd="sng" algn="ctr">
+                      <a:solidFill>
+                        <a:schemeClr val="tx1"/>
+                      </a:solidFill>
+                      <a:prstDash val="solid"/>
+                      <a:round/>
+                      <a:headEnd type="none" w="med" len="med"/>
+                      <a:tailEnd type="none" w="med" len="med"/>
+                    </a:lnR>
+                    <a:solidFill>
+                      <a:schemeClr val="bg1"/>
+                    </a:solidFill>
+                  </a:tcPr>
+                </a:tc>
+              </a:tr>
+              <a:tr h="218233">
+                <a:tc>
+                  <a:txBody>
+                    <a:bodyPr/>
+                    <a:lstStyle/>
+                    <a:p>
+                      <a:pPr marL="0" marR="0" lvl="0" indent="0" algn="l" defTabSz="914400" rtl="0" eaLnBrk="1" fontAlgn="base" latinLnBrk="0" hangingPunct="1">
+                        <a:lnSpc>
+                          <a:spcPct val="100000"/>
+                        </a:lnSpc>
+                        <a:spcBef>
+                          <a:spcPct val="20000"/>
+                        </a:spcBef>
+                        <a:spcAft>
+                          <a:spcPct val="0"/>
+                        </a:spcAft>
+                        <a:buClr>
+                          <a:schemeClr val="tx1"/>
+                        </a:buClr>
+                        <a:buSzTx/>
+                        <a:buFont typeface="Wingdings" pitchFamily="2" charset="2"/>
+                        <a:buNone/>
+                        <a:tabLst/>
+                      </a:pPr>
+                      <a:r>
+                        <a:rPr kumimoji="0" lang="en-US" altLang="en-US" sz="900" b="0" i="0" u="none" strike="noStrike" cap="none" normalizeH="0" baseline="0" dirty="0" smtClean="0">
+                          <a:ln>
+                            <a:noFill/>
+                          </a:ln>
+                          <a:solidFill>
+                            <a:schemeClr val="tx1"/>
+                          </a:solidFill>
+                          <a:effectLst/>
+                          <a:latin typeface="Arial" charset="0"/>
+                          <a:cs typeface="Arial" charset="0"/>
+                        </a:rPr>
+                        <a:t>- NY employment by job category (white collar/blue collar/service..)</a:t>
+                      </a:r>
+                    </a:p>
+                  </a:txBody>
+                  <a:tcPr marT="45747" marB="45747" horzOverflow="overflow">
+                    <a:lnL w="12700" cap="flat" cmpd="sng" algn="ctr">
+                      <a:solidFill>
+                        <a:schemeClr val="tx1"/>
+                      </a:solidFill>
+                      <a:prstDash val="solid"/>
+                      <a:round/>
+                      <a:headEnd type="none" w="med" len="med"/>
+                      <a:tailEnd type="none" w="med" len="med"/>
+                    </a:lnL>
+                    <a:lnR w="12700" cap="flat" cmpd="sng" algn="ctr">
+                      <a:solidFill>
+                        <a:schemeClr val="tx1"/>
+                      </a:solidFill>
+                      <a:prstDash val="solid"/>
+                      <a:round/>
+                      <a:headEnd type="none" w="med" len="med"/>
+                      <a:tailEnd type="none" w="med" len="med"/>
+                    </a:lnR>
+                    <a:lnT w="12700" cap="flat" cmpd="sng" algn="ctr">
+                      <a:solidFill>
+                        <a:schemeClr val="tx1"/>
+                      </a:solidFill>
+                      <a:prstDash val="solid"/>
+                      <a:round/>
+                      <a:headEnd type="none" w="med" len="med"/>
+                      <a:tailEnd type="none" w="med" len="med"/>
+                    </a:lnT>
+                    <a:lnB w="12700" cap="flat" cmpd="sng" algn="ctr">
+                      <a:solidFill>
+                        <a:schemeClr val="tx1"/>
+                      </a:solidFill>
+                      <a:prstDash val="solid"/>
+                      <a:round/>
+                      <a:headEnd type="none" w="med" len="med"/>
+                      <a:tailEnd type="none" w="med" len="med"/>
+                    </a:lnB>
+                    <a:lnTlToBr>
+                      <a:noFill/>
+                    </a:lnTlToBr>
+                    <a:lnBlToTr>
+                      <a:noFill/>
+                    </a:lnBlToTr>
+                    <a:solidFill>
+                      <a:schemeClr val="bg1"/>
+                    </a:solidFill>
+                  </a:tcPr>
+                </a:tc>
+                <a:tc gridSpan="2">
+                  <a:txBody>
+                    <a:bodyPr/>
+                    <a:lstStyle/>
+                    <a:p>
+                      <a:pPr marL="0" marR="0" lvl="0" indent="0" algn="l" defTabSz="914400" rtl="0" eaLnBrk="1" fontAlgn="base" latinLnBrk="0" hangingPunct="1">
+                        <a:lnSpc>
+                          <a:spcPct val="100000"/>
+                        </a:lnSpc>
+                        <a:spcBef>
+                          <a:spcPct val="20000"/>
+                        </a:spcBef>
+                        <a:spcAft>
+                          <a:spcPct val="0"/>
+                        </a:spcAft>
+                        <a:buClr>
+                          <a:schemeClr val="tx1"/>
+                        </a:buClr>
+                        <a:buSzTx/>
+                        <a:buFont typeface="Wingdings" pitchFamily="2" charset="2"/>
+                        <a:buNone/>
+                        <a:tabLst/>
+                        <a:defRPr/>
+                      </a:pPr>
+                      <a:r>
+                        <a:rPr kumimoji="0" lang="en-US" altLang="en-US" sz="900" b="0" i="0" u="none" strike="noStrike" cap="none" normalizeH="0" baseline="0" dirty="0" smtClean="0">
+                          <a:ln>
+                            <a:noFill/>
+                          </a:ln>
+                          <a:solidFill>
+                            <a:schemeClr val="tx1"/>
+                          </a:solidFill>
+                          <a:effectLst/>
+                          <a:latin typeface="Arial" charset="0"/>
+                          <a:cs typeface="Arial" charset="0"/>
+                        </a:rPr>
+                        <a:t>- This data comes as historical aggregate employment and net job flows by industry (CSV).  This directly gives us numbers on how many people started or stopped working in a certain type of job.</a:t>
+                      </a:r>
+                    </a:p>
+                  </a:txBody>
+                  <a:tcPr marT="45747" marB="45747" horzOverflow="overflow">
+                    <a:lnL w="12700" cap="flat" cmpd="sng" algn="ctr">
+                      <a:solidFill>
+                        <a:schemeClr val="tx1"/>
+                      </a:solidFill>
+                      <a:prstDash val="solid"/>
+                      <a:round/>
+                      <a:headEnd type="none" w="med" len="med"/>
+                      <a:tailEnd type="none" w="med" len="med"/>
+                    </a:lnL>
+                    <a:lnR w="12700" cap="flat" cmpd="sng" algn="ctr">
+                      <a:solidFill>
+                        <a:schemeClr val="tx1"/>
+                      </a:solidFill>
+                      <a:prstDash val="solid"/>
+                      <a:round/>
+                      <a:headEnd type="none" w="med" len="med"/>
+                      <a:tailEnd type="none" w="med" len="med"/>
+                    </a:lnR>
+                    <a:lnT w="12700" cap="flat" cmpd="sng" algn="ctr">
+                      <a:solidFill>
+                        <a:schemeClr val="tx1"/>
+                      </a:solidFill>
+                      <a:prstDash val="solid"/>
+                      <a:round/>
+                      <a:headEnd type="none" w="med" len="med"/>
+                      <a:tailEnd type="none" w="med" len="med"/>
+                    </a:lnT>
+                    <a:lnB w="12700" cap="flat" cmpd="sng" algn="ctr">
+                      <a:solidFill>
+                        <a:schemeClr val="tx1"/>
+                      </a:solidFill>
+                      <a:prstDash val="solid"/>
+                      <a:round/>
+                      <a:headEnd type="none" w="med" len="med"/>
+                      <a:tailEnd type="none" w="med" len="med"/>
+                    </a:lnB>
+                    <a:solidFill>
+                      <a:schemeClr val="bg1"/>
+                    </a:solidFill>
+                  </a:tcPr>
+                </a:tc>
+                <a:tc hMerge="1">
+                  <a:txBody>
+                    <a:bodyPr/>
+                    <a:lstStyle/>
+                    <a:p>
+                      <a:endParaRPr lang="en-US"/>
+                    </a:p>
+                  </a:txBody>
+                  <a:tcPr/>
+                </a:tc>
+                <a:tc>
+                  <a:txBody>
+                    <a:bodyPr/>
+                    <a:lstStyle/>
+                    <a:p>
+                      <a:r>
+                        <a:rPr lang="en-US" sz="900" dirty="0" smtClean="0"/>
+                        <a:t>- Quarterly (2009-2012)</a:t>
+                      </a:r>
                       <a:endParaRPr lang="en-US" sz="900" dirty="0"/>
                     </a:p>
                   </a:txBody>
@@ -15467,6 +14684,22 @@
                         <a:defRPr/>
                       </a:pPr>
                       <a:r>
+                        <a:rPr kumimoji="0" lang="en-US" altLang="en-US" sz="1100" b="0" i="0" u="none" strike="noStrike" kern="1200" cap="none" spc="0" normalizeH="0" baseline="0" noProof="0" dirty="0" err="1" smtClean="0">
+                          <a:ln>
+                            <a:noFill/>
+                          </a:ln>
+                          <a:solidFill>
+                            <a:srgbClr val="000000"/>
+                          </a:solidFill>
+                          <a:effectLst/>
+                          <a:uLnTx/>
+                          <a:uFillTx/>
+                          <a:latin typeface="Arial"/>
+                          <a:cs typeface="Arial"/>
+                        </a:rPr>
+                        <a:t>MapReduce</a:t>
+                      </a:r>
+                      <a:r>
                         <a:rPr kumimoji="0" lang="en-US" altLang="en-US" sz="1100" b="0" i="0" u="none" strike="noStrike" kern="1200" cap="none" spc="0" normalizeH="0" baseline="0" noProof="0" dirty="0" smtClean="0">
                           <a:ln>
                             <a:noFill/>
@@ -15480,7 +14713,7 @@
                           <a:latin typeface="Arial"/>
                           <a:cs typeface="Arial"/>
                         </a:rPr>
-                        <a:t>Describe technologies. Will your project make use of MapReduce? Pig? Twitter? HDFS? Flume? HBase? Hive? Impala? Other?</a:t>
+                        <a:t>, Pig, Other technologies: Twitter API</a:t>
                       </a:r>
                     </a:p>
                   </a:txBody>
@@ -15792,8 +15025,591 @@
                   <a:tcPr/>
                 </a:tc>
               </a:tr>
+            </a:tbl>
+          </a:graphicData>
+        </a:graphic>
+      </p:graphicFrame>
+    </p:spTree>
+    <p:extLst>
+      <p:ext uri="{BB962C8B-B14F-4D97-AF65-F5344CB8AC3E}">
+        <p14:creationId xmlns:p14="http://schemas.microsoft.com/office/powerpoint/2010/main" xmlns:p="http://schemas.openxmlformats.org/presentationml/2006/main" xmlns:r="http://schemas.openxmlformats.org/officeDocument/2006/relationships" xmlns:a="http://schemas.openxmlformats.org/drawingml/2006/main" xmlns="" val="3852912342"/>
+      </p:ext>
+    </p:extLst>
+  </p:cSld>
+  <p:clrMapOvr>
+    <a:masterClrMapping/>
+  </p:clrMapOvr>
+  <p:timing>
+    <p:tnLst>
+      <p:par>
+        <p:cTn id="1" dur="indefinite" restart="never" nodeType="tmRoot"/>
+      </p:par>
+    </p:tnLst>
+  </p:timing>
+</p:sld>
+</file>
+
+<file path=ppt/slides/slide2.xml><?xml version="1.0" encoding="utf-8"?>
+<p:sld xmlns:a="http://schemas.openxmlformats.org/drawingml/2006/main" xmlns:r="http://schemas.openxmlformats.org/officeDocument/2006/relationships" xmlns:mc="http://schemas.openxmlformats.org/markup-compatibility/2006" xmlns:mv="urn:schemas-microsoft-com:mac:vml" xmlns:p="http://schemas.openxmlformats.org/presentationml/2006/main" mc:Ignorable="mv" mc:PreserveAttributes="mv:*" showMasterSp="0">
+  <p:cSld>
+    <p:spTree>
+      <p:nvGrpSpPr>
+        <p:cNvPr id="1" name=""/>
+        <p:cNvGrpSpPr/>
+        <p:nvPr/>
+      </p:nvGrpSpPr>
+      <p:grpSpPr>
+        <a:xfrm>
+          <a:off x="0" y="0"/>
+          <a:ext cx="0" cy="0"/>
+          <a:chOff x="0" y="0"/>
+          <a:chExt cx="0" cy="0"/>
+        </a:xfrm>
+      </p:grpSpPr>
+      <p:sp>
+        <p:nvSpPr>
+          <p:cNvPr id="29698" name="Slide Number Placeholder 4"/>
+          <p:cNvSpPr>
+            <a:spLocks noGrp="1"/>
+          </p:cNvSpPr>
+          <p:nvPr>
+            <p:ph type="sldNum" sz="quarter" idx="10"/>
+          </p:nvPr>
+        </p:nvSpPr>
+        <p:spPr>
+          <a:noFill/>
+        </p:spPr>
+        <p:txBody>
+          <a:bodyPr/>
+          <a:lstStyle>
+            <a:lvl1pPr eaLnBrk="0" hangingPunct="0">
+              <a:spcBef>
+                <a:spcPct val="20000"/>
+              </a:spcBef>
+              <a:buClr>
+                <a:schemeClr val="tx1"/>
+              </a:buClr>
+              <a:buFont typeface="Wingdings" pitchFamily="2" charset="2"/>
+              <a:buChar char="p"/>
+              <a:defRPr sz="2400">
+                <a:solidFill>
+                  <a:schemeClr val="tx1"/>
+                </a:solidFill>
+                <a:latin typeface="Arial" charset="0"/>
+                <a:cs typeface="Arial" charset="0"/>
+              </a:defRPr>
+            </a:lvl1pPr>
+            <a:lvl2pPr marL="742950" indent="-285750" eaLnBrk="0" hangingPunct="0">
+              <a:spcBef>
+                <a:spcPct val="20000"/>
+              </a:spcBef>
+              <a:buClr>
+                <a:schemeClr val="tx1"/>
+              </a:buClr>
+              <a:buFont typeface="Wingdings" pitchFamily="2" charset="2"/>
+              <a:buChar char="n"/>
+              <a:defRPr sz="2000">
+                <a:solidFill>
+                  <a:schemeClr val="tx1"/>
+                </a:solidFill>
+                <a:latin typeface="Arial" charset="0"/>
+                <a:cs typeface="Arial" charset="0"/>
+              </a:defRPr>
+            </a:lvl2pPr>
+            <a:lvl3pPr marL="1143000" indent="-228600" eaLnBrk="0" hangingPunct="0">
+              <a:spcBef>
+                <a:spcPct val="20000"/>
+              </a:spcBef>
+              <a:buClr>
+                <a:schemeClr val="tx1"/>
+              </a:buClr>
+              <a:buFont typeface="Wingdings" pitchFamily="2" charset="2"/>
+              <a:buChar char="p"/>
+              <a:defRPr>
+                <a:solidFill>
+                  <a:schemeClr val="tx1"/>
+                </a:solidFill>
+                <a:latin typeface="Arial" charset="0"/>
+                <a:cs typeface="Arial" charset="0"/>
+              </a:defRPr>
+            </a:lvl3pPr>
+            <a:lvl4pPr marL="1600200" indent="-228600" eaLnBrk="0" hangingPunct="0">
+              <a:spcBef>
+                <a:spcPct val="20000"/>
+              </a:spcBef>
+              <a:buClr>
+                <a:schemeClr val="tx1"/>
+              </a:buClr>
+              <a:buFont typeface="Wingdings" pitchFamily="2" charset="2"/>
+              <a:buChar char="§"/>
+              <a:defRPr sz="1600">
+                <a:solidFill>
+                  <a:schemeClr val="tx1"/>
+                </a:solidFill>
+                <a:latin typeface="Arial" charset="0"/>
+                <a:cs typeface="Arial" charset="0"/>
+              </a:defRPr>
+            </a:lvl4pPr>
+            <a:lvl5pPr marL="2057400" indent="-228600" eaLnBrk="0" hangingPunct="0">
+              <a:spcBef>
+                <a:spcPct val="20000"/>
+              </a:spcBef>
+              <a:buClr>
+                <a:schemeClr val="tx1"/>
+              </a:buClr>
+              <a:buFont typeface="Wingdings" pitchFamily="2" charset="2"/>
+              <a:buChar char="§"/>
+              <a:defRPr sz="1600">
+                <a:solidFill>
+                  <a:schemeClr val="tx1"/>
+                </a:solidFill>
+                <a:latin typeface="Arial" charset="0"/>
+                <a:cs typeface="Arial" charset="0"/>
+              </a:defRPr>
+            </a:lvl5pPr>
+            <a:lvl6pPr marL="2514600" indent="-228600" eaLnBrk="0" fontAlgn="base" hangingPunct="0">
+              <a:spcBef>
+                <a:spcPct val="20000"/>
+              </a:spcBef>
+              <a:spcAft>
+                <a:spcPct val="0"/>
+              </a:spcAft>
+              <a:buClr>
+                <a:schemeClr val="tx1"/>
+              </a:buClr>
+              <a:buFont typeface="Wingdings" pitchFamily="2" charset="2"/>
+              <a:buChar char="§"/>
+              <a:defRPr sz="1600">
+                <a:solidFill>
+                  <a:schemeClr val="tx1"/>
+                </a:solidFill>
+                <a:latin typeface="Arial" charset="0"/>
+                <a:cs typeface="Arial" charset="0"/>
+              </a:defRPr>
+            </a:lvl6pPr>
+            <a:lvl7pPr marL="2971800" indent="-228600" eaLnBrk="0" fontAlgn="base" hangingPunct="0">
+              <a:spcBef>
+                <a:spcPct val="20000"/>
+              </a:spcBef>
+              <a:spcAft>
+                <a:spcPct val="0"/>
+              </a:spcAft>
+              <a:buClr>
+                <a:schemeClr val="tx1"/>
+              </a:buClr>
+              <a:buFont typeface="Wingdings" pitchFamily="2" charset="2"/>
+              <a:buChar char="§"/>
+              <a:defRPr sz="1600">
+                <a:solidFill>
+                  <a:schemeClr val="tx1"/>
+                </a:solidFill>
+                <a:latin typeface="Arial" charset="0"/>
+                <a:cs typeface="Arial" charset="0"/>
+              </a:defRPr>
+            </a:lvl7pPr>
+            <a:lvl8pPr marL="3429000" indent="-228600" eaLnBrk="0" fontAlgn="base" hangingPunct="0">
+              <a:spcBef>
+                <a:spcPct val="20000"/>
+              </a:spcBef>
+              <a:spcAft>
+                <a:spcPct val="0"/>
+              </a:spcAft>
+              <a:buClr>
+                <a:schemeClr val="tx1"/>
+              </a:buClr>
+              <a:buFont typeface="Wingdings" pitchFamily="2" charset="2"/>
+              <a:buChar char="§"/>
+              <a:defRPr sz="1600">
+                <a:solidFill>
+                  <a:schemeClr val="tx1"/>
+                </a:solidFill>
+                <a:latin typeface="Arial" charset="0"/>
+                <a:cs typeface="Arial" charset="0"/>
+              </a:defRPr>
+            </a:lvl8pPr>
+            <a:lvl9pPr marL="3886200" indent="-228600" eaLnBrk="0" fontAlgn="base" hangingPunct="0">
+              <a:spcBef>
+                <a:spcPct val="20000"/>
+              </a:spcBef>
+              <a:spcAft>
+                <a:spcPct val="0"/>
+              </a:spcAft>
+              <a:buClr>
+                <a:schemeClr val="tx1"/>
+              </a:buClr>
+              <a:buFont typeface="Wingdings" pitchFamily="2" charset="2"/>
+              <a:buChar char="§"/>
+              <a:defRPr sz="1600">
+                <a:solidFill>
+                  <a:schemeClr val="tx1"/>
+                </a:solidFill>
+                <a:latin typeface="Arial" charset="0"/>
+                <a:cs typeface="Arial" charset="0"/>
+              </a:defRPr>
+            </a:lvl9pPr>
+          </a:lstStyle>
+          <a:p>
+            <a:pPr eaLnBrk="1" hangingPunct="1">
+              <a:spcBef>
+                <a:spcPct val="0"/>
+              </a:spcBef>
+              <a:buClrTx/>
+              <a:buFontTx/>
+              <a:buNone/>
+            </a:pPr>
+            <a:fld id="{2D85BBC0-0B15-40EC-BAC6-58D4FC367C62}" type="slidenum">
+              <a:rPr lang="en-US" altLang="en-US" sz="900" smtClean="0">
+                <a:latin typeface="Verdana" pitchFamily="34" charset="0"/>
+              </a:rPr>
+              <a:pPr eaLnBrk="1" hangingPunct="1">
+                <a:spcBef>
+                  <a:spcPct val="0"/>
+                </a:spcBef>
+                <a:buClrTx/>
+                <a:buFontTx/>
+                <a:buNone/>
+              </a:pPr>
+              <a:t>2</a:t>
+            </a:fld>
+            <a:endParaRPr lang="en-US" altLang="en-US" sz="900" smtClean="0">
+              <a:latin typeface="Verdana" pitchFamily="34" charset="0"/>
+            </a:endParaRPr>
+          </a:p>
+        </p:txBody>
+      </p:sp>
+      <p:sp>
+        <p:nvSpPr>
+          <p:cNvPr id="29699" name="Footer Placeholder 5"/>
+          <p:cNvSpPr>
+            <a:spLocks noGrp="1"/>
+          </p:cNvSpPr>
+          <p:nvPr>
+            <p:ph type="ftr" sz="quarter" idx="11"/>
+          </p:nvPr>
+        </p:nvSpPr>
+        <p:spPr>
+          <a:noFill/>
+        </p:spPr>
+        <p:txBody>
+          <a:bodyPr/>
+          <a:lstStyle>
+            <a:lvl1pPr eaLnBrk="0" hangingPunct="0">
+              <a:spcBef>
+                <a:spcPct val="20000"/>
+              </a:spcBef>
+              <a:buClr>
+                <a:schemeClr val="tx1"/>
+              </a:buClr>
+              <a:buFont typeface="Wingdings" pitchFamily="2" charset="2"/>
+              <a:buChar char="p"/>
+              <a:defRPr sz="2400">
+                <a:solidFill>
+                  <a:schemeClr val="tx1"/>
+                </a:solidFill>
+                <a:latin typeface="Arial" charset="0"/>
+                <a:cs typeface="Arial" charset="0"/>
+              </a:defRPr>
+            </a:lvl1pPr>
+            <a:lvl2pPr marL="742950" indent="-285750" eaLnBrk="0" hangingPunct="0">
+              <a:spcBef>
+                <a:spcPct val="20000"/>
+              </a:spcBef>
+              <a:buClr>
+                <a:schemeClr val="tx1"/>
+              </a:buClr>
+              <a:buFont typeface="Wingdings" pitchFamily="2" charset="2"/>
+              <a:buChar char="n"/>
+              <a:defRPr sz="2000">
+                <a:solidFill>
+                  <a:schemeClr val="tx1"/>
+                </a:solidFill>
+                <a:latin typeface="Arial" charset="0"/>
+                <a:cs typeface="Arial" charset="0"/>
+              </a:defRPr>
+            </a:lvl2pPr>
+            <a:lvl3pPr marL="1143000" indent="-228600" eaLnBrk="0" hangingPunct="0">
+              <a:spcBef>
+                <a:spcPct val="20000"/>
+              </a:spcBef>
+              <a:buClr>
+                <a:schemeClr val="tx1"/>
+              </a:buClr>
+              <a:buFont typeface="Wingdings" pitchFamily="2" charset="2"/>
+              <a:buChar char="p"/>
+              <a:defRPr>
+                <a:solidFill>
+                  <a:schemeClr val="tx1"/>
+                </a:solidFill>
+                <a:latin typeface="Arial" charset="0"/>
+                <a:cs typeface="Arial" charset="0"/>
+              </a:defRPr>
+            </a:lvl3pPr>
+            <a:lvl4pPr marL="1600200" indent="-228600" eaLnBrk="0" hangingPunct="0">
+              <a:spcBef>
+                <a:spcPct val="20000"/>
+              </a:spcBef>
+              <a:buClr>
+                <a:schemeClr val="tx1"/>
+              </a:buClr>
+              <a:buFont typeface="Wingdings" pitchFamily="2" charset="2"/>
+              <a:buChar char="§"/>
+              <a:defRPr sz="1600">
+                <a:solidFill>
+                  <a:schemeClr val="tx1"/>
+                </a:solidFill>
+                <a:latin typeface="Arial" charset="0"/>
+                <a:cs typeface="Arial" charset="0"/>
+              </a:defRPr>
+            </a:lvl4pPr>
+            <a:lvl5pPr marL="2057400" indent="-228600" eaLnBrk="0" hangingPunct="0">
+              <a:spcBef>
+                <a:spcPct val="20000"/>
+              </a:spcBef>
+              <a:buClr>
+                <a:schemeClr val="tx1"/>
+              </a:buClr>
+              <a:buFont typeface="Wingdings" pitchFamily="2" charset="2"/>
+              <a:buChar char="§"/>
+              <a:defRPr sz="1600">
+                <a:solidFill>
+                  <a:schemeClr val="tx1"/>
+                </a:solidFill>
+                <a:latin typeface="Arial" charset="0"/>
+                <a:cs typeface="Arial" charset="0"/>
+              </a:defRPr>
+            </a:lvl5pPr>
+            <a:lvl6pPr marL="2514600" indent="-228600" eaLnBrk="0" fontAlgn="base" hangingPunct="0">
+              <a:spcBef>
+                <a:spcPct val="20000"/>
+              </a:spcBef>
+              <a:spcAft>
+                <a:spcPct val="0"/>
+              </a:spcAft>
+              <a:buClr>
+                <a:schemeClr val="tx1"/>
+              </a:buClr>
+              <a:buFont typeface="Wingdings" pitchFamily="2" charset="2"/>
+              <a:buChar char="§"/>
+              <a:defRPr sz="1600">
+                <a:solidFill>
+                  <a:schemeClr val="tx1"/>
+                </a:solidFill>
+                <a:latin typeface="Arial" charset="0"/>
+                <a:cs typeface="Arial" charset="0"/>
+              </a:defRPr>
+            </a:lvl6pPr>
+            <a:lvl7pPr marL="2971800" indent="-228600" eaLnBrk="0" fontAlgn="base" hangingPunct="0">
+              <a:spcBef>
+                <a:spcPct val="20000"/>
+              </a:spcBef>
+              <a:spcAft>
+                <a:spcPct val="0"/>
+              </a:spcAft>
+              <a:buClr>
+                <a:schemeClr val="tx1"/>
+              </a:buClr>
+              <a:buFont typeface="Wingdings" pitchFamily="2" charset="2"/>
+              <a:buChar char="§"/>
+              <a:defRPr sz="1600">
+                <a:solidFill>
+                  <a:schemeClr val="tx1"/>
+                </a:solidFill>
+                <a:latin typeface="Arial" charset="0"/>
+                <a:cs typeface="Arial" charset="0"/>
+              </a:defRPr>
+            </a:lvl7pPr>
+            <a:lvl8pPr marL="3429000" indent="-228600" eaLnBrk="0" fontAlgn="base" hangingPunct="0">
+              <a:spcBef>
+                <a:spcPct val="20000"/>
+              </a:spcBef>
+              <a:spcAft>
+                <a:spcPct val="0"/>
+              </a:spcAft>
+              <a:buClr>
+                <a:schemeClr val="tx1"/>
+              </a:buClr>
+              <a:buFont typeface="Wingdings" pitchFamily="2" charset="2"/>
+              <a:buChar char="§"/>
+              <a:defRPr sz="1600">
+                <a:solidFill>
+                  <a:schemeClr val="tx1"/>
+                </a:solidFill>
+                <a:latin typeface="Arial" charset="0"/>
+                <a:cs typeface="Arial" charset="0"/>
+              </a:defRPr>
+            </a:lvl8pPr>
+            <a:lvl9pPr marL="3886200" indent="-228600" eaLnBrk="0" fontAlgn="base" hangingPunct="0">
+              <a:spcBef>
+                <a:spcPct val="20000"/>
+              </a:spcBef>
+              <a:spcAft>
+                <a:spcPct val="0"/>
+              </a:spcAft>
+              <a:buClr>
+                <a:schemeClr val="tx1"/>
+              </a:buClr>
+              <a:buFont typeface="Wingdings" pitchFamily="2" charset="2"/>
+              <a:buChar char="§"/>
+              <a:defRPr sz="1600">
+                <a:solidFill>
+                  <a:schemeClr val="tx1"/>
+                </a:solidFill>
+                <a:latin typeface="Arial" charset="0"/>
+                <a:cs typeface="Arial" charset="0"/>
+              </a:defRPr>
+            </a:lvl9pPr>
+          </a:lstStyle>
+          <a:p>
+            <a:pPr eaLnBrk="1" hangingPunct="1">
+              <a:spcBef>
+                <a:spcPct val="0"/>
+              </a:spcBef>
+              <a:buClrTx/>
+              <a:buFontTx/>
+              <a:buNone/>
+            </a:pPr>
+            <a:r>
+              <a:rPr lang="en-US" altLang="en-US" sz="900" smtClean="0">
+                <a:latin typeface="Verdana" pitchFamily="34" charset="0"/>
+              </a:rPr>
+              <a:t>Realtime and Big Data Analytics</a:t>
+            </a:r>
+          </a:p>
+        </p:txBody>
+      </p:sp>
+      <p:graphicFrame>
+        <p:nvGraphicFramePr>
+          <p:cNvPr id="415817" name="Group 73"/>
+          <p:cNvGraphicFramePr>
+            <a:graphicFrameLocks noGrp="1"/>
+          </p:cNvGraphicFramePr>
+          <p:nvPr>
+            <p:ph sz="half" idx="2"/>
+            <p:extLst>
+              <p:ext uri="{D42A27DB-BD31-4B8C-83A1-F6EECF244321}">
+                <p14:modId xmlns:p14="http://schemas.microsoft.com/office/powerpoint/2010/main" xmlns:p="http://schemas.openxmlformats.org/presentationml/2006/main" xmlns:r="http://schemas.openxmlformats.org/officeDocument/2006/relationships" xmlns:a="http://schemas.openxmlformats.org/drawingml/2006/main" xmlns="" val="2684002353"/>
+              </p:ext>
+            </p:extLst>
+          </p:nvPr>
+        </p:nvGraphicFramePr>
+        <p:xfrm>
+          <a:off x="313267" y="1113938"/>
+          <a:ext cx="8444753" cy="3307241"/>
+        </p:xfrm>
+        <a:graphic>
+          <a:graphicData uri="http://schemas.openxmlformats.org/drawingml/2006/table">
+            <a:tbl>
+              <a:tblPr/>
+              <a:tblGrid>
+                <a:gridCol w="8444753"/>
+              </a:tblGrid>
+              <a:tr h="429486">
+                <a:tc>
+                  <a:txBody>
+                    <a:bodyPr/>
+                    <a:lstStyle/>
+                    <a:p>
+                      <a:pPr marL="438150" indent="-381000" algn="ctr" eaLnBrk="1" hangingPunct="1">
+                        <a:buFont typeface="Wingdings" pitchFamily="2" charset="2"/>
+                        <a:buNone/>
+                      </a:pPr>
+                      <a:endParaRPr lang="en-US" altLang="en-US" sz="700" b="1" i="1" dirty="0" smtClean="0">
+                        <a:solidFill>
+                          <a:schemeClr val="tx1"/>
+                        </a:solidFill>
+                      </a:endParaRPr>
+                    </a:p>
+                    <a:p>
+                      <a:pPr marL="438150" indent="-381000" algn="ctr" eaLnBrk="1" hangingPunct="1">
+                        <a:buFont typeface="Wingdings" pitchFamily="2" charset="2"/>
+                        <a:buNone/>
+                      </a:pPr>
+                      <a:r>
+                        <a:rPr lang="en-US" altLang="en-US" sz="1400" b="1" i="1" dirty="0" smtClean="0">
+                          <a:solidFill>
+                            <a:schemeClr val="tx1"/>
+                          </a:solidFill>
+                        </a:rPr>
+                        <a:t>Realtime and</a:t>
+                      </a:r>
+                      <a:r>
+                        <a:rPr lang="en-US" altLang="en-US" sz="1400" b="1" i="1" baseline="0" dirty="0" smtClean="0">
+                          <a:solidFill>
+                            <a:schemeClr val="tx1"/>
+                          </a:solidFill>
+                        </a:rPr>
+                        <a:t> Big Data Analytics </a:t>
+                      </a:r>
+                      <a:r>
+                        <a:rPr lang="en-US" altLang="en-US" sz="1400" b="1" i="1" dirty="0" smtClean="0">
+                          <a:solidFill>
+                            <a:schemeClr val="tx1"/>
+                          </a:solidFill>
+                        </a:rPr>
+                        <a:t>Project Proposal</a:t>
+                      </a:r>
+                    </a:p>
+                    <a:p>
+                      <a:pPr marL="438150" indent="-381000" eaLnBrk="1" hangingPunct="1">
+                        <a:buFont typeface="Wingdings" pitchFamily="2" charset="2"/>
+                        <a:buNone/>
+                      </a:pPr>
+                      <a:endParaRPr lang="en-US" altLang="en-US" sz="400" dirty="0" smtClean="0">
+                        <a:solidFill>
+                          <a:schemeClr val="tx1"/>
+                        </a:solidFill>
+                      </a:endParaRPr>
+                    </a:p>
+                  </a:txBody>
+                  <a:tcPr marT="45747" marB="45747" horzOverflow="overflow">
+                    <a:lnL w="12700" cap="flat" cmpd="sng" algn="ctr">
+                      <a:solidFill>
+                        <a:schemeClr val="tx1"/>
+                      </a:solidFill>
+                      <a:prstDash val="solid"/>
+                      <a:round/>
+                      <a:headEnd type="none" w="med" len="med"/>
+                      <a:tailEnd type="none" w="med" len="med"/>
+                    </a:lnL>
+                    <a:lnR w="12700" cap="flat" cmpd="sng" algn="ctr">
+                      <a:solidFill>
+                        <a:schemeClr val="tx1"/>
+                      </a:solidFill>
+                      <a:prstDash val="solid"/>
+                      <a:round/>
+                      <a:headEnd type="none" w="med" len="med"/>
+                      <a:tailEnd type="none" w="med" len="med"/>
+                    </a:lnR>
+                    <a:lnT w="12700" cap="flat" cmpd="sng" algn="ctr">
+                      <a:solidFill>
+                        <a:schemeClr val="tx1"/>
+                      </a:solidFill>
+                      <a:prstDash val="solid"/>
+                      <a:round/>
+                      <a:headEnd type="none" w="med" len="med"/>
+                      <a:tailEnd type="none" w="med" len="med"/>
+                    </a:lnT>
+                    <a:lnB w="12700" cap="flat" cmpd="sng" algn="ctr">
+                      <a:solidFill>
+                        <a:schemeClr val="tx1"/>
+                      </a:solidFill>
+                      <a:prstDash val="solid"/>
+                      <a:round/>
+                      <a:headEnd type="none" w="med" len="med"/>
+                      <a:tailEnd type="none" w="med" len="med"/>
+                    </a:lnB>
+                    <a:lnTlToBr>
+                      <a:noFill/>
+                    </a:lnTlToBr>
+                    <a:lnBlToTr>
+                      <a:noFill/>
+                    </a:lnBlToTr>
+                    <a:noFill/>
+                  </a:tcPr>
+                </a:tc>
+              </a:tr>
               <a:tr h="209264">
-                <a:tc gridSpan="4">
+                <a:tc>
                   <a:txBody>
                     <a:bodyPr/>
                     <a:lstStyle/>
@@ -15873,42 +15689,383 @@
                     </a:solidFill>
                   </a:tcPr>
                 </a:tc>
-                <a:tc hMerge="1">
+              </a:tr>
+              <a:tr h="310696">
+                <a:tc>
                   <a:txBody>
                     <a:bodyPr/>
                     <a:lstStyle/>
                     <a:p>
-                      <a:endParaRPr lang="en-US"/>
+                      <a:pPr marL="438150" marR="0" lvl="0" indent="-381000" algn="l" defTabSz="914400" rtl="0" eaLnBrk="1" fontAlgn="auto" latinLnBrk="0" hangingPunct="1">
+                        <a:lnSpc>
+                          <a:spcPct val="100000"/>
+                        </a:lnSpc>
+                        <a:spcBef>
+                          <a:spcPts val="0"/>
+                        </a:spcBef>
+                        <a:spcAft>
+                          <a:spcPts val="0"/>
+                        </a:spcAft>
+                        <a:buClrTx/>
+                        <a:buSzTx/>
+                        <a:buFont typeface="Wingdings" pitchFamily="2" charset="2"/>
+                        <a:buNone/>
+                        <a:tabLst/>
+                        <a:defRPr/>
+                      </a:pPr>
+                      <a:r>
+                        <a:rPr lang="en-US" sz="1100" dirty="0" err="1" smtClean="0"/>
+                        <a:t>Halleröd</a:t>
+                      </a:r>
+                      <a:r>
+                        <a:rPr lang="en-US" sz="1100" dirty="0" smtClean="0"/>
+                        <a:t>, </a:t>
+                      </a:r>
+                      <a:r>
+                        <a:rPr lang="en-US" sz="1100" dirty="0" err="1" smtClean="0"/>
+                        <a:t>Björn</a:t>
+                      </a:r>
+                      <a:r>
+                        <a:rPr lang="en-US" sz="1100" dirty="0" smtClean="0"/>
+                        <a:t>, and Jan-Eric </a:t>
+                      </a:r>
+                      <a:r>
+                        <a:rPr lang="en-US" sz="1100" dirty="0" err="1" smtClean="0"/>
+                        <a:t>Gustafsson</a:t>
+                      </a:r>
+                      <a:r>
+                        <a:rPr lang="en-US" sz="1100" dirty="0" smtClean="0"/>
+                        <a:t>. "A longitudinal analysis of the </a:t>
+                      </a:r>
+                      <a:r>
+                        <a:rPr lang="en-US" sz="1100" b="0" dirty="0" smtClean="0"/>
+                        <a:t>relationship between changes in socio-economic status and changes in health.“</a:t>
+                      </a:r>
                     </a:p>
-                  </a:txBody>
-                  <a:tcPr/>
-                </a:tc>
-                <a:tc hMerge="1">
-                  <a:txBody>
-                    <a:bodyPr/>
-                    <a:lstStyle/>
                     <a:p>
-                      <a:endParaRPr lang="en-US"/>
+                      <a:pPr marL="438150" marR="0" lvl="0" indent="-381000" algn="l" defTabSz="914400" rtl="0" eaLnBrk="1" fontAlgn="auto" latinLnBrk="0" hangingPunct="1">
+                        <a:lnSpc>
+                          <a:spcPct val="100000"/>
+                        </a:lnSpc>
+                        <a:spcBef>
+                          <a:spcPts val="0"/>
+                        </a:spcBef>
+                        <a:spcAft>
+                          <a:spcPts val="0"/>
+                        </a:spcAft>
+                        <a:buClrTx/>
+                        <a:buSzTx/>
+                        <a:buFont typeface="Wingdings" pitchFamily="2" charset="2"/>
+                        <a:buNone/>
+                        <a:tabLst/>
+                        <a:defRPr/>
+                      </a:pPr>
+                      <a:endParaRPr kumimoji="0" lang="en-US" altLang="en-US" sz="1100" b="0" i="0" u="none" strike="noStrike" kern="1200" cap="none" spc="0" normalizeH="0" baseline="0" noProof="0" dirty="0" smtClean="0">
+                        <a:ln>
+                          <a:noFill/>
+                        </a:ln>
+                        <a:solidFill>
+                          <a:srgbClr val="000000"/>
+                        </a:solidFill>
+                        <a:effectLst/>
+                        <a:uLnTx/>
+                        <a:uFillTx/>
+                        <a:latin typeface="+mn-lt"/>
+                        <a:cs typeface="+mn-cs"/>
+                      </a:endParaRPr>
                     </a:p>
-                  </a:txBody>
-                  <a:tcPr/>
-                </a:tc>
-                <a:tc hMerge="1">
-                  <a:txBody>
-                    <a:bodyPr/>
-                    <a:lstStyle/>
                     <a:p>
-                      <a:endParaRPr lang="en-US"/>
+                      <a:pPr marL="438150" marR="0" lvl="0" indent="-381000" algn="l" defTabSz="914400" rtl="0" eaLnBrk="1" fontAlgn="auto" latinLnBrk="0" hangingPunct="1">
+                        <a:lnSpc>
+                          <a:spcPct val="100000"/>
+                        </a:lnSpc>
+                        <a:spcBef>
+                          <a:spcPts val="0"/>
+                        </a:spcBef>
+                        <a:spcAft>
+                          <a:spcPts val="0"/>
+                        </a:spcAft>
+                        <a:buClrTx/>
+                        <a:buSzTx/>
+                        <a:buFont typeface="Wingdings" pitchFamily="2" charset="2"/>
+                        <a:buNone/>
+                        <a:tabLst/>
+                        <a:defRPr/>
+                      </a:pPr>
+                      <a:r>
+                        <a:rPr lang="en-US" sz="1100" dirty="0" err="1" smtClean="0"/>
+                        <a:t>Morefield</a:t>
+                      </a:r>
+                      <a:r>
+                        <a:rPr lang="en-US" sz="1100" dirty="0" smtClean="0"/>
+                        <a:t>, G. Brant, David C. </a:t>
+                      </a:r>
+                      <a:r>
+                        <a:rPr lang="en-US" sz="1100" dirty="0" err="1" smtClean="0"/>
+                        <a:t>Ribar</a:t>
+                      </a:r>
+                      <a:r>
+                        <a:rPr lang="en-US" sz="1100" dirty="0" smtClean="0"/>
+                        <a:t>, and Christopher J. </a:t>
+                      </a:r>
+                      <a:r>
+                        <a:rPr lang="en-US" sz="1100" dirty="0" err="1" smtClean="0"/>
+                        <a:t>Ruhm</a:t>
+                      </a:r>
+                      <a:r>
+                        <a:rPr lang="en-US" sz="1100" dirty="0" smtClean="0"/>
+                        <a:t>. </a:t>
+                      </a:r>
+                      <a:r>
+                        <a:rPr lang="en-US" sz="1100" b="0" dirty="0" smtClean="0"/>
+                        <a:t>“Occupational status and health transitions.”</a:t>
+                      </a:r>
                     </a:p>
-                  </a:txBody>
-                  <a:tcPr/>
-                </a:tc>
-              </a:tr>
-              <a:tr h="310696">
-                <a:tc gridSpan="4">
-                  <a:txBody>
-                    <a:bodyPr/>
-                    <a:lstStyle/>
+                    <a:p>
+                      <a:pPr marL="438150" marR="0" lvl="0" indent="-381000" algn="l" defTabSz="914400" rtl="0" eaLnBrk="1" fontAlgn="auto" latinLnBrk="0" hangingPunct="1">
+                        <a:lnSpc>
+                          <a:spcPct val="100000"/>
+                        </a:lnSpc>
+                        <a:spcBef>
+                          <a:spcPts val="0"/>
+                        </a:spcBef>
+                        <a:spcAft>
+                          <a:spcPts val="0"/>
+                        </a:spcAft>
+                        <a:buClrTx/>
+                        <a:buSzTx/>
+                        <a:buFont typeface="Wingdings" pitchFamily="2" charset="2"/>
+                        <a:buNone/>
+                        <a:tabLst/>
+                        <a:defRPr/>
+                      </a:pPr>
+                      <a:endParaRPr kumimoji="0" lang="en-US" altLang="en-US" sz="1100" b="0" i="0" u="none" strike="noStrike" kern="1200" cap="none" spc="0" normalizeH="0" baseline="0" noProof="0" dirty="0" smtClean="0">
+                        <a:ln>
+                          <a:noFill/>
+                        </a:ln>
+                        <a:solidFill>
+                          <a:srgbClr val="000000"/>
+                        </a:solidFill>
+                        <a:effectLst/>
+                        <a:uLnTx/>
+                        <a:uFillTx/>
+                        <a:latin typeface="+mn-lt"/>
+                        <a:cs typeface="+mn-cs"/>
+                      </a:endParaRPr>
+                    </a:p>
+                    <a:p>
+                      <a:pPr marL="438150" marR="0" lvl="0" indent="-381000" algn="l" defTabSz="914400" rtl="0" eaLnBrk="1" fontAlgn="auto" latinLnBrk="0" hangingPunct="1">
+                        <a:lnSpc>
+                          <a:spcPct val="100000"/>
+                        </a:lnSpc>
+                        <a:spcBef>
+                          <a:spcPts val="0"/>
+                        </a:spcBef>
+                        <a:spcAft>
+                          <a:spcPts val="0"/>
+                        </a:spcAft>
+                        <a:buClrTx/>
+                        <a:buSzTx/>
+                        <a:buFont typeface="Wingdings" pitchFamily="2" charset="2"/>
+                        <a:buNone/>
+                        <a:tabLst/>
+                        <a:defRPr/>
+                      </a:pPr>
+                      <a:r>
+                        <a:rPr lang="en-US" sz="1100" dirty="0" smtClean="0"/>
+                        <a:t>Nixon, Ashley E., et al. </a:t>
+                      </a:r>
+                      <a:r>
+                        <a:rPr lang="en-US" sz="1100" b="0" dirty="0" smtClean="0"/>
+                        <a:t>"Can work make you sick? A meta-analysis of the relationships between job stressors and physical symptoms.“</a:t>
+                      </a:r>
+                    </a:p>
+                    <a:p>
+                      <a:pPr marL="438150" marR="0" lvl="0" indent="-381000" algn="l" defTabSz="914400" rtl="0" eaLnBrk="1" fontAlgn="auto" latinLnBrk="0" hangingPunct="1">
+                        <a:lnSpc>
+                          <a:spcPct val="100000"/>
+                        </a:lnSpc>
+                        <a:spcBef>
+                          <a:spcPts val="0"/>
+                        </a:spcBef>
+                        <a:spcAft>
+                          <a:spcPts val="0"/>
+                        </a:spcAft>
+                        <a:buClrTx/>
+                        <a:buSzTx/>
+                        <a:buFont typeface="Wingdings" pitchFamily="2" charset="2"/>
+                        <a:buNone/>
+                        <a:tabLst/>
+                        <a:defRPr/>
+                      </a:pPr>
+                      <a:endParaRPr kumimoji="0" lang="en-US" altLang="en-US" sz="1100" b="0" i="0" u="none" strike="noStrike" kern="1200" cap="none" spc="0" normalizeH="0" baseline="0" noProof="0" dirty="0" smtClean="0">
+                        <a:ln>
+                          <a:noFill/>
+                        </a:ln>
+                        <a:solidFill>
+                          <a:srgbClr val="000000"/>
+                        </a:solidFill>
+                        <a:effectLst/>
+                        <a:uLnTx/>
+                        <a:uFillTx/>
+                        <a:latin typeface="+mn-lt"/>
+                        <a:cs typeface="+mn-cs"/>
+                      </a:endParaRPr>
+                    </a:p>
+                    <a:p>
+                      <a:pPr marL="438150" marR="0" lvl="0" indent="-381000" algn="l" defTabSz="914400" rtl="0" eaLnBrk="1" fontAlgn="auto" latinLnBrk="0" hangingPunct="1">
+                        <a:lnSpc>
+                          <a:spcPct val="100000"/>
+                        </a:lnSpc>
+                        <a:spcBef>
+                          <a:spcPts val="0"/>
+                        </a:spcBef>
+                        <a:spcAft>
+                          <a:spcPts val="0"/>
+                        </a:spcAft>
+                        <a:buClrTx/>
+                        <a:buSzTx/>
+                        <a:buFont typeface="Wingdings" pitchFamily="2" charset="2"/>
+                        <a:buNone/>
+                        <a:tabLst/>
+                        <a:defRPr/>
+                      </a:pPr>
+                      <a:r>
+                        <a:rPr lang="en-US" sz="1100" baseline="0" dirty="0" smtClean="0"/>
+                        <a:t>Ross, </a:t>
+                      </a:r>
+                      <a:r>
+                        <a:rPr lang="en-US" sz="1100" dirty="0" smtClean="0"/>
+                        <a:t>Catherine E</a:t>
+                      </a:r>
+                      <a:r>
+                        <a:rPr lang="en-US" sz="1100" baseline="0" dirty="0" smtClean="0"/>
+                        <a:t>, and John </a:t>
+                      </a:r>
+                      <a:r>
+                        <a:rPr lang="en-US" sz="1100" baseline="0" dirty="0" err="1" smtClean="0"/>
+                        <a:t>Mirowksky</a:t>
+                      </a:r>
+                      <a:r>
+                        <a:rPr lang="en-US" sz="1100" baseline="0" dirty="0" smtClean="0"/>
+                        <a:t>.  </a:t>
+                      </a:r>
+                      <a:r>
+                        <a:rPr lang="en-US" sz="1100" dirty="0" smtClean="0"/>
+                        <a:t>“Does Employment Affect Health?”</a:t>
+                      </a:r>
+                    </a:p>
+                    <a:p>
+                      <a:pPr marL="438150" marR="0" lvl="0" indent="-381000" algn="l" defTabSz="914400" rtl="0" eaLnBrk="1" fontAlgn="auto" latinLnBrk="0" hangingPunct="1">
+                        <a:lnSpc>
+                          <a:spcPct val="100000"/>
+                        </a:lnSpc>
+                        <a:spcBef>
+                          <a:spcPts val="0"/>
+                        </a:spcBef>
+                        <a:spcAft>
+                          <a:spcPts val="0"/>
+                        </a:spcAft>
+                        <a:buClrTx/>
+                        <a:buSzTx/>
+                        <a:buFont typeface="Wingdings" pitchFamily="2" charset="2"/>
+                        <a:buNone/>
+                        <a:tabLst/>
+                        <a:defRPr/>
+                      </a:pPr>
+                      <a:endParaRPr kumimoji="0" lang="en-US" altLang="en-US" sz="1100" b="0" i="0" u="none" strike="noStrike" kern="1200" cap="none" spc="0" normalizeH="0" baseline="0" noProof="0" dirty="0" smtClean="0">
+                        <a:ln>
+                          <a:noFill/>
+                        </a:ln>
+                        <a:solidFill>
+                          <a:srgbClr val="000000"/>
+                        </a:solidFill>
+                        <a:effectLst/>
+                        <a:uLnTx/>
+                        <a:uFillTx/>
+                        <a:latin typeface="+mn-lt"/>
+                        <a:cs typeface="+mn-cs"/>
+                      </a:endParaRPr>
+                    </a:p>
+                    <a:p>
+                      <a:pPr marL="438150" marR="0" lvl="0" indent="-381000" algn="l" defTabSz="914400" rtl="0" eaLnBrk="1" fontAlgn="auto" latinLnBrk="0" hangingPunct="1">
+                        <a:lnSpc>
+                          <a:spcPct val="100000"/>
+                        </a:lnSpc>
+                        <a:spcBef>
+                          <a:spcPts val="0"/>
+                        </a:spcBef>
+                        <a:spcAft>
+                          <a:spcPts val="0"/>
+                        </a:spcAft>
+                        <a:buClrTx/>
+                        <a:buSzTx/>
+                        <a:buFont typeface="Wingdings" pitchFamily="2" charset="2"/>
+                        <a:buNone/>
+                        <a:tabLst/>
+                        <a:defRPr/>
+                      </a:pPr>
+                      <a:r>
+                        <a:rPr lang="en-US" sz="1100" dirty="0" smtClean="0"/>
+                        <a:t>Jin, Robert L., </a:t>
+                      </a:r>
+                      <a:r>
+                        <a:rPr lang="en-US" sz="1100" dirty="0" err="1" smtClean="0"/>
+                        <a:t>Chandrakant</a:t>
+                      </a:r>
+                      <a:r>
+                        <a:rPr lang="en-US" sz="1100" dirty="0" smtClean="0"/>
+                        <a:t> P. Shah,</a:t>
+                      </a:r>
+                      <a:r>
+                        <a:rPr lang="en-US" sz="1100" baseline="0" dirty="0" smtClean="0"/>
+                        <a:t> and </a:t>
+                      </a:r>
+                      <a:r>
+                        <a:rPr lang="en-US" sz="1100" baseline="0" dirty="0" err="1" smtClean="0"/>
+                        <a:t>Tomislav</a:t>
+                      </a:r>
+                      <a:r>
+                        <a:rPr lang="en-US" sz="1100" baseline="0" dirty="0" smtClean="0"/>
+                        <a:t> J. Svoboda.  </a:t>
+                      </a:r>
+                      <a:r>
+                        <a:rPr lang="en-US" sz="1100" dirty="0" smtClean="0"/>
+                        <a:t>“The Impact of Unemployment on Health: A Review of the Evidence”</a:t>
+                      </a:r>
+                    </a:p>
+                    <a:p>
+                      <a:pPr marL="438150" marR="0" lvl="0" indent="-381000" algn="l" defTabSz="914400" rtl="0" eaLnBrk="1" fontAlgn="auto" latinLnBrk="0" hangingPunct="1">
+                        <a:lnSpc>
+                          <a:spcPct val="100000"/>
+                        </a:lnSpc>
+                        <a:spcBef>
+                          <a:spcPts val="0"/>
+                        </a:spcBef>
+                        <a:spcAft>
+                          <a:spcPts val="0"/>
+                        </a:spcAft>
+                        <a:buClrTx/>
+                        <a:buSzTx/>
+                        <a:buFont typeface="Wingdings" pitchFamily="2" charset="2"/>
+                        <a:buNone/>
+                        <a:tabLst/>
+                        <a:defRPr/>
+                      </a:pPr>
+                      <a:endParaRPr kumimoji="0" lang="en-US" altLang="en-US" sz="1100" b="0" i="0" u="none" strike="noStrike" kern="1200" cap="none" spc="0" normalizeH="0" baseline="0" noProof="0" dirty="0" smtClean="0">
+                        <a:ln>
+                          <a:noFill/>
+                        </a:ln>
+                        <a:solidFill>
+                          <a:srgbClr val="000000"/>
+                        </a:solidFill>
+                        <a:effectLst/>
+                        <a:uLnTx/>
+                        <a:uFillTx/>
+                        <a:latin typeface="+mn-lt"/>
+                        <a:cs typeface="+mn-cs"/>
+                      </a:endParaRPr>
+                    </a:p>
                     <a:p>
                       <a:pPr marL="438150" marR="0" lvl="0" indent="-381000" algn="l" defTabSz="914400" rtl="0" eaLnBrk="1" fontAlgn="auto" latinLnBrk="0" hangingPunct="1">
                         <a:lnSpc>
@@ -15941,7 +16098,170 @@
                           <a:latin typeface="+mn-lt"/>
                           <a:cs typeface="+mn-cs"/>
                         </a:rPr>
-                        <a:t>References – Please add references to all papers/articles read by the team.</a:t>
+                        <a:t>Bernstein AB, </a:t>
+                      </a:r>
+                      <a:r>
+                        <a:rPr kumimoji="0" lang="en-US" altLang="en-US" sz="1100" b="0" i="0" u="none" strike="noStrike" kern="1200" cap="none" spc="0" normalizeH="0" baseline="0" noProof="0" dirty="0" err="1" smtClean="0">
+                          <a:ln>
+                            <a:noFill/>
+                          </a:ln>
+                          <a:solidFill>
+                            <a:srgbClr val="000000"/>
+                          </a:solidFill>
+                          <a:effectLst/>
+                          <a:uLnTx/>
+                          <a:uFillTx/>
+                          <a:latin typeface="+mn-lt"/>
+                          <a:cs typeface="+mn-cs"/>
+                        </a:rPr>
+                        <a:t>Hing</a:t>
+                      </a:r>
+                      <a:r>
+                        <a:rPr kumimoji="0" lang="en-US" altLang="en-US" sz="1100" b="0" i="0" u="none" strike="noStrike" kern="1200" cap="none" spc="0" normalizeH="0" baseline="0" noProof="0" dirty="0" smtClean="0">
+                          <a:ln>
+                            <a:noFill/>
+                          </a:ln>
+                          <a:solidFill>
+                            <a:srgbClr val="000000"/>
+                          </a:solidFill>
+                          <a:effectLst/>
+                          <a:uLnTx/>
+                          <a:uFillTx/>
+                          <a:latin typeface="+mn-lt"/>
+                          <a:cs typeface="+mn-cs"/>
+                        </a:rPr>
+                        <a:t> E, Moss AJ, Allen KF, </a:t>
+                      </a:r>
+                      <a:r>
+                        <a:rPr kumimoji="0" lang="en-US" altLang="en-US" sz="1100" b="0" i="0" u="none" strike="noStrike" kern="1200" cap="none" spc="0" normalizeH="0" baseline="0" noProof="0" dirty="0" err="1" smtClean="0">
+                          <a:ln>
+                            <a:noFill/>
+                          </a:ln>
+                          <a:solidFill>
+                            <a:srgbClr val="000000"/>
+                          </a:solidFill>
+                          <a:effectLst/>
+                          <a:uLnTx/>
+                          <a:uFillTx/>
+                          <a:latin typeface="+mn-lt"/>
+                          <a:cs typeface="+mn-cs"/>
+                        </a:rPr>
+                        <a:t>Siller</a:t>
+                      </a:r>
+                      <a:r>
+                        <a:rPr kumimoji="0" lang="en-US" altLang="en-US" sz="1100" b="0" i="0" u="none" strike="noStrike" kern="1200" cap="none" spc="0" normalizeH="0" baseline="0" noProof="0" dirty="0" smtClean="0">
+                          <a:ln>
+                            <a:noFill/>
+                          </a:ln>
+                          <a:solidFill>
+                            <a:srgbClr val="000000"/>
+                          </a:solidFill>
+                          <a:effectLst/>
+                          <a:uLnTx/>
+                          <a:uFillTx/>
+                          <a:latin typeface="+mn-lt"/>
+                          <a:cs typeface="+mn-cs"/>
+                        </a:rPr>
+                        <a:t> AB, </a:t>
+                      </a:r>
+                      <a:r>
+                        <a:rPr kumimoji="0" lang="en-US" altLang="en-US" sz="1100" b="0" i="0" u="none" strike="noStrike" kern="1200" cap="none" spc="0" normalizeH="0" baseline="0" noProof="0" dirty="0" err="1" smtClean="0">
+                          <a:ln>
+                            <a:noFill/>
+                          </a:ln>
+                          <a:solidFill>
+                            <a:srgbClr val="000000"/>
+                          </a:solidFill>
+                          <a:effectLst/>
+                          <a:uLnTx/>
+                          <a:uFillTx/>
+                          <a:latin typeface="+mn-lt"/>
+                          <a:cs typeface="+mn-cs"/>
+                        </a:rPr>
+                        <a:t>Tiggle</a:t>
+                      </a:r>
+                      <a:r>
+                        <a:rPr kumimoji="0" lang="en-US" altLang="en-US" sz="1100" b="0" i="0" u="none" strike="noStrike" kern="1200" cap="none" spc="0" normalizeH="0" baseline="0" noProof="0" dirty="0" smtClean="0">
+                          <a:ln>
+                            <a:noFill/>
+                          </a:ln>
+                          <a:solidFill>
+                            <a:srgbClr val="000000"/>
+                          </a:solidFill>
+                          <a:effectLst/>
+                          <a:uLnTx/>
+                          <a:uFillTx/>
+                          <a:latin typeface="+mn-lt"/>
+                          <a:cs typeface="+mn-cs"/>
+                        </a:rPr>
+                        <a:t> RB.  “Health care in America: Trends in utilization”</a:t>
+                      </a:r>
+                    </a:p>
+                    <a:p>
+                      <a:pPr marL="438150" marR="0" lvl="0" indent="-381000" algn="l" defTabSz="914400" rtl="0" eaLnBrk="1" fontAlgn="auto" latinLnBrk="0" hangingPunct="1">
+                        <a:lnSpc>
+                          <a:spcPct val="100000"/>
+                        </a:lnSpc>
+                        <a:spcBef>
+                          <a:spcPts val="0"/>
+                        </a:spcBef>
+                        <a:spcAft>
+                          <a:spcPts val="0"/>
+                        </a:spcAft>
+                        <a:buClrTx/>
+                        <a:buSzTx/>
+                        <a:buFont typeface="Wingdings" pitchFamily="2" charset="2"/>
+                        <a:buNone/>
+                        <a:tabLst/>
+                        <a:defRPr/>
+                      </a:pPr>
+                      <a:endParaRPr kumimoji="0" lang="en-US" altLang="en-US" sz="1100" b="0" i="0" u="none" strike="noStrike" kern="1200" cap="none" spc="0" normalizeH="0" baseline="0" noProof="0" dirty="0" smtClean="0">
+                        <a:ln>
+                          <a:noFill/>
+                        </a:ln>
+                        <a:solidFill>
+                          <a:srgbClr val="000000"/>
+                        </a:solidFill>
+                        <a:effectLst/>
+                        <a:uLnTx/>
+                        <a:uFillTx/>
+                        <a:latin typeface="+mn-lt"/>
+                        <a:cs typeface="+mn-cs"/>
+                      </a:endParaRPr>
+                    </a:p>
+                    <a:p>
+                      <a:pPr marL="438150" marR="0" lvl="0" indent="-381000" algn="l" defTabSz="914400" rtl="0" eaLnBrk="1" fontAlgn="auto" latinLnBrk="0" hangingPunct="1">
+                        <a:lnSpc>
+                          <a:spcPct val="100000"/>
+                        </a:lnSpc>
+                        <a:spcBef>
+                          <a:spcPts val="0"/>
+                        </a:spcBef>
+                        <a:spcAft>
+                          <a:spcPts val="0"/>
+                        </a:spcAft>
+                        <a:buClrTx/>
+                        <a:buSzTx/>
+                        <a:buFont typeface="Wingdings" pitchFamily="2" charset="2"/>
+                        <a:buNone/>
+                        <a:tabLst/>
+                        <a:defRPr/>
+                      </a:pPr>
+                      <a:r>
+                        <a:rPr kumimoji="0" lang="en-US" altLang="en-US" sz="1100" b="0" i="0" u="none" strike="noStrike" kern="1200" cap="none" spc="0" normalizeH="0" baseline="0" noProof="0" dirty="0" smtClean="0">
+                          <a:ln>
+                            <a:noFill/>
+                          </a:ln>
+                          <a:solidFill>
+                            <a:srgbClr val="000000"/>
+                          </a:solidFill>
+                          <a:effectLst/>
+                          <a:uLnTx/>
+                          <a:uFillTx/>
+                          <a:latin typeface="+mn-lt"/>
+                          <a:cs typeface="+mn-cs"/>
+                        </a:rPr>
+                        <a:t>Adler, Nancy E., and Katherine Newman.  “Socioeconomic Disparities In Health: Pathways and Policies”</a:t>
                       </a:r>
                     </a:p>
                   </a:txBody>
@@ -15993,36 +16313,6 @@
                     </a:solidFill>
                   </a:tcPr>
                 </a:tc>
-                <a:tc hMerge="1">
-                  <a:txBody>
-                    <a:bodyPr/>
-                    <a:lstStyle/>
-                    <a:p>
-                      <a:endParaRPr lang="en-US"/>
-                    </a:p>
-                  </a:txBody>
-                  <a:tcPr/>
-                </a:tc>
-                <a:tc hMerge="1">
-                  <a:txBody>
-                    <a:bodyPr/>
-                    <a:lstStyle/>
-                    <a:p>
-                      <a:endParaRPr lang="en-US"/>
-                    </a:p>
-                  </a:txBody>
-                  <a:tcPr/>
-                </a:tc>
-                <a:tc hMerge="1">
-                  <a:txBody>
-                    <a:bodyPr/>
-                    <a:lstStyle/>
-                    <a:p>
-                      <a:endParaRPr lang="en-US"/>
-                    </a:p>
-                  </a:txBody>
-                  <a:tcPr/>
-                </a:tc>
               </a:tr>
             </a:tbl>
           </a:graphicData>
@@ -16031,7 +16321,7 @@
     </p:spTree>
     <p:extLst>
       <p:ext uri="{BB962C8B-B14F-4D97-AF65-F5344CB8AC3E}">
-        <p14:creationId xmlns:p14="http://schemas.microsoft.com/office/powerpoint/2010/main" xmlns:p="http://schemas.openxmlformats.org/presentationml/2006/main" xmlns:r="http://schemas.openxmlformats.org/officeDocument/2006/relationships" xmlns:a="http://schemas.openxmlformats.org/drawingml/2006/main" xmlns="" val="3852912342"/>
+        <p14:creationId xmlns:p14="http://schemas.microsoft.com/office/powerpoint/2010/main" xmlns:p="http://schemas.openxmlformats.org/presentationml/2006/main" xmlns:r="http://schemas.openxmlformats.org/officeDocument/2006/relationships" xmlns:a="http://schemas.openxmlformats.org/drawingml/2006/main" xmlns="" val="1728810535"/>
       </p:ext>
     </p:extLst>
   </p:cSld>

</xml_diff>

<commit_message>
Updated the proposal and milestones
</commit_message>
<xml_diff>
--- a/Proposal/Project Proposal.pptx
+++ b/Proposal/Project Proposal.pptx
@@ -1,6 +1,6 @@
 
 <file path=ppt/presentation.xml><?xml version="1.0" encoding="utf-8"?>
-<p:presentation xmlns:a="http://schemas.openxmlformats.org/drawingml/2006/main" xmlns:r="http://schemas.openxmlformats.org/officeDocument/2006/relationships" xmlns:mc="http://schemas.openxmlformats.org/markup-compatibility/2006" xmlns:mv="urn:schemas-microsoft-com:mac:vml" xmlns:p="http://schemas.openxmlformats.org/presentationml/2006/main" mc:Ignorable="mv" mc:PreserveAttributes="mv:*" showSpecialPlsOnTitleSld="0" saveSubsetFonts="1">
+<p:presentation xmlns:a="http://schemas.openxmlformats.org/drawingml/2006/main" xmlns:r="http://schemas.openxmlformats.org/officeDocument/2006/relationships" xmlns:p="http://schemas.openxmlformats.org/presentationml/2006/main" showSpecialPlsOnTitleSld="0" saveSubsetFonts="1">
   <p:sldMasterIdLst>
     <p:sldMasterId id="2147483886" r:id="rId1"/>
     <p:sldMasterId id="2147483888" r:id="rId2"/>
@@ -139,11 +139,27 @@
       </a:defRPr>
     </a:lvl9pPr>
   </p:defaultTextStyle>
+  <p:extLst>
+    <p:ext uri="{EFAFB233-063F-42B5-8137-9DF3F51BA10A}">
+      <p15:sldGuideLst xmlns:p15="http://schemas.microsoft.com/office/powerpoint/2012/main">
+        <p15:guide id="1" orient="horz" pos="2160">
+          <p15:clr>
+            <a:srgbClr val="A4A3A4"/>
+          </p15:clr>
+        </p15:guide>
+        <p15:guide id="2" pos="2880">
+          <p15:clr>
+            <a:srgbClr val="A4A3A4"/>
+          </p15:clr>
+        </p15:guide>
+      </p15:sldGuideLst>
+    </p:ext>
+  </p:extLst>
 </p:presentation>
 </file>
 
 <file path=ppt/notesMasters/notesMaster1.xml><?xml version="1.0" encoding="utf-8"?>
-<p:notesMaster xmlns:a="http://schemas.openxmlformats.org/drawingml/2006/main" xmlns:r="http://schemas.openxmlformats.org/officeDocument/2006/relationships" xmlns:mc="http://schemas.openxmlformats.org/markup-compatibility/2006" xmlns:mv="urn:schemas-microsoft-com:mac:vml" xmlns:p="http://schemas.openxmlformats.org/presentationml/2006/main" mc:Ignorable="mv" mc:PreserveAttributes="mv:*">
+<p:notesMaster xmlns:a="http://schemas.openxmlformats.org/drawingml/2006/main" xmlns:r="http://schemas.openxmlformats.org/officeDocument/2006/relationships" xmlns:p="http://schemas.openxmlformats.org/presentationml/2006/main">
   <p:cSld>
     <p:bg>
       <p:bgPr>
@@ -192,14 +208,14 @@
           <a:effectLst/>
           <a:extLst>
             <a:ext uri="{909E8E84-426E-40DD-AFC4-6F175D3DCCD1}">
-              <a14:hiddenFill xmlns:a14="http://schemas.microsoft.com/office/drawing/2010/main" xmlns:p="http://schemas.openxmlformats.org/presentationml/2006/main" xmlns:r="http://schemas.openxmlformats.org/officeDocument/2006/relationships" xmlns:a="http://schemas.openxmlformats.org/drawingml/2006/main" xmlns="">
+              <a14:hiddenFill xmlns:a14="http://schemas.microsoft.com/office/drawing/2010/main">
                 <a:solidFill>
                   <a:schemeClr val="accent1"/>
                 </a:solidFill>
               </a14:hiddenFill>
             </a:ext>
             <a:ext uri="{91240B29-F687-4F45-9708-019B960494DF}">
-              <a14:hiddenLine xmlns:a14="http://schemas.microsoft.com/office/drawing/2010/main" xmlns:p="http://schemas.openxmlformats.org/presentationml/2006/main" xmlns:r="http://schemas.openxmlformats.org/officeDocument/2006/relationships" xmlns:a="http://schemas.openxmlformats.org/drawingml/2006/main" xmlns="" w="9525">
+              <a14:hiddenLine xmlns:a14="http://schemas.microsoft.com/office/drawing/2010/main" w="9525">
                 <a:solidFill>
                   <a:schemeClr val="tx1"/>
                 </a:solidFill>
@@ -209,7 +225,7 @@
               </a14:hiddenLine>
             </a:ext>
             <a:ext uri="{AF507438-7753-43E0-B8FC-AC1667EBCBE1}">
-              <a14:hiddenEffects xmlns:a14="http://schemas.microsoft.com/office/drawing/2010/main" xmlns:p="http://schemas.openxmlformats.org/presentationml/2006/main" xmlns:r="http://schemas.openxmlformats.org/officeDocument/2006/relationships" xmlns:a="http://schemas.openxmlformats.org/drawingml/2006/main" xmlns="">
+              <a14:hiddenEffects xmlns:a14="http://schemas.microsoft.com/office/drawing/2010/main">
                 <a:effectLst>
                   <a:outerShdw dist="35921" dir="2700000" algn="ctr" rotWithShape="0">
                     <a:schemeClr val="bg2"/>
@@ -265,14 +281,14 @@
           <a:effectLst/>
           <a:extLst>
             <a:ext uri="{909E8E84-426E-40DD-AFC4-6F175D3DCCD1}">
-              <a14:hiddenFill xmlns:a14="http://schemas.microsoft.com/office/drawing/2010/main" xmlns:p="http://schemas.openxmlformats.org/presentationml/2006/main" xmlns:r="http://schemas.openxmlformats.org/officeDocument/2006/relationships" xmlns:a="http://schemas.openxmlformats.org/drawingml/2006/main" xmlns="">
+              <a14:hiddenFill xmlns:a14="http://schemas.microsoft.com/office/drawing/2010/main">
                 <a:solidFill>
                   <a:schemeClr val="accent1"/>
                 </a:solidFill>
               </a14:hiddenFill>
             </a:ext>
             <a:ext uri="{91240B29-F687-4F45-9708-019B960494DF}">
-              <a14:hiddenLine xmlns:a14="http://schemas.microsoft.com/office/drawing/2010/main" xmlns:p="http://schemas.openxmlformats.org/presentationml/2006/main" xmlns:r="http://schemas.openxmlformats.org/officeDocument/2006/relationships" xmlns:a="http://schemas.openxmlformats.org/drawingml/2006/main" xmlns="" w="9525">
+              <a14:hiddenLine xmlns:a14="http://schemas.microsoft.com/office/drawing/2010/main" w="9525">
                 <a:solidFill>
                   <a:schemeClr val="tx1"/>
                 </a:solidFill>
@@ -282,7 +298,7 @@
               </a14:hiddenLine>
             </a:ext>
             <a:ext uri="{AF507438-7753-43E0-B8FC-AC1667EBCBE1}">
-              <a14:hiddenEffects xmlns:a14="http://schemas.microsoft.com/office/drawing/2010/main" xmlns:p="http://schemas.openxmlformats.org/presentationml/2006/main" xmlns:r="http://schemas.openxmlformats.org/officeDocument/2006/relationships" xmlns:a="http://schemas.openxmlformats.org/drawingml/2006/main" xmlns="">
+              <a14:hiddenEffects xmlns:a14="http://schemas.microsoft.com/office/drawing/2010/main">
                 <a:effectLst>
                   <a:outerShdw dist="35921" dir="2700000" algn="ctr" rotWithShape="0">
                     <a:schemeClr val="bg2"/>
@@ -343,14 +359,14 @@
           <a:effectLst/>
           <a:extLst>
             <a:ext uri="{909E8E84-426E-40DD-AFC4-6F175D3DCCD1}">
-              <a14:hiddenFill xmlns:a14="http://schemas.microsoft.com/office/drawing/2010/main" xmlns:p="http://schemas.openxmlformats.org/presentationml/2006/main" xmlns:r="http://schemas.openxmlformats.org/officeDocument/2006/relationships" xmlns:a="http://schemas.openxmlformats.org/drawingml/2006/main" xmlns="">
+              <a14:hiddenFill xmlns:a14="http://schemas.microsoft.com/office/drawing/2010/main">
                 <a:solidFill>
                   <a:srgbClr val="FFFFFF"/>
                 </a:solidFill>
               </a14:hiddenFill>
             </a:ext>
             <a:ext uri="{AF507438-7753-43E0-B8FC-AC1667EBCBE1}">
-              <a14:hiddenEffects xmlns:a14="http://schemas.microsoft.com/office/drawing/2010/main" xmlns:p="http://schemas.openxmlformats.org/presentationml/2006/main" xmlns:r="http://schemas.openxmlformats.org/officeDocument/2006/relationships" xmlns:a="http://schemas.openxmlformats.org/drawingml/2006/main" xmlns="">
+              <a14:hiddenEffects xmlns:a14="http://schemas.microsoft.com/office/drawing/2010/main">
                 <a:effectLst>
                   <a:outerShdw dist="35921" dir="2700000" algn="ctr" rotWithShape="0">
                     <a:srgbClr val="808080"/>
@@ -359,7 +375,7 @@
               </a14:hiddenEffects>
             </a:ext>
             <a:ext uri="{53640926-AAD7-44D8-BBD7-CCE9431645EC}">
-              <a14:shadowObscured xmlns:a14="http://schemas.microsoft.com/office/drawing/2010/main" xmlns:p="http://schemas.openxmlformats.org/presentationml/2006/main" xmlns:r="http://schemas.openxmlformats.org/officeDocument/2006/relationships" xmlns:a="http://schemas.openxmlformats.org/drawingml/2006/main" xmlns="" val="1"/>
+              <a14:shadowObscured xmlns:a14="http://schemas.microsoft.com/office/drawing/2010/main" val="1"/>
             </a:ext>
           </a:extLst>
         </p:spPr>
@@ -389,14 +405,14 @@
           <a:effectLst/>
           <a:extLst>
             <a:ext uri="{909E8E84-426E-40DD-AFC4-6F175D3DCCD1}">
-              <a14:hiddenFill xmlns:a14="http://schemas.microsoft.com/office/drawing/2010/main" xmlns:p="http://schemas.openxmlformats.org/presentationml/2006/main" xmlns:r="http://schemas.openxmlformats.org/officeDocument/2006/relationships" xmlns:a="http://schemas.openxmlformats.org/drawingml/2006/main" xmlns="">
+              <a14:hiddenFill xmlns:a14="http://schemas.microsoft.com/office/drawing/2010/main">
                 <a:solidFill>
                   <a:schemeClr val="accent1"/>
                 </a:solidFill>
               </a14:hiddenFill>
             </a:ext>
             <a:ext uri="{91240B29-F687-4F45-9708-019B960494DF}">
-              <a14:hiddenLine xmlns:a14="http://schemas.microsoft.com/office/drawing/2010/main" xmlns:p="http://schemas.openxmlformats.org/presentationml/2006/main" xmlns:r="http://schemas.openxmlformats.org/officeDocument/2006/relationships" xmlns:a="http://schemas.openxmlformats.org/drawingml/2006/main" xmlns="" w="9525">
+              <a14:hiddenLine xmlns:a14="http://schemas.microsoft.com/office/drawing/2010/main" w="9525">
                 <a:solidFill>
                   <a:schemeClr val="tx1"/>
                 </a:solidFill>
@@ -406,7 +422,7 @@
               </a14:hiddenLine>
             </a:ext>
             <a:ext uri="{AF507438-7753-43E0-B8FC-AC1667EBCBE1}">
-              <a14:hiddenEffects xmlns:a14="http://schemas.microsoft.com/office/drawing/2010/main" xmlns:p="http://schemas.openxmlformats.org/presentationml/2006/main" xmlns:r="http://schemas.openxmlformats.org/officeDocument/2006/relationships" xmlns:a="http://schemas.openxmlformats.org/drawingml/2006/main" xmlns="">
+              <a14:hiddenEffects xmlns:a14="http://schemas.microsoft.com/office/drawing/2010/main">
                 <a:effectLst>
                   <a:outerShdw dist="35921" dir="2700000" algn="ctr" rotWithShape="0">
                     <a:schemeClr val="bg2"/>
@@ -485,14 +501,14 @@
           <a:effectLst/>
           <a:extLst>
             <a:ext uri="{909E8E84-426E-40DD-AFC4-6F175D3DCCD1}">
-              <a14:hiddenFill xmlns:a14="http://schemas.microsoft.com/office/drawing/2010/main" xmlns:p="http://schemas.openxmlformats.org/presentationml/2006/main" xmlns:r="http://schemas.openxmlformats.org/officeDocument/2006/relationships" xmlns:a="http://schemas.openxmlformats.org/drawingml/2006/main" xmlns="">
+              <a14:hiddenFill xmlns:a14="http://schemas.microsoft.com/office/drawing/2010/main">
                 <a:solidFill>
                   <a:schemeClr val="accent1"/>
                 </a:solidFill>
               </a14:hiddenFill>
             </a:ext>
             <a:ext uri="{91240B29-F687-4F45-9708-019B960494DF}">
-              <a14:hiddenLine xmlns:a14="http://schemas.microsoft.com/office/drawing/2010/main" xmlns:p="http://schemas.openxmlformats.org/presentationml/2006/main" xmlns:r="http://schemas.openxmlformats.org/officeDocument/2006/relationships" xmlns:a="http://schemas.openxmlformats.org/drawingml/2006/main" xmlns="" w="9525">
+              <a14:hiddenLine xmlns:a14="http://schemas.microsoft.com/office/drawing/2010/main" w="9525">
                 <a:solidFill>
                   <a:schemeClr val="tx1"/>
                 </a:solidFill>
@@ -502,7 +518,7 @@
               </a14:hiddenLine>
             </a:ext>
             <a:ext uri="{AF507438-7753-43E0-B8FC-AC1667EBCBE1}">
-              <a14:hiddenEffects xmlns:a14="http://schemas.microsoft.com/office/drawing/2010/main" xmlns:p="http://schemas.openxmlformats.org/presentationml/2006/main" xmlns:r="http://schemas.openxmlformats.org/officeDocument/2006/relationships" xmlns:a="http://schemas.openxmlformats.org/drawingml/2006/main" xmlns="">
+              <a14:hiddenEffects xmlns:a14="http://schemas.microsoft.com/office/drawing/2010/main">
                 <a:effectLst>
                   <a:outerShdw dist="35921" dir="2700000" algn="ctr" rotWithShape="0">
                     <a:schemeClr val="bg2"/>
@@ -558,14 +574,14 @@
           <a:effectLst/>
           <a:extLst>
             <a:ext uri="{909E8E84-426E-40DD-AFC4-6F175D3DCCD1}">
-              <a14:hiddenFill xmlns:a14="http://schemas.microsoft.com/office/drawing/2010/main" xmlns:p="http://schemas.openxmlformats.org/presentationml/2006/main" xmlns:r="http://schemas.openxmlformats.org/officeDocument/2006/relationships" xmlns:a="http://schemas.openxmlformats.org/drawingml/2006/main" xmlns="">
+              <a14:hiddenFill xmlns:a14="http://schemas.microsoft.com/office/drawing/2010/main">
                 <a:solidFill>
                   <a:schemeClr val="accent1"/>
                 </a:solidFill>
               </a14:hiddenFill>
             </a:ext>
             <a:ext uri="{91240B29-F687-4F45-9708-019B960494DF}">
-              <a14:hiddenLine xmlns:a14="http://schemas.microsoft.com/office/drawing/2010/main" xmlns:p="http://schemas.openxmlformats.org/presentationml/2006/main" xmlns:r="http://schemas.openxmlformats.org/officeDocument/2006/relationships" xmlns:a="http://schemas.openxmlformats.org/drawingml/2006/main" xmlns="" w="9525">
+              <a14:hiddenLine xmlns:a14="http://schemas.microsoft.com/office/drawing/2010/main" w="9525">
                 <a:solidFill>
                   <a:schemeClr val="tx1"/>
                 </a:solidFill>
@@ -575,7 +591,7 @@
               </a14:hiddenLine>
             </a:ext>
             <a:ext uri="{AF507438-7753-43E0-B8FC-AC1667EBCBE1}">
-              <a14:hiddenEffects xmlns:a14="http://schemas.microsoft.com/office/drawing/2010/main" xmlns:p="http://schemas.openxmlformats.org/presentationml/2006/main" xmlns:r="http://schemas.openxmlformats.org/officeDocument/2006/relationships" xmlns:a="http://schemas.openxmlformats.org/drawingml/2006/main" xmlns="">
+              <a14:hiddenEffects xmlns:a14="http://schemas.microsoft.com/office/drawing/2010/main">
                 <a:effectLst>
                   <a:outerShdw dist="35921" dir="2700000" algn="ctr" rotWithShape="0">
                     <a:schemeClr val="bg2"/>
@@ -616,7 +632,7 @@
     </p:spTree>
     <p:extLst>
       <p:ext uri="{BB962C8B-B14F-4D97-AF65-F5344CB8AC3E}">
-        <p14:creationId xmlns:p14="http://schemas.microsoft.com/office/powerpoint/2010/main" xmlns:p="http://schemas.openxmlformats.org/presentationml/2006/main" xmlns:r="http://schemas.openxmlformats.org/officeDocument/2006/relationships" xmlns:a="http://schemas.openxmlformats.org/drawingml/2006/main" xmlns="" val="1219703977"/>
+        <p14:creationId xmlns:p14="http://schemas.microsoft.com/office/powerpoint/2010/main" val="1219703977"/>
       </p:ext>
     </p:extLst>
   </p:cSld>
@@ -747,7 +763,7 @@
 </file>
 
 <file path=ppt/slideLayouts/slideLayout1.xml><?xml version="1.0" encoding="utf-8"?>
-<p:sldLayout xmlns:a="http://schemas.openxmlformats.org/drawingml/2006/main" xmlns:r="http://schemas.openxmlformats.org/officeDocument/2006/relationships" xmlns:mc="http://schemas.openxmlformats.org/markup-compatibility/2006" xmlns:mv="urn:schemas-microsoft-com:mac:vml" xmlns:p="http://schemas.openxmlformats.org/presentationml/2006/main" mc:Ignorable="mv" mc:PreserveAttributes="mv:*" showMasterSp="0" type="title" preserve="1">
+<p:sldLayout xmlns:a="http://schemas.openxmlformats.org/drawingml/2006/main" xmlns:r="http://schemas.openxmlformats.org/officeDocument/2006/relationships" xmlns:p="http://schemas.openxmlformats.org/presentationml/2006/main" showMasterSp="0" type="title" preserve="1">
   <p:cSld name="Title Slide">
     <p:spTree>
       <p:nvGrpSpPr>
@@ -788,7 +804,7 @@
           <a:effectLst/>
           <a:extLst>
             <a:ext uri="{91240B29-F687-4F45-9708-019B960494DF}">
-              <a14:hiddenLine xmlns:a14="http://schemas.microsoft.com/office/drawing/2010/main" xmlns:p="http://schemas.openxmlformats.org/presentationml/2006/main" xmlns:r="http://schemas.openxmlformats.org/officeDocument/2006/relationships" xmlns:a="http://schemas.openxmlformats.org/drawingml/2006/main" xmlns="" w="9525">
+              <a14:hiddenLine xmlns:a14="http://schemas.microsoft.com/office/drawing/2010/main" w="9525">
                 <a:solidFill>
                   <a:schemeClr val="tx1"/>
                 </a:solidFill>
@@ -798,7 +814,7 @@
               </a14:hiddenLine>
             </a:ext>
             <a:ext uri="{AF507438-7753-43E0-B8FC-AC1667EBCBE1}">
-              <a14:hiddenEffects xmlns:a14="http://schemas.microsoft.com/office/drawing/2010/main" xmlns:p="http://schemas.openxmlformats.org/presentationml/2006/main" xmlns:r="http://schemas.openxmlformats.org/officeDocument/2006/relationships" xmlns:a="http://schemas.openxmlformats.org/drawingml/2006/main" xmlns="">
+              <a14:hiddenEffects xmlns:a14="http://schemas.microsoft.com/office/drawing/2010/main">
                 <a:effectLst>
                   <a:outerShdw dist="35921" dir="2700000" algn="ctr" rotWithShape="0">
                     <a:schemeClr val="bg2"/>
@@ -950,7 +966,7 @@
           <a:effectLst/>
           <a:extLst>
             <a:ext uri="{91240B29-F687-4F45-9708-019B960494DF}">
-              <a14:hiddenLine xmlns:a14="http://schemas.microsoft.com/office/drawing/2010/main" xmlns:p="http://schemas.openxmlformats.org/presentationml/2006/main" xmlns:r="http://schemas.openxmlformats.org/officeDocument/2006/relationships" xmlns:a="http://schemas.openxmlformats.org/drawingml/2006/main" xmlns="" w="9525">
+              <a14:hiddenLine xmlns:a14="http://schemas.microsoft.com/office/drawing/2010/main" w="9525">
                 <a:solidFill>
                   <a:schemeClr val="tx1"/>
                 </a:solidFill>
@@ -960,7 +976,7 @@
               </a14:hiddenLine>
             </a:ext>
             <a:ext uri="{AF507438-7753-43E0-B8FC-AC1667EBCBE1}">
-              <a14:hiddenEffects xmlns:a14="http://schemas.microsoft.com/office/drawing/2010/main" xmlns:p="http://schemas.openxmlformats.org/presentationml/2006/main" xmlns:r="http://schemas.openxmlformats.org/officeDocument/2006/relationships" xmlns:a="http://schemas.openxmlformats.org/drawingml/2006/main" xmlns="">
+              <a14:hiddenEffects xmlns:a14="http://schemas.microsoft.com/office/drawing/2010/main">
                 <a:effectLst>
                   <a:outerShdw dist="35921" dir="2700000" algn="ctr" rotWithShape="0">
                     <a:schemeClr val="bg2"/>
@@ -1112,7 +1128,7 @@
           <a:effectLst/>
           <a:extLst>
             <a:ext uri="{91240B29-F687-4F45-9708-019B960494DF}">
-              <a14:hiddenLine xmlns:a14="http://schemas.microsoft.com/office/drawing/2010/main" xmlns:p="http://schemas.openxmlformats.org/presentationml/2006/main" xmlns:r="http://schemas.openxmlformats.org/officeDocument/2006/relationships" xmlns:a="http://schemas.openxmlformats.org/drawingml/2006/main" xmlns="" w="9525">
+              <a14:hiddenLine xmlns:a14="http://schemas.microsoft.com/office/drawing/2010/main" w="9525">
                 <a:solidFill>
                   <a:schemeClr val="tx1"/>
                 </a:solidFill>
@@ -1122,7 +1138,7 @@
               </a14:hiddenLine>
             </a:ext>
             <a:ext uri="{AF507438-7753-43E0-B8FC-AC1667EBCBE1}">
-              <a14:hiddenEffects xmlns:a14="http://schemas.microsoft.com/office/drawing/2010/main" xmlns:p="http://schemas.openxmlformats.org/presentationml/2006/main" xmlns:r="http://schemas.openxmlformats.org/officeDocument/2006/relationships" xmlns:a="http://schemas.openxmlformats.org/drawingml/2006/main" xmlns="">
+              <a14:hiddenEffects xmlns:a14="http://schemas.microsoft.com/office/drawing/2010/main">
                 <a:effectLst>
                   <a:outerShdw dist="35921" dir="2700000" algn="ctr" rotWithShape="0">
                     <a:schemeClr val="bg2"/>
@@ -1385,7 +1401,7 @@
     </p:spTree>
     <p:extLst>
       <p:ext uri="{BB962C8B-B14F-4D97-AF65-F5344CB8AC3E}">
-        <p14:creationId xmlns:p14="http://schemas.microsoft.com/office/powerpoint/2010/main" xmlns:p="http://schemas.openxmlformats.org/presentationml/2006/main" xmlns:r="http://schemas.openxmlformats.org/officeDocument/2006/relationships" xmlns:a="http://schemas.openxmlformats.org/drawingml/2006/main" xmlns="" val="698456182"/>
+        <p14:creationId xmlns:p14="http://schemas.microsoft.com/office/powerpoint/2010/main" val="698456182"/>
       </p:ext>
     </p:extLst>
   </p:cSld>
@@ -1396,7 +1412,7 @@
 </file>
 
 <file path=ppt/slideLayouts/slideLayout10.xml><?xml version="1.0" encoding="utf-8"?>
-<p:sldLayout xmlns:a="http://schemas.openxmlformats.org/drawingml/2006/main" xmlns:r="http://schemas.openxmlformats.org/officeDocument/2006/relationships" xmlns:mc="http://schemas.openxmlformats.org/markup-compatibility/2006" xmlns:mv="urn:schemas-microsoft-com:mac:vml" xmlns:p="http://schemas.openxmlformats.org/presentationml/2006/main" mc:Ignorable="mv" mc:PreserveAttributes="mv:*" type="vertTx" preserve="1">
+<p:sldLayout xmlns:a="http://schemas.openxmlformats.org/drawingml/2006/main" xmlns:r="http://schemas.openxmlformats.org/officeDocument/2006/relationships" xmlns:p="http://schemas.openxmlformats.org/presentationml/2006/main" type="vertTx" preserve="1">
   <p:cSld name="Title and Vertical Text">
     <p:spTree>
       <p:nvGrpSpPr>
@@ -1556,7 +1572,7 @@
     </p:spTree>
     <p:extLst>
       <p:ext uri="{BB962C8B-B14F-4D97-AF65-F5344CB8AC3E}">
-        <p14:creationId xmlns:p14="http://schemas.microsoft.com/office/powerpoint/2010/main" xmlns:p="http://schemas.openxmlformats.org/presentationml/2006/main" xmlns:r="http://schemas.openxmlformats.org/officeDocument/2006/relationships" xmlns:a="http://schemas.openxmlformats.org/drawingml/2006/main" xmlns="" val="718308142"/>
+        <p14:creationId xmlns:p14="http://schemas.microsoft.com/office/powerpoint/2010/main" val="718308142"/>
       </p:ext>
     </p:extLst>
   </p:cSld>
@@ -1567,7 +1583,7 @@
 </file>
 
 <file path=ppt/slideLayouts/slideLayout11.xml><?xml version="1.0" encoding="utf-8"?>
-<p:sldLayout xmlns:a="http://schemas.openxmlformats.org/drawingml/2006/main" xmlns:r="http://schemas.openxmlformats.org/officeDocument/2006/relationships" xmlns:mc="http://schemas.openxmlformats.org/markup-compatibility/2006" xmlns:mv="urn:schemas-microsoft-com:mac:vml" xmlns:p="http://schemas.openxmlformats.org/presentationml/2006/main" mc:Ignorable="mv" mc:PreserveAttributes="mv:*" type="vertTitleAndTx" preserve="1">
+<p:sldLayout xmlns:a="http://schemas.openxmlformats.org/drawingml/2006/main" xmlns:r="http://schemas.openxmlformats.org/officeDocument/2006/relationships" xmlns:p="http://schemas.openxmlformats.org/presentationml/2006/main" type="vertTitleAndTx" preserve="1">
   <p:cSld name="Vertical Title and Text">
     <p:spTree>
       <p:nvGrpSpPr>
@@ -1737,7 +1753,7 @@
     </p:spTree>
     <p:extLst>
       <p:ext uri="{BB962C8B-B14F-4D97-AF65-F5344CB8AC3E}">
-        <p14:creationId xmlns:p14="http://schemas.microsoft.com/office/powerpoint/2010/main" xmlns:p="http://schemas.openxmlformats.org/presentationml/2006/main" xmlns:r="http://schemas.openxmlformats.org/officeDocument/2006/relationships" xmlns:a="http://schemas.openxmlformats.org/drawingml/2006/main" xmlns="" val="1947262867"/>
+        <p14:creationId xmlns:p14="http://schemas.microsoft.com/office/powerpoint/2010/main" val="1947262867"/>
       </p:ext>
     </p:extLst>
   </p:cSld>
@@ -1748,7 +1764,7 @@
 </file>
 
 <file path=ppt/slideLayouts/slideLayout12.xml><?xml version="1.0" encoding="utf-8"?>
-<p:sldLayout xmlns:a="http://schemas.openxmlformats.org/drawingml/2006/main" xmlns:r="http://schemas.openxmlformats.org/officeDocument/2006/relationships" xmlns:mc="http://schemas.openxmlformats.org/markup-compatibility/2006" xmlns:mv="urn:schemas-microsoft-com:mac:vml" xmlns:p="http://schemas.openxmlformats.org/presentationml/2006/main" mc:Ignorable="mv" mc:PreserveAttributes="mv:*" type="txAndObj" preserve="1">
+<p:sldLayout xmlns:a="http://schemas.openxmlformats.org/drawingml/2006/main" xmlns:r="http://schemas.openxmlformats.org/officeDocument/2006/relationships" xmlns:p="http://schemas.openxmlformats.org/presentationml/2006/main" type="txAndObj" preserve="1">
   <p:cSld name="Title, Text, and Content">
     <p:spTree>
       <p:nvGrpSpPr>
@@ -1975,7 +1991,7 @@
     </p:spTree>
     <p:extLst>
       <p:ext uri="{BB962C8B-B14F-4D97-AF65-F5344CB8AC3E}">
-        <p14:creationId xmlns:p14="http://schemas.microsoft.com/office/powerpoint/2010/main" xmlns:p="http://schemas.openxmlformats.org/presentationml/2006/main" xmlns:r="http://schemas.openxmlformats.org/officeDocument/2006/relationships" xmlns:a="http://schemas.openxmlformats.org/drawingml/2006/main" xmlns="" val="2734291439"/>
+        <p14:creationId xmlns:p14="http://schemas.microsoft.com/office/powerpoint/2010/main" val="2734291439"/>
       </p:ext>
     </p:extLst>
   </p:cSld>
@@ -1986,7 +2002,7 @@
 </file>
 
 <file path=ppt/slideLayouts/slideLayout13.xml><?xml version="1.0" encoding="utf-8"?>
-<p:sldLayout xmlns:a="http://schemas.openxmlformats.org/drawingml/2006/main" xmlns:r="http://schemas.openxmlformats.org/officeDocument/2006/relationships" xmlns:mc="http://schemas.openxmlformats.org/markup-compatibility/2006" xmlns:mv="urn:schemas-microsoft-com:mac:vml" xmlns:p="http://schemas.openxmlformats.org/presentationml/2006/main" mc:Ignorable="mv" mc:PreserveAttributes="mv:*" showMasterSp="0" type="title" preserve="1">
+<p:sldLayout xmlns:a="http://schemas.openxmlformats.org/drawingml/2006/main" xmlns:r="http://schemas.openxmlformats.org/officeDocument/2006/relationships" xmlns:p="http://schemas.openxmlformats.org/presentationml/2006/main" showMasterSp="0" type="title" preserve="1">
   <p:cSld name="Title Slide">
     <p:spTree>
       <p:nvGrpSpPr>
@@ -2014,7 +2030,7 @@
           <a:blip r:embed="rId2">
             <a:extLst>
               <a:ext uri="{28A0092B-C50C-407E-A947-70E740481C1C}">
-                <a14:useLocalDpi xmlns:a14="http://schemas.microsoft.com/office/drawing/2010/main" xmlns:p="http://schemas.openxmlformats.org/presentationml/2006/main" xmlns:r="http://schemas.openxmlformats.org/officeDocument/2006/relationships" xmlns:a="http://schemas.openxmlformats.org/drawingml/2006/main" xmlns="" val="0"/>
+                <a14:useLocalDpi xmlns:a14="http://schemas.microsoft.com/office/drawing/2010/main" val="0"/>
               </a:ext>
             </a:extLst>
           </a:blip>
@@ -2037,14 +2053,14 @@
           </a:ln>
           <a:extLst>
             <a:ext uri="{909E8E84-426E-40DD-AFC4-6F175D3DCCD1}">
-              <a14:hiddenFill xmlns:a14="http://schemas.microsoft.com/office/drawing/2010/main" xmlns:p="http://schemas.openxmlformats.org/presentationml/2006/main" xmlns:r="http://schemas.openxmlformats.org/officeDocument/2006/relationships" xmlns:a="http://schemas.openxmlformats.org/drawingml/2006/main" xmlns="">
+              <a14:hiddenFill xmlns:a14="http://schemas.microsoft.com/office/drawing/2010/main">
                 <a:solidFill>
                   <a:srgbClr val="FFFFFF"/>
                 </a:solidFill>
               </a14:hiddenFill>
             </a:ext>
             <a:ext uri="{91240B29-F687-4F45-9708-019B960494DF}">
-              <a14:hiddenLine xmlns:a14="http://schemas.microsoft.com/office/drawing/2010/main" xmlns:p="http://schemas.openxmlformats.org/presentationml/2006/main" xmlns:r="http://schemas.openxmlformats.org/officeDocument/2006/relationships" xmlns:a="http://schemas.openxmlformats.org/drawingml/2006/main" xmlns="" w="9525">
+              <a14:hiddenLine xmlns:a14="http://schemas.microsoft.com/office/drawing/2010/main" w="9525">
                 <a:solidFill>
                   <a:srgbClr val="000000"/>
                 </a:solidFill>
@@ -2084,12 +2100,12 @@
           <a:effectLst/>
           <a:extLst>
             <a:ext uri="{909E8E84-426E-40DD-AFC4-6F175D3DCCD1}">
-              <a14:hiddenFill xmlns:a14="http://schemas.microsoft.com/office/drawing/2010/main" xmlns:p="http://schemas.openxmlformats.org/presentationml/2006/main" xmlns:r="http://schemas.openxmlformats.org/officeDocument/2006/relationships" xmlns:a="http://schemas.openxmlformats.org/drawingml/2006/main" xmlns="">
+              <a14:hiddenFill xmlns:a14="http://schemas.microsoft.com/office/drawing/2010/main">
                 <a:noFill/>
               </a14:hiddenFill>
             </a:ext>
             <a:ext uri="{AF507438-7753-43E0-B8FC-AC1667EBCBE1}">
-              <a14:hiddenEffects xmlns:a14="http://schemas.microsoft.com/office/drawing/2010/main" xmlns:p="http://schemas.openxmlformats.org/presentationml/2006/main" xmlns:r="http://schemas.openxmlformats.org/officeDocument/2006/relationships" xmlns:a="http://schemas.openxmlformats.org/drawingml/2006/main" xmlns="">
+              <a14:hiddenEffects xmlns:a14="http://schemas.microsoft.com/office/drawing/2010/main">
                 <a:effectLst>
                   <a:outerShdw dist="35921" dir="2700000" algn="ctr" rotWithShape="0">
                     <a:schemeClr val="bg2"/>
@@ -2149,7 +2165,7 @@
             </a:ln>
             <a:extLst>
               <a:ext uri="{91240B29-F687-4F45-9708-019B960494DF}">
-                <a14:hiddenLine xmlns:a14="http://schemas.microsoft.com/office/drawing/2010/main" xmlns:p="http://schemas.openxmlformats.org/presentationml/2006/main" xmlns:r="http://schemas.openxmlformats.org/officeDocument/2006/relationships" xmlns:a="http://schemas.openxmlformats.org/drawingml/2006/main" xmlns="" w="9525">
+                <a14:hiddenLine xmlns:a14="http://schemas.microsoft.com/office/drawing/2010/main" w="9525">
                   <a:solidFill>
                     <a:schemeClr val="tx1"/>
                   </a:solidFill>
@@ -2303,7 +2319,7 @@
             </a:ln>
             <a:extLst>
               <a:ext uri="{91240B29-F687-4F45-9708-019B960494DF}">
-                <a14:hiddenLine xmlns:a14="http://schemas.microsoft.com/office/drawing/2010/main" xmlns:p="http://schemas.openxmlformats.org/presentationml/2006/main" xmlns:r="http://schemas.openxmlformats.org/officeDocument/2006/relationships" xmlns:a="http://schemas.openxmlformats.org/drawingml/2006/main" xmlns="" w="9525">
+                <a14:hiddenLine xmlns:a14="http://schemas.microsoft.com/office/drawing/2010/main" w="9525">
                   <a:solidFill>
                     <a:schemeClr val="tx1"/>
                   </a:solidFill>
@@ -2457,7 +2473,7 @@
             </a:ln>
             <a:extLst>
               <a:ext uri="{91240B29-F687-4F45-9708-019B960494DF}">
-                <a14:hiddenLine xmlns:a14="http://schemas.microsoft.com/office/drawing/2010/main" xmlns:p="http://schemas.openxmlformats.org/presentationml/2006/main" xmlns:r="http://schemas.openxmlformats.org/officeDocument/2006/relationships" xmlns:a="http://schemas.openxmlformats.org/drawingml/2006/main" xmlns="" w="9525">
+                <a14:hiddenLine xmlns:a14="http://schemas.microsoft.com/office/drawing/2010/main" w="9525">
                   <a:solidFill>
                     <a:schemeClr val="tx1"/>
                   </a:solidFill>
@@ -2611,7 +2627,7 @@
             </a:ln>
             <a:extLst>
               <a:ext uri="{91240B29-F687-4F45-9708-019B960494DF}">
-                <a14:hiddenLine xmlns:a14="http://schemas.microsoft.com/office/drawing/2010/main" xmlns:p="http://schemas.openxmlformats.org/presentationml/2006/main" xmlns:r="http://schemas.openxmlformats.org/officeDocument/2006/relationships" xmlns:a="http://schemas.openxmlformats.org/drawingml/2006/main" xmlns="" w="9525">
+                <a14:hiddenLine xmlns:a14="http://schemas.microsoft.com/office/drawing/2010/main" w="9525">
                   <a:solidFill>
                     <a:schemeClr val="tx1"/>
                   </a:solidFill>
@@ -2765,7 +2781,7 @@
             </a:ln>
             <a:extLst>
               <a:ext uri="{91240B29-F687-4F45-9708-019B960494DF}">
-                <a14:hiddenLine xmlns:a14="http://schemas.microsoft.com/office/drawing/2010/main" xmlns:p="http://schemas.openxmlformats.org/presentationml/2006/main" xmlns:r="http://schemas.openxmlformats.org/officeDocument/2006/relationships" xmlns:a="http://schemas.openxmlformats.org/drawingml/2006/main" xmlns="" w="9525">
+                <a14:hiddenLine xmlns:a14="http://schemas.microsoft.com/office/drawing/2010/main" w="9525">
                   <a:solidFill>
                     <a:schemeClr val="tx1"/>
                   </a:solidFill>
@@ -2919,7 +2935,7 @@
             </a:ln>
             <a:extLst>
               <a:ext uri="{91240B29-F687-4F45-9708-019B960494DF}">
-                <a14:hiddenLine xmlns:a14="http://schemas.microsoft.com/office/drawing/2010/main" xmlns:p="http://schemas.openxmlformats.org/presentationml/2006/main" xmlns:r="http://schemas.openxmlformats.org/officeDocument/2006/relationships" xmlns:a="http://schemas.openxmlformats.org/drawingml/2006/main" xmlns="" w="9525">
+                <a14:hiddenLine xmlns:a14="http://schemas.microsoft.com/office/drawing/2010/main" w="9525">
                   <a:solidFill>
                     <a:schemeClr val="tx1"/>
                   </a:solidFill>
@@ -3171,7 +3187,7 @@
             </a:ln>
             <a:extLst>
               <a:ext uri="{91240B29-F687-4F45-9708-019B960494DF}">
-                <a14:hiddenLine xmlns:a14="http://schemas.microsoft.com/office/drawing/2010/main" xmlns:p="http://schemas.openxmlformats.org/presentationml/2006/main" xmlns:r="http://schemas.openxmlformats.org/officeDocument/2006/relationships" xmlns:a="http://schemas.openxmlformats.org/drawingml/2006/main" xmlns="" w="9525">
+                <a14:hiddenLine xmlns:a14="http://schemas.microsoft.com/office/drawing/2010/main" w="9525">
                   <a:solidFill>
                     <a:schemeClr val="tx1"/>
                   </a:solidFill>
@@ -3303,7 +3319,7 @@
             </a:ln>
             <a:extLst>
               <a:ext uri="{91240B29-F687-4F45-9708-019B960494DF}">
-                <a14:hiddenLine xmlns:a14="http://schemas.microsoft.com/office/drawing/2010/main" xmlns:p="http://schemas.openxmlformats.org/presentationml/2006/main" xmlns:r="http://schemas.openxmlformats.org/officeDocument/2006/relationships" xmlns:a="http://schemas.openxmlformats.org/drawingml/2006/main" xmlns="" w="9525">
+                <a14:hiddenLine xmlns:a14="http://schemas.microsoft.com/office/drawing/2010/main" w="9525">
                   <a:solidFill>
                     <a:schemeClr val="tx1"/>
                   </a:solidFill>
@@ -3424,7 +3440,7 @@
             </a:ln>
             <a:extLst>
               <a:ext uri="{91240B29-F687-4F45-9708-019B960494DF}">
-                <a14:hiddenLine xmlns:a14="http://schemas.microsoft.com/office/drawing/2010/main" xmlns:p="http://schemas.openxmlformats.org/presentationml/2006/main" xmlns:r="http://schemas.openxmlformats.org/officeDocument/2006/relationships" xmlns:a="http://schemas.openxmlformats.org/drawingml/2006/main" xmlns="" w="9525">
+                <a14:hiddenLine xmlns:a14="http://schemas.microsoft.com/office/drawing/2010/main" w="9525">
                   <a:solidFill>
                     <a:schemeClr val="tx1"/>
                   </a:solidFill>
@@ -3469,7 +3485,7 @@
             </a:ln>
             <a:extLst>
               <a:ext uri="{91240B29-F687-4F45-9708-019B960494DF}">
-                <a14:hiddenLine xmlns:a14="http://schemas.microsoft.com/office/drawing/2010/main" xmlns:p="http://schemas.openxmlformats.org/presentationml/2006/main" xmlns:r="http://schemas.openxmlformats.org/officeDocument/2006/relationships" xmlns:a="http://schemas.openxmlformats.org/drawingml/2006/main" xmlns="" w="9525">
+                <a14:hiddenLine xmlns:a14="http://schemas.microsoft.com/office/drawing/2010/main" w="9525">
                   <a:solidFill>
                     <a:schemeClr val="tx1"/>
                   </a:solidFill>
@@ -3668,7 +3684,7 @@
     </p:spTree>
     <p:extLst>
       <p:ext uri="{BB962C8B-B14F-4D97-AF65-F5344CB8AC3E}">
-        <p14:creationId xmlns:p14="http://schemas.microsoft.com/office/powerpoint/2010/main" xmlns:p="http://schemas.openxmlformats.org/presentationml/2006/main" xmlns:r="http://schemas.openxmlformats.org/officeDocument/2006/relationships" xmlns:a="http://schemas.openxmlformats.org/drawingml/2006/main" xmlns="" val="760033320"/>
+        <p14:creationId xmlns:p14="http://schemas.microsoft.com/office/powerpoint/2010/main" val="760033320"/>
       </p:ext>
     </p:extLst>
   </p:cSld>
@@ -3679,7 +3695,7 @@
 </file>
 
 <file path=ppt/slideLayouts/slideLayout14.xml><?xml version="1.0" encoding="utf-8"?>
-<p:sldLayout xmlns:a="http://schemas.openxmlformats.org/drawingml/2006/main" xmlns:r="http://schemas.openxmlformats.org/officeDocument/2006/relationships" xmlns:mc="http://schemas.openxmlformats.org/markup-compatibility/2006" xmlns:mv="urn:schemas-microsoft-com:mac:vml" xmlns:p="http://schemas.openxmlformats.org/presentationml/2006/main" mc:Ignorable="mv" mc:PreserveAttributes="mv:*" type="obj" preserve="1">
+<p:sldLayout xmlns:a="http://schemas.openxmlformats.org/drawingml/2006/main" xmlns:r="http://schemas.openxmlformats.org/officeDocument/2006/relationships" xmlns:p="http://schemas.openxmlformats.org/presentationml/2006/main" type="obj" preserve="1">
   <p:cSld name="Title and Content">
     <p:spTree>
       <p:nvGrpSpPr>
@@ -3808,7 +3824,7 @@
     </p:spTree>
     <p:extLst>
       <p:ext uri="{BB962C8B-B14F-4D97-AF65-F5344CB8AC3E}">
-        <p14:creationId xmlns:p14="http://schemas.microsoft.com/office/powerpoint/2010/main" xmlns:p="http://schemas.openxmlformats.org/presentationml/2006/main" xmlns:r="http://schemas.openxmlformats.org/officeDocument/2006/relationships" xmlns:a="http://schemas.openxmlformats.org/drawingml/2006/main" xmlns="" val="1632672820"/>
+        <p14:creationId xmlns:p14="http://schemas.microsoft.com/office/powerpoint/2010/main" val="1632672820"/>
       </p:ext>
     </p:extLst>
   </p:cSld>
@@ -3819,7 +3835,7 @@
 </file>
 
 <file path=ppt/slideLayouts/slideLayout15.xml><?xml version="1.0" encoding="utf-8"?>
-<p:sldLayout xmlns:a="http://schemas.openxmlformats.org/drawingml/2006/main" xmlns:r="http://schemas.openxmlformats.org/officeDocument/2006/relationships" xmlns:mc="http://schemas.openxmlformats.org/markup-compatibility/2006" xmlns:mv="urn:schemas-microsoft-com:mac:vml" xmlns:p="http://schemas.openxmlformats.org/presentationml/2006/main" mc:Ignorable="mv" mc:PreserveAttributes="mv:*" type="secHead" preserve="1">
+<p:sldLayout xmlns:a="http://schemas.openxmlformats.org/drawingml/2006/main" xmlns:r="http://schemas.openxmlformats.org/officeDocument/2006/relationships" xmlns:p="http://schemas.openxmlformats.org/presentationml/2006/main" type="secHead" preserve="1">
   <p:cSld name="Section Header">
     <p:spTree>
       <p:nvGrpSpPr>
@@ -3970,7 +3986,7 @@
     </p:spTree>
     <p:extLst>
       <p:ext uri="{BB962C8B-B14F-4D97-AF65-F5344CB8AC3E}">
-        <p14:creationId xmlns:p14="http://schemas.microsoft.com/office/powerpoint/2010/main" xmlns:p="http://schemas.openxmlformats.org/presentationml/2006/main" xmlns:r="http://schemas.openxmlformats.org/officeDocument/2006/relationships" xmlns:a="http://schemas.openxmlformats.org/drawingml/2006/main" xmlns="" val="2990269342"/>
+        <p14:creationId xmlns:p14="http://schemas.microsoft.com/office/powerpoint/2010/main" val="2990269342"/>
       </p:ext>
     </p:extLst>
   </p:cSld>
@@ -3981,7 +3997,7 @@
 </file>
 
 <file path=ppt/slideLayouts/slideLayout16.xml><?xml version="1.0" encoding="utf-8"?>
-<p:sldLayout xmlns:a="http://schemas.openxmlformats.org/drawingml/2006/main" xmlns:r="http://schemas.openxmlformats.org/officeDocument/2006/relationships" xmlns:mc="http://schemas.openxmlformats.org/markup-compatibility/2006" xmlns:mv="urn:schemas-microsoft-com:mac:vml" xmlns:p="http://schemas.openxmlformats.org/presentationml/2006/main" mc:Ignorable="mv" mc:PreserveAttributes="mv:*" type="twoObj" preserve="1">
+<p:sldLayout xmlns:a="http://schemas.openxmlformats.org/drawingml/2006/main" xmlns:r="http://schemas.openxmlformats.org/officeDocument/2006/relationships" xmlns:p="http://schemas.openxmlformats.org/presentationml/2006/main" type="twoObj" preserve="1">
   <p:cSld name="Two Content">
     <p:spTree>
       <p:nvGrpSpPr>
@@ -4228,7 +4244,7 @@
     </p:spTree>
     <p:extLst>
       <p:ext uri="{BB962C8B-B14F-4D97-AF65-F5344CB8AC3E}">
-        <p14:creationId xmlns:p14="http://schemas.microsoft.com/office/powerpoint/2010/main" xmlns:p="http://schemas.openxmlformats.org/presentationml/2006/main" xmlns:r="http://schemas.openxmlformats.org/officeDocument/2006/relationships" xmlns:a="http://schemas.openxmlformats.org/drawingml/2006/main" xmlns="" val="2536726207"/>
+        <p14:creationId xmlns:p14="http://schemas.microsoft.com/office/powerpoint/2010/main" val="2536726207"/>
       </p:ext>
     </p:extLst>
   </p:cSld>
@@ -4239,7 +4255,7 @@
 </file>
 
 <file path=ppt/slideLayouts/slideLayout17.xml><?xml version="1.0" encoding="utf-8"?>
-<p:sldLayout xmlns:a="http://schemas.openxmlformats.org/drawingml/2006/main" xmlns:r="http://schemas.openxmlformats.org/officeDocument/2006/relationships" xmlns:mc="http://schemas.openxmlformats.org/markup-compatibility/2006" xmlns:mv="urn:schemas-microsoft-com:mac:vml" xmlns:p="http://schemas.openxmlformats.org/presentationml/2006/main" mc:Ignorable="mv" mc:PreserveAttributes="mv:*" type="twoTxTwoObj" preserve="1">
+<p:sldLayout xmlns:a="http://schemas.openxmlformats.org/drawingml/2006/main" xmlns:r="http://schemas.openxmlformats.org/officeDocument/2006/relationships" xmlns:p="http://schemas.openxmlformats.org/presentationml/2006/main" type="twoTxTwoObj" preserve="1">
   <p:cSld name="Comparison">
     <p:spTree>
       <p:nvGrpSpPr>
@@ -4625,7 +4641,7 @@
     </p:spTree>
     <p:extLst>
       <p:ext uri="{BB962C8B-B14F-4D97-AF65-F5344CB8AC3E}">
-        <p14:creationId xmlns:p14="http://schemas.microsoft.com/office/powerpoint/2010/main" xmlns:p="http://schemas.openxmlformats.org/presentationml/2006/main" xmlns:r="http://schemas.openxmlformats.org/officeDocument/2006/relationships" xmlns:a="http://schemas.openxmlformats.org/drawingml/2006/main" xmlns="" val="3085395522"/>
+        <p14:creationId xmlns:p14="http://schemas.microsoft.com/office/powerpoint/2010/main" val="3085395522"/>
       </p:ext>
     </p:extLst>
   </p:cSld>
@@ -4636,7 +4652,7 @@
 </file>
 
 <file path=ppt/slideLayouts/slideLayout18.xml><?xml version="1.0" encoding="utf-8"?>
-<p:sldLayout xmlns:a="http://schemas.openxmlformats.org/drawingml/2006/main" xmlns:r="http://schemas.openxmlformats.org/officeDocument/2006/relationships" xmlns:mc="http://schemas.openxmlformats.org/markup-compatibility/2006" xmlns:mv="urn:schemas-microsoft-com:mac:vml" xmlns:p="http://schemas.openxmlformats.org/presentationml/2006/main" mc:Ignorable="mv" mc:PreserveAttributes="mv:*" type="titleOnly" preserve="1">
+<p:sldLayout xmlns:a="http://schemas.openxmlformats.org/drawingml/2006/main" xmlns:r="http://schemas.openxmlformats.org/officeDocument/2006/relationships" xmlns:p="http://schemas.openxmlformats.org/presentationml/2006/main" type="titleOnly" preserve="1">
   <p:cSld name="Title Only">
     <p:spTree>
       <p:nvGrpSpPr>
@@ -4713,7 +4729,7 @@
     </p:spTree>
     <p:extLst>
       <p:ext uri="{BB962C8B-B14F-4D97-AF65-F5344CB8AC3E}">
-        <p14:creationId xmlns:p14="http://schemas.microsoft.com/office/powerpoint/2010/main" xmlns:p="http://schemas.openxmlformats.org/presentationml/2006/main" xmlns:r="http://schemas.openxmlformats.org/officeDocument/2006/relationships" xmlns:a="http://schemas.openxmlformats.org/drawingml/2006/main" xmlns="" val="3683629312"/>
+        <p14:creationId xmlns:p14="http://schemas.microsoft.com/office/powerpoint/2010/main" val="3683629312"/>
       </p:ext>
     </p:extLst>
   </p:cSld>
@@ -4724,7 +4740,7 @@
 </file>
 
 <file path=ppt/slideLayouts/slideLayout19.xml><?xml version="1.0" encoding="utf-8"?>
-<p:sldLayout xmlns:a="http://schemas.openxmlformats.org/drawingml/2006/main" xmlns:r="http://schemas.openxmlformats.org/officeDocument/2006/relationships" xmlns:mc="http://schemas.openxmlformats.org/markup-compatibility/2006" xmlns:mv="urn:schemas-microsoft-com:mac:vml" xmlns:p="http://schemas.openxmlformats.org/presentationml/2006/main" mc:Ignorable="mv" mc:PreserveAttributes="mv:*" type="blank" preserve="1">
+<p:sldLayout xmlns:a="http://schemas.openxmlformats.org/drawingml/2006/main" xmlns:r="http://schemas.openxmlformats.org/officeDocument/2006/relationships" xmlns:p="http://schemas.openxmlformats.org/presentationml/2006/main" type="blank" preserve="1">
   <p:cSld name="Blank">
     <p:spTree>
       <p:nvGrpSpPr>
@@ -4778,7 +4794,7 @@
     </p:spTree>
     <p:extLst>
       <p:ext uri="{BB962C8B-B14F-4D97-AF65-F5344CB8AC3E}">
-        <p14:creationId xmlns:p14="http://schemas.microsoft.com/office/powerpoint/2010/main" xmlns:p="http://schemas.openxmlformats.org/presentationml/2006/main" xmlns:r="http://schemas.openxmlformats.org/officeDocument/2006/relationships" xmlns:a="http://schemas.openxmlformats.org/drawingml/2006/main" xmlns="" val="3661616939"/>
+        <p14:creationId xmlns:p14="http://schemas.microsoft.com/office/powerpoint/2010/main" val="3661616939"/>
       </p:ext>
     </p:extLst>
   </p:cSld>
@@ -4789,7 +4805,7 @@
 </file>
 
 <file path=ppt/slideLayouts/slideLayout2.xml><?xml version="1.0" encoding="utf-8"?>
-<p:sldLayout xmlns:a="http://schemas.openxmlformats.org/drawingml/2006/main" xmlns:r="http://schemas.openxmlformats.org/officeDocument/2006/relationships" xmlns:mc="http://schemas.openxmlformats.org/markup-compatibility/2006" xmlns:mv="urn:schemas-microsoft-com:mac:vml" xmlns:p="http://schemas.openxmlformats.org/presentationml/2006/main" mc:Ignorable="mv" mc:PreserveAttributes="mv:*" type="obj" preserve="1">
+<p:sldLayout xmlns:a="http://schemas.openxmlformats.org/drawingml/2006/main" xmlns:r="http://schemas.openxmlformats.org/officeDocument/2006/relationships" xmlns:p="http://schemas.openxmlformats.org/presentationml/2006/main" type="obj" preserve="1">
   <p:cSld name="Title and Content">
     <p:spTree>
       <p:nvGrpSpPr>
@@ -4949,7 +4965,7 @@
     </p:spTree>
     <p:extLst>
       <p:ext uri="{BB962C8B-B14F-4D97-AF65-F5344CB8AC3E}">
-        <p14:creationId xmlns:p14="http://schemas.microsoft.com/office/powerpoint/2010/main" xmlns:p="http://schemas.openxmlformats.org/presentationml/2006/main" xmlns:r="http://schemas.openxmlformats.org/officeDocument/2006/relationships" xmlns:a="http://schemas.openxmlformats.org/drawingml/2006/main" xmlns="" val="3131122235"/>
+        <p14:creationId xmlns:p14="http://schemas.microsoft.com/office/powerpoint/2010/main" val="3131122235"/>
       </p:ext>
     </p:extLst>
   </p:cSld>
@@ -4960,7 +4976,7 @@
 </file>
 
 <file path=ppt/slideLayouts/slideLayout20.xml><?xml version="1.0" encoding="utf-8"?>
-<p:sldLayout xmlns:a="http://schemas.openxmlformats.org/drawingml/2006/main" xmlns:r="http://schemas.openxmlformats.org/officeDocument/2006/relationships" xmlns:mc="http://schemas.openxmlformats.org/markup-compatibility/2006" xmlns:mv="urn:schemas-microsoft-com:mac:vml" xmlns:p="http://schemas.openxmlformats.org/presentationml/2006/main" mc:Ignorable="mv" mc:PreserveAttributes="mv:*" type="objTx" preserve="1">
+<p:sldLayout xmlns:a="http://schemas.openxmlformats.org/drawingml/2006/main" xmlns:r="http://schemas.openxmlformats.org/officeDocument/2006/relationships" xmlns:p="http://schemas.openxmlformats.org/presentationml/2006/main" type="objTx" preserve="1">
   <p:cSld name="Content with Caption">
     <p:spTree>
       <p:nvGrpSpPr>
@@ -5196,7 +5212,7 @@
     </p:spTree>
     <p:extLst>
       <p:ext uri="{BB962C8B-B14F-4D97-AF65-F5344CB8AC3E}">
-        <p14:creationId xmlns:p14="http://schemas.microsoft.com/office/powerpoint/2010/main" xmlns:p="http://schemas.openxmlformats.org/presentationml/2006/main" xmlns:r="http://schemas.openxmlformats.org/officeDocument/2006/relationships" xmlns:a="http://schemas.openxmlformats.org/drawingml/2006/main" xmlns="" val="736100685"/>
+        <p14:creationId xmlns:p14="http://schemas.microsoft.com/office/powerpoint/2010/main" val="736100685"/>
       </p:ext>
     </p:extLst>
   </p:cSld>
@@ -5207,7 +5223,7 @@
 </file>
 
 <file path=ppt/slideLayouts/slideLayout21.xml><?xml version="1.0" encoding="utf-8"?>
-<p:sldLayout xmlns:a="http://schemas.openxmlformats.org/drawingml/2006/main" xmlns:r="http://schemas.openxmlformats.org/officeDocument/2006/relationships" xmlns:mc="http://schemas.openxmlformats.org/markup-compatibility/2006" xmlns:mv="urn:schemas-microsoft-com:mac:vml" xmlns:p="http://schemas.openxmlformats.org/presentationml/2006/main" mc:Ignorable="mv" mc:PreserveAttributes="mv:*" type="picTx" preserve="1">
+<p:sldLayout xmlns:a="http://schemas.openxmlformats.org/drawingml/2006/main" xmlns:r="http://schemas.openxmlformats.org/officeDocument/2006/relationships" xmlns:p="http://schemas.openxmlformats.org/presentationml/2006/main" type="picTx" preserve="1">
   <p:cSld name="Picture with Caption">
     <p:spTree>
       <p:nvGrpSpPr>
@@ -5420,7 +5436,7 @@
     </p:spTree>
     <p:extLst>
       <p:ext uri="{BB962C8B-B14F-4D97-AF65-F5344CB8AC3E}">
-        <p14:creationId xmlns:p14="http://schemas.microsoft.com/office/powerpoint/2010/main" xmlns:p="http://schemas.openxmlformats.org/presentationml/2006/main" xmlns:r="http://schemas.openxmlformats.org/officeDocument/2006/relationships" xmlns:a="http://schemas.openxmlformats.org/drawingml/2006/main" xmlns="" val="465457564"/>
+        <p14:creationId xmlns:p14="http://schemas.microsoft.com/office/powerpoint/2010/main" val="465457564"/>
       </p:ext>
     </p:extLst>
   </p:cSld>
@@ -5431,7 +5447,7 @@
 </file>
 
 <file path=ppt/slideLayouts/slideLayout22.xml><?xml version="1.0" encoding="utf-8"?>
-<p:sldLayout xmlns:a="http://schemas.openxmlformats.org/drawingml/2006/main" xmlns:r="http://schemas.openxmlformats.org/officeDocument/2006/relationships" xmlns:mc="http://schemas.openxmlformats.org/markup-compatibility/2006" xmlns:mv="urn:schemas-microsoft-com:mac:vml" xmlns:p="http://schemas.openxmlformats.org/presentationml/2006/main" mc:Ignorable="mv" mc:PreserveAttributes="mv:*" type="vertTx" preserve="1">
+<p:sldLayout xmlns:a="http://schemas.openxmlformats.org/drawingml/2006/main" xmlns:r="http://schemas.openxmlformats.org/officeDocument/2006/relationships" xmlns:p="http://schemas.openxmlformats.org/presentationml/2006/main" type="vertTx" preserve="1">
   <p:cSld name="Title and Vertical Text">
     <p:spTree>
       <p:nvGrpSpPr>
@@ -5560,7 +5576,7 @@
     </p:spTree>
     <p:extLst>
       <p:ext uri="{BB962C8B-B14F-4D97-AF65-F5344CB8AC3E}">
-        <p14:creationId xmlns:p14="http://schemas.microsoft.com/office/powerpoint/2010/main" xmlns:p="http://schemas.openxmlformats.org/presentationml/2006/main" xmlns:r="http://schemas.openxmlformats.org/officeDocument/2006/relationships" xmlns:a="http://schemas.openxmlformats.org/drawingml/2006/main" xmlns="" val="2900285960"/>
+        <p14:creationId xmlns:p14="http://schemas.microsoft.com/office/powerpoint/2010/main" val="2900285960"/>
       </p:ext>
     </p:extLst>
   </p:cSld>
@@ -5571,7 +5587,7 @@
 </file>
 
 <file path=ppt/slideLayouts/slideLayout23.xml><?xml version="1.0" encoding="utf-8"?>
-<p:sldLayout xmlns:a="http://schemas.openxmlformats.org/drawingml/2006/main" xmlns:r="http://schemas.openxmlformats.org/officeDocument/2006/relationships" xmlns:mc="http://schemas.openxmlformats.org/markup-compatibility/2006" xmlns:mv="urn:schemas-microsoft-com:mac:vml" xmlns:p="http://schemas.openxmlformats.org/presentationml/2006/main" mc:Ignorable="mv" mc:PreserveAttributes="mv:*" type="vertTitleAndTx" preserve="1">
+<p:sldLayout xmlns:a="http://schemas.openxmlformats.org/drawingml/2006/main" xmlns:r="http://schemas.openxmlformats.org/officeDocument/2006/relationships" xmlns:p="http://schemas.openxmlformats.org/presentationml/2006/main" type="vertTitleAndTx" preserve="1">
   <p:cSld name="Vertical Title and Text">
     <p:spTree>
       <p:nvGrpSpPr>
@@ -5710,7 +5726,7 @@
     </p:spTree>
     <p:extLst>
       <p:ext uri="{BB962C8B-B14F-4D97-AF65-F5344CB8AC3E}">
-        <p14:creationId xmlns:p14="http://schemas.microsoft.com/office/powerpoint/2010/main" xmlns:p="http://schemas.openxmlformats.org/presentationml/2006/main" xmlns:r="http://schemas.openxmlformats.org/officeDocument/2006/relationships" xmlns:a="http://schemas.openxmlformats.org/drawingml/2006/main" xmlns="" val="3451879814"/>
+        <p14:creationId xmlns:p14="http://schemas.microsoft.com/office/powerpoint/2010/main" val="3451879814"/>
       </p:ext>
     </p:extLst>
   </p:cSld>
@@ -5721,7 +5737,7 @@
 </file>
 
 <file path=ppt/slideLayouts/slideLayout3.xml><?xml version="1.0" encoding="utf-8"?>
-<p:sldLayout xmlns:a="http://schemas.openxmlformats.org/drawingml/2006/main" xmlns:r="http://schemas.openxmlformats.org/officeDocument/2006/relationships" xmlns:mc="http://schemas.openxmlformats.org/markup-compatibility/2006" xmlns:mv="urn:schemas-microsoft-com:mac:vml" xmlns:p="http://schemas.openxmlformats.org/presentationml/2006/main" mc:Ignorable="mv" mc:PreserveAttributes="mv:*" type="secHead" preserve="1">
+<p:sldLayout xmlns:a="http://schemas.openxmlformats.org/drawingml/2006/main" xmlns:r="http://schemas.openxmlformats.org/officeDocument/2006/relationships" xmlns:p="http://schemas.openxmlformats.org/presentationml/2006/main" type="secHead" preserve="1">
   <p:cSld name="Section Header">
     <p:spTree>
       <p:nvGrpSpPr>
@@ -5903,7 +5919,7 @@
     </p:spTree>
     <p:extLst>
       <p:ext uri="{BB962C8B-B14F-4D97-AF65-F5344CB8AC3E}">
-        <p14:creationId xmlns:p14="http://schemas.microsoft.com/office/powerpoint/2010/main" xmlns:p="http://schemas.openxmlformats.org/presentationml/2006/main" xmlns:r="http://schemas.openxmlformats.org/officeDocument/2006/relationships" xmlns:a="http://schemas.openxmlformats.org/drawingml/2006/main" xmlns="" val="2427079212"/>
+        <p14:creationId xmlns:p14="http://schemas.microsoft.com/office/powerpoint/2010/main" val="2427079212"/>
       </p:ext>
     </p:extLst>
   </p:cSld>
@@ -5914,7 +5930,7 @@
 </file>
 
 <file path=ppt/slideLayouts/slideLayout4.xml><?xml version="1.0" encoding="utf-8"?>
-<p:sldLayout xmlns:a="http://schemas.openxmlformats.org/drawingml/2006/main" xmlns:r="http://schemas.openxmlformats.org/officeDocument/2006/relationships" xmlns:mc="http://schemas.openxmlformats.org/markup-compatibility/2006" xmlns:mv="urn:schemas-microsoft-com:mac:vml" xmlns:p="http://schemas.openxmlformats.org/presentationml/2006/main" mc:Ignorable="mv" mc:PreserveAttributes="mv:*" type="twoObj" preserve="1">
+<p:sldLayout xmlns:a="http://schemas.openxmlformats.org/drawingml/2006/main" xmlns:r="http://schemas.openxmlformats.org/officeDocument/2006/relationships" xmlns:p="http://schemas.openxmlformats.org/presentationml/2006/main" type="twoObj" preserve="1">
   <p:cSld name="Two Content">
     <p:spTree>
       <p:nvGrpSpPr>
@@ -6192,7 +6208,7 @@
     </p:spTree>
     <p:extLst>
       <p:ext uri="{BB962C8B-B14F-4D97-AF65-F5344CB8AC3E}">
-        <p14:creationId xmlns:p14="http://schemas.microsoft.com/office/powerpoint/2010/main" xmlns:p="http://schemas.openxmlformats.org/presentationml/2006/main" xmlns:r="http://schemas.openxmlformats.org/officeDocument/2006/relationships" xmlns:a="http://schemas.openxmlformats.org/drawingml/2006/main" xmlns="" val="4054074126"/>
+        <p14:creationId xmlns:p14="http://schemas.microsoft.com/office/powerpoint/2010/main" val="4054074126"/>
       </p:ext>
     </p:extLst>
   </p:cSld>
@@ -6203,7 +6219,7 @@
 </file>
 
 <file path=ppt/slideLayouts/slideLayout5.xml><?xml version="1.0" encoding="utf-8"?>
-<p:sldLayout xmlns:a="http://schemas.openxmlformats.org/drawingml/2006/main" xmlns:r="http://schemas.openxmlformats.org/officeDocument/2006/relationships" xmlns:mc="http://schemas.openxmlformats.org/markup-compatibility/2006" xmlns:mv="urn:schemas-microsoft-com:mac:vml" xmlns:p="http://schemas.openxmlformats.org/presentationml/2006/main" mc:Ignorable="mv" mc:PreserveAttributes="mv:*" type="twoTxTwoObj" preserve="1">
+<p:sldLayout xmlns:a="http://schemas.openxmlformats.org/drawingml/2006/main" xmlns:r="http://schemas.openxmlformats.org/officeDocument/2006/relationships" xmlns:p="http://schemas.openxmlformats.org/presentationml/2006/main" type="twoTxTwoObj" preserve="1">
   <p:cSld name="Comparison">
     <p:spTree>
       <p:nvGrpSpPr>
@@ -6620,7 +6636,7 @@
     </p:spTree>
     <p:extLst>
       <p:ext uri="{BB962C8B-B14F-4D97-AF65-F5344CB8AC3E}">
-        <p14:creationId xmlns:p14="http://schemas.microsoft.com/office/powerpoint/2010/main" xmlns:p="http://schemas.openxmlformats.org/presentationml/2006/main" xmlns:r="http://schemas.openxmlformats.org/officeDocument/2006/relationships" xmlns:a="http://schemas.openxmlformats.org/drawingml/2006/main" xmlns="" val="596268466"/>
+        <p14:creationId xmlns:p14="http://schemas.microsoft.com/office/powerpoint/2010/main" val="596268466"/>
       </p:ext>
     </p:extLst>
   </p:cSld>
@@ -6631,7 +6647,7 @@
 </file>
 
 <file path=ppt/slideLayouts/slideLayout6.xml><?xml version="1.0" encoding="utf-8"?>
-<p:sldLayout xmlns:a="http://schemas.openxmlformats.org/drawingml/2006/main" xmlns:r="http://schemas.openxmlformats.org/officeDocument/2006/relationships" xmlns:mc="http://schemas.openxmlformats.org/markup-compatibility/2006" xmlns:mv="urn:schemas-microsoft-com:mac:vml" xmlns:p="http://schemas.openxmlformats.org/presentationml/2006/main" mc:Ignorable="mv" mc:PreserveAttributes="mv:*" type="titleOnly" preserve="1">
+<p:sldLayout xmlns:a="http://schemas.openxmlformats.org/drawingml/2006/main" xmlns:r="http://schemas.openxmlformats.org/officeDocument/2006/relationships" xmlns:p="http://schemas.openxmlformats.org/presentationml/2006/main" type="titleOnly" preserve="1">
   <p:cSld name="Title Only">
     <p:spTree>
       <p:nvGrpSpPr>
@@ -6739,7 +6755,7 @@
     </p:spTree>
     <p:extLst>
       <p:ext uri="{BB962C8B-B14F-4D97-AF65-F5344CB8AC3E}">
-        <p14:creationId xmlns:p14="http://schemas.microsoft.com/office/powerpoint/2010/main" xmlns:p="http://schemas.openxmlformats.org/presentationml/2006/main" xmlns:r="http://schemas.openxmlformats.org/officeDocument/2006/relationships" xmlns:a="http://schemas.openxmlformats.org/drawingml/2006/main" xmlns="" val="2818743489"/>
+        <p14:creationId xmlns:p14="http://schemas.microsoft.com/office/powerpoint/2010/main" val="2818743489"/>
       </p:ext>
     </p:extLst>
   </p:cSld>
@@ -6750,7 +6766,7 @@
 </file>
 
 <file path=ppt/slideLayouts/slideLayout7.xml><?xml version="1.0" encoding="utf-8"?>
-<p:sldLayout xmlns:a="http://schemas.openxmlformats.org/drawingml/2006/main" xmlns:r="http://schemas.openxmlformats.org/officeDocument/2006/relationships" xmlns:mc="http://schemas.openxmlformats.org/markup-compatibility/2006" xmlns:mv="urn:schemas-microsoft-com:mac:vml" xmlns:p="http://schemas.openxmlformats.org/presentationml/2006/main" mc:Ignorable="mv" mc:PreserveAttributes="mv:*" type="blank" preserve="1">
+<p:sldLayout xmlns:a="http://schemas.openxmlformats.org/drawingml/2006/main" xmlns:r="http://schemas.openxmlformats.org/officeDocument/2006/relationships" xmlns:p="http://schemas.openxmlformats.org/presentationml/2006/main" type="blank" preserve="1">
   <p:cSld name="Blank">
     <p:spTree>
       <p:nvGrpSpPr>
@@ -6835,7 +6851,7 @@
     </p:spTree>
     <p:extLst>
       <p:ext uri="{BB962C8B-B14F-4D97-AF65-F5344CB8AC3E}">
-        <p14:creationId xmlns:p14="http://schemas.microsoft.com/office/powerpoint/2010/main" xmlns:p="http://schemas.openxmlformats.org/presentationml/2006/main" xmlns:r="http://schemas.openxmlformats.org/officeDocument/2006/relationships" xmlns:a="http://schemas.openxmlformats.org/drawingml/2006/main" xmlns="" val="166600289"/>
+        <p14:creationId xmlns:p14="http://schemas.microsoft.com/office/powerpoint/2010/main" val="166600289"/>
       </p:ext>
     </p:extLst>
   </p:cSld>
@@ -6846,7 +6862,7 @@
 </file>
 
 <file path=ppt/slideLayouts/slideLayout8.xml><?xml version="1.0" encoding="utf-8"?>
-<p:sldLayout xmlns:a="http://schemas.openxmlformats.org/drawingml/2006/main" xmlns:r="http://schemas.openxmlformats.org/officeDocument/2006/relationships" xmlns:mc="http://schemas.openxmlformats.org/markup-compatibility/2006" xmlns:mv="urn:schemas-microsoft-com:mac:vml" xmlns:p="http://schemas.openxmlformats.org/presentationml/2006/main" mc:Ignorable="mv" mc:PreserveAttributes="mv:*" type="objTx" preserve="1">
+<p:sldLayout xmlns:a="http://schemas.openxmlformats.org/drawingml/2006/main" xmlns:r="http://schemas.openxmlformats.org/officeDocument/2006/relationships" xmlns:p="http://schemas.openxmlformats.org/presentationml/2006/main" type="objTx" preserve="1">
   <p:cSld name="Content with Caption">
     <p:spTree>
       <p:nvGrpSpPr>
@@ -7113,7 +7129,7 @@
     </p:spTree>
     <p:extLst>
       <p:ext uri="{BB962C8B-B14F-4D97-AF65-F5344CB8AC3E}">
-        <p14:creationId xmlns:p14="http://schemas.microsoft.com/office/powerpoint/2010/main" xmlns:p="http://schemas.openxmlformats.org/presentationml/2006/main" xmlns:r="http://schemas.openxmlformats.org/officeDocument/2006/relationships" xmlns:a="http://schemas.openxmlformats.org/drawingml/2006/main" xmlns="" val="2168143246"/>
+        <p14:creationId xmlns:p14="http://schemas.microsoft.com/office/powerpoint/2010/main" val="2168143246"/>
       </p:ext>
     </p:extLst>
   </p:cSld>
@@ -7124,7 +7140,7 @@
 </file>
 
 <file path=ppt/slideLayouts/slideLayout9.xml><?xml version="1.0" encoding="utf-8"?>
-<p:sldLayout xmlns:a="http://schemas.openxmlformats.org/drawingml/2006/main" xmlns:r="http://schemas.openxmlformats.org/officeDocument/2006/relationships" xmlns:mc="http://schemas.openxmlformats.org/markup-compatibility/2006" xmlns:mv="urn:schemas-microsoft-com:mac:vml" xmlns:p="http://schemas.openxmlformats.org/presentationml/2006/main" mc:Ignorable="mv" mc:PreserveAttributes="mv:*" type="picTx" preserve="1">
+<p:sldLayout xmlns:a="http://schemas.openxmlformats.org/drawingml/2006/main" xmlns:r="http://schemas.openxmlformats.org/officeDocument/2006/relationships" xmlns:p="http://schemas.openxmlformats.org/presentationml/2006/main" type="picTx" preserve="1">
   <p:cSld name="Picture with Caption">
     <p:spTree>
       <p:nvGrpSpPr>
@@ -7368,7 +7384,7 @@
     </p:spTree>
     <p:extLst>
       <p:ext uri="{BB962C8B-B14F-4D97-AF65-F5344CB8AC3E}">
-        <p14:creationId xmlns:p14="http://schemas.microsoft.com/office/powerpoint/2010/main" xmlns:p="http://schemas.openxmlformats.org/presentationml/2006/main" xmlns:r="http://schemas.openxmlformats.org/officeDocument/2006/relationships" xmlns:a="http://schemas.openxmlformats.org/drawingml/2006/main" xmlns="" val="359608907"/>
+        <p14:creationId xmlns:p14="http://schemas.microsoft.com/office/powerpoint/2010/main" val="359608907"/>
       </p:ext>
     </p:extLst>
   </p:cSld>
@@ -7379,7 +7395,7 @@
 </file>
 
 <file path=ppt/slideMasters/slideMaster1.xml><?xml version="1.0" encoding="utf-8"?>
-<p:sldMaster xmlns:a="http://schemas.openxmlformats.org/drawingml/2006/main" xmlns:r="http://schemas.openxmlformats.org/officeDocument/2006/relationships" xmlns:mc="http://schemas.openxmlformats.org/markup-compatibility/2006" xmlns:mv="urn:schemas-microsoft-com:mac:vml" xmlns:p="http://schemas.openxmlformats.org/presentationml/2006/main" mc:Ignorable="mv" mc:PreserveAttributes="mv:*">
+<p:sldMaster xmlns:a="http://schemas.openxmlformats.org/drawingml/2006/main" xmlns:r="http://schemas.openxmlformats.org/officeDocument/2006/relationships" xmlns:p="http://schemas.openxmlformats.org/presentationml/2006/main">
   <p:cSld>
     <p:bg>
       <p:bgPr>
@@ -7428,14 +7444,14 @@
           <a:effectLst/>
           <a:extLst>
             <a:ext uri="{909E8E84-426E-40DD-AFC4-6F175D3DCCD1}">
-              <a14:hiddenFill xmlns:a14="http://schemas.microsoft.com/office/drawing/2010/main" xmlns:p="http://schemas.openxmlformats.org/presentationml/2006/main" xmlns:r="http://schemas.openxmlformats.org/officeDocument/2006/relationships" xmlns:a="http://schemas.openxmlformats.org/drawingml/2006/main" xmlns="">
+              <a14:hiddenFill xmlns:a14="http://schemas.microsoft.com/office/drawing/2010/main">
                 <a:solidFill>
                   <a:schemeClr val="accent1"/>
                 </a:solidFill>
               </a14:hiddenFill>
             </a:ext>
             <a:ext uri="{91240B29-F687-4F45-9708-019B960494DF}">
-              <a14:hiddenLine xmlns:a14="http://schemas.microsoft.com/office/drawing/2010/main" xmlns:p="http://schemas.openxmlformats.org/presentationml/2006/main" xmlns:r="http://schemas.openxmlformats.org/officeDocument/2006/relationships" xmlns:a="http://schemas.openxmlformats.org/drawingml/2006/main" xmlns="" w="9525">
+              <a14:hiddenLine xmlns:a14="http://schemas.microsoft.com/office/drawing/2010/main" w="9525">
                 <a:solidFill>
                   <a:schemeClr val="tx1"/>
                 </a:solidFill>
@@ -7445,7 +7461,7 @@
               </a14:hiddenLine>
             </a:ext>
             <a:ext uri="{AF507438-7753-43E0-B8FC-AC1667EBCBE1}">
-              <a14:hiddenEffects xmlns:a14="http://schemas.microsoft.com/office/drawing/2010/main" xmlns:p="http://schemas.openxmlformats.org/presentationml/2006/main" xmlns:r="http://schemas.openxmlformats.org/officeDocument/2006/relationships" xmlns:a="http://schemas.openxmlformats.org/drawingml/2006/main" xmlns="">
+              <a14:hiddenEffects xmlns:a14="http://schemas.microsoft.com/office/drawing/2010/main">
                 <a:effectLst>
                   <a:outerShdw dist="35921" dir="2700000" algn="ctr" rotWithShape="0">
                     <a:schemeClr val="bg2"/>
@@ -7496,14 +7512,14 @@
           <a:effectLst/>
           <a:extLst>
             <a:ext uri="{909E8E84-426E-40DD-AFC4-6F175D3DCCD1}">
-              <a14:hiddenFill xmlns:a14="http://schemas.microsoft.com/office/drawing/2010/main" xmlns:p="http://schemas.openxmlformats.org/presentationml/2006/main" xmlns:r="http://schemas.openxmlformats.org/officeDocument/2006/relationships" xmlns:a="http://schemas.openxmlformats.org/drawingml/2006/main" xmlns="">
+              <a14:hiddenFill xmlns:a14="http://schemas.microsoft.com/office/drawing/2010/main">
                 <a:solidFill>
                   <a:schemeClr val="accent1"/>
                 </a:solidFill>
               </a14:hiddenFill>
             </a:ext>
             <a:ext uri="{91240B29-F687-4F45-9708-019B960494DF}">
-              <a14:hiddenLine xmlns:a14="http://schemas.microsoft.com/office/drawing/2010/main" xmlns:p="http://schemas.openxmlformats.org/presentationml/2006/main" xmlns:r="http://schemas.openxmlformats.org/officeDocument/2006/relationships" xmlns:a="http://schemas.openxmlformats.org/drawingml/2006/main" xmlns="" w="9525">
+              <a14:hiddenLine xmlns:a14="http://schemas.microsoft.com/office/drawing/2010/main" w="9525">
                 <a:solidFill>
                   <a:schemeClr val="tx1"/>
                 </a:solidFill>
@@ -7513,7 +7529,7 @@
               </a14:hiddenLine>
             </a:ext>
             <a:ext uri="{AF507438-7753-43E0-B8FC-AC1667EBCBE1}">
-              <a14:hiddenEffects xmlns:a14="http://schemas.microsoft.com/office/drawing/2010/main" xmlns:p="http://schemas.openxmlformats.org/presentationml/2006/main" xmlns:r="http://schemas.openxmlformats.org/officeDocument/2006/relationships" xmlns:a="http://schemas.openxmlformats.org/drawingml/2006/main" xmlns="">
+              <a14:hiddenEffects xmlns:a14="http://schemas.microsoft.com/office/drawing/2010/main">
                 <a:effectLst>
                   <a:outerShdw dist="35921" dir="2700000" algn="ctr" rotWithShape="0">
                     <a:schemeClr val="bg2"/>
@@ -7592,14 +7608,14 @@
           <a:effectLst/>
           <a:extLst>
             <a:ext uri="{909E8E84-426E-40DD-AFC4-6F175D3DCCD1}">
-              <a14:hiddenFill xmlns:a14="http://schemas.microsoft.com/office/drawing/2010/main" xmlns:p="http://schemas.openxmlformats.org/presentationml/2006/main" xmlns:r="http://schemas.openxmlformats.org/officeDocument/2006/relationships" xmlns:a="http://schemas.openxmlformats.org/drawingml/2006/main" xmlns="">
+              <a14:hiddenFill xmlns:a14="http://schemas.microsoft.com/office/drawing/2010/main">
                 <a:solidFill>
                   <a:schemeClr val="accent1"/>
                 </a:solidFill>
               </a14:hiddenFill>
             </a:ext>
             <a:ext uri="{91240B29-F687-4F45-9708-019B960494DF}">
-              <a14:hiddenLine xmlns:a14="http://schemas.microsoft.com/office/drawing/2010/main" xmlns:p="http://schemas.openxmlformats.org/presentationml/2006/main" xmlns:r="http://schemas.openxmlformats.org/officeDocument/2006/relationships" xmlns:a="http://schemas.openxmlformats.org/drawingml/2006/main" xmlns="" w="9525">
+              <a14:hiddenLine xmlns:a14="http://schemas.microsoft.com/office/drawing/2010/main" w="9525">
                 <a:solidFill>
                   <a:schemeClr val="tx1"/>
                 </a:solidFill>
@@ -7609,7 +7625,7 @@
               </a14:hiddenLine>
             </a:ext>
             <a:ext uri="{AF507438-7753-43E0-B8FC-AC1667EBCBE1}">
-              <a14:hiddenEffects xmlns:a14="http://schemas.microsoft.com/office/drawing/2010/main" xmlns:p="http://schemas.openxmlformats.org/presentationml/2006/main" xmlns:r="http://schemas.openxmlformats.org/officeDocument/2006/relationships" xmlns:a="http://schemas.openxmlformats.org/drawingml/2006/main" xmlns="">
+              <a14:hiddenEffects xmlns:a14="http://schemas.microsoft.com/office/drawing/2010/main">
                 <a:effectLst>
                   <a:outerShdw dist="35921" dir="2700000" algn="ctr" rotWithShape="0">
                     <a:schemeClr val="bg2"/>
@@ -7673,12 +7689,12 @@
           <a:effectLst/>
           <a:extLst>
             <a:ext uri="{909E8E84-426E-40DD-AFC4-6F175D3DCCD1}">
-              <a14:hiddenFill xmlns:a14="http://schemas.microsoft.com/office/drawing/2010/main" xmlns:p="http://schemas.openxmlformats.org/presentationml/2006/main" xmlns:r="http://schemas.openxmlformats.org/officeDocument/2006/relationships" xmlns:a="http://schemas.openxmlformats.org/drawingml/2006/main" xmlns="">
+              <a14:hiddenFill xmlns:a14="http://schemas.microsoft.com/office/drawing/2010/main">
                 <a:noFill/>
               </a14:hiddenFill>
             </a:ext>
             <a:ext uri="{AF507438-7753-43E0-B8FC-AC1667EBCBE1}">
-              <a14:hiddenEffects xmlns:a14="http://schemas.microsoft.com/office/drawing/2010/main" xmlns:p="http://schemas.openxmlformats.org/presentationml/2006/main" xmlns:r="http://schemas.openxmlformats.org/officeDocument/2006/relationships" xmlns:a="http://schemas.openxmlformats.org/drawingml/2006/main" xmlns="">
+              <a14:hiddenEffects xmlns:a14="http://schemas.microsoft.com/office/drawing/2010/main">
                 <a:effectLst>
                   <a:outerShdw dist="35921" dir="2700000" algn="ctr" rotWithShape="0">
                     <a:schemeClr val="bg2"/>
@@ -7721,14 +7737,14 @@
           <a:effectLst/>
           <a:extLst>
             <a:ext uri="{909E8E84-426E-40DD-AFC4-6F175D3DCCD1}">
-              <a14:hiddenFill xmlns:a14="http://schemas.microsoft.com/office/drawing/2010/main" xmlns:p="http://schemas.openxmlformats.org/presentationml/2006/main" xmlns:r="http://schemas.openxmlformats.org/officeDocument/2006/relationships" xmlns:a="http://schemas.openxmlformats.org/drawingml/2006/main" xmlns="">
+              <a14:hiddenFill xmlns:a14="http://schemas.microsoft.com/office/drawing/2010/main">
                 <a:solidFill>
                   <a:schemeClr val="accent1"/>
                 </a:solidFill>
               </a14:hiddenFill>
             </a:ext>
             <a:ext uri="{91240B29-F687-4F45-9708-019B960494DF}">
-              <a14:hiddenLine xmlns:a14="http://schemas.microsoft.com/office/drawing/2010/main" xmlns:p="http://schemas.openxmlformats.org/presentationml/2006/main" xmlns:r="http://schemas.openxmlformats.org/officeDocument/2006/relationships" xmlns:a="http://schemas.openxmlformats.org/drawingml/2006/main" xmlns="" w="9525">
+              <a14:hiddenLine xmlns:a14="http://schemas.microsoft.com/office/drawing/2010/main" w="9525">
                 <a:solidFill>
                   <a:schemeClr val="tx1"/>
                 </a:solidFill>
@@ -7738,7 +7754,7 @@
               </a14:hiddenLine>
             </a:ext>
             <a:ext uri="{AF507438-7753-43E0-B8FC-AC1667EBCBE1}">
-              <a14:hiddenEffects xmlns:a14="http://schemas.microsoft.com/office/drawing/2010/main" xmlns:p="http://schemas.openxmlformats.org/presentationml/2006/main" xmlns:r="http://schemas.openxmlformats.org/officeDocument/2006/relationships" xmlns:a="http://schemas.openxmlformats.org/drawingml/2006/main" xmlns="">
+              <a14:hiddenEffects xmlns:a14="http://schemas.microsoft.com/office/drawing/2010/main">
                 <a:effectLst>
                   <a:outerShdw dist="35921" dir="2700000" algn="ctr" rotWithShape="0">
                     <a:schemeClr val="bg2"/>
@@ -7793,14 +7809,14 @@
           <a:effectLst/>
           <a:extLst>
             <a:ext uri="{909E8E84-426E-40DD-AFC4-6F175D3DCCD1}">
-              <a14:hiddenFill xmlns:a14="http://schemas.microsoft.com/office/drawing/2010/main" xmlns:p="http://schemas.openxmlformats.org/presentationml/2006/main" xmlns:r="http://schemas.openxmlformats.org/officeDocument/2006/relationships" xmlns:a="http://schemas.openxmlformats.org/drawingml/2006/main" xmlns="">
+              <a14:hiddenFill xmlns:a14="http://schemas.microsoft.com/office/drawing/2010/main">
                 <a:solidFill>
                   <a:schemeClr val="accent1"/>
                 </a:solidFill>
               </a14:hiddenFill>
             </a:ext>
             <a:ext uri="{91240B29-F687-4F45-9708-019B960494DF}">
-              <a14:hiddenLine xmlns:a14="http://schemas.microsoft.com/office/drawing/2010/main" xmlns:p="http://schemas.openxmlformats.org/presentationml/2006/main" xmlns:r="http://schemas.openxmlformats.org/officeDocument/2006/relationships" xmlns:a="http://schemas.openxmlformats.org/drawingml/2006/main" xmlns="" w="9525">
+              <a14:hiddenLine xmlns:a14="http://schemas.microsoft.com/office/drawing/2010/main" w="9525">
                 <a:solidFill>
                   <a:schemeClr val="tx1"/>
                 </a:solidFill>
@@ -7810,7 +7826,7 @@
               </a14:hiddenLine>
             </a:ext>
             <a:ext uri="{AF507438-7753-43E0-B8FC-AC1667EBCBE1}">
-              <a14:hiddenEffects xmlns:a14="http://schemas.microsoft.com/office/drawing/2010/main" xmlns:p="http://schemas.openxmlformats.org/presentationml/2006/main" xmlns:r="http://schemas.openxmlformats.org/officeDocument/2006/relationships" xmlns:a="http://schemas.openxmlformats.org/drawingml/2006/main" xmlns="">
+              <a14:hiddenEffects xmlns:a14="http://schemas.microsoft.com/office/drawing/2010/main">
                 <a:effectLst>
                   <a:outerShdw dist="35921" dir="2700000" algn="ctr" rotWithShape="0">
                     <a:schemeClr val="bg2"/>
@@ -8387,7 +8403,7 @@
 </file>
 
 <file path=ppt/slideMasters/slideMaster2.xml><?xml version="1.0" encoding="utf-8"?>
-<p:sldMaster xmlns:a="http://schemas.openxmlformats.org/drawingml/2006/main" xmlns:r="http://schemas.openxmlformats.org/officeDocument/2006/relationships" xmlns:mc="http://schemas.openxmlformats.org/markup-compatibility/2006" xmlns:mv="urn:schemas-microsoft-com:mac:vml" xmlns:p="http://schemas.openxmlformats.org/presentationml/2006/main" mc:Ignorable="mv" mc:PreserveAttributes="mv:*" preserve="1">
+<p:sldMaster xmlns:a="http://schemas.openxmlformats.org/drawingml/2006/main" xmlns:r="http://schemas.openxmlformats.org/officeDocument/2006/relationships" xmlns:p="http://schemas.openxmlformats.org/presentationml/2006/main" preserve="1">
   <p:cSld>
     <p:bg>
       <p:bgPr>
@@ -8436,14 +8452,14 @@
           <a:effectLst/>
           <a:extLst>
             <a:ext uri="{909E8E84-426E-40DD-AFC4-6F175D3DCCD1}">
-              <a14:hiddenFill xmlns:a14="http://schemas.microsoft.com/office/drawing/2010/main" xmlns:p="http://schemas.openxmlformats.org/presentationml/2006/main" xmlns:r="http://schemas.openxmlformats.org/officeDocument/2006/relationships" xmlns:a="http://schemas.openxmlformats.org/drawingml/2006/main" xmlns="">
+              <a14:hiddenFill xmlns:a14="http://schemas.microsoft.com/office/drawing/2010/main">
                 <a:solidFill>
                   <a:schemeClr val="accent1"/>
                 </a:solidFill>
               </a14:hiddenFill>
             </a:ext>
             <a:ext uri="{91240B29-F687-4F45-9708-019B960494DF}">
-              <a14:hiddenLine xmlns:a14="http://schemas.microsoft.com/office/drawing/2010/main" xmlns:p="http://schemas.openxmlformats.org/presentationml/2006/main" xmlns:r="http://schemas.openxmlformats.org/officeDocument/2006/relationships" xmlns:a="http://schemas.openxmlformats.org/drawingml/2006/main" xmlns="" w="9525">
+              <a14:hiddenLine xmlns:a14="http://schemas.microsoft.com/office/drawing/2010/main" w="9525">
                 <a:solidFill>
                   <a:schemeClr val="tx1"/>
                 </a:solidFill>
@@ -8453,7 +8469,7 @@
               </a14:hiddenLine>
             </a:ext>
             <a:ext uri="{AF507438-7753-43E0-B8FC-AC1667EBCBE1}">
-              <a14:hiddenEffects xmlns:a14="http://schemas.microsoft.com/office/drawing/2010/main" xmlns:p="http://schemas.openxmlformats.org/presentationml/2006/main" xmlns:r="http://schemas.openxmlformats.org/officeDocument/2006/relationships" xmlns:a="http://schemas.openxmlformats.org/drawingml/2006/main" xmlns="">
+              <a14:hiddenEffects xmlns:a14="http://schemas.microsoft.com/office/drawing/2010/main">
                 <a:effectLst>
                   <a:outerShdw dist="35921" dir="2700000" algn="ctr" rotWithShape="0">
                     <a:schemeClr val="bg2"/>
@@ -8521,12 +8537,12 @@
           <a:effectLst/>
           <a:extLst>
             <a:ext uri="{909E8E84-426E-40DD-AFC4-6F175D3DCCD1}">
-              <a14:hiddenFill xmlns:a14="http://schemas.microsoft.com/office/drawing/2010/main" xmlns:p="http://schemas.openxmlformats.org/presentationml/2006/main" xmlns:r="http://schemas.openxmlformats.org/officeDocument/2006/relationships" xmlns:a="http://schemas.openxmlformats.org/drawingml/2006/main" xmlns="">
+              <a14:hiddenFill xmlns:a14="http://schemas.microsoft.com/office/drawing/2010/main">
                 <a:noFill/>
               </a14:hiddenFill>
             </a:ext>
             <a:ext uri="{AF507438-7753-43E0-B8FC-AC1667EBCBE1}">
-              <a14:hiddenEffects xmlns:a14="http://schemas.microsoft.com/office/drawing/2010/main" xmlns:p="http://schemas.openxmlformats.org/presentationml/2006/main" xmlns:r="http://schemas.openxmlformats.org/officeDocument/2006/relationships" xmlns:a="http://schemas.openxmlformats.org/drawingml/2006/main" xmlns="">
+              <a14:hiddenEffects xmlns:a14="http://schemas.microsoft.com/office/drawing/2010/main">
                 <a:effectLst>
                   <a:outerShdw dist="35921" dir="2700000" algn="ctr" rotWithShape="0">
                     <a:schemeClr val="bg2"/>
@@ -8569,14 +8585,14 @@
           <a:effectLst/>
           <a:extLst>
             <a:ext uri="{909E8E84-426E-40DD-AFC4-6F175D3DCCD1}">
-              <a14:hiddenFill xmlns:a14="http://schemas.microsoft.com/office/drawing/2010/main" xmlns:p="http://schemas.openxmlformats.org/presentationml/2006/main" xmlns:r="http://schemas.openxmlformats.org/officeDocument/2006/relationships" xmlns:a="http://schemas.openxmlformats.org/drawingml/2006/main" xmlns="">
+              <a14:hiddenFill xmlns:a14="http://schemas.microsoft.com/office/drawing/2010/main">
                 <a:solidFill>
                   <a:schemeClr val="accent1"/>
                 </a:solidFill>
               </a14:hiddenFill>
             </a:ext>
             <a:ext uri="{91240B29-F687-4F45-9708-019B960494DF}">
-              <a14:hiddenLine xmlns:a14="http://schemas.microsoft.com/office/drawing/2010/main" xmlns:p="http://schemas.openxmlformats.org/presentationml/2006/main" xmlns:r="http://schemas.openxmlformats.org/officeDocument/2006/relationships" xmlns:a="http://schemas.openxmlformats.org/drawingml/2006/main" xmlns="" w="9525">
+              <a14:hiddenLine xmlns:a14="http://schemas.microsoft.com/office/drawing/2010/main" w="9525">
                 <a:solidFill>
                   <a:schemeClr val="tx1"/>
                 </a:solidFill>
@@ -8586,7 +8602,7 @@
               </a14:hiddenLine>
             </a:ext>
             <a:ext uri="{AF507438-7753-43E0-B8FC-AC1667EBCBE1}">
-              <a14:hiddenEffects xmlns:a14="http://schemas.microsoft.com/office/drawing/2010/main" xmlns:p="http://schemas.openxmlformats.org/presentationml/2006/main" xmlns:r="http://schemas.openxmlformats.org/officeDocument/2006/relationships" xmlns:a="http://schemas.openxmlformats.org/drawingml/2006/main" xmlns="">
+              <a14:hiddenEffects xmlns:a14="http://schemas.microsoft.com/office/drawing/2010/main">
                 <a:effectLst>
                   <a:outerShdw dist="35921" dir="2700000" algn="ctr" rotWithShape="0">
                     <a:schemeClr val="bg2"/>
@@ -8652,14 +8668,14 @@
           <a:effectLst/>
           <a:extLst>
             <a:ext uri="{909E8E84-426E-40DD-AFC4-6F175D3DCCD1}">
-              <a14:hiddenFill xmlns:a14="http://schemas.microsoft.com/office/drawing/2010/main" xmlns:p="http://schemas.openxmlformats.org/presentationml/2006/main" xmlns:r="http://schemas.openxmlformats.org/officeDocument/2006/relationships" xmlns:a="http://schemas.openxmlformats.org/drawingml/2006/main" xmlns="">
+              <a14:hiddenFill xmlns:a14="http://schemas.microsoft.com/office/drawing/2010/main">
                 <a:solidFill>
                   <a:schemeClr val="accent1"/>
                 </a:solidFill>
               </a14:hiddenFill>
             </a:ext>
             <a:ext uri="{91240B29-F687-4F45-9708-019B960494DF}">
-              <a14:hiddenLine xmlns:a14="http://schemas.microsoft.com/office/drawing/2010/main" xmlns:p="http://schemas.openxmlformats.org/presentationml/2006/main" xmlns:r="http://schemas.openxmlformats.org/officeDocument/2006/relationships" xmlns:a="http://schemas.openxmlformats.org/drawingml/2006/main" xmlns="" w="9525">
+              <a14:hiddenLine xmlns:a14="http://schemas.microsoft.com/office/drawing/2010/main" w="9525">
                 <a:solidFill>
                   <a:schemeClr val="tx1"/>
                 </a:solidFill>
@@ -8669,7 +8685,7 @@
               </a14:hiddenLine>
             </a:ext>
             <a:ext uri="{AF507438-7753-43E0-B8FC-AC1667EBCBE1}">
-              <a14:hiddenEffects xmlns:a14="http://schemas.microsoft.com/office/drawing/2010/main" xmlns:p="http://schemas.openxmlformats.org/presentationml/2006/main" xmlns:r="http://schemas.openxmlformats.org/officeDocument/2006/relationships" xmlns:a="http://schemas.openxmlformats.org/drawingml/2006/main" xmlns="">
+              <a14:hiddenEffects xmlns:a14="http://schemas.microsoft.com/office/drawing/2010/main">
                 <a:effectLst>
                   <a:outerShdw dist="35921" dir="2700000" algn="ctr" rotWithShape="0">
                     <a:schemeClr val="bg2"/>
@@ -8718,14 +8734,14 @@
           <a:effectLst/>
           <a:extLst>
             <a:ext uri="{909E8E84-426E-40DD-AFC4-6F175D3DCCD1}">
-              <a14:hiddenFill xmlns:a14="http://schemas.microsoft.com/office/drawing/2010/main" xmlns:p="http://schemas.openxmlformats.org/presentationml/2006/main" xmlns:r="http://schemas.openxmlformats.org/officeDocument/2006/relationships" xmlns:a="http://schemas.openxmlformats.org/drawingml/2006/main" xmlns="">
+              <a14:hiddenFill xmlns:a14="http://schemas.microsoft.com/office/drawing/2010/main">
                 <a:solidFill>
                   <a:schemeClr val="accent1"/>
                 </a:solidFill>
               </a14:hiddenFill>
             </a:ext>
             <a:ext uri="{91240B29-F687-4F45-9708-019B960494DF}">
-              <a14:hiddenLine xmlns:a14="http://schemas.microsoft.com/office/drawing/2010/main" xmlns:p="http://schemas.openxmlformats.org/presentationml/2006/main" xmlns:r="http://schemas.openxmlformats.org/officeDocument/2006/relationships" xmlns:a="http://schemas.openxmlformats.org/drawingml/2006/main" xmlns="" w="9525" algn="ctr">
+              <a14:hiddenLine xmlns:a14="http://schemas.microsoft.com/office/drawing/2010/main" w="9525" algn="ctr">
                 <a:solidFill>
                   <a:schemeClr val="tx1"/>
                 </a:solidFill>
@@ -8735,7 +8751,7 @@
               </a14:hiddenLine>
             </a:ext>
             <a:ext uri="{AF507438-7753-43E0-B8FC-AC1667EBCBE1}">
-              <a14:hiddenEffects xmlns:a14="http://schemas.microsoft.com/office/drawing/2010/main" xmlns:p="http://schemas.openxmlformats.org/presentationml/2006/main" xmlns:r="http://schemas.openxmlformats.org/officeDocument/2006/relationships" xmlns:a="http://schemas.openxmlformats.org/drawingml/2006/main" xmlns="">
+              <a14:hiddenEffects xmlns:a14="http://schemas.microsoft.com/office/drawing/2010/main">
                 <a:effectLst>
                   <a:outerShdw dist="35921" dir="2700000" algn="ctr" rotWithShape="0">
                     <a:schemeClr val="bg2"/>
@@ -8894,14 +8910,14 @@
           <a:effectLst/>
           <a:extLst>
             <a:ext uri="{909E8E84-426E-40DD-AFC4-6F175D3DCCD1}">
-              <a14:hiddenFill xmlns:a14="http://schemas.microsoft.com/office/drawing/2010/main" xmlns:p="http://schemas.openxmlformats.org/presentationml/2006/main" xmlns:r="http://schemas.openxmlformats.org/officeDocument/2006/relationships" xmlns:a="http://schemas.openxmlformats.org/drawingml/2006/main" xmlns="">
+              <a14:hiddenFill xmlns:a14="http://schemas.microsoft.com/office/drawing/2010/main">
                 <a:solidFill>
                   <a:schemeClr val="accent1"/>
                 </a:solidFill>
               </a14:hiddenFill>
             </a:ext>
             <a:ext uri="{91240B29-F687-4F45-9708-019B960494DF}">
-              <a14:hiddenLine xmlns:a14="http://schemas.microsoft.com/office/drawing/2010/main" xmlns:p="http://schemas.openxmlformats.org/presentationml/2006/main" xmlns:r="http://schemas.openxmlformats.org/officeDocument/2006/relationships" xmlns:a="http://schemas.openxmlformats.org/drawingml/2006/main" xmlns="" w="9525" algn="ctr">
+              <a14:hiddenLine xmlns:a14="http://schemas.microsoft.com/office/drawing/2010/main" w="9525" algn="ctr">
                 <a:solidFill>
                   <a:schemeClr val="tx1"/>
                 </a:solidFill>
@@ -8911,7 +8927,7 @@
               </a14:hiddenLine>
             </a:ext>
             <a:ext uri="{AF507438-7753-43E0-B8FC-AC1667EBCBE1}">
-              <a14:hiddenEffects xmlns:a14="http://schemas.microsoft.com/office/drawing/2010/main" xmlns:p="http://schemas.openxmlformats.org/presentationml/2006/main" xmlns:r="http://schemas.openxmlformats.org/officeDocument/2006/relationships" xmlns:a="http://schemas.openxmlformats.org/drawingml/2006/main" xmlns="">
+              <a14:hiddenEffects xmlns:a14="http://schemas.microsoft.com/office/drawing/2010/main">
                 <a:effectLst>
                   <a:outerShdw dist="35921" dir="2700000" algn="ctr" rotWithShape="0">
                     <a:schemeClr val="bg2"/>
@@ -9079,14 +9095,14 @@
           <a:effectLst/>
           <a:extLst>
             <a:ext uri="{909E8E84-426E-40DD-AFC4-6F175D3DCCD1}">
-              <a14:hiddenFill xmlns:a14="http://schemas.microsoft.com/office/drawing/2010/main" xmlns:p="http://schemas.openxmlformats.org/presentationml/2006/main" xmlns:r="http://schemas.openxmlformats.org/officeDocument/2006/relationships" xmlns:a="http://schemas.openxmlformats.org/drawingml/2006/main" xmlns="">
+              <a14:hiddenFill xmlns:a14="http://schemas.microsoft.com/office/drawing/2010/main">
                 <a:solidFill>
                   <a:schemeClr val="accent1"/>
                 </a:solidFill>
               </a14:hiddenFill>
             </a:ext>
             <a:ext uri="{91240B29-F687-4F45-9708-019B960494DF}">
-              <a14:hiddenLine xmlns:a14="http://schemas.microsoft.com/office/drawing/2010/main" xmlns:p="http://schemas.openxmlformats.org/presentationml/2006/main" xmlns:r="http://schemas.openxmlformats.org/officeDocument/2006/relationships" xmlns:a="http://schemas.openxmlformats.org/drawingml/2006/main" xmlns="" w="9525" algn="ctr">
+              <a14:hiddenLine xmlns:a14="http://schemas.microsoft.com/office/drawing/2010/main" w="9525" algn="ctr">
                 <a:solidFill>
                   <a:schemeClr val="tx1"/>
                 </a:solidFill>
@@ -9096,7 +9112,7 @@
               </a14:hiddenLine>
             </a:ext>
             <a:ext uri="{AF507438-7753-43E0-B8FC-AC1667EBCBE1}">
-              <a14:hiddenEffects xmlns:a14="http://schemas.microsoft.com/office/drawing/2010/main" xmlns:p="http://schemas.openxmlformats.org/presentationml/2006/main" xmlns:r="http://schemas.openxmlformats.org/officeDocument/2006/relationships" xmlns:a="http://schemas.openxmlformats.org/drawingml/2006/main" xmlns="">
+              <a14:hiddenEffects xmlns:a14="http://schemas.microsoft.com/office/drawing/2010/main">
                 <a:effectLst>
                   <a:outerShdw dist="35921" dir="2700000" algn="ctr" rotWithShape="0">
                     <a:schemeClr val="bg2"/>
@@ -9714,7 +9730,7 @@
 </file>
 
 <file path=ppt/slides/slide1.xml><?xml version="1.0" encoding="utf-8"?>
-<p:sld xmlns:a="http://schemas.openxmlformats.org/drawingml/2006/main" xmlns:r="http://schemas.openxmlformats.org/officeDocument/2006/relationships" xmlns:mc="http://schemas.openxmlformats.org/markup-compatibility/2006" xmlns:mv="urn:schemas-microsoft-com:mac:vml" xmlns:p="http://schemas.openxmlformats.org/presentationml/2006/main" mc:Ignorable="mv" mc:PreserveAttributes="mv:*" showMasterSp="0">
+<p:sld xmlns:a="http://schemas.openxmlformats.org/drawingml/2006/main" xmlns:r="http://schemas.openxmlformats.org/officeDocument/2006/relationships" xmlns:p="http://schemas.openxmlformats.org/presentationml/2006/main" showMasterSp="0">
   <p:cSld>
     <p:spTree>
       <p:nvGrpSpPr>
@@ -10159,14 +10175,14 @@
             <p:ph sz="half" idx="2"/>
             <p:extLst>
               <p:ext uri="{D42A27DB-BD31-4B8C-83A1-F6EECF244321}">
-                <p14:modId xmlns:p14="http://schemas.microsoft.com/office/powerpoint/2010/main" xmlns:p="http://schemas.openxmlformats.org/presentationml/2006/main" xmlns:r="http://schemas.openxmlformats.org/officeDocument/2006/relationships" xmlns:a="http://schemas.openxmlformats.org/drawingml/2006/main" xmlns="" val="3062184352"/>
+                <p14:modId xmlns:p14="http://schemas.microsoft.com/office/powerpoint/2010/main" val="4293622027"/>
               </p:ext>
             </p:extLst>
           </p:nvPr>
         </p:nvGraphicFramePr>
         <p:xfrm>
           <a:off x="370417" y="148738"/>
-          <a:ext cx="8444753" cy="6364891"/>
+          <a:ext cx="8444753" cy="5816252"/>
         </p:xfrm>
         <a:graphic>
           <a:graphicData uri="http://schemas.openxmlformats.org/drawingml/2006/table">
@@ -11996,7 +12012,7 @@
                   </a:tcPr>
                 </a:tc>
               </a:tr>
-              <a:tr h="122697">
+              <a:tr h="0">
                 <a:tc gridSpan="2">
                   <a:txBody>
                     <a:bodyPr/>
@@ -12020,20 +12036,17 @@
                         <a:buNone/>
                         <a:tabLst/>
                       </a:pPr>
-                      <a:r>
-                        <a:rPr kumimoji="0" lang="en-US" altLang="en-US" sz="900" b="0" i="0" u="none" strike="noStrike" cap="none" normalizeH="0" baseline="0" dirty="0" smtClean="0">
-                          <a:ln>
-                            <a:noFill/>
-                          </a:ln>
-                          <a:solidFill>
-                            <a:schemeClr val="tx1"/>
-                          </a:solidFill>
-                          <a:effectLst/>
-                          <a:latin typeface="Arial" charset="0"/>
-                          <a:cs typeface="Arial" charset="0"/>
-                        </a:rPr>
-                        <a:t>Twitter</a:t>
-                      </a:r>
+                      <a:endParaRPr kumimoji="0" lang="en-US" altLang="en-US" sz="900" b="0" i="0" u="none" strike="noStrike" cap="none" normalizeH="0" baseline="0" dirty="0" smtClean="0">
+                        <a:ln>
+                          <a:noFill/>
+                        </a:ln>
+                        <a:solidFill>
+                          <a:schemeClr val="tx1"/>
+                        </a:solidFill>
+                        <a:effectLst/>
+                        <a:latin typeface="Arial" charset="0"/>
+                        <a:cs typeface="Arial" charset="0"/>
+                      </a:endParaRPr>
                     </a:p>
                   </a:txBody>
                   <a:tcPr marT="45747" marB="45747" horzOverflow="overflow">
@@ -12097,14 +12110,6 @@
                     <a:bodyPr/>
                     <a:lstStyle/>
                     <a:p>
-                      <a:r>
-                        <a:rPr lang="en-US" sz="900" dirty="0" smtClean="0"/>
-                        <a:t>Twitter status updates for specific days and geographic areas using a sample of keywords related to employment (“working”, ‘job”, “fired”</a:t>
-                      </a:r>
-                      <a:r>
-                        <a:rPr lang="en-US" sz="900" baseline="0" dirty="0" smtClean="0"/>
-                        <a:t> etc.)</a:t>
-                      </a:r>
                       <a:endParaRPr lang="en-US" sz="900" dirty="0"/>
                     </a:p>
                   </a:txBody>
@@ -12159,10 +12164,7 @@
                     <a:bodyPr/>
                     <a:lstStyle/>
                     <a:p>
-                      <a:r>
-                        <a:rPr lang="en-US" sz="900" dirty="0" smtClean="0"/>
-                        <a:t>&gt; 100MB</a:t>
-                      </a:r>
+                      <a:endParaRPr lang="en-US" sz="900" dirty="0" smtClean="0"/>
                     </a:p>
                   </a:txBody>
                   <a:tcPr marT="45747" marB="45747" horzOverflow="overflow">
@@ -13861,20 +13863,17 @@
                         <a:buNone/>
                         <a:tabLst/>
                       </a:pPr>
-                      <a:r>
-                        <a:rPr kumimoji="0" lang="en-US" altLang="en-US" sz="900" b="0" i="0" u="none" strike="noStrike" cap="none" normalizeH="0" baseline="0" dirty="0" smtClean="0">
-                          <a:ln>
-                            <a:noFill/>
-                          </a:ln>
-                          <a:solidFill>
-                            <a:schemeClr val="tx1"/>
-                          </a:solidFill>
-                          <a:effectLst/>
-                          <a:latin typeface="Arial" charset="0"/>
-                          <a:cs typeface="Arial" charset="0"/>
-                        </a:rPr>
-                        <a:t>- Status date and geo-tagged specific historical status messages for NY</a:t>
-                      </a:r>
+                      <a:endParaRPr kumimoji="0" lang="en-US" altLang="en-US" sz="900" b="0" i="0" u="none" strike="noStrike" cap="none" normalizeH="0" baseline="0" dirty="0" smtClean="0">
+                        <a:ln>
+                          <a:noFill/>
+                        </a:ln>
+                        <a:solidFill>
+                          <a:schemeClr val="tx1"/>
+                        </a:solidFill>
+                        <a:effectLst/>
+                        <a:latin typeface="Arial" charset="0"/>
+                        <a:cs typeface="Arial" charset="0"/>
+                      </a:endParaRPr>
                     </a:p>
                   </a:txBody>
                   <a:tcPr marT="45747" marB="45747" horzOverflow="overflow">
@@ -13949,48 +13948,17 @@
                         <a:tabLst/>
                         <a:defRPr/>
                       </a:pPr>
-                      <a:r>
-                        <a:rPr kumimoji="0" lang="en-US" altLang="en-US" sz="900" b="0" i="0" u="none" strike="noStrike" cap="none" normalizeH="0" baseline="0" dirty="0" smtClean="0">
-                          <a:ln>
-                            <a:noFill/>
-                          </a:ln>
-                          <a:solidFill>
-                            <a:schemeClr val="tx1"/>
-                          </a:solidFill>
-                          <a:effectLst/>
-                          <a:latin typeface="Arial" charset="0"/>
-                          <a:cs typeface="Arial" charset="0"/>
-                        </a:rPr>
-                        <a:t>- Using historic twitter status messages based on keyword, and location, we want to attempt to correlate keywords to the reported unemployment numbers.  Then, because we can get twitter messages in </a:t>
-                      </a:r>
-                      <a:r>
-                        <a:rPr kumimoji="0" lang="en-US" altLang="en-US" sz="900" b="0" i="0" u="none" strike="noStrike" cap="none" normalizeH="0" baseline="0" dirty="0" err="1" smtClean="0">
-                          <a:ln>
-                            <a:noFill/>
-                          </a:ln>
-                          <a:solidFill>
-                            <a:schemeClr val="tx1"/>
-                          </a:solidFill>
-                          <a:effectLst/>
-                          <a:latin typeface="Arial" charset="0"/>
-                          <a:cs typeface="Arial" charset="0"/>
-                        </a:rPr>
-                        <a:t>realtime</a:t>
-                      </a:r>
-                      <a:r>
-                        <a:rPr kumimoji="0" lang="en-US" altLang="en-US" sz="900" b="0" i="0" u="none" strike="noStrike" cap="none" normalizeH="0" baseline="0" dirty="0" smtClean="0">
-                          <a:ln>
-                            <a:noFill/>
-                          </a:ln>
-                          <a:solidFill>
-                            <a:schemeClr val="tx1"/>
-                          </a:solidFill>
-                          <a:effectLst/>
-                          <a:latin typeface="Arial" charset="0"/>
-                          <a:cs typeface="Arial" charset="0"/>
-                        </a:rPr>
-                        <a:t>, we can use that as a predictor of health statistics (API)</a:t>
-                      </a:r>
+                      <a:endParaRPr kumimoji="0" lang="en-US" altLang="en-US" sz="900" b="0" i="0" u="none" strike="noStrike" cap="none" normalizeH="0" baseline="0" dirty="0" smtClean="0">
+                        <a:ln>
+                          <a:noFill/>
+                        </a:ln>
+                        <a:solidFill>
+                          <a:schemeClr val="tx1"/>
+                        </a:solidFill>
+                        <a:effectLst/>
+                        <a:latin typeface="Arial" charset="0"/>
+                        <a:cs typeface="Arial" charset="0"/>
+                      </a:endParaRPr>
                     </a:p>
                   </a:txBody>
                   <a:tcPr marT="45747" marB="45747" horzOverflow="overflow">
@@ -14049,102 +14017,6 @@
                   <a:txBody>
                     <a:bodyPr/>
                     <a:lstStyle/>
-                    <a:p>
-                      <a:pPr marL="0" marR="0" lvl="0" indent="0" algn="l" defTabSz="914400" rtl="0" eaLnBrk="1" fontAlgn="base" latinLnBrk="0" hangingPunct="1">
-                        <a:lnSpc>
-                          <a:spcPct val="100000"/>
-                        </a:lnSpc>
-                        <a:spcBef>
-                          <a:spcPct val="20000"/>
-                        </a:spcBef>
-                        <a:spcAft>
-                          <a:spcPct val="0"/>
-                        </a:spcAft>
-                        <a:buClr>
-                          <a:schemeClr val="tx1"/>
-                        </a:buClr>
-                        <a:buSzTx/>
-                        <a:buFontTx/>
-                        <a:buNone/>
-                        <a:tabLst/>
-                      </a:pPr>
-                      <a:r>
-                        <a:rPr kumimoji="0" lang="en-US" altLang="en-US" sz="900" b="0" i="0" u="none" strike="noStrike" cap="none" normalizeH="0" baseline="0" dirty="0" smtClean="0">
-                          <a:ln>
-                            <a:noFill/>
-                          </a:ln>
-                          <a:solidFill>
-                            <a:schemeClr val="tx1"/>
-                          </a:solidFill>
-                          <a:effectLst/>
-                          <a:latin typeface="Arial" charset="0"/>
-                          <a:cs typeface="Arial" charset="0"/>
-                        </a:rPr>
-                        <a:t>- 100 per day historical (2009-2012)</a:t>
-                      </a:r>
-                    </a:p>
-                    <a:p>
-                      <a:pPr marL="0" marR="0" lvl="0" indent="0" algn="l" defTabSz="914400" rtl="0" eaLnBrk="1" fontAlgn="base" latinLnBrk="0" hangingPunct="1">
-                        <a:lnSpc>
-                          <a:spcPct val="100000"/>
-                        </a:lnSpc>
-                        <a:spcBef>
-                          <a:spcPct val="20000"/>
-                        </a:spcBef>
-                        <a:spcAft>
-                          <a:spcPct val="0"/>
-                        </a:spcAft>
-                        <a:buClr>
-                          <a:schemeClr val="tx1"/>
-                        </a:buClr>
-                        <a:buSzTx/>
-                        <a:buFontTx/>
-                        <a:buNone/>
-                        <a:tabLst/>
-                      </a:pPr>
-                      <a:r>
-                        <a:rPr kumimoji="0" lang="en-US" altLang="en-US" sz="900" b="0" i="0" u="none" strike="noStrike" cap="none" normalizeH="0" baseline="0" dirty="0" smtClean="0">
-                          <a:ln>
-                            <a:noFill/>
-                          </a:ln>
-                          <a:solidFill>
-                            <a:schemeClr val="tx1"/>
-                          </a:solidFill>
-                          <a:effectLst/>
-                          <a:latin typeface="Arial" charset="0"/>
-                          <a:cs typeface="Arial" charset="0"/>
-                        </a:rPr>
-                        <a:t>- </a:t>
-                      </a:r>
-                      <a:r>
-                        <a:rPr kumimoji="0" lang="en-US" altLang="en-US" sz="900" b="0" i="0" u="none" strike="noStrike" cap="none" normalizeH="0" baseline="0" dirty="0" err="1" smtClean="0">
-                          <a:ln>
-                            <a:noFill/>
-                          </a:ln>
-                          <a:solidFill>
-                            <a:schemeClr val="tx1"/>
-                          </a:solidFill>
-                          <a:effectLst/>
-                          <a:latin typeface="Arial" charset="0"/>
-                          <a:cs typeface="Arial" charset="0"/>
-                        </a:rPr>
-                        <a:t>Realtime</a:t>
-                      </a:r>
-                      <a:r>
-                        <a:rPr kumimoji="0" lang="en-US" altLang="en-US" sz="900" b="0" i="0" u="none" strike="noStrike" cap="none" normalizeH="0" baseline="0" dirty="0" smtClean="0">
-                          <a:ln>
-                            <a:noFill/>
-                          </a:ln>
-                          <a:solidFill>
-                            <a:schemeClr val="tx1"/>
-                          </a:solidFill>
-                          <a:effectLst/>
-                          <a:latin typeface="Arial" charset="0"/>
-                          <a:cs typeface="Arial" charset="0"/>
-                        </a:rPr>
-                        <a:t>…</a:t>
-                      </a:r>
-                    </a:p>
                     <a:p>
                       <a:endParaRPr lang="en-US" sz="900" dirty="0"/>
                     </a:p>
@@ -14713,8 +14585,37 @@
                           <a:latin typeface="Arial"/>
                           <a:cs typeface="Arial"/>
                         </a:rPr>
-                        <a:t>, Pig, Other technologies: Twitter API</a:t>
+                        <a:t>, </a:t>
                       </a:r>
+                      <a:r>
+                        <a:rPr kumimoji="0" lang="en-US" altLang="en-US" sz="1100" b="0" i="0" u="none" strike="noStrike" kern="1200" cap="none" spc="0" normalizeH="0" baseline="0" noProof="0" dirty="0" smtClean="0">
+                          <a:ln>
+                            <a:noFill/>
+                          </a:ln>
+                          <a:solidFill>
+                            <a:srgbClr val="000000"/>
+                          </a:solidFill>
+                          <a:effectLst/>
+                          <a:uLnTx/>
+                          <a:uFillTx/>
+                          <a:latin typeface="Arial"/>
+                          <a:cs typeface="Arial"/>
+                        </a:rPr>
+                        <a:t>Pig</a:t>
+                      </a:r>
+                      <a:endParaRPr kumimoji="0" lang="en-US" altLang="en-US" sz="1100" b="0" i="0" u="none" strike="noStrike" kern="1200" cap="none" spc="0" normalizeH="0" baseline="0" noProof="0" dirty="0" smtClean="0">
+                        <a:ln>
+                          <a:noFill/>
+                        </a:ln>
+                        <a:solidFill>
+                          <a:srgbClr val="000000"/>
+                        </a:solidFill>
+                        <a:effectLst/>
+                        <a:uLnTx/>
+                        <a:uFillTx/>
+                        <a:latin typeface="Arial"/>
+                        <a:cs typeface="Arial"/>
+                      </a:endParaRPr>
                     </a:p>
                   </a:txBody>
                   <a:tcPr marT="45747" marB="45747" horzOverflow="overflow">
@@ -15032,7 +14933,7 @@
     </p:spTree>
     <p:extLst>
       <p:ext uri="{BB962C8B-B14F-4D97-AF65-F5344CB8AC3E}">
-        <p14:creationId xmlns:p14="http://schemas.microsoft.com/office/powerpoint/2010/main" xmlns:p="http://schemas.openxmlformats.org/presentationml/2006/main" xmlns:r="http://schemas.openxmlformats.org/officeDocument/2006/relationships" xmlns:a="http://schemas.openxmlformats.org/drawingml/2006/main" xmlns="" val="3852912342"/>
+        <p14:creationId xmlns:p14="http://schemas.microsoft.com/office/powerpoint/2010/main" val="3852912342"/>
       </p:ext>
     </p:extLst>
   </p:cSld>
@@ -15050,7 +14951,7 @@
 </file>
 
 <file path=ppt/slides/slide2.xml><?xml version="1.0" encoding="utf-8"?>
-<p:sld xmlns:a="http://schemas.openxmlformats.org/drawingml/2006/main" xmlns:r="http://schemas.openxmlformats.org/officeDocument/2006/relationships" xmlns:mc="http://schemas.openxmlformats.org/markup-compatibility/2006" xmlns:mv="urn:schemas-microsoft-com:mac:vml" xmlns:p="http://schemas.openxmlformats.org/presentationml/2006/main" mc:Ignorable="mv" mc:PreserveAttributes="mv:*" showMasterSp="0">
+<p:sld xmlns:a="http://schemas.openxmlformats.org/drawingml/2006/main" xmlns:r="http://schemas.openxmlformats.org/officeDocument/2006/relationships" xmlns:p="http://schemas.openxmlformats.org/presentationml/2006/main" showMasterSp="0">
   <p:cSld>
     <p:spTree>
       <p:nvGrpSpPr>
@@ -15487,14 +15388,14 @@
             <p:ph sz="half" idx="2"/>
             <p:extLst>
               <p:ext uri="{D42A27DB-BD31-4B8C-83A1-F6EECF244321}">
-                <p14:modId xmlns:p14="http://schemas.microsoft.com/office/powerpoint/2010/main" xmlns:p="http://schemas.openxmlformats.org/presentationml/2006/main" xmlns:r="http://schemas.openxmlformats.org/officeDocument/2006/relationships" xmlns:a="http://schemas.openxmlformats.org/drawingml/2006/main" xmlns="" val="2684002353"/>
+                <p14:modId xmlns:p14="http://schemas.microsoft.com/office/powerpoint/2010/main" val="2684002353"/>
               </p:ext>
             </p:extLst>
           </p:nvPr>
         </p:nvGraphicFramePr>
         <p:xfrm>
           <a:off x="313267" y="1113938"/>
-          <a:ext cx="8444753" cy="3307241"/>
+          <a:ext cx="8444753" cy="3474882"/>
         </p:xfrm>
         <a:graphic>
           <a:graphicData uri="http://schemas.openxmlformats.org/drawingml/2006/table">
@@ -16321,7 +16222,7 @@
     </p:spTree>
     <p:extLst>
       <p:ext uri="{BB962C8B-B14F-4D97-AF65-F5344CB8AC3E}">
-        <p14:creationId xmlns:p14="http://schemas.microsoft.com/office/powerpoint/2010/main" xmlns:p="http://schemas.openxmlformats.org/presentationml/2006/main" xmlns:r="http://schemas.openxmlformats.org/officeDocument/2006/relationships" xmlns:a="http://schemas.openxmlformats.org/drawingml/2006/main" xmlns="" val="1728810535"/>
+        <p14:creationId xmlns:p14="http://schemas.microsoft.com/office/powerpoint/2010/main" val="1728810535"/>
       </p:ext>
     </p:extLst>
   </p:cSld>

</xml_diff>

<commit_message>
Updated the paper with diagrams and description.
</commit_message>
<xml_diff>
--- a/Proposal/Project Proposal.pptx
+++ b/Proposal/Project Proposal.pptx
@@ -141,7 +141,7 @@
   </p:defaultTextStyle>
   <p:extLst>
     <p:ext uri="{EFAFB233-063F-42B5-8137-9DF3F51BA10A}">
-      <p15:sldGuideLst xmlns:p15="http://schemas.microsoft.com/office/powerpoint/2012/main">
+      <p15:sldGuideLst xmlns:p15="http://schemas.microsoft.com/office/powerpoint/2012/main" xmlns="">
         <p15:guide id="1" orient="horz" pos="2160">
           <p15:clr>
             <a:srgbClr val="A4A3A4"/>
@@ -10175,14 +10175,14 @@
             <p:ph sz="half" idx="2"/>
             <p:extLst>
               <p:ext uri="{D42A27DB-BD31-4B8C-83A1-F6EECF244321}">
-                <p14:modId xmlns:p14="http://schemas.microsoft.com/office/powerpoint/2010/main" val="4293622027"/>
+                <p14:modId xmlns:p14="http://schemas.microsoft.com/office/powerpoint/2010/main" val="2504918338"/>
               </p:ext>
             </p:extLst>
           </p:nvPr>
         </p:nvGraphicFramePr>
         <p:xfrm>
           <a:off x="370417" y="148738"/>
-          <a:ext cx="8444753" cy="5816252"/>
+          <a:ext cx="8444753" cy="5770424"/>
         </p:xfrm>
         <a:graphic>
           <a:graphicData uri="http://schemas.openxmlformats.org/drawingml/2006/table">
@@ -10620,7 +10620,23 @@
                             <a:schemeClr val="tx1"/>
                           </a:solidFill>
                         </a:rPr>
-                        <a:t> Using New York state employment statistics by county, in-patient hospital data by </a:t>
+                        <a:t> Using New York state employment statistics by county, </a:t>
+                      </a:r>
+                      <a:r>
+                        <a:rPr lang="en-US" altLang="en-US" sz="900" baseline="0" dirty="0" smtClean="0">
+                          <a:solidFill>
+                            <a:schemeClr val="tx1"/>
+                          </a:solidFill>
+                        </a:rPr>
+                        <a:t>and in-patient </a:t>
+                      </a:r>
+                      <a:r>
+                        <a:rPr lang="en-US" altLang="en-US" sz="900" baseline="0" dirty="0" smtClean="0">
+                          <a:solidFill>
+                            <a:schemeClr val="tx1"/>
+                          </a:solidFill>
+                        </a:rPr>
+                        <a:t>hospital data by </a:t>
                       </a:r>
                       <a:r>
                         <a:rPr lang="en-US" altLang="en-US" sz="900" baseline="0" dirty="0" err="1" smtClean="0">
@@ -10636,7 +10652,23 @@
                             <a:schemeClr val="tx1"/>
                           </a:solidFill>
                         </a:rPr>
-                        <a:t>, and twitter updates, we intend to explore whether there is a correlation between unemployment and changes in health.  Assuming we can find a relationship between historical unemployment and hospital stays, we can than then use current twitter updates as a predictor of future declining health.</a:t>
+                        <a:t>, </a:t>
+                      </a:r>
+                      <a:r>
+                        <a:rPr lang="en-US" altLang="en-US" sz="900" baseline="0" dirty="0" smtClean="0">
+                          <a:solidFill>
+                            <a:schemeClr val="tx1"/>
+                          </a:solidFill>
+                        </a:rPr>
+                        <a:t>we intend to explore whether there is a correlation between unemployment and changes in health.  </a:t>
+                      </a:r>
+                      <a:r>
+                        <a:rPr lang="en-US" altLang="en-US" sz="900" baseline="0" dirty="0" smtClean="0">
+                          <a:solidFill>
+                            <a:schemeClr val="tx1"/>
+                          </a:solidFill>
+                        </a:rPr>
+                        <a:t>Rather than tracking individuals in a longitudinal study of direct cause and effect, this project aims to study the larger impact of unemployment as a macro-economic effect on social outcomes in geographic areas.  All data is de-identified (anonymized) so we have no way of knowing if a particular person lost their job and then spent more time in the hospital as a result, or whether they got a job, and experienced a workplace injury.  However, using comprehensive data gathered by central agencies across many years, we expect to be able to determine if the macro-economic goals of the government are aligned with the well-being of the population in aggregate.</a:t>
                       </a:r>
                       <a:endParaRPr lang="en-US" altLang="en-US" sz="400" dirty="0" smtClean="0">
                         <a:solidFill>
@@ -11963,208 +11995,6 @@
                         <a:rPr lang="en-US" sz="900" dirty="0" smtClean="0"/>
                         <a:t>&lt;10 MB</a:t>
                       </a:r>
-                    </a:p>
-                  </a:txBody>
-                  <a:tcPr marT="45747" marB="45747" horzOverflow="overflow">
-                    <a:lnL w="12700" cap="flat" cmpd="sng" algn="ctr">
-                      <a:solidFill>
-                        <a:schemeClr val="tx1"/>
-                      </a:solidFill>
-                      <a:prstDash val="solid"/>
-                      <a:round/>
-                      <a:headEnd type="none" w="med" len="med"/>
-                      <a:tailEnd type="none" w="med" len="med"/>
-                    </a:lnL>
-                    <a:lnR w="12700" cap="flat" cmpd="sng" algn="ctr">
-                      <a:solidFill>
-                        <a:schemeClr val="tx1"/>
-                      </a:solidFill>
-                      <a:prstDash val="solid"/>
-                      <a:round/>
-                      <a:headEnd type="none" w="med" len="med"/>
-                      <a:tailEnd type="none" w="med" len="med"/>
-                    </a:lnR>
-                    <a:lnT w="12700" cap="flat" cmpd="sng" algn="ctr">
-                      <a:solidFill>
-                        <a:schemeClr val="tx1"/>
-                      </a:solidFill>
-                      <a:prstDash val="solid"/>
-                      <a:round/>
-                      <a:headEnd type="none" w="med" len="med"/>
-                      <a:tailEnd type="none" w="med" len="med"/>
-                    </a:lnT>
-                    <a:lnB w="12700" cap="flat" cmpd="sng" algn="ctr">
-                      <a:solidFill>
-                        <a:schemeClr val="tx1"/>
-                      </a:solidFill>
-                      <a:prstDash val="solid"/>
-                      <a:round/>
-                      <a:headEnd type="none" w="med" len="med"/>
-                      <a:tailEnd type="none" w="med" len="med"/>
-                    </a:lnB>
-                    <a:lnTlToBr>
-                      <a:noFill/>
-                    </a:lnTlToBr>
-                    <a:lnBlToTr>
-                      <a:noFill/>
-                    </a:lnBlToTr>
-                    <a:noFill/>
-                  </a:tcPr>
-                </a:tc>
-              </a:tr>
-              <a:tr h="0">
-                <a:tc gridSpan="2">
-                  <a:txBody>
-                    <a:bodyPr/>
-                    <a:lstStyle/>
-                    <a:p>
-                      <a:pPr marL="0" marR="0" lvl="0" indent="0" algn="l" defTabSz="914400" rtl="0" eaLnBrk="1" fontAlgn="base" latinLnBrk="0" hangingPunct="1">
-                        <a:lnSpc>
-                          <a:spcPct val="100000"/>
-                        </a:lnSpc>
-                        <a:spcBef>
-                          <a:spcPct val="20000"/>
-                        </a:spcBef>
-                        <a:spcAft>
-                          <a:spcPct val="0"/>
-                        </a:spcAft>
-                        <a:buClr>
-                          <a:schemeClr val="tx1"/>
-                        </a:buClr>
-                        <a:buSzTx/>
-                        <a:buFont typeface="Wingdings" pitchFamily="2" charset="2"/>
-                        <a:buNone/>
-                        <a:tabLst/>
-                      </a:pPr>
-                      <a:endParaRPr kumimoji="0" lang="en-US" altLang="en-US" sz="900" b="0" i="0" u="none" strike="noStrike" cap="none" normalizeH="0" baseline="0" dirty="0" smtClean="0">
-                        <a:ln>
-                          <a:noFill/>
-                        </a:ln>
-                        <a:solidFill>
-                          <a:schemeClr val="tx1"/>
-                        </a:solidFill>
-                        <a:effectLst/>
-                        <a:latin typeface="Arial" charset="0"/>
-                        <a:cs typeface="Arial" charset="0"/>
-                      </a:endParaRPr>
-                    </a:p>
-                  </a:txBody>
-                  <a:tcPr marT="45747" marB="45747" horzOverflow="overflow">
-                    <a:lnL w="12700" cap="flat" cmpd="sng" algn="ctr">
-                      <a:solidFill>
-                        <a:schemeClr val="tx1"/>
-                      </a:solidFill>
-                      <a:prstDash val="solid"/>
-                      <a:round/>
-                      <a:headEnd type="none" w="med" len="med"/>
-                      <a:tailEnd type="none" w="med" len="med"/>
-                    </a:lnL>
-                    <a:lnR w="12700" cap="flat" cmpd="sng" algn="ctr">
-                      <a:solidFill>
-                        <a:schemeClr val="tx1"/>
-                      </a:solidFill>
-                      <a:prstDash val="solid"/>
-                      <a:round/>
-                      <a:headEnd type="none" w="med" len="med"/>
-                      <a:tailEnd type="none" w="med" len="med"/>
-                    </a:lnR>
-                    <a:lnT w="12700" cap="flat" cmpd="sng" algn="ctr">
-                      <a:solidFill>
-                        <a:schemeClr val="tx1"/>
-                      </a:solidFill>
-                      <a:prstDash val="solid"/>
-                      <a:round/>
-                      <a:headEnd type="none" w="med" len="med"/>
-                      <a:tailEnd type="none" w="med" len="med"/>
-                    </a:lnT>
-                    <a:lnB w="12700" cap="flat" cmpd="sng" algn="ctr">
-                      <a:solidFill>
-                        <a:schemeClr val="tx1"/>
-                      </a:solidFill>
-                      <a:prstDash val="solid"/>
-                      <a:round/>
-                      <a:headEnd type="none" w="med" len="med"/>
-                      <a:tailEnd type="none" w="med" len="med"/>
-                    </a:lnB>
-                    <a:lnTlToBr>
-                      <a:noFill/>
-                    </a:lnTlToBr>
-                    <a:lnBlToTr>
-                      <a:noFill/>
-                    </a:lnBlToTr>
-                    <a:noFill/>
-                  </a:tcPr>
-                </a:tc>
-                <a:tc hMerge="1">
-                  <a:txBody>
-                    <a:bodyPr/>
-                    <a:lstStyle/>
-                    <a:p>
-                      <a:endParaRPr lang="en-US"/>
-                    </a:p>
-                  </a:txBody>
-                  <a:tcPr/>
-                </a:tc>
-                <a:tc>
-                  <a:txBody>
-                    <a:bodyPr/>
-                    <a:lstStyle/>
-                    <a:p>
-                      <a:endParaRPr lang="en-US" sz="900" dirty="0"/>
-                    </a:p>
-                  </a:txBody>
-                  <a:tcPr marT="45747" marB="45747" horzOverflow="overflow">
-                    <a:lnL w="12700" cap="flat" cmpd="sng" algn="ctr">
-                      <a:solidFill>
-                        <a:schemeClr val="tx1"/>
-                      </a:solidFill>
-                      <a:prstDash val="solid"/>
-                      <a:round/>
-                      <a:headEnd type="none" w="med" len="med"/>
-                      <a:tailEnd type="none" w="med" len="med"/>
-                    </a:lnL>
-                    <a:lnR w="12700" cap="flat" cmpd="sng" algn="ctr">
-                      <a:solidFill>
-                        <a:schemeClr val="tx1"/>
-                      </a:solidFill>
-                      <a:prstDash val="solid"/>
-                      <a:round/>
-                      <a:headEnd type="none" w="med" len="med"/>
-                      <a:tailEnd type="none" w="med" len="med"/>
-                    </a:lnR>
-                    <a:lnT w="12700" cap="flat" cmpd="sng" algn="ctr">
-                      <a:solidFill>
-                        <a:schemeClr val="tx1"/>
-                      </a:solidFill>
-                      <a:prstDash val="solid"/>
-                      <a:round/>
-                      <a:headEnd type="none" w="med" len="med"/>
-                      <a:tailEnd type="none" w="med" len="med"/>
-                    </a:lnT>
-                    <a:lnB w="12700" cap="flat" cmpd="sng" algn="ctr">
-                      <a:solidFill>
-                        <a:schemeClr val="tx1"/>
-                      </a:solidFill>
-                      <a:prstDash val="solid"/>
-                      <a:round/>
-                      <a:headEnd type="none" w="med" len="med"/>
-                      <a:tailEnd type="none" w="med" len="med"/>
-                    </a:lnB>
-                    <a:lnTlToBr>
-                      <a:noFill/>
-                    </a:lnTlToBr>
-                    <a:lnBlToTr>
-                      <a:noFill/>
-                    </a:lnBlToTr>
-                    <a:noFill/>
-                  </a:tcPr>
-                </a:tc>
-                <a:tc>
-                  <a:txBody>
-                    <a:bodyPr/>
-                    <a:lstStyle/>
-                    <a:p>
-                      <a:endParaRPr lang="en-US" sz="900" dirty="0" smtClean="0"/>
                     </a:p>
                   </a:txBody>
                   <a:tcPr marT="45747" marB="45747" horzOverflow="overflow">
@@ -13863,213 +13693,6 @@
                         <a:buNone/>
                         <a:tabLst/>
                       </a:pPr>
-                      <a:endParaRPr kumimoji="0" lang="en-US" altLang="en-US" sz="900" b="0" i="0" u="none" strike="noStrike" cap="none" normalizeH="0" baseline="0" dirty="0" smtClean="0">
-                        <a:ln>
-                          <a:noFill/>
-                        </a:ln>
-                        <a:solidFill>
-                          <a:schemeClr val="tx1"/>
-                        </a:solidFill>
-                        <a:effectLst/>
-                        <a:latin typeface="Arial" charset="0"/>
-                        <a:cs typeface="Arial" charset="0"/>
-                      </a:endParaRPr>
-                    </a:p>
-                  </a:txBody>
-                  <a:tcPr marT="45747" marB="45747" horzOverflow="overflow">
-                    <a:lnL w="12700" cap="flat" cmpd="sng" algn="ctr">
-                      <a:solidFill>
-                        <a:schemeClr val="tx1"/>
-                      </a:solidFill>
-                      <a:prstDash val="solid"/>
-                      <a:round/>
-                      <a:headEnd type="none" w="med" len="med"/>
-                      <a:tailEnd type="none" w="med" len="med"/>
-                    </a:lnL>
-                    <a:lnR w="12700" cap="flat" cmpd="sng" algn="ctr">
-                      <a:solidFill>
-                        <a:schemeClr val="tx1"/>
-                      </a:solidFill>
-                      <a:prstDash val="solid"/>
-                      <a:round/>
-                      <a:headEnd type="none" w="med" len="med"/>
-                      <a:tailEnd type="none" w="med" len="med"/>
-                    </a:lnR>
-                    <a:lnT w="12700" cap="flat" cmpd="sng" algn="ctr">
-                      <a:solidFill>
-                        <a:schemeClr val="tx1"/>
-                      </a:solidFill>
-                      <a:prstDash val="solid"/>
-                      <a:round/>
-                      <a:headEnd type="none" w="med" len="med"/>
-                      <a:tailEnd type="none" w="med" len="med"/>
-                    </a:lnT>
-                    <a:lnB w="12700" cap="flat" cmpd="sng" algn="ctr">
-                      <a:solidFill>
-                        <a:schemeClr val="tx1"/>
-                      </a:solidFill>
-                      <a:prstDash val="solid"/>
-                      <a:round/>
-                      <a:headEnd type="none" w="med" len="med"/>
-                      <a:tailEnd type="none" w="med" len="med"/>
-                    </a:lnB>
-                    <a:lnTlToBr>
-                      <a:noFill/>
-                    </a:lnTlToBr>
-                    <a:lnBlToTr>
-                      <a:noFill/>
-                    </a:lnBlToTr>
-                    <a:solidFill>
-                      <a:schemeClr val="bg1"/>
-                    </a:solidFill>
-                  </a:tcPr>
-                </a:tc>
-                <a:tc gridSpan="2">
-                  <a:txBody>
-                    <a:bodyPr/>
-                    <a:lstStyle/>
-                    <a:p>
-                      <a:pPr marL="0" marR="0" lvl="0" indent="0" algn="l" defTabSz="914400" rtl="0" eaLnBrk="1" fontAlgn="base" latinLnBrk="0" hangingPunct="1">
-                        <a:lnSpc>
-                          <a:spcPct val="100000"/>
-                        </a:lnSpc>
-                        <a:spcBef>
-                          <a:spcPct val="20000"/>
-                        </a:spcBef>
-                        <a:spcAft>
-                          <a:spcPct val="0"/>
-                        </a:spcAft>
-                        <a:buClr>
-                          <a:schemeClr val="tx1"/>
-                        </a:buClr>
-                        <a:buSzTx/>
-                        <a:buFont typeface="Wingdings" pitchFamily="2" charset="2"/>
-                        <a:buNone/>
-                        <a:tabLst/>
-                        <a:defRPr/>
-                      </a:pPr>
-                      <a:endParaRPr kumimoji="0" lang="en-US" altLang="en-US" sz="900" b="0" i="0" u="none" strike="noStrike" cap="none" normalizeH="0" baseline="0" dirty="0" smtClean="0">
-                        <a:ln>
-                          <a:noFill/>
-                        </a:ln>
-                        <a:solidFill>
-                          <a:schemeClr val="tx1"/>
-                        </a:solidFill>
-                        <a:effectLst/>
-                        <a:latin typeface="Arial" charset="0"/>
-                        <a:cs typeface="Arial" charset="0"/>
-                      </a:endParaRPr>
-                    </a:p>
-                  </a:txBody>
-                  <a:tcPr marT="45747" marB="45747" horzOverflow="overflow">
-                    <a:lnL w="12700" cap="flat" cmpd="sng" algn="ctr">
-                      <a:solidFill>
-                        <a:schemeClr val="tx1"/>
-                      </a:solidFill>
-                      <a:prstDash val="solid"/>
-                      <a:round/>
-                      <a:headEnd type="none" w="med" len="med"/>
-                      <a:tailEnd type="none" w="med" len="med"/>
-                    </a:lnL>
-                    <a:lnR w="12700" cap="flat" cmpd="sng" algn="ctr">
-                      <a:solidFill>
-                        <a:schemeClr val="tx1"/>
-                      </a:solidFill>
-                      <a:prstDash val="solid"/>
-                      <a:round/>
-                      <a:headEnd type="none" w="med" len="med"/>
-                      <a:tailEnd type="none" w="med" len="med"/>
-                    </a:lnR>
-                    <a:lnT w="12700" cap="flat" cmpd="sng" algn="ctr">
-                      <a:solidFill>
-                        <a:schemeClr val="tx1"/>
-                      </a:solidFill>
-                      <a:prstDash val="solid"/>
-                      <a:round/>
-                      <a:headEnd type="none" w="med" len="med"/>
-                      <a:tailEnd type="none" w="med" len="med"/>
-                    </a:lnT>
-                    <a:lnB w="12700" cap="flat" cmpd="sng" algn="ctr">
-                      <a:solidFill>
-                        <a:schemeClr val="tx1"/>
-                      </a:solidFill>
-                      <a:prstDash val="solid"/>
-                      <a:round/>
-                      <a:headEnd type="none" w="med" len="med"/>
-                      <a:tailEnd type="none" w="med" len="med"/>
-                    </a:lnB>
-                    <a:solidFill>
-                      <a:schemeClr val="bg1"/>
-                    </a:solidFill>
-                  </a:tcPr>
-                </a:tc>
-                <a:tc hMerge="1">
-                  <a:txBody>
-                    <a:bodyPr/>
-                    <a:lstStyle/>
-                    <a:p>
-                      <a:endParaRPr lang="en-US"/>
-                    </a:p>
-                  </a:txBody>
-                  <a:tcPr/>
-                </a:tc>
-                <a:tc>
-                  <a:txBody>
-                    <a:bodyPr/>
-                    <a:lstStyle/>
-                    <a:p>
-                      <a:endParaRPr lang="en-US" sz="900" dirty="0"/>
-                    </a:p>
-                  </a:txBody>
-                  <a:tcPr marT="45747" marB="45747" horzOverflow="overflow">
-                    <a:lnL w="12700" cap="flat" cmpd="sng" algn="ctr">
-                      <a:solidFill>
-                        <a:schemeClr val="tx1"/>
-                      </a:solidFill>
-                      <a:prstDash val="solid"/>
-                      <a:round/>
-                      <a:headEnd type="none" w="med" len="med"/>
-                      <a:tailEnd type="none" w="med" len="med"/>
-                    </a:lnL>
-                    <a:lnR w="12700" cap="flat" cmpd="sng" algn="ctr">
-                      <a:solidFill>
-                        <a:schemeClr val="tx1"/>
-                      </a:solidFill>
-                      <a:prstDash val="solid"/>
-                      <a:round/>
-                      <a:headEnd type="none" w="med" len="med"/>
-                      <a:tailEnd type="none" w="med" len="med"/>
-                    </a:lnR>
-                    <a:solidFill>
-                      <a:schemeClr val="bg1"/>
-                    </a:solidFill>
-                  </a:tcPr>
-                </a:tc>
-              </a:tr>
-              <a:tr h="218233">
-                <a:tc>
-                  <a:txBody>
-                    <a:bodyPr/>
-                    <a:lstStyle/>
-                    <a:p>
-                      <a:pPr marL="0" marR="0" lvl="0" indent="0" algn="l" defTabSz="914400" rtl="0" eaLnBrk="1" fontAlgn="base" latinLnBrk="0" hangingPunct="1">
-                        <a:lnSpc>
-                          <a:spcPct val="100000"/>
-                        </a:lnSpc>
-                        <a:spcBef>
-                          <a:spcPct val="20000"/>
-                        </a:spcBef>
-                        <a:spcAft>
-                          <a:spcPct val="0"/>
-                        </a:spcAft>
-                        <a:buClr>
-                          <a:schemeClr val="tx1"/>
-                        </a:buClr>
-                        <a:buSzTx/>
-                        <a:buFont typeface="Wingdings" pitchFamily="2" charset="2"/>
-                        <a:buNone/>
-                        <a:tabLst/>
-                      </a:pPr>
                       <a:r>
                         <a:rPr kumimoji="0" lang="en-US" altLang="en-US" sz="900" b="0" i="0" u="none" strike="noStrike" cap="none" normalizeH="0" baseline="0" dirty="0" smtClean="0">
                           <a:ln>
@@ -14585,37 +14208,8 @@
                           <a:latin typeface="Arial"/>
                           <a:cs typeface="Arial"/>
                         </a:rPr>
-                        <a:t>, </a:t>
+                        <a:t>, Pig</a:t>
                       </a:r>
-                      <a:r>
-                        <a:rPr kumimoji="0" lang="en-US" altLang="en-US" sz="1100" b="0" i="0" u="none" strike="noStrike" kern="1200" cap="none" spc="0" normalizeH="0" baseline="0" noProof="0" dirty="0" smtClean="0">
-                          <a:ln>
-                            <a:noFill/>
-                          </a:ln>
-                          <a:solidFill>
-                            <a:srgbClr val="000000"/>
-                          </a:solidFill>
-                          <a:effectLst/>
-                          <a:uLnTx/>
-                          <a:uFillTx/>
-                          <a:latin typeface="Arial"/>
-                          <a:cs typeface="Arial"/>
-                        </a:rPr>
-                        <a:t>Pig</a:t>
-                      </a:r>
-                      <a:endParaRPr kumimoji="0" lang="en-US" altLang="en-US" sz="1100" b="0" i="0" u="none" strike="noStrike" kern="1200" cap="none" spc="0" normalizeH="0" baseline="0" noProof="0" dirty="0" smtClean="0">
-                        <a:ln>
-                          <a:noFill/>
-                        </a:ln>
-                        <a:solidFill>
-                          <a:srgbClr val="000000"/>
-                        </a:solidFill>
-                        <a:effectLst/>
-                        <a:uLnTx/>
-                        <a:uFillTx/>
-                        <a:latin typeface="Arial"/>
-                        <a:cs typeface="Arial"/>
-                      </a:endParaRPr>
                     </a:p>
                   </a:txBody>
                   <a:tcPr marT="45747" marB="45747" horzOverflow="overflow">

</xml_diff>